<commit_message>
Update ML Lab, Add AutoML
</commit_message>
<xml_diff>
--- a/3 - Machine Learning/MachineLearning.pptx
+++ b/3 - Machine Learning/MachineLearning.pptx
@@ -5,7 +5,7 @@
     <p:sldMasterId id="2147483659" r:id="rId1"/>
   </p:sldMasterIdLst>
   <p:notesMasterIdLst>
-    <p:notesMasterId r:id="rId30"/>
+    <p:notesMasterId r:id="rId32"/>
   </p:notesMasterIdLst>
   <p:sldIdLst>
     <p:sldId id="256" r:id="rId2"/>
@@ -36,41 +36,43 @@
     <p:sldId id="458" r:id="rId27"/>
     <p:sldId id="461" r:id="rId28"/>
     <p:sldId id="459" r:id="rId29"/>
+    <p:sldId id="462" r:id="rId30"/>
+    <p:sldId id="463" r:id="rId31"/>
   </p:sldIdLst>
   <p:sldSz cx="9144000" cy="5143500" type="screen16x9"/>
   <p:notesSz cx="6858000" cy="9144000"/>
   <p:embeddedFontLst>
     <p:embeddedFont>
       <p:font typeface="Cambria Math" panose="02040503050406030204" pitchFamily="18" charset="0"/>
-      <p:regular r:id="rId31"/>
+      <p:regular r:id="rId33"/>
     </p:embeddedFont>
     <p:embeddedFont>
       <p:font typeface="Consolas" panose="020B0609020204030204" pitchFamily="49" charset="0"/>
-      <p:regular r:id="rId32"/>
-      <p:bold r:id="rId33"/>
-      <p:italic r:id="rId34"/>
-      <p:boldItalic r:id="rId35"/>
+      <p:regular r:id="rId34"/>
+      <p:bold r:id="rId35"/>
+      <p:italic r:id="rId36"/>
+      <p:boldItalic r:id="rId37"/>
     </p:embeddedFont>
     <p:embeddedFont>
-      <p:font typeface="Lato" panose="020B0604020202020204" charset="0"/>
-      <p:regular r:id="rId36"/>
-      <p:bold r:id="rId37"/>
-      <p:italic r:id="rId38"/>
-      <p:boldItalic r:id="rId39"/>
+      <p:font typeface="Lato" panose="020F0502020204030203" pitchFamily="34" charset="0"/>
+      <p:regular r:id="rId38"/>
+      <p:bold r:id="rId39"/>
+      <p:italic r:id="rId40"/>
+      <p:boldItalic r:id="rId41"/>
     </p:embeddedFont>
     <p:embeddedFont>
       <p:font typeface="Raleway" panose="020B0604020202020204" charset="0"/>
-      <p:regular r:id="rId40"/>
-      <p:bold r:id="rId41"/>
-      <p:italic r:id="rId42"/>
-      <p:boldItalic r:id="rId43"/>
+      <p:regular r:id="rId42"/>
+      <p:bold r:id="rId43"/>
+      <p:italic r:id="rId44"/>
+      <p:boldItalic r:id="rId45"/>
     </p:embeddedFont>
     <p:embeddedFont>
       <p:font typeface="Segoe UI" panose="020B0502040204020203" pitchFamily="34" charset="0"/>
-      <p:regular r:id="rId44"/>
-      <p:bold r:id="rId45"/>
-      <p:italic r:id="rId46"/>
-      <p:boldItalic r:id="rId47"/>
+      <p:regular r:id="rId46"/>
+      <p:bold r:id="rId47"/>
+      <p:italic r:id="rId48"/>
+      <p:boldItalic r:id="rId49"/>
     </p:embeddedFont>
   </p:embeddedFontLst>
   <p:defaultTextStyle>
@@ -6615,7 +6617,7 @@
           <a:p>
             <a:fld id="{123CBCE9-0914-4950-A986-7596C92667F1}" type="datetime1">
               <a:rPr lang="en-US" smtClean="0"/>
-              <a:t>2/13/2019</a:t>
+              <a:t>9/11/2019</a:t>
             </a:fld>
             <a:endParaRPr lang="en-US"/>
           </a:p>
@@ -8230,7 +8232,7 @@
             </a:pPr>
             <a:r>
               <a:rPr lang="en" dirty="0"/>
-              <a:t>DSBA 6190-U91 | Colby T. Ford, Ph.D.</a:t>
+              <a:t>DSBA 6190-U90 | Colby T. Ford, Ph.D.</a:t>
             </a:r>
             <a:endParaRPr dirty="0"/>
           </a:p>
@@ -11463,7 +11465,7 @@
           <a:graphicData uri="http://schemas.openxmlformats.org/presentationml/2006/ole">
             <mc:AlternateContent xmlns:mc="http://schemas.openxmlformats.org/markup-compatibility/2006">
               <mc:Choice xmlns:v="urn:schemas-microsoft-com:vml" Requires="v">
-                <p:oleObj spid="_x0000_s1070" name="Equation" r:id="rId3" imgW="1333440" imgH="457200" progId="Equation.3">
+                <p:oleObj spid="_x0000_s1076" name="Equation" r:id="rId3" imgW="1333440" imgH="457200" progId="Equation.3">
                   <p:embed/>
                 </p:oleObj>
               </mc:Choice>
@@ -11859,7 +11861,7 @@
           <a:graphicData uri="http://schemas.openxmlformats.org/presentationml/2006/ole">
             <mc:AlternateContent xmlns:mc="http://schemas.openxmlformats.org/markup-compatibility/2006">
               <mc:Choice xmlns:v="urn:schemas-microsoft-com:vml" Requires="v">
-                <p:oleObj spid="_x0000_s1071" name="Equation" r:id="rId5" imgW="1180800" imgH="431640" progId="Equation.3">
+                <p:oleObj spid="_x0000_s1077" name="Equation" r:id="rId5" imgW="1180800" imgH="431640" progId="Equation.3">
                   <p:embed/>
                 </p:oleObj>
               </mc:Choice>
@@ -12241,7 +12243,7 @@
           <a:graphicData uri="http://schemas.openxmlformats.org/presentationml/2006/ole">
             <mc:AlternateContent xmlns:mc="http://schemas.openxmlformats.org/markup-compatibility/2006">
               <mc:Choice xmlns:v="urn:schemas-microsoft-com:vml" Requires="v">
-                <p:oleObj spid="_x0000_s2094" name="Equation" r:id="rId3" imgW="1498320" imgH="482400" progId="Equation.3">
+                <p:oleObj spid="_x0000_s2100" name="Equation" r:id="rId3" imgW="1498320" imgH="482400" progId="Equation.3">
                   <p:embed/>
                 </p:oleObj>
               </mc:Choice>
@@ -12313,7 +12315,7 @@
           <a:graphicData uri="http://schemas.openxmlformats.org/presentationml/2006/ole">
             <mc:AlternateContent xmlns:mc="http://schemas.openxmlformats.org/markup-compatibility/2006">
               <mc:Choice xmlns:v="urn:schemas-microsoft-com:vml" Requires="v">
-                <p:oleObj spid="_x0000_s2095" name="Equation" r:id="rId5" imgW="1663560" imgH="444240" progId="Equation.3">
+                <p:oleObj spid="_x0000_s2101" name="Equation" r:id="rId5" imgW="1663560" imgH="444240" progId="Equation.3">
                   <p:embed/>
                 </p:oleObj>
               </mc:Choice>
@@ -12661,8 +12663,8 @@
         </p:nvSpPr>
         <p:spPr>
           <a:xfrm>
-            <a:off x="4939500" y="200722"/>
-            <a:ext cx="3837000" cy="4218578"/>
+            <a:off x="4939500" y="394854"/>
+            <a:ext cx="3837000" cy="3719945"/>
           </a:xfrm>
           <a:prstGeom prst="rect">
             <a:avLst/>
@@ -12681,7 +12683,7 @@
               <a:buNone/>
             </a:pPr>
             <a:r>
-              <a:rPr lang="en-US" b="1" dirty="0"/>
+              <a:rPr lang="en-US" sz="1400" b="1" dirty="0"/>
               <a:t>Intro to Machine Learning</a:t>
             </a:r>
           </a:p>
@@ -12690,7 +12692,7 @@
               <a:buNone/>
             </a:pPr>
             <a:r>
-              <a:rPr lang="en-US" b="1" dirty="0"/>
+              <a:rPr lang="en-US" sz="1400" b="1" dirty="0"/>
               <a:t>Machine Learning in the Cloud</a:t>
             </a:r>
           </a:p>
@@ -12699,7 +12701,7 @@
               <a:buNone/>
             </a:pPr>
             <a:r>
-              <a:rPr lang="en-US" b="1" dirty="0"/>
+              <a:rPr lang="en-US" sz="1400" b="1" dirty="0"/>
               <a:t>Cognitive Services</a:t>
             </a:r>
           </a:p>
@@ -12711,28 +12713,28 @@
               <a:buNone/>
             </a:pPr>
             <a:r>
-              <a:rPr lang="en-US" b="1" dirty="0"/>
+              <a:rPr lang="en-US" sz="1400" b="1" dirty="0"/>
               <a:t>Basics of Algorithms</a:t>
             </a:r>
           </a:p>
           <a:p>
             <a:pPr marL="285750" indent="-285750"/>
             <a:r>
-              <a:rPr lang="en-US" b="1" dirty="0"/>
+              <a:rPr lang="en-US" sz="1400" b="1" dirty="0"/>
               <a:t>Regression</a:t>
             </a:r>
           </a:p>
           <a:p>
             <a:pPr marL="285750" indent="-285750"/>
             <a:r>
-              <a:rPr lang="en-US" b="1" dirty="0"/>
+              <a:rPr lang="en-US" sz="1400" b="1" dirty="0"/>
               <a:t>Classification</a:t>
             </a:r>
           </a:p>
           <a:p>
             <a:pPr marL="285750" indent="-285750"/>
             <a:r>
-              <a:rPr lang="en-US" b="1" dirty="0"/>
+              <a:rPr lang="en-US" sz="1400" b="1" dirty="0"/>
               <a:t>Clustering</a:t>
             </a:r>
           </a:p>
@@ -12744,30 +12746,44 @@
               <a:buNone/>
             </a:pPr>
             <a:r>
-              <a:rPr lang="en-US" b="1" dirty="0"/>
+              <a:rPr lang="en-US" sz="1400" b="1" dirty="0"/>
               <a:t>Scaling Up with Parallelization</a:t>
             </a:r>
           </a:p>
           <a:p>
             <a:pPr marL="285750" indent="-285750"/>
             <a:r>
-              <a:rPr lang="en-US" b="1" dirty="0"/>
+              <a:rPr lang="en-US" sz="1400" b="1" dirty="0"/>
               <a:t>Training</a:t>
             </a:r>
           </a:p>
           <a:p>
             <a:pPr marL="285750" indent="-285750"/>
             <a:r>
-              <a:rPr lang="en-US" b="1" dirty="0"/>
+              <a:rPr lang="en-US" sz="1400" b="1" dirty="0"/>
               <a:t>Cross-Validation</a:t>
             </a:r>
           </a:p>
           <a:p>
             <a:pPr marL="285750" indent="-285750"/>
             <a:r>
-              <a:rPr lang="en-US" b="1" dirty="0"/>
+              <a:rPr lang="en-US" sz="1400" b="1" dirty="0"/>
               <a:t>Parameter Tuning</a:t>
             </a:r>
+          </a:p>
+          <a:p>
+            <a:pPr marL="285750" indent="-285750"/>
+            <a:endParaRPr lang="en-US" sz="1400" b="1" dirty="0"/>
+          </a:p>
+          <a:p>
+            <a:pPr marL="0" indent="0">
+              <a:buNone/>
+            </a:pPr>
+            <a:r>
+              <a:rPr lang="en-US" sz="1400" b="1" dirty="0" err="1"/>
+              <a:t>AutoML</a:t>
+            </a:r>
+            <a:endParaRPr lang="en-US" sz="1400" b="1" dirty="0"/>
           </a:p>
         </p:txBody>
       </p:sp>
@@ -20761,8 +20777,8 @@
           </p:sp>
         </mc:Fallback>
       </mc:AlternateContent>
-      <mc:AlternateContent xmlns:mc="http://schemas.openxmlformats.org/markup-compatibility/2006">
-        <mc:Choice xmlns:a14="http://schemas.microsoft.com/office/drawing/2010/main" Requires="a14">
+      <mc:AlternateContent xmlns:mc="http://schemas.openxmlformats.org/markup-compatibility/2006" xmlns:a14="http://schemas.microsoft.com/office/drawing/2010/main">
+        <mc:Choice Requires="a14">
           <p:sp>
             <p:nvSpPr>
               <p:cNvPr id="5" name="TextBox 4">
@@ -21054,7 +21070,7 @@
             </p:txBody>
           </p:sp>
         </mc:Choice>
-        <mc:Fallback>
+        <mc:Fallback xmlns="">
           <p:sp>
             <p:nvSpPr>
               <p:cNvPr id="5" name="TextBox 4">
@@ -21997,6 +22013,1267 @@
 </p:sld>
 </file>
 
+<file path=ppt/slides/slide29.xml><?xml version="1.0" encoding="utf-8"?>
+<p:sld xmlns:a="http://schemas.openxmlformats.org/drawingml/2006/main" xmlns:r="http://schemas.openxmlformats.org/officeDocument/2006/relationships" xmlns:p="http://schemas.openxmlformats.org/presentationml/2006/main">
+  <p:cSld>
+    <p:spTree>
+      <p:nvGrpSpPr>
+        <p:cNvPr id="1" name=""/>
+        <p:cNvGrpSpPr/>
+        <p:nvPr/>
+      </p:nvGrpSpPr>
+      <p:grpSpPr>
+        <a:xfrm>
+          <a:off x="0" y="0"/>
+          <a:ext cx="0" cy="0"/>
+          <a:chOff x="0" y="0"/>
+          <a:chExt cx="0" cy="0"/>
+        </a:xfrm>
+      </p:grpSpPr>
+      <p:sp>
+        <p:nvSpPr>
+          <p:cNvPr id="2" name="Title 1">
+            <a:extLst>
+              <a:ext uri="{FF2B5EF4-FFF2-40B4-BE49-F238E27FC236}">
+                <a16:creationId xmlns:a16="http://schemas.microsoft.com/office/drawing/2014/main" id="{B2E6EB5F-C563-4961-BA02-2702B9C5AF3C}"/>
+              </a:ext>
+            </a:extLst>
+          </p:cNvPr>
+          <p:cNvSpPr>
+            <a:spLocks noGrp="1"/>
+          </p:cNvSpPr>
+          <p:nvPr>
+            <p:ph type="title"/>
+          </p:nvPr>
+        </p:nvSpPr>
+        <p:spPr>
+          <a:xfrm>
+            <a:off x="319500" y="180900"/>
+            <a:ext cx="2808000" cy="755700"/>
+          </a:xfrm>
+        </p:spPr>
+        <p:txBody>
+          <a:bodyPr/>
+          <a:lstStyle/>
+          <a:p>
+            <a:r>
+              <a:rPr lang="en-US" dirty="0" err="1"/>
+              <a:t>AutoML</a:t>
+            </a:r>
+            <a:endParaRPr lang="en-US" dirty="0"/>
+          </a:p>
+        </p:txBody>
+      </p:sp>
+      <p:sp>
+        <p:nvSpPr>
+          <p:cNvPr id="3" name="Text Placeholder 2">
+            <a:extLst>
+              <a:ext uri="{FF2B5EF4-FFF2-40B4-BE49-F238E27FC236}">
+                <a16:creationId xmlns:a16="http://schemas.microsoft.com/office/drawing/2014/main" id="{0A6D9E67-C183-48CE-A744-2C8AB740048D}"/>
+              </a:ext>
+            </a:extLst>
+          </p:cNvPr>
+          <p:cNvSpPr>
+            <a:spLocks noGrp="1"/>
+          </p:cNvSpPr>
+          <p:nvPr>
+            <p:ph type="body" idx="1"/>
+          </p:nvPr>
+        </p:nvSpPr>
+        <p:spPr>
+          <a:xfrm>
+            <a:off x="319499" y="936600"/>
+            <a:ext cx="3552845" cy="3716404"/>
+          </a:xfrm>
+        </p:spPr>
+        <p:txBody>
+          <a:bodyPr/>
+          <a:lstStyle/>
+          <a:p>
+            <a:pPr>
+              <a:spcBef>
+                <a:spcPts val="600"/>
+              </a:spcBef>
+            </a:pPr>
+            <a:r>
+              <a:rPr lang="en-US" dirty="0"/>
+              <a:t>Automatically test various algorithms, hyperparameters, and scaling techniques</a:t>
+            </a:r>
+          </a:p>
+          <a:p>
+            <a:pPr>
+              <a:spcBef>
+                <a:spcPts val="600"/>
+              </a:spcBef>
+            </a:pPr>
+            <a:r>
+              <a:rPr lang="en-US" dirty="0"/>
+              <a:t>Three Experiment Types:</a:t>
+            </a:r>
+          </a:p>
+          <a:p>
+            <a:pPr lvl="1">
+              <a:spcBef>
+                <a:spcPts val="600"/>
+              </a:spcBef>
+            </a:pPr>
+            <a:r>
+              <a:rPr lang="en-US" dirty="0"/>
+              <a:t>Classification</a:t>
+            </a:r>
+          </a:p>
+          <a:p>
+            <a:pPr lvl="1">
+              <a:spcBef>
+                <a:spcPts val="600"/>
+              </a:spcBef>
+            </a:pPr>
+            <a:r>
+              <a:rPr lang="en-US" dirty="0"/>
+              <a:t>Regression</a:t>
+            </a:r>
+          </a:p>
+          <a:p>
+            <a:pPr lvl="1">
+              <a:spcBef>
+                <a:spcPts val="600"/>
+              </a:spcBef>
+            </a:pPr>
+            <a:r>
+              <a:rPr lang="en-US" dirty="0"/>
+              <a:t>Forecasting</a:t>
+            </a:r>
+          </a:p>
+          <a:p>
+            <a:pPr>
+              <a:spcBef>
+                <a:spcPts val="600"/>
+              </a:spcBef>
+            </a:pPr>
+            <a:r>
+              <a:rPr lang="en-US" dirty="0"/>
+              <a:t>Steps:</a:t>
+            </a:r>
+          </a:p>
+          <a:p>
+            <a:pPr lvl="1">
+              <a:spcBef>
+                <a:spcPts val="600"/>
+              </a:spcBef>
+            </a:pPr>
+            <a:r>
+              <a:rPr lang="en-US" dirty="0"/>
+              <a:t>Preprocessing &amp; Scaling</a:t>
+            </a:r>
+          </a:p>
+          <a:p>
+            <a:pPr lvl="1">
+              <a:spcBef>
+                <a:spcPts val="600"/>
+              </a:spcBef>
+            </a:pPr>
+            <a:r>
+              <a:rPr lang="en-US" dirty="0"/>
+              <a:t>Featurization</a:t>
+            </a:r>
+          </a:p>
+          <a:p>
+            <a:pPr lvl="1">
+              <a:spcBef>
+                <a:spcPts val="600"/>
+              </a:spcBef>
+            </a:pPr>
+            <a:r>
+              <a:rPr lang="en-US" dirty="0"/>
+              <a:t>Cross-Validation</a:t>
+            </a:r>
+          </a:p>
+          <a:p>
+            <a:pPr lvl="1">
+              <a:spcBef>
+                <a:spcPts val="600"/>
+              </a:spcBef>
+            </a:pPr>
+            <a:r>
+              <a:rPr lang="en-US" dirty="0" err="1"/>
+              <a:t>Ensembling</a:t>
+            </a:r>
+            <a:endParaRPr lang="en-US" dirty="0"/>
+          </a:p>
+          <a:p>
+            <a:pPr lvl="1">
+              <a:spcBef>
+                <a:spcPts val="600"/>
+              </a:spcBef>
+            </a:pPr>
+            <a:endParaRPr lang="en-US" dirty="0"/>
+          </a:p>
+        </p:txBody>
+      </p:sp>
+      <p:graphicFrame>
+        <p:nvGraphicFramePr>
+          <p:cNvPr id="4" name="Table 3">
+            <a:extLst>
+              <a:ext uri="{FF2B5EF4-FFF2-40B4-BE49-F238E27FC236}">
+                <a16:creationId xmlns:a16="http://schemas.microsoft.com/office/drawing/2014/main" id="{287E4274-7456-4C85-ACEB-DF88F6F79EF5}"/>
+              </a:ext>
+            </a:extLst>
+          </p:cNvPr>
+          <p:cNvGraphicFramePr>
+            <a:graphicFrameLocks noGrp="1"/>
+          </p:cNvGraphicFramePr>
+          <p:nvPr>
+            <p:extLst>
+              <p:ext uri="{D42A27DB-BD31-4B8C-83A1-F6EECF244321}">
+                <p14:modId xmlns:p14="http://schemas.microsoft.com/office/powerpoint/2010/main" val="2433286491"/>
+              </p:ext>
+            </p:extLst>
+          </p:nvPr>
+        </p:nvGraphicFramePr>
+        <p:xfrm>
+          <a:off x="3817974" y="640146"/>
+          <a:ext cx="4865759" cy="3585984"/>
+        </p:xfrm>
+        <a:graphic>
+          <a:graphicData uri="http://schemas.openxmlformats.org/drawingml/2006/table">
+            <a:tbl>
+              <a:tblPr/>
+              <a:tblGrid>
+                <a:gridCol w="2418557">
+                  <a:extLst>
+                    <a:ext uri="{9D8B030D-6E8A-4147-A177-3AD203B41FA5}">
+                      <a16:colId xmlns:a16="http://schemas.microsoft.com/office/drawing/2014/main" val="1089580484"/>
+                    </a:ext>
+                  </a:extLst>
+                </a:gridCol>
+                <a:gridCol w="2447202">
+                  <a:extLst>
+                    <a:ext uri="{9D8B030D-6E8A-4147-A177-3AD203B41FA5}">
+                      <a16:colId xmlns:a16="http://schemas.microsoft.com/office/drawing/2014/main" val="1382446080"/>
+                    </a:ext>
+                  </a:extLst>
+                </a:gridCol>
+              </a:tblGrid>
+              <a:tr h="178790">
+                <a:tc>
+                  <a:txBody>
+                    <a:bodyPr/>
+                    <a:lstStyle/>
+                    <a:p>
+                      <a:pPr algn="ctr"/>
+                      <a:r>
+                        <a:rPr lang="en-US" sz="1200" b="1"/>
+                        <a:t>Classification</a:t>
+                      </a:r>
+                    </a:p>
+                  </a:txBody>
+                  <a:tcPr marL="52666" marR="52666" marT="26333" marB="26333" anchor="ctr">
+                    <a:lnL>
+                      <a:noFill/>
+                    </a:lnL>
+                    <a:lnR>
+                      <a:noFill/>
+                    </a:lnR>
+                    <a:lnT>
+                      <a:noFill/>
+                    </a:lnT>
+                    <a:lnB>
+                      <a:noFill/>
+                    </a:lnB>
+                  </a:tcPr>
+                </a:tc>
+                <a:tc>
+                  <a:txBody>
+                    <a:bodyPr/>
+                    <a:lstStyle/>
+                    <a:p>
+                      <a:pPr algn="ctr"/>
+                      <a:r>
+                        <a:rPr lang="en-US" sz="1200" b="1" dirty="0"/>
+                        <a:t>Regression &amp;</a:t>
+                      </a:r>
+                    </a:p>
+                    <a:p>
+                      <a:pPr algn="ctr"/>
+                      <a:r>
+                        <a:rPr lang="en-US" sz="1200" b="1" dirty="0"/>
+                        <a:t>Time Series Forecasting</a:t>
+                      </a:r>
+                    </a:p>
+                  </a:txBody>
+                  <a:tcPr marL="52666" marR="52666" marT="26333" marB="26333" anchor="ctr">
+                    <a:lnL>
+                      <a:noFill/>
+                    </a:lnL>
+                    <a:lnR>
+                      <a:noFill/>
+                    </a:lnR>
+                    <a:lnT>
+                      <a:noFill/>
+                    </a:lnT>
+                    <a:lnB>
+                      <a:noFill/>
+                    </a:lnB>
+                  </a:tcPr>
+                </a:tc>
+                <a:extLst>
+                  <a:ext uri="{0D108BD9-81ED-4DB2-BD59-A6C34878D82A}">
+                    <a16:rowId xmlns:a16="http://schemas.microsoft.com/office/drawing/2014/main" val="3301145887"/>
+                  </a:ext>
+                </a:extLst>
+              </a:tr>
+              <a:tr h="178790">
+                <a:tc>
+                  <a:txBody>
+                    <a:bodyPr/>
+                    <a:lstStyle/>
+                    <a:p>
+                      <a:r>
+                        <a:rPr lang="en-US" sz="1000">
+                          <a:hlinkClick r:id="rId2"/>
+                        </a:rPr>
+                        <a:t>Logistic Regression</a:t>
+                      </a:r>
+                      <a:endParaRPr lang="en-US" sz="1000"/>
+                    </a:p>
+                  </a:txBody>
+                  <a:tcPr marL="52666" marR="52666" marT="26333" marB="26333" anchor="ctr">
+                    <a:lnL>
+                      <a:noFill/>
+                    </a:lnL>
+                    <a:lnR>
+                      <a:noFill/>
+                    </a:lnR>
+                    <a:lnT>
+                      <a:noFill/>
+                    </a:lnT>
+                    <a:lnB>
+                      <a:noFill/>
+                    </a:lnB>
+                  </a:tcPr>
+                </a:tc>
+                <a:tc>
+                  <a:txBody>
+                    <a:bodyPr/>
+                    <a:lstStyle/>
+                    <a:p>
+                      <a:r>
+                        <a:rPr lang="en-US" sz="1000" dirty="0">
+                          <a:hlinkClick r:id="rId3"/>
+                        </a:rPr>
+                        <a:t>Elastic Net</a:t>
+                      </a:r>
+                      <a:endParaRPr lang="en-US" sz="1000" dirty="0"/>
+                    </a:p>
+                  </a:txBody>
+                  <a:tcPr marL="52666" marR="52666" marT="26333" marB="26333" anchor="ctr">
+                    <a:lnL>
+                      <a:noFill/>
+                    </a:lnL>
+                    <a:lnR>
+                      <a:noFill/>
+                    </a:lnR>
+                    <a:lnT>
+                      <a:noFill/>
+                    </a:lnT>
+                    <a:lnB>
+                      <a:noFill/>
+                    </a:lnB>
+                  </a:tcPr>
+                </a:tc>
+                <a:extLst>
+                  <a:ext uri="{0D108BD9-81ED-4DB2-BD59-A6C34878D82A}">
+                    <a16:rowId xmlns:a16="http://schemas.microsoft.com/office/drawing/2014/main" val="801165373"/>
+                  </a:ext>
+                </a:extLst>
+              </a:tr>
+              <a:tr h="178790">
+                <a:tc>
+                  <a:txBody>
+                    <a:bodyPr/>
+                    <a:lstStyle/>
+                    <a:p>
+                      <a:r>
+                        <a:rPr lang="en-US" sz="1000">
+                          <a:hlinkClick r:id="rId4"/>
+                        </a:rPr>
+                        <a:t>Light GBM</a:t>
+                      </a:r>
+                      <a:endParaRPr lang="en-US" sz="1000"/>
+                    </a:p>
+                  </a:txBody>
+                  <a:tcPr marL="52666" marR="52666" marT="26333" marB="26333" anchor="ctr">
+                    <a:lnL>
+                      <a:noFill/>
+                    </a:lnL>
+                    <a:lnR>
+                      <a:noFill/>
+                    </a:lnR>
+                    <a:lnT>
+                      <a:noFill/>
+                    </a:lnT>
+                    <a:lnB>
+                      <a:noFill/>
+                    </a:lnB>
+                  </a:tcPr>
+                </a:tc>
+                <a:tc>
+                  <a:txBody>
+                    <a:bodyPr/>
+                    <a:lstStyle/>
+                    <a:p>
+                      <a:r>
+                        <a:rPr lang="en-US" sz="1000">
+                          <a:hlinkClick r:id="rId4"/>
+                        </a:rPr>
+                        <a:t>Light GBM</a:t>
+                      </a:r>
+                      <a:endParaRPr lang="en-US" sz="1000"/>
+                    </a:p>
+                  </a:txBody>
+                  <a:tcPr marL="52666" marR="52666" marT="26333" marB="26333" anchor="ctr">
+                    <a:lnL>
+                      <a:noFill/>
+                    </a:lnL>
+                    <a:lnR>
+                      <a:noFill/>
+                    </a:lnR>
+                    <a:lnT>
+                      <a:noFill/>
+                    </a:lnT>
+                    <a:lnB>
+                      <a:noFill/>
+                    </a:lnB>
+                  </a:tcPr>
+                </a:tc>
+                <a:extLst>
+                  <a:ext uri="{0D108BD9-81ED-4DB2-BD59-A6C34878D82A}">
+                    <a16:rowId xmlns:a16="http://schemas.microsoft.com/office/drawing/2014/main" val="1291908786"/>
+                  </a:ext>
+                </a:extLst>
+              </a:tr>
+              <a:tr h="178790">
+                <a:tc>
+                  <a:txBody>
+                    <a:bodyPr/>
+                    <a:lstStyle/>
+                    <a:p>
+                      <a:r>
+                        <a:rPr lang="en-US" sz="1000">
+                          <a:hlinkClick r:id="rId5"/>
+                        </a:rPr>
+                        <a:t>Gradient Boosting</a:t>
+                      </a:r>
+                      <a:endParaRPr lang="en-US" sz="1000"/>
+                    </a:p>
+                  </a:txBody>
+                  <a:tcPr marL="52666" marR="52666" marT="26333" marB="26333" anchor="ctr">
+                    <a:lnL>
+                      <a:noFill/>
+                    </a:lnL>
+                    <a:lnR>
+                      <a:noFill/>
+                    </a:lnR>
+                    <a:lnT>
+                      <a:noFill/>
+                    </a:lnT>
+                    <a:lnB>
+                      <a:noFill/>
+                    </a:lnB>
+                  </a:tcPr>
+                </a:tc>
+                <a:tc>
+                  <a:txBody>
+                    <a:bodyPr/>
+                    <a:lstStyle/>
+                    <a:p>
+                      <a:r>
+                        <a:rPr lang="en-US" sz="1000">
+                          <a:hlinkClick r:id="rId6"/>
+                        </a:rPr>
+                        <a:t>Gradient Boosting</a:t>
+                      </a:r>
+                      <a:endParaRPr lang="en-US" sz="1000"/>
+                    </a:p>
+                  </a:txBody>
+                  <a:tcPr marL="52666" marR="52666" marT="26333" marB="26333" anchor="ctr">
+                    <a:lnL>
+                      <a:noFill/>
+                    </a:lnL>
+                    <a:lnR>
+                      <a:noFill/>
+                    </a:lnR>
+                    <a:lnT>
+                      <a:noFill/>
+                    </a:lnT>
+                    <a:lnB>
+                      <a:noFill/>
+                    </a:lnB>
+                  </a:tcPr>
+                </a:tc>
+                <a:extLst>
+                  <a:ext uri="{0D108BD9-81ED-4DB2-BD59-A6C34878D82A}">
+                    <a16:rowId xmlns:a16="http://schemas.microsoft.com/office/drawing/2014/main" val="1841407873"/>
+                  </a:ext>
+                </a:extLst>
+              </a:tr>
+              <a:tr h="178790">
+                <a:tc>
+                  <a:txBody>
+                    <a:bodyPr/>
+                    <a:lstStyle/>
+                    <a:p>
+                      <a:r>
+                        <a:rPr lang="en-US" sz="1000">
+                          <a:hlinkClick r:id="rId7"/>
+                        </a:rPr>
+                        <a:t>Decision Tree</a:t>
+                      </a:r>
+                      <a:endParaRPr lang="en-US" sz="1000"/>
+                    </a:p>
+                  </a:txBody>
+                  <a:tcPr marL="52666" marR="52666" marT="26333" marB="26333" anchor="ctr">
+                    <a:lnL>
+                      <a:noFill/>
+                    </a:lnL>
+                    <a:lnR>
+                      <a:noFill/>
+                    </a:lnR>
+                    <a:lnT>
+                      <a:noFill/>
+                    </a:lnT>
+                    <a:lnB>
+                      <a:noFill/>
+                    </a:lnB>
+                  </a:tcPr>
+                </a:tc>
+                <a:tc>
+                  <a:txBody>
+                    <a:bodyPr/>
+                    <a:lstStyle/>
+                    <a:p>
+                      <a:r>
+                        <a:rPr lang="en-US" sz="1000">
+                          <a:hlinkClick r:id="rId8"/>
+                        </a:rPr>
+                        <a:t>Decision Tree</a:t>
+                      </a:r>
+                      <a:endParaRPr lang="en-US" sz="1000"/>
+                    </a:p>
+                  </a:txBody>
+                  <a:tcPr marL="52666" marR="52666" marT="26333" marB="26333" anchor="ctr">
+                    <a:lnL>
+                      <a:noFill/>
+                    </a:lnL>
+                    <a:lnR>
+                      <a:noFill/>
+                    </a:lnR>
+                    <a:lnT>
+                      <a:noFill/>
+                    </a:lnT>
+                    <a:lnB>
+                      <a:noFill/>
+                    </a:lnB>
+                  </a:tcPr>
+                </a:tc>
+                <a:extLst>
+                  <a:ext uri="{0D108BD9-81ED-4DB2-BD59-A6C34878D82A}">
+                    <a16:rowId xmlns:a16="http://schemas.microsoft.com/office/drawing/2014/main" val="833870345"/>
+                  </a:ext>
+                </a:extLst>
+              </a:tr>
+              <a:tr h="178790">
+                <a:tc>
+                  <a:txBody>
+                    <a:bodyPr/>
+                    <a:lstStyle/>
+                    <a:p>
+                      <a:r>
+                        <a:rPr lang="en-US" sz="1000">
+                          <a:hlinkClick r:id="rId9"/>
+                        </a:rPr>
+                        <a:t>K Nearest Neighbors</a:t>
+                      </a:r>
+                      <a:endParaRPr lang="en-US" sz="1000"/>
+                    </a:p>
+                  </a:txBody>
+                  <a:tcPr marL="52666" marR="52666" marT="26333" marB="26333" anchor="ctr">
+                    <a:lnL>
+                      <a:noFill/>
+                    </a:lnL>
+                    <a:lnR>
+                      <a:noFill/>
+                    </a:lnR>
+                    <a:lnT>
+                      <a:noFill/>
+                    </a:lnT>
+                    <a:lnB>
+                      <a:noFill/>
+                    </a:lnB>
+                  </a:tcPr>
+                </a:tc>
+                <a:tc>
+                  <a:txBody>
+                    <a:bodyPr/>
+                    <a:lstStyle/>
+                    <a:p>
+                      <a:r>
+                        <a:rPr lang="en-US" sz="1000">
+                          <a:hlinkClick r:id="rId9"/>
+                        </a:rPr>
+                        <a:t>K Nearest Neighbors</a:t>
+                      </a:r>
+                      <a:endParaRPr lang="en-US" sz="1000"/>
+                    </a:p>
+                  </a:txBody>
+                  <a:tcPr marL="52666" marR="52666" marT="26333" marB="26333" anchor="ctr">
+                    <a:lnL>
+                      <a:noFill/>
+                    </a:lnL>
+                    <a:lnR>
+                      <a:noFill/>
+                    </a:lnR>
+                    <a:lnT>
+                      <a:noFill/>
+                    </a:lnT>
+                    <a:lnB>
+                      <a:noFill/>
+                    </a:lnB>
+                  </a:tcPr>
+                </a:tc>
+                <a:extLst>
+                  <a:ext uri="{0D108BD9-81ED-4DB2-BD59-A6C34878D82A}">
+                    <a16:rowId xmlns:a16="http://schemas.microsoft.com/office/drawing/2014/main" val="2832259499"/>
+                  </a:ext>
+                </a:extLst>
+              </a:tr>
+              <a:tr h="178790">
+                <a:tc>
+                  <a:txBody>
+                    <a:bodyPr/>
+                    <a:lstStyle/>
+                    <a:p>
+                      <a:r>
+                        <a:rPr lang="en-US" sz="1000">
+                          <a:hlinkClick r:id="rId10"/>
+                        </a:rPr>
+                        <a:t>Linear SVC</a:t>
+                      </a:r>
+                      <a:endParaRPr lang="en-US" sz="1000"/>
+                    </a:p>
+                  </a:txBody>
+                  <a:tcPr marL="52666" marR="52666" marT="26333" marB="26333" anchor="ctr">
+                    <a:lnL>
+                      <a:noFill/>
+                    </a:lnL>
+                    <a:lnR>
+                      <a:noFill/>
+                    </a:lnR>
+                    <a:lnT>
+                      <a:noFill/>
+                    </a:lnT>
+                    <a:lnB>
+                      <a:noFill/>
+                    </a:lnB>
+                  </a:tcPr>
+                </a:tc>
+                <a:tc>
+                  <a:txBody>
+                    <a:bodyPr/>
+                    <a:lstStyle/>
+                    <a:p>
+                      <a:r>
+                        <a:rPr lang="en-US" sz="1000">
+                          <a:hlinkClick r:id="rId11"/>
+                        </a:rPr>
+                        <a:t>LARS Lasso</a:t>
+                      </a:r>
+                      <a:endParaRPr lang="en-US" sz="1000"/>
+                    </a:p>
+                  </a:txBody>
+                  <a:tcPr marL="52666" marR="52666" marT="26333" marB="26333" anchor="ctr">
+                    <a:lnL>
+                      <a:noFill/>
+                    </a:lnL>
+                    <a:lnR>
+                      <a:noFill/>
+                    </a:lnR>
+                    <a:lnT>
+                      <a:noFill/>
+                    </a:lnT>
+                    <a:lnB>
+                      <a:noFill/>
+                    </a:lnB>
+                  </a:tcPr>
+                </a:tc>
+                <a:extLst>
+                  <a:ext uri="{0D108BD9-81ED-4DB2-BD59-A6C34878D82A}">
+                    <a16:rowId xmlns:a16="http://schemas.microsoft.com/office/drawing/2014/main" val="228754427"/>
+                  </a:ext>
+                </a:extLst>
+              </a:tr>
+              <a:tr h="303944">
+                <a:tc>
+                  <a:txBody>
+                    <a:bodyPr/>
+                    <a:lstStyle/>
+                    <a:p>
+                      <a:r>
+                        <a:rPr lang="en-US" sz="1000">
+                          <a:hlinkClick r:id="rId10"/>
+                        </a:rPr>
+                        <a:t>C-Support Vector Classification (SVC)</a:t>
+                      </a:r>
+                      <a:endParaRPr lang="en-US" sz="1000"/>
+                    </a:p>
+                  </a:txBody>
+                  <a:tcPr marL="52666" marR="52666" marT="26333" marB="26333" anchor="ctr">
+                    <a:lnL>
+                      <a:noFill/>
+                    </a:lnL>
+                    <a:lnR>
+                      <a:noFill/>
+                    </a:lnR>
+                    <a:lnT>
+                      <a:noFill/>
+                    </a:lnT>
+                    <a:lnB>
+                      <a:noFill/>
+                    </a:lnB>
+                  </a:tcPr>
+                </a:tc>
+                <a:tc>
+                  <a:txBody>
+                    <a:bodyPr/>
+                    <a:lstStyle/>
+                    <a:p>
+                      <a:r>
+                        <a:rPr lang="en-US" sz="1000">
+                          <a:hlinkClick r:id="rId12"/>
+                        </a:rPr>
+                        <a:t>Stochastic Gradient Descent (SGD)</a:t>
+                      </a:r>
+                      <a:endParaRPr lang="en-US" sz="1000"/>
+                    </a:p>
+                  </a:txBody>
+                  <a:tcPr marL="52666" marR="52666" marT="26333" marB="26333" anchor="ctr">
+                    <a:lnL>
+                      <a:noFill/>
+                    </a:lnL>
+                    <a:lnR>
+                      <a:noFill/>
+                    </a:lnR>
+                    <a:lnT>
+                      <a:noFill/>
+                    </a:lnT>
+                    <a:lnB>
+                      <a:noFill/>
+                    </a:lnB>
+                  </a:tcPr>
+                </a:tc>
+                <a:extLst>
+                  <a:ext uri="{0D108BD9-81ED-4DB2-BD59-A6C34878D82A}">
+                    <a16:rowId xmlns:a16="http://schemas.microsoft.com/office/drawing/2014/main" val="482337621"/>
+                  </a:ext>
+                </a:extLst>
+              </a:tr>
+              <a:tr h="178790">
+                <a:tc>
+                  <a:txBody>
+                    <a:bodyPr/>
+                    <a:lstStyle/>
+                    <a:p>
+                      <a:r>
+                        <a:rPr lang="en-US" sz="1000">
+                          <a:hlinkClick r:id="rId13"/>
+                        </a:rPr>
+                        <a:t>Random Forest</a:t>
+                      </a:r>
+                      <a:endParaRPr lang="en-US" sz="1000"/>
+                    </a:p>
+                  </a:txBody>
+                  <a:tcPr marL="52666" marR="52666" marT="26333" marB="26333" anchor="ctr">
+                    <a:lnL>
+                      <a:noFill/>
+                    </a:lnL>
+                    <a:lnR>
+                      <a:noFill/>
+                    </a:lnR>
+                    <a:lnT>
+                      <a:noFill/>
+                    </a:lnT>
+                    <a:lnB>
+                      <a:noFill/>
+                    </a:lnB>
+                  </a:tcPr>
+                </a:tc>
+                <a:tc>
+                  <a:txBody>
+                    <a:bodyPr/>
+                    <a:lstStyle/>
+                    <a:p>
+                      <a:r>
+                        <a:rPr lang="en-US" sz="1000">
+                          <a:hlinkClick r:id="rId13"/>
+                        </a:rPr>
+                        <a:t>Random Forest</a:t>
+                      </a:r>
+                      <a:endParaRPr lang="en-US" sz="1000"/>
+                    </a:p>
+                  </a:txBody>
+                  <a:tcPr marL="52666" marR="52666" marT="26333" marB="26333" anchor="ctr">
+                    <a:lnL>
+                      <a:noFill/>
+                    </a:lnL>
+                    <a:lnR>
+                      <a:noFill/>
+                    </a:lnR>
+                    <a:lnT>
+                      <a:noFill/>
+                    </a:lnT>
+                    <a:lnB>
+                      <a:noFill/>
+                    </a:lnB>
+                  </a:tcPr>
+                </a:tc>
+                <a:extLst>
+                  <a:ext uri="{0D108BD9-81ED-4DB2-BD59-A6C34878D82A}">
+                    <a16:rowId xmlns:a16="http://schemas.microsoft.com/office/drawing/2014/main" val="1521599616"/>
+                  </a:ext>
+                </a:extLst>
+              </a:tr>
+              <a:tr h="303944">
+                <a:tc>
+                  <a:txBody>
+                    <a:bodyPr/>
+                    <a:lstStyle/>
+                    <a:p>
+                      <a:r>
+                        <a:rPr lang="en-US" sz="1000">
+                          <a:hlinkClick r:id="rId14"/>
+                        </a:rPr>
+                        <a:t>Extremely Randomized Trees</a:t>
+                      </a:r>
+                      <a:endParaRPr lang="en-US" sz="1000"/>
+                    </a:p>
+                  </a:txBody>
+                  <a:tcPr marL="52666" marR="52666" marT="26333" marB="26333" anchor="ctr">
+                    <a:lnL>
+                      <a:noFill/>
+                    </a:lnL>
+                    <a:lnR>
+                      <a:noFill/>
+                    </a:lnR>
+                    <a:lnT>
+                      <a:noFill/>
+                    </a:lnT>
+                    <a:lnB>
+                      <a:noFill/>
+                    </a:lnB>
+                  </a:tcPr>
+                </a:tc>
+                <a:tc>
+                  <a:txBody>
+                    <a:bodyPr/>
+                    <a:lstStyle/>
+                    <a:p>
+                      <a:r>
+                        <a:rPr lang="en-US" sz="1000">
+                          <a:hlinkClick r:id="rId14"/>
+                        </a:rPr>
+                        <a:t>Extremely Randomized Trees</a:t>
+                      </a:r>
+                      <a:endParaRPr lang="en-US" sz="1000"/>
+                    </a:p>
+                  </a:txBody>
+                  <a:tcPr marL="52666" marR="52666" marT="26333" marB="26333" anchor="ctr">
+                    <a:lnL>
+                      <a:noFill/>
+                    </a:lnL>
+                    <a:lnR>
+                      <a:noFill/>
+                    </a:lnR>
+                    <a:lnT>
+                      <a:noFill/>
+                    </a:lnT>
+                    <a:lnB>
+                      <a:noFill/>
+                    </a:lnB>
+                  </a:tcPr>
+                </a:tc>
+                <a:extLst>
+                  <a:ext uri="{0D108BD9-81ED-4DB2-BD59-A6C34878D82A}">
+                    <a16:rowId xmlns:a16="http://schemas.microsoft.com/office/drawing/2014/main" val="1154399125"/>
+                  </a:ext>
+                </a:extLst>
+              </a:tr>
+              <a:tr h="178790">
+                <a:tc>
+                  <a:txBody>
+                    <a:bodyPr/>
+                    <a:lstStyle/>
+                    <a:p>
+                      <a:r>
+                        <a:rPr lang="en-US" sz="1000" dirty="0" err="1">
+                          <a:hlinkClick r:id="rId15"/>
+                        </a:rPr>
+                        <a:t>Xgboost</a:t>
+                      </a:r>
+                      <a:endParaRPr lang="en-US" sz="1000" dirty="0"/>
+                    </a:p>
+                  </a:txBody>
+                  <a:tcPr marL="52666" marR="52666" marT="26333" marB="26333" anchor="ctr">
+                    <a:lnL>
+                      <a:noFill/>
+                    </a:lnL>
+                    <a:lnR>
+                      <a:noFill/>
+                    </a:lnR>
+                    <a:lnT>
+                      <a:noFill/>
+                    </a:lnT>
+                    <a:lnB>
+                      <a:noFill/>
+                    </a:lnB>
+                  </a:tcPr>
+                </a:tc>
+                <a:tc>
+                  <a:txBody>
+                    <a:bodyPr/>
+                    <a:lstStyle/>
+                    <a:p>
+                      <a:r>
+                        <a:rPr lang="en-US" sz="1000">
+                          <a:hlinkClick r:id="rId15"/>
+                        </a:rPr>
+                        <a:t>Xgboost</a:t>
+                      </a:r>
+                      <a:endParaRPr lang="en-US" sz="1000"/>
+                    </a:p>
+                  </a:txBody>
+                  <a:tcPr marL="52666" marR="52666" marT="26333" marB="26333" anchor="ctr">
+                    <a:lnL>
+                      <a:noFill/>
+                    </a:lnL>
+                    <a:lnR>
+                      <a:noFill/>
+                    </a:lnR>
+                    <a:lnT>
+                      <a:noFill/>
+                    </a:lnT>
+                    <a:lnB>
+                      <a:noFill/>
+                    </a:lnB>
+                  </a:tcPr>
+                </a:tc>
+                <a:extLst>
+                  <a:ext uri="{0D108BD9-81ED-4DB2-BD59-A6C34878D82A}">
+                    <a16:rowId xmlns:a16="http://schemas.microsoft.com/office/drawing/2014/main" val="3537502937"/>
+                  </a:ext>
+                </a:extLst>
+              </a:tr>
+              <a:tr h="178790">
+                <a:tc>
+                  <a:txBody>
+                    <a:bodyPr/>
+                    <a:lstStyle/>
+                    <a:p>
+                      <a:r>
+                        <a:rPr lang="en-US" sz="1000">
+                          <a:hlinkClick r:id="rId16"/>
+                        </a:rPr>
+                        <a:t>DNN Classifier</a:t>
+                      </a:r>
+                      <a:endParaRPr lang="en-US" sz="1000"/>
+                    </a:p>
+                  </a:txBody>
+                  <a:tcPr marL="52666" marR="52666" marT="26333" marB="26333" anchor="ctr">
+                    <a:lnL>
+                      <a:noFill/>
+                    </a:lnL>
+                    <a:lnR>
+                      <a:noFill/>
+                    </a:lnR>
+                    <a:lnT>
+                      <a:noFill/>
+                    </a:lnT>
+                    <a:lnB>
+                      <a:noFill/>
+                    </a:lnB>
+                  </a:tcPr>
+                </a:tc>
+                <a:tc>
+                  <a:txBody>
+                    <a:bodyPr/>
+                    <a:lstStyle/>
+                    <a:p>
+                      <a:r>
+                        <a:rPr lang="en-US" sz="1000">
+                          <a:hlinkClick r:id="rId17"/>
+                        </a:rPr>
+                        <a:t>DNN Regressor</a:t>
+                      </a:r>
+                      <a:endParaRPr lang="en-US" sz="1000"/>
+                    </a:p>
+                  </a:txBody>
+                  <a:tcPr marL="52666" marR="52666" marT="26333" marB="26333" anchor="ctr">
+                    <a:lnL>
+                      <a:noFill/>
+                    </a:lnL>
+                    <a:lnR>
+                      <a:noFill/>
+                    </a:lnR>
+                    <a:lnT>
+                      <a:noFill/>
+                    </a:lnT>
+                    <a:lnB>
+                      <a:noFill/>
+                    </a:lnB>
+                  </a:tcPr>
+                </a:tc>
+                <a:extLst>
+                  <a:ext uri="{0D108BD9-81ED-4DB2-BD59-A6C34878D82A}">
+                    <a16:rowId xmlns:a16="http://schemas.microsoft.com/office/drawing/2014/main" val="1708269267"/>
+                  </a:ext>
+                </a:extLst>
+              </a:tr>
+              <a:tr h="178790">
+                <a:tc>
+                  <a:txBody>
+                    <a:bodyPr/>
+                    <a:lstStyle/>
+                    <a:p>
+                      <a:r>
+                        <a:rPr lang="en-US" sz="1000">
+                          <a:hlinkClick r:id="rId18"/>
+                        </a:rPr>
+                        <a:t>DNN Linear Classifier</a:t>
+                      </a:r>
+                      <a:endParaRPr lang="en-US" sz="1000"/>
+                    </a:p>
+                  </a:txBody>
+                  <a:tcPr marL="52666" marR="52666" marT="26333" marB="26333" anchor="ctr">
+                    <a:lnL>
+                      <a:noFill/>
+                    </a:lnL>
+                    <a:lnR>
+                      <a:noFill/>
+                    </a:lnR>
+                    <a:lnT>
+                      <a:noFill/>
+                    </a:lnT>
+                    <a:lnB>
+                      <a:noFill/>
+                    </a:lnB>
+                  </a:tcPr>
+                </a:tc>
+                <a:tc>
+                  <a:txBody>
+                    <a:bodyPr/>
+                    <a:lstStyle/>
+                    <a:p>
+                      <a:r>
+                        <a:rPr lang="en-US" sz="1000">
+                          <a:hlinkClick r:id="rId19"/>
+                        </a:rPr>
+                        <a:t>Linear Regressor</a:t>
+                      </a:r>
+                      <a:endParaRPr lang="en-US" sz="1000"/>
+                    </a:p>
+                  </a:txBody>
+                  <a:tcPr marL="52666" marR="52666" marT="26333" marB="26333" anchor="ctr">
+                    <a:lnL>
+                      <a:noFill/>
+                    </a:lnL>
+                    <a:lnR>
+                      <a:noFill/>
+                    </a:lnR>
+                    <a:lnT>
+                      <a:noFill/>
+                    </a:lnT>
+                    <a:lnB>
+                      <a:noFill/>
+                    </a:lnB>
+                  </a:tcPr>
+                </a:tc>
+                <a:extLst>
+                  <a:ext uri="{0D108BD9-81ED-4DB2-BD59-A6C34878D82A}">
+                    <a16:rowId xmlns:a16="http://schemas.microsoft.com/office/drawing/2014/main" val="3239242384"/>
+                  </a:ext>
+                </a:extLst>
+              </a:tr>
+              <a:tr h="178790">
+                <a:tc>
+                  <a:txBody>
+                    <a:bodyPr/>
+                    <a:lstStyle/>
+                    <a:p>
+                      <a:r>
+                        <a:rPr lang="en-US" sz="1000">
+                          <a:hlinkClick r:id="rId20"/>
+                        </a:rPr>
+                        <a:t>Naive Bayes</a:t>
+                      </a:r>
+                      <a:endParaRPr lang="en-US" sz="1000"/>
+                    </a:p>
+                  </a:txBody>
+                  <a:tcPr marL="52666" marR="52666" marT="26333" marB="26333" anchor="ctr">
+                    <a:lnL>
+                      <a:noFill/>
+                    </a:lnL>
+                    <a:lnR>
+                      <a:noFill/>
+                    </a:lnR>
+                    <a:lnT>
+                      <a:noFill/>
+                    </a:lnT>
+                    <a:lnB>
+                      <a:noFill/>
+                    </a:lnB>
+                  </a:tcPr>
+                </a:tc>
+                <a:tc>
+                  <a:txBody>
+                    <a:bodyPr/>
+                    <a:lstStyle/>
+                    <a:p>
+                      <a:endParaRPr lang="en-US" sz="1000"/>
+                    </a:p>
+                  </a:txBody>
+                  <a:tcPr marL="52666" marR="52666" marT="26333" marB="26333" anchor="ctr">
+                    <a:lnL>
+                      <a:noFill/>
+                    </a:lnL>
+                    <a:lnR>
+                      <a:noFill/>
+                    </a:lnR>
+                    <a:lnT>
+                      <a:noFill/>
+                    </a:lnT>
+                    <a:lnB>
+                      <a:noFill/>
+                    </a:lnB>
+                  </a:tcPr>
+                </a:tc>
+                <a:extLst>
+                  <a:ext uri="{0D108BD9-81ED-4DB2-BD59-A6C34878D82A}">
+                    <a16:rowId xmlns:a16="http://schemas.microsoft.com/office/drawing/2014/main" val="341898756"/>
+                  </a:ext>
+                </a:extLst>
+              </a:tr>
+              <a:tr h="303944">
+                <a:tc>
+                  <a:txBody>
+                    <a:bodyPr/>
+                    <a:lstStyle/>
+                    <a:p>
+                      <a:r>
+                        <a:rPr lang="en-US" sz="1000">
+                          <a:hlinkClick r:id="rId21"/>
+                        </a:rPr>
+                        <a:t>Stochastic Gradient Descent (SGD)</a:t>
+                      </a:r>
+                      <a:endParaRPr lang="en-US" sz="1000"/>
+                    </a:p>
+                  </a:txBody>
+                  <a:tcPr marL="52666" marR="52666" marT="26333" marB="26333" anchor="ctr">
+                    <a:lnL>
+                      <a:noFill/>
+                    </a:lnL>
+                    <a:lnR>
+                      <a:noFill/>
+                    </a:lnR>
+                    <a:lnT>
+                      <a:noFill/>
+                    </a:lnT>
+                    <a:lnB>
+                      <a:noFill/>
+                    </a:lnB>
+                  </a:tcPr>
+                </a:tc>
+                <a:tc>
+                  <a:txBody>
+                    <a:bodyPr/>
+                    <a:lstStyle/>
+                    <a:p>
+                      <a:endParaRPr lang="en-US" sz="1000" dirty="0"/>
+                    </a:p>
+                  </a:txBody>
+                  <a:tcPr marL="52666" marR="52666" marT="26333" marB="26333" anchor="ctr">
+                    <a:lnL>
+                      <a:noFill/>
+                    </a:lnL>
+                    <a:lnR>
+                      <a:noFill/>
+                    </a:lnR>
+                    <a:lnT>
+                      <a:noFill/>
+                    </a:lnT>
+                    <a:lnB>
+                      <a:noFill/>
+                    </a:lnB>
+                  </a:tcPr>
+                </a:tc>
+                <a:extLst>
+                  <a:ext uri="{0D108BD9-81ED-4DB2-BD59-A6C34878D82A}">
+                    <a16:rowId xmlns:a16="http://schemas.microsoft.com/office/drawing/2014/main" val="3966003278"/>
+                  </a:ext>
+                </a:extLst>
+              </a:tr>
+            </a:tbl>
+          </a:graphicData>
+        </a:graphic>
+      </p:graphicFrame>
+      <p:sp>
+        <p:nvSpPr>
+          <p:cNvPr id="6" name="Rectangle 5">
+            <a:extLst>
+              <a:ext uri="{FF2B5EF4-FFF2-40B4-BE49-F238E27FC236}">
+                <a16:creationId xmlns:a16="http://schemas.microsoft.com/office/drawing/2014/main" id="{C96C4D95-99B7-4E6E-A3D2-B6969D97C36B}"/>
+              </a:ext>
+            </a:extLst>
+          </p:cNvPr>
+          <p:cNvSpPr/>
+          <p:nvPr/>
+        </p:nvSpPr>
+        <p:spPr>
+          <a:xfrm>
+            <a:off x="3178609" y="4831794"/>
+            <a:ext cx="6144490" cy="261610"/>
+          </a:xfrm>
+          <a:prstGeom prst="rect">
+            <a:avLst/>
+          </a:prstGeom>
+        </p:spPr>
+        <p:txBody>
+          <a:bodyPr wrap="square">
+            <a:spAutoFit/>
+          </a:bodyPr>
+          <a:lstStyle/>
+          <a:p>
+            <a:r>
+              <a:rPr lang="en-US" sz="1100" dirty="0">
+                <a:hlinkClick r:id="rId22"/>
+              </a:rPr>
+              <a:t>https://docs.microsoft.com/en-us/azure/machine-learning/service/how-to-configure-auto-train</a:t>
+            </a:r>
+            <a:endParaRPr lang="en-US" sz="1100" dirty="0"/>
+          </a:p>
+        </p:txBody>
+      </p:sp>
+    </p:spTree>
+    <p:extLst>
+      <p:ext uri="{BB962C8B-B14F-4D97-AF65-F5344CB8AC3E}">
+        <p14:creationId xmlns:p14="http://schemas.microsoft.com/office/powerpoint/2010/main" val="2350663502"/>
+      </p:ext>
+    </p:extLst>
+  </p:cSld>
+  <p:clrMapOvr>
+    <a:masterClrMapping/>
+  </p:clrMapOvr>
+</p:sld>
+</file>
+
 <file path=ppt/slides/slide3.xml><?xml version="1.0" encoding="utf-8"?>
 <p:sld xmlns:a="http://schemas.openxmlformats.org/drawingml/2006/main" xmlns:r="http://schemas.openxmlformats.org/officeDocument/2006/relationships" xmlns:p="http://schemas.openxmlformats.org/presentationml/2006/main">
   <p:cSld>
@@ -22453,6 +23730,221 @@
         </p:spPr>
       </p:pic>
     </p:spTree>
+  </p:cSld>
+  <p:clrMapOvr>
+    <a:masterClrMapping/>
+  </p:clrMapOvr>
+</p:sld>
+</file>
+
+<file path=ppt/slides/slide30.xml><?xml version="1.0" encoding="utf-8"?>
+<p:sld xmlns:a="http://schemas.openxmlformats.org/drawingml/2006/main" xmlns:r="http://schemas.openxmlformats.org/officeDocument/2006/relationships" xmlns:p="http://schemas.openxmlformats.org/presentationml/2006/main">
+  <p:cSld>
+    <p:spTree>
+      <p:nvGrpSpPr>
+        <p:cNvPr id="1" name=""/>
+        <p:cNvGrpSpPr/>
+        <p:nvPr/>
+      </p:nvGrpSpPr>
+      <p:grpSpPr>
+        <a:xfrm>
+          <a:off x="0" y="0"/>
+          <a:ext cx="0" cy="0"/>
+          <a:chOff x="0" y="0"/>
+          <a:chExt cx="0" cy="0"/>
+        </a:xfrm>
+      </p:grpSpPr>
+      <p:sp>
+        <p:nvSpPr>
+          <p:cNvPr id="2" name="Title 1">
+            <a:extLst>
+              <a:ext uri="{FF2B5EF4-FFF2-40B4-BE49-F238E27FC236}">
+                <a16:creationId xmlns:a16="http://schemas.microsoft.com/office/drawing/2014/main" id="{B01CFD37-EDF7-42F2-9518-A10251253ABA}"/>
+              </a:ext>
+            </a:extLst>
+          </p:cNvPr>
+          <p:cNvSpPr>
+            <a:spLocks noGrp="1"/>
+          </p:cNvSpPr>
+          <p:nvPr>
+            <p:ph type="title"/>
+          </p:nvPr>
+        </p:nvSpPr>
+        <p:spPr/>
+        <p:txBody>
+          <a:bodyPr/>
+          <a:lstStyle/>
+          <a:p>
+            <a:r>
+              <a:rPr lang="en-US" dirty="0"/>
+              <a:t>Picking the Best Model</a:t>
+            </a:r>
+          </a:p>
+        </p:txBody>
+      </p:sp>
+      <p:sp>
+        <p:nvSpPr>
+          <p:cNvPr id="3" name="Text Placeholder 2">
+            <a:extLst>
+              <a:ext uri="{FF2B5EF4-FFF2-40B4-BE49-F238E27FC236}">
+                <a16:creationId xmlns:a16="http://schemas.microsoft.com/office/drawing/2014/main" id="{7B559461-43BB-4521-B584-E6B31A283F52}"/>
+              </a:ext>
+            </a:extLst>
+          </p:cNvPr>
+          <p:cNvSpPr>
+            <a:spLocks noGrp="1"/>
+          </p:cNvSpPr>
+          <p:nvPr>
+            <p:ph type="body" idx="1"/>
+          </p:nvPr>
+        </p:nvSpPr>
+        <p:spPr>
+          <a:xfrm>
+            <a:off x="422028" y="1565150"/>
+            <a:ext cx="3071400" cy="3002400"/>
+          </a:xfrm>
+        </p:spPr>
+        <p:txBody>
+          <a:bodyPr>
+            <a:normAutofit fontScale="92500" lnSpcReduction="20000"/>
+          </a:bodyPr>
+          <a:lstStyle/>
+          <a:p>
+            <a:r>
+              <a:rPr lang="en-US" dirty="0"/>
+              <a:t>Picks a best model(s) based on a Primary Metric</a:t>
+            </a:r>
+          </a:p>
+          <a:p>
+            <a:pPr lvl="1">
+              <a:spcBef>
+                <a:spcPts val="600"/>
+              </a:spcBef>
+            </a:pPr>
+            <a:r>
+              <a:rPr lang="en-US" dirty="0"/>
+              <a:t>In Classification Problems:</a:t>
+            </a:r>
+          </a:p>
+          <a:p>
+            <a:pPr lvl="2">
+              <a:spcBef>
+                <a:spcPts val="600"/>
+              </a:spcBef>
+            </a:pPr>
+            <a:r>
+              <a:rPr lang="en-US" dirty="0"/>
+              <a:t>Accuracy, Weighted AUC, Average Weighted Precision Score, Normalized Macro Recall, Weighted Precision Score</a:t>
+            </a:r>
+          </a:p>
+          <a:p>
+            <a:pPr lvl="1">
+              <a:spcBef>
+                <a:spcPts val="600"/>
+              </a:spcBef>
+            </a:pPr>
+            <a:r>
+              <a:rPr lang="en-US" dirty="0"/>
+              <a:t>In Regression/Forecasting Problems:</a:t>
+            </a:r>
+          </a:p>
+          <a:p>
+            <a:pPr lvl="2">
+              <a:spcBef>
+                <a:spcPts val="600"/>
+              </a:spcBef>
+            </a:pPr>
+            <a:r>
+              <a:rPr lang="en-US" dirty="0"/>
+              <a:t>Spearman Correlation, Normalized RMSE, R</a:t>
+            </a:r>
+            <a:r>
+              <a:rPr lang="en-US" baseline="30000" dirty="0"/>
+              <a:t>2</a:t>
+            </a:r>
+            <a:r>
+              <a:rPr lang="en-US" dirty="0"/>
+              <a:t>, Normalized MAE</a:t>
+            </a:r>
+          </a:p>
+          <a:p>
+            <a:endParaRPr lang="en-US" dirty="0"/>
+          </a:p>
+        </p:txBody>
+      </p:sp>
+      <p:sp>
+        <p:nvSpPr>
+          <p:cNvPr id="4" name="Rectangle 3">
+            <a:extLst>
+              <a:ext uri="{FF2B5EF4-FFF2-40B4-BE49-F238E27FC236}">
+                <a16:creationId xmlns:a16="http://schemas.microsoft.com/office/drawing/2014/main" id="{E874D10C-6D65-4617-8879-A22C02FF83D3}"/>
+              </a:ext>
+            </a:extLst>
+          </p:cNvPr>
+          <p:cNvSpPr/>
+          <p:nvPr/>
+        </p:nvSpPr>
+        <p:spPr>
+          <a:xfrm>
+            <a:off x="319500" y="4807508"/>
+            <a:ext cx="4662054" cy="215444"/>
+          </a:xfrm>
+          <a:prstGeom prst="rect">
+            <a:avLst/>
+          </a:prstGeom>
+        </p:spPr>
+        <p:txBody>
+          <a:bodyPr wrap="square">
+            <a:spAutoFit/>
+          </a:bodyPr>
+          <a:lstStyle/>
+          <a:p>
+            <a:r>
+              <a:rPr lang="en-US" sz="800" dirty="0">
+                <a:hlinkClick r:id="rId2"/>
+              </a:rPr>
+              <a:t>https://docs.microsoft.com/en-us/azure/machine-learning/service/how-to-understand-automated-ml</a:t>
+            </a:r>
+            <a:endParaRPr lang="en-US" sz="800" dirty="0"/>
+          </a:p>
+        </p:txBody>
+      </p:sp>
+      <p:pic>
+        <p:nvPicPr>
+          <p:cNvPr id="7" name="Picture 6">
+            <a:extLst>
+              <a:ext uri="{FF2B5EF4-FFF2-40B4-BE49-F238E27FC236}">
+                <a16:creationId xmlns:a16="http://schemas.microsoft.com/office/drawing/2014/main" id="{BE0C4B95-9A79-44B8-9528-F9DF165F32E8}"/>
+              </a:ext>
+            </a:extLst>
+          </p:cNvPr>
+          <p:cNvPicPr>
+            <a:picLocks noChangeAspect="1"/>
+          </p:cNvPicPr>
+          <p:nvPr/>
+        </p:nvPicPr>
+        <p:blipFill>
+          <a:blip r:embed="rId3"/>
+          <a:stretch>
+            <a:fillRect/>
+          </a:stretch>
+        </p:blipFill>
+        <p:spPr>
+          <a:xfrm>
+            <a:off x="3851564" y="1451308"/>
+            <a:ext cx="4613562" cy="2825324"/>
+          </a:xfrm>
+          <a:prstGeom prst="rect">
+            <a:avLst/>
+          </a:prstGeom>
+        </p:spPr>
+      </p:pic>
+    </p:spTree>
+    <p:extLst>
+      <p:ext uri="{BB962C8B-B14F-4D97-AF65-F5344CB8AC3E}">
+        <p14:creationId xmlns:p14="http://schemas.microsoft.com/office/powerpoint/2010/main" val="1759626261"/>
+      </p:ext>
+    </p:extLst>
   </p:cSld>
   <p:clrMapOvr>
     <a:masterClrMapping/>

</xml_diff>

<commit_message>
Move AutoML to first ML Lecture
</commit_message>
<xml_diff>
--- a/3 - Machine Learning/MachineLearning.pptx
+++ b/3 - Machine Learning/MachineLearning.pptx
@@ -18,26 +18,26 @@
     <p:sldId id="282" r:id="rId9"/>
     <p:sldId id="283" r:id="rId10"/>
     <p:sldId id="280" r:id="rId11"/>
-    <p:sldId id="281" r:id="rId12"/>
-    <p:sldId id="286" r:id="rId13"/>
-    <p:sldId id="289" r:id="rId14"/>
-    <p:sldId id="287" r:id="rId15"/>
-    <p:sldId id="446" r:id="rId16"/>
-    <p:sldId id="447" r:id="rId17"/>
-    <p:sldId id="448" r:id="rId18"/>
-    <p:sldId id="453" r:id="rId19"/>
-    <p:sldId id="455" r:id="rId20"/>
-    <p:sldId id="454" r:id="rId21"/>
-    <p:sldId id="288" r:id="rId22"/>
-    <p:sldId id="290" r:id="rId23"/>
-    <p:sldId id="456" r:id="rId24"/>
-    <p:sldId id="457" r:id="rId25"/>
-    <p:sldId id="460" r:id="rId26"/>
-    <p:sldId id="458" r:id="rId27"/>
-    <p:sldId id="461" r:id="rId28"/>
-    <p:sldId id="459" r:id="rId29"/>
-    <p:sldId id="462" r:id="rId30"/>
-    <p:sldId id="463" r:id="rId31"/>
+    <p:sldId id="462" r:id="rId12"/>
+    <p:sldId id="463" r:id="rId13"/>
+    <p:sldId id="281" r:id="rId14"/>
+    <p:sldId id="286" r:id="rId15"/>
+    <p:sldId id="289" r:id="rId16"/>
+    <p:sldId id="287" r:id="rId17"/>
+    <p:sldId id="446" r:id="rId18"/>
+    <p:sldId id="447" r:id="rId19"/>
+    <p:sldId id="448" r:id="rId20"/>
+    <p:sldId id="453" r:id="rId21"/>
+    <p:sldId id="455" r:id="rId22"/>
+    <p:sldId id="454" r:id="rId23"/>
+    <p:sldId id="288" r:id="rId24"/>
+    <p:sldId id="290" r:id="rId25"/>
+    <p:sldId id="456" r:id="rId26"/>
+    <p:sldId id="457" r:id="rId27"/>
+    <p:sldId id="460" r:id="rId28"/>
+    <p:sldId id="458" r:id="rId29"/>
+    <p:sldId id="461" r:id="rId30"/>
+    <p:sldId id="459" r:id="rId31"/>
   </p:sldIdLst>
   <p:sldSz cx="9144000" cy="5143500" type="screen16x9"/>
   <p:notesSz cx="6858000" cy="9144000"/>
@@ -54,7 +54,7 @@
       <p:boldItalic r:id="rId37"/>
     </p:embeddedFont>
     <p:embeddedFont>
-      <p:font typeface="Lato" panose="020F0502020204030203" pitchFamily="34" charset="0"/>
+      <p:font typeface="Lato" panose="020B0604020202020204" charset="0"/>
       <p:regular r:id="rId38"/>
       <p:bold r:id="rId39"/>
       <p:italic r:id="rId40"/>
@@ -6617,7 +6617,7 @@
           <a:p>
             <a:fld id="{123CBCE9-0914-4950-A986-7596C92667F1}" type="datetime1">
               <a:rPr lang="en-US" smtClean="0"/>
-              <a:t>9/11/2019</a:t>
+              <a:t>9/12/2019</a:t>
             </a:fld>
             <a:endParaRPr lang="en-US"/>
           </a:p>
@@ -8316,7 +8316,65 @@
           <a:bodyPr/>
           <a:lstStyle/>
           <a:p>
-            <a:endParaRPr lang="en-US"/>
+            <a:r>
+              <a:rPr lang="en-US" dirty="0">
+                <a:solidFill>
+                  <a:schemeClr val="tx1"/>
+                </a:solidFill>
+              </a:rPr>
+              <a:t>Automated</a:t>
+            </a:r>
+            <a:br>
+              <a:rPr lang="en-US" dirty="0">
+                <a:solidFill>
+                  <a:schemeClr val="tx1"/>
+                </a:solidFill>
+              </a:rPr>
+            </a:br>
+            <a:r>
+              <a:rPr lang="en-US" dirty="0">
+                <a:solidFill>
+                  <a:schemeClr val="tx1"/>
+                </a:solidFill>
+              </a:rPr>
+              <a:t>Machine Learning</a:t>
+            </a:r>
+            <a:br>
+              <a:rPr lang="en-US" dirty="0">
+                <a:solidFill>
+                  <a:schemeClr val="tx1"/>
+                </a:solidFill>
+              </a:rPr>
+            </a:br>
+            <a:r>
+              <a:rPr lang="en-US" sz="2000" dirty="0">
+                <a:solidFill>
+                  <a:schemeClr val="accent3"/>
+                </a:solidFill>
+              </a:rPr>
+              <a:t>(When you’re too </a:t>
+            </a:r>
+            <a:r>
+              <a:rPr lang="en-US" sz="2000" strike="sngStrike" dirty="0">
+                <a:solidFill>
+                  <a:schemeClr val="accent3"/>
+                </a:solidFill>
+              </a:rPr>
+              <a:t>lazy</a:t>
+            </a:r>
+            <a:r>
+              <a:rPr lang="en-US" sz="2000" dirty="0">
+                <a:solidFill>
+                  <a:schemeClr val="accent3"/>
+                </a:solidFill>
+              </a:rPr>
+              <a:t> busy to do it yourself…)</a:t>
+            </a:r>
+            <a:endParaRPr lang="en-US" dirty="0">
+              <a:solidFill>
+                <a:schemeClr val="accent3"/>
+              </a:solidFill>
+            </a:endParaRPr>
           </a:p>
         </p:txBody>
       </p:sp>
@@ -8355,6 +8413,1478 @@
           <p:cNvPr id="2" name="Title 1">
             <a:extLst>
               <a:ext uri="{FF2B5EF4-FFF2-40B4-BE49-F238E27FC236}">
+                <a16:creationId xmlns:a16="http://schemas.microsoft.com/office/drawing/2014/main" id="{B2E6EB5F-C563-4961-BA02-2702B9C5AF3C}"/>
+              </a:ext>
+            </a:extLst>
+          </p:cNvPr>
+          <p:cNvSpPr>
+            <a:spLocks noGrp="1"/>
+          </p:cNvSpPr>
+          <p:nvPr>
+            <p:ph type="title"/>
+          </p:nvPr>
+        </p:nvSpPr>
+        <p:spPr>
+          <a:xfrm>
+            <a:off x="319500" y="180900"/>
+            <a:ext cx="2808000" cy="755700"/>
+          </a:xfrm>
+        </p:spPr>
+        <p:txBody>
+          <a:bodyPr/>
+          <a:lstStyle/>
+          <a:p>
+            <a:r>
+              <a:rPr lang="en-US" dirty="0" err="1"/>
+              <a:t>AutoML</a:t>
+            </a:r>
+            <a:endParaRPr lang="en-US" dirty="0"/>
+          </a:p>
+        </p:txBody>
+      </p:sp>
+      <p:sp>
+        <p:nvSpPr>
+          <p:cNvPr id="3" name="Text Placeholder 2">
+            <a:extLst>
+              <a:ext uri="{FF2B5EF4-FFF2-40B4-BE49-F238E27FC236}">
+                <a16:creationId xmlns:a16="http://schemas.microsoft.com/office/drawing/2014/main" id="{0A6D9E67-C183-48CE-A744-2C8AB740048D}"/>
+              </a:ext>
+            </a:extLst>
+          </p:cNvPr>
+          <p:cNvSpPr>
+            <a:spLocks noGrp="1"/>
+          </p:cNvSpPr>
+          <p:nvPr>
+            <p:ph type="body" idx="1"/>
+          </p:nvPr>
+        </p:nvSpPr>
+        <p:spPr>
+          <a:xfrm>
+            <a:off x="319499" y="936600"/>
+            <a:ext cx="3552845" cy="3716404"/>
+          </a:xfrm>
+        </p:spPr>
+        <p:txBody>
+          <a:bodyPr/>
+          <a:lstStyle/>
+          <a:p>
+            <a:pPr>
+              <a:spcBef>
+                <a:spcPts val="600"/>
+              </a:spcBef>
+            </a:pPr>
+            <a:r>
+              <a:rPr lang="en-US" dirty="0"/>
+              <a:t>Automatically test various algorithms, hyperparameters, and scaling techniques</a:t>
+            </a:r>
+          </a:p>
+          <a:p>
+            <a:pPr>
+              <a:spcBef>
+                <a:spcPts val="600"/>
+              </a:spcBef>
+            </a:pPr>
+            <a:r>
+              <a:rPr lang="en-US" dirty="0"/>
+              <a:t>Three Experiment Types:</a:t>
+            </a:r>
+          </a:p>
+          <a:p>
+            <a:pPr lvl="1">
+              <a:spcBef>
+                <a:spcPts val="600"/>
+              </a:spcBef>
+            </a:pPr>
+            <a:r>
+              <a:rPr lang="en-US" dirty="0"/>
+              <a:t>Classification</a:t>
+            </a:r>
+          </a:p>
+          <a:p>
+            <a:pPr lvl="1">
+              <a:spcBef>
+                <a:spcPts val="600"/>
+              </a:spcBef>
+            </a:pPr>
+            <a:r>
+              <a:rPr lang="en-US" dirty="0"/>
+              <a:t>Regression</a:t>
+            </a:r>
+          </a:p>
+          <a:p>
+            <a:pPr lvl="1">
+              <a:spcBef>
+                <a:spcPts val="600"/>
+              </a:spcBef>
+            </a:pPr>
+            <a:r>
+              <a:rPr lang="en-US" dirty="0"/>
+              <a:t>Forecasting</a:t>
+            </a:r>
+          </a:p>
+          <a:p>
+            <a:pPr>
+              <a:spcBef>
+                <a:spcPts val="600"/>
+              </a:spcBef>
+            </a:pPr>
+            <a:r>
+              <a:rPr lang="en-US" dirty="0"/>
+              <a:t>Steps:</a:t>
+            </a:r>
+          </a:p>
+          <a:p>
+            <a:pPr lvl="1">
+              <a:spcBef>
+                <a:spcPts val="600"/>
+              </a:spcBef>
+            </a:pPr>
+            <a:r>
+              <a:rPr lang="en-US" dirty="0"/>
+              <a:t>Preprocessing &amp; Scaling</a:t>
+            </a:r>
+          </a:p>
+          <a:p>
+            <a:pPr lvl="1">
+              <a:spcBef>
+                <a:spcPts val="600"/>
+              </a:spcBef>
+            </a:pPr>
+            <a:r>
+              <a:rPr lang="en-US" dirty="0"/>
+              <a:t>Featurization</a:t>
+            </a:r>
+          </a:p>
+          <a:p>
+            <a:pPr lvl="1">
+              <a:spcBef>
+                <a:spcPts val="600"/>
+              </a:spcBef>
+            </a:pPr>
+            <a:r>
+              <a:rPr lang="en-US" dirty="0"/>
+              <a:t>Cross-Validation</a:t>
+            </a:r>
+          </a:p>
+          <a:p>
+            <a:pPr lvl="1">
+              <a:spcBef>
+                <a:spcPts val="600"/>
+              </a:spcBef>
+            </a:pPr>
+            <a:r>
+              <a:rPr lang="en-US" dirty="0" err="1"/>
+              <a:t>Ensembling</a:t>
+            </a:r>
+            <a:endParaRPr lang="en-US" dirty="0"/>
+          </a:p>
+          <a:p>
+            <a:pPr lvl="1">
+              <a:spcBef>
+                <a:spcPts val="600"/>
+              </a:spcBef>
+            </a:pPr>
+            <a:endParaRPr lang="en-US" dirty="0"/>
+          </a:p>
+        </p:txBody>
+      </p:sp>
+      <p:graphicFrame>
+        <p:nvGraphicFramePr>
+          <p:cNvPr id="4" name="Table 3">
+            <a:extLst>
+              <a:ext uri="{FF2B5EF4-FFF2-40B4-BE49-F238E27FC236}">
+                <a16:creationId xmlns:a16="http://schemas.microsoft.com/office/drawing/2014/main" id="{287E4274-7456-4C85-ACEB-DF88F6F79EF5}"/>
+              </a:ext>
+            </a:extLst>
+          </p:cNvPr>
+          <p:cNvGraphicFramePr>
+            <a:graphicFrameLocks noGrp="1"/>
+          </p:cNvGraphicFramePr>
+          <p:nvPr>
+            <p:extLst/>
+          </p:nvPr>
+        </p:nvGraphicFramePr>
+        <p:xfrm>
+          <a:off x="3817974" y="640146"/>
+          <a:ext cx="4865759" cy="3585984"/>
+        </p:xfrm>
+        <a:graphic>
+          <a:graphicData uri="http://schemas.openxmlformats.org/drawingml/2006/table">
+            <a:tbl>
+              <a:tblPr/>
+              <a:tblGrid>
+                <a:gridCol w="2418557">
+                  <a:extLst>
+                    <a:ext uri="{9D8B030D-6E8A-4147-A177-3AD203B41FA5}">
+                      <a16:colId xmlns:a16="http://schemas.microsoft.com/office/drawing/2014/main" val="1089580484"/>
+                    </a:ext>
+                  </a:extLst>
+                </a:gridCol>
+                <a:gridCol w="2447202">
+                  <a:extLst>
+                    <a:ext uri="{9D8B030D-6E8A-4147-A177-3AD203B41FA5}">
+                      <a16:colId xmlns:a16="http://schemas.microsoft.com/office/drawing/2014/main" val="1382446080"/>
+                    </a:ext>
+                  </a:extLst>
+                </a:gridCol>
+              </a:tblGrid>
+              <a:tr h="178790">
+                <a:tc>
+                  <a:txBody>
+                    <a:bodyPr/>
+                    <a:lstStyle/>
+                    <a:p>
+                      <a:pPr algn="ctr"/>
+                      <a:r>
+                        <a:rPr lang="en-US" sz="1200" b="1"/>
+                        <a:t>Classification</a:t>
+                      </a:r>
+                    </a:p>
+                  </a:txBody>
+                  <a:tcPr marL="52666" marR="52666" marT="26333" marB="26333" anchor="ctr">
+                    <a:lnL>
+                      <a:noFill/>
+                    </a:lnL>
+                    <a:lnR>
+                      <a:noFill/>
+                    </a:lnR>
+                    <a:lnT>
+                      <a:noFill/>
+                    </a:lnT>
+                    <a:lnB>
+                      <a:noFill/>
+                    </a:lnB>
+                  </a:tcPr>
+                </a:tc>
+                <a:tc>
+                  <a:txBody>
+                    <a:bodyPr/>
+                    <a:lstStyle/>
+                    <a:p>
+                      <a:pPr algn="ctr"/>
+                      <a:r>
+                        <a:rPr lang="en-US" sz="1200" b="1" dirty="0"/>
+                        <a:t>Regression &amp;</a:t>
+                      </a:r>
+                    </a:p>
+                    <a:p>
+                      <a:pPr algn="ctr"/>
+                      <a:r>
+                        <a:rPr lang="en-US" sz="1200" b="1" dirty="0"/>
+                        <a:t>Time Series Forecasting</a:t>
+                      </a:r>
+                    </a:p>
+                  </a:txBody>
+                  <a:tcPr marL="52666" marR="52666" marT="26333" marB="26333" anchor="ctr">
+                    <a:lnL>
+                      <a:noFill/>
+                    </a:lnL>
+                    <a:lnR>
+                      <a:noFill/>
+                    </a:lnR>
+                    <a:lnT>
+                      <a:noFill/>
+                    </a:lnT>
+                    <a:lnB>
+                      <a:noFill/>
+                    </a:lnB>
+                  </a:tcPr>
+                </a:tc>
+                <a:extLst>
+                  <a:ext uri="{0D108BD9-81ED-4DB2-BD59-A6C34878D82A}">
+                    <a16:rowId xmlns:a16="http://schemas.microsoft.com/office/drawing/2014/main" val="3301145887"/>
+                  </a:ext>
+                </a:extLst>
+              </a:tr>
+              <a:tr h="178790">
+                <a:tc>
+                  <a:txBody>
+                    <a:bodyPr/>
+                    <a:lstStyle/>
+                    <a:p>
+                      <a:r>
+                        <a:rPr lang="en-US" sz="1000">
+                          <a:hlinkClick r:id="rId2"/>
+                        </a:rPr>
+                        <a:t>Logistic Regression</a:t>
+                      </a:r>
+                      <a:endParaRPr lang="en-US" sz="1000"/>
+                    </a:p>
+                  </a:txBody>
+                  <a:tcPr marL="52666" marR="52666" marT="26333" marB="26333" anchor="ctr">
+                    <a:lnL>
+                      <a:noFill/>
+                    </a:lnL>
+                    <a:lnR>
+                      <a:noFill/>
+                    </a:lnR>
+                    <a:lnT>
+                      <a:noFill/>
+                    </a:lnT>
+                    <a:lnB>
+                      <a:noFill/>
+                    </a:lnB>
+                  </a:tcPr>
+                </a:tc>
+                <a:tc>
+                  <a:txBody>
+                    <a:bodyPr/>
+                    <a:lstStyle/>
+                    <a:p>
+                      <a:r>
+                        <a:rPr lang="en-US" sz="1000" dirty="0">
+                          <a:hlinkClick r:id="rId3"/>
+                        </a:rPr>
+                        <a:t>Elastic Net</a:t>
+                      </a:r>
+                      <a:endParaRPr lang="en-US" sz="1000" dirty="0"/>
+                    </a:p>
+                  </a:txBody>
+                  <a:tcPr marL="52666" marR="52666" marT="26333" marB="26333" anchor="ctr">
+                    <a:lnL>
+                      <a:noFill/>
+                    </a:lnL>
+                    <a:lnR>
+                      <a:noFill/>
+                    </a:lnR>
+                    <a:lnT>
+                      <a:noFill/>
+                    </a:lnT>
+                    <a:lnB>
+                      <a:noFill/>
+                    </a:lnB>
+                  </a:tcPr>
+                </a:tc>
+                <a:extLst>
+                  <a:ext uri="{0D108BD9-81ED-4DB2-BD59-A6C34878D82A}">
+                    <a16:rowId xmlns:a16="http://schemas.microsoft.com/office/drawing/2014/main" val="801165373"/>
+                  </a:ext>
+                </a:extLst>
+              </a:tr>
+              <a:tr h="178790">
+                <a:tc>
+                  <a:txBody>
+                    <a:bodyPr/>
+                    <a:lstStyle/>
+                    <a:p>
+                      <a:r>
+                        <a:rPr lang="en-US" sz="1000">
+                          <a:hlinkClick r:id="rId4"/>
+                        </a:rPr>
+                        <a:t>Light GBM</a:t>
+                      </a:r>
+                      <a:endParaRPr lang="en-US" sz="1000"/>
+                    </a:p>
+                  </a:txBody>
+                  <a:tcPr marL="52666" marR="52666" marT="26333" marB="26333" anchor="ctr">
+                    <a:lnL>
+                      <a:noFill/>
+                    </a:lnL>
+                    <a:lnR>
+                      <a:noFill/>
+                    </a:lnR>
+                    <a:lnT>
+                      <a:noFill/>
+                    </a:lnT>
+                    <a:lnB>
+                      <a:noFill/>
+                    </a:lnB>
+                  </a:tcPr>
+                </a:tc>
+                <a:tc>
+                  <a:txBody>
+                    <a:bodyPr/>
+                    <a:lstStyle/>
+                    <a:p>
+                      <a:r>
+                        <a:rPr lang="en-US" sz="1000">
+                          <a:hlinkClick r:id="rId4"/>
+                        </a:rPr>
+                        <a:t>Light GBM</a:t>
+                      </a:r>
+                      <a:endParaRPr lang="en-US" sz="1000"/>
+                    </a:p>
+                  </a:txBody>
+                  <a:tcPr marL="52666" marR="52666" marT="26333" marB="26333" anchor="ctr">
+                    <a:lnL>
+                      <a:noFill/>
+                    </a:lnL>
+                    <a:lnR>
+                      <a:noFill/>
+                    </a:lnR>
+                    <a:lnT>
+                      <a:noFill/>
+                    </a:lnT>
+                    <a:lnB>
+                      <a:noFill/>
+                    </a:lnB>
+                  </a:tcPr>
+                </a:tc>
+                <a:extLst>
+                  <a:ext uri="{0D108BD9-81ED-4DB2-BD59-A6C34878D82A}">
+                    <a16:rowId xmlns:a16="http://schemas.microsoft.com/office/drawing/2014/main" val="1291908786"/>
+                  </a:ext>
+                </a:extLst>
+              </a:tr>
+              <a:tr h="178790">
+                <a:tc>
+                  <a:txBody>
+                    <a:bodyPr/>
+                    <a:lstStyle/>
+                    <a:p>
+                      <a:r>
+                        <a:rPr lang="en-US" sz="1000">
+                          <a:hlinkClick r:id="rId5"/>
+                        </a:rPr>
+                        <a:t>Gradient Boosting</a:t>
+                      </a:r>
+                      <a:endParaRPr lang="en-US" sz="1000"/>
+                    </a:p>
+                  </a:txBody>
+                  <a:tcPr marL="52666" marR="52666" marT="26333" marB="26333" anchor="ctr">
+                    <a:lnL>
+                      <a:noFill/>
+                    </a:lnL>
+                    <a:lnR>
+                      <a:noFill/>
+                    </a:lnR>
+                    <a:lnT>
+                      <a:noFill/>
+                    </a:lnT>
+                    <a:lnB>
+                      <a:noFill/>
+                    </a:lnB>
+                  </a:tcPr>
+                </a:tc>
+                <a:tc>
+                  <a:txBody>
+                    <a:bodyPr/>
+                    <a:lstStyle/>
+                    <a:p>
+                      <a:r>
+                        <a:rPr lang="en-US" sz="1000">
+                          <a:hlinkClick r:id="rId6"/>
+                        </a:rPr>
+                        <a:t>Gradient Boosting</a:t>
+                      </a:r>
+                      <a:endParaRPr lang="en-US" sz="1000"/>
+                    </a:p>
+                  </a:txBody>
+                  <a:tcPr marL="52666" marR="52666" marT="26333" marB="26333" anchor="ctr">
+                    <a:lnL>
+                      <a:noFill/>
+                    </a:lnL>
+                    <a:lnR>
+                      <a:noFill/>
+                    </a:lnR>
+                    <a:lnT>
+                      <a:noFill/>
+                    </a:lnT>
+                    <a:lnB>
+                      <a:noFill/>
+                    </a:lnB>
+                  </a:tcPr>
+                </a:tc>
+                <a:extLst>
+                  <a:ext uri="{0D108BD9-81ED-4DB2-BD59-A6C34878D82A}">
+                    <a16:rowId xmlns:a16="http://schemas.microsoft.com/office/drawing/2014/main" val="1841407873"/>
+                  </a:ext>
+                </a:extLst>
+              </a:tr>
+              <a:tr h="178790">
+                <a:tc>
+                  <a:txBody>
+                    <a:bodyPr/>
+                    <a:lstStyle/>
+                    <a:p>
+                      <a:r>
+                        <a:rPr lang="en-US" sz="1000">
+                          <a:hlinkClick r:id="rId7"/>
+                        </a:rPr>
+                        <a:t>Decision Tree</a:t>
+                      </a:r>
+                      <a:endParaRPr lang="en-US" sz="1000"/>
+                    </a:p>
+                  </a:txBody>
+                  <a:tcPr marL="52666" marR="52666" marT="26333" marB="26333" anchor="ctr">
+                    <a:lnL>
+                      <a:noFill/>
+                    </a:lnL>
+                    <a:lnR>
+                      <a:noFill/>
+                    </a:lnR>
+                    <a:lnT>
+                      <a:noFill/>
+                    </a:lnT>
+                    <a:lnB>
+                      <a:noFill/>
+                    </a:lnB>
+                  </a:tcPr>
+                </a:tc>
+                <a:tc>
+                  <a:txBody>
+                    <a:bodyPr/>
+                    <a:lstStyle/>
+                    <a:p>
+                      <a:r>
+                        <a:rPr lang="en-US" sz="1000">
+                          <a:hlinkClick r:id="rId8"/>
+                        </a:rPr>
+                        <a:t>Decision Tree</a:t>
+                      </a:r>
+                      <a:endParaRPr lang="en-US" sz="1000"/>
+                    </a:p>
+                  </a:txBody>
+                  <a:tcPr marL="52666" marR="52666" marT="26333" marB="26333" anchor="ctr">
+                    <a:lnL>
+                      <a:noFill/>
+                    </a:lnL>
+                    <a:lnR>
+                      <a:noFill/>
+                    </a:lnR>
+                    <a:lnT>
+                      <a:noFill/>
+                    </a:lnT>
+                    <a:lnB>
+                      <a:noFill/>
+                    </a:lnB>
+                  </a:tcPr>
+                </a:tc>
+                <a:extLst>
+                  <a:ext uri="{0D108BD9-81ED-4DB2-BD59-A6C34878D82A}">
+                    <a16:rowId xmlns:a16="http://schemas.microsoft.com/office/drawing/2014/main" val="833870345"/>
+                  </a:ext>
+                </a:extLst>
+              </a:tr>
+              <a:tr h="178790">
+                <a:tc>
+                  <a:txBody>
+                    <a:bodyPr/>
+                    <a:lstStyle/>
+                    <a:p>
+                      <a:r>
+                        <a:rPr lang="en-US" sz="1000">
+                          <a:hlinkClick r:id="rId9"/>
+                        </a:rPr>
+                        <a:t>K Nearest Neighbors</a:t>
+                      </a:r>
+                      <a:endParaRPr lang="en-US" sz="1000"/>
+                    </a:p>
+                  </a:txBody>
+                  <a:tcPr marL="52666" marR="52666" marT="26333" marB="26333" anchor="ctr">
+                    <a:lnL>
+                      <a:noFill/>
+                    </a:lnL>
+                    <a:lnR>
+                      <a:noFill/>
+                    </a:lnR>
+                    <a:lnT>
+                      <a:noFill/>
+                    </a:lnT>
+                    <a:lnB>
+                      <a:noFill/>
+                    </a:lnB>
+                  </a:tcPr>
+                </a:tc>
+                <a:tc>
+                  <a:txBody>
+                    <a:bodyPr/>
+                    <a:lstStyle/>
+                    <a:p>
+                      <a:r>
+                        <a:rPr lang="en-US" sz="1000">
+                          <a:hlinkClick r:id="rId9"/>
+                        </a:rPr>
+                        <a:t>K Nearest Neighbors</a:t>
+                      </a:r>
+                      <a:endParaRPr lang="en-US" sz="1000"/>
+                    </a:p>
+                  </a:txBody>
+                  <a:tcPr marL="52666" marR="52666" marT="26333" marB="26333" anchor="ctr">
+                    <a:lnL>
+                      <a:noFill/>
+                    </a:lnL>
+                    <a:lnR>
+                      <a:noFill/>
+                    </a:lnR>
+                    <a:lnT>
+                      <a:noFill/>
+                    </a:lnT>
+                    <a:lnB>
+                      <a:noFill/>
+                    </a:lnB>
+                  </a:tcPr>
+                </a:tc>
+                <a:extLst>
+                  <a:ext uri="{0D108BD9-81ED-4DB2-BD59-A6C34878D82A}">
+                    <a16:rowId xmlns:a16="http://schemas.microsoft.com/office/drawing/2014/main" val="2832259499"/>
+                  </a:ext>
+                </a:extLst>
+              </a:tr>
+              <a:tr h="178790">
+                <a:tc>
+                  <a:txBody>
+                    <a:bodyPr/>
+                    <a:lstStyle/>
+                    <a:p>
+                      <a:r>
+                        <a:rPr lang="en-US" sz="1000">
+                          <a:hlinkClick r:id="rId10"/>
+                        </a:rPr>
+                        <a:t>Linear SVC</a:t>
+                      </a:r>
+                      <a:endParaRPr lang="en-US" sz="1000"/>
+                    </a:p>
+                  </a:txBody>
+                  <a:tcPr marL="52666" marR="52666" marT="26333" marB="26333" anchor="ctr">
+                    <a:lnL>
+                      <a:noFill/>
+                    </a:lnL>
+                    <a:lnR>
+                      <a:noFill/>
+                    </a:lnR>
+                    <a:lnT>
+                      <a:noFill/>
+                    </a:lnT>
+                    <a:lnB>
+                      <a:noFill/>
+                    </a:lnB>
+                  </a:tcPr>
+                </a:tc>
+                <a:tc>
+                  <a:txBody>
+                    <a:bodyPr/>
+                    <a:lstStyle/>
+                    <a:p>
+                      <a:r>
+                        <a:rPr lang="en-US" sz="1000">
+                          <a:hlinkClick r:id="rId11"/>
+                        </a:rPr>
+                        <a:t>LARS Lasso</a:t>
+                      </a:r>
+                      <a:endParaRPr lang="en-US" sz="1000"/>
+                    </a:p>
+                  </a:txBody>
+                  <a:tcPr marL="52666" marR="52666" marT="26333" marB="26333" anchor="ctr">
+                    <a:lnL>
+                      <a:noFill/>
+                    </a:lnL>
+                    <a:lnR>
+                      <a:noFill/>
+                    </a:lnR>
+                    <a:lnT>
+                      <a:noFill/>
+                    </a:lnT>
+                    <a:lnB>
+                      <a:noFill/>
+                    </a:lnB>
+                  </a:tcPr>
+                </a:tc>
+                <a:extLst>
+                  <a:ext uri="{0D108BD9-81ED-4DB2-BD59-A6C34878D82A}">
+                    <a16:rowId xmlns:a16="http://schemas.microsoft.com/office/drawing/2014/main" val="228754427"/>
+                  </a:ext>
+                </a:extLst>
+              </a:tr>
+              <a:tr h="303944">
+                <a:tc>
+                  <a:txBody>
+                    <a:bodyPr/>
+                    <a:lstStyle/>
+                    <a:p>
+                      <a:r>
+                        <a:rPr lang="en-US" sz="1000">
+                          <a:hlinkClick r:id="rId10"/>
+                        </a:rPr>
+                        <a:t>C-Support Vector Classification (SVC)</a:t>
+                      </a:r>
+                      <a:endParaRPr lang="en-US" sz="1000"/>
+                    </a:p>
+                  </a:txBody>
+                  <a:tcPr marL="52666" marR="52666" marT="26333" marB="26333" anchor="ctr">
+                    <a:lnL>
+                      <a:noFill/>
+                    </a:lnL>
+                    <a:lnR>
+                      <a:noFill/>
+                    </a:lnR>
+                    <a:lnT>
+                      <a:noFill/>
+                    </a:lnT>
+                    <a:lnB>
+                      <a:noFill/>
+                    </a:lnB>
+                  </a:tcPr>
+                </a:tc>
+                <a:tc>
+                  <a:txBody>
+                    <a:bodyPr/>
+                    <a:lstStyle/>
+                    <a:p>
+                      <a:r>
+                        <a:rPr lang="en-US" sz="1000">
+                          <a:hlinkClick r:id="rId12"/>
+                        </a:rPr>
+                        <a:t>Stochastic Gradient Descent (SGD)</a:t>
+                      </a:r>
+                      <a:endParaRPr lang="en-US" sz="1000"/>
+                    </a:p>
+                  </a:txBody>
+                  <a:tcPr marL="52666" marR="52666" marT="26333" marB="26333" anchor="ctr">
+                    <a:lnL>
+                      <a:noFill/>
+                    </a:lnL>
+                    <a:lnR>
+                      <a:noFill/>
+                    </a:lnR>
+                    <a:lnT>
+                      <a:noFill/>
+                    </a:lnT>
+                    <a:lnB>
+                      <a:noFill/>
+                    </a:lnB>
+                  </a:tcPr>
+                </a:tc>
+                <a:extLst>
+                  <a:ext uri="{0D108BD9-81ED-4DB2-BD59-A6C34878D82A}">
+                    <a16:rowId xmlns:a16="http://schemas.microsoft.com/office/drawing/2014/main" val="482337621"/>
+                  </a:ext>
+                </a:extLst>
+              </a:tr>
+              <a:tr h="178790">
+                <a:tc>
+                  <a:txBody>
+                    <a:bodyPr/>
+                    <a:lstStyle/>
+                    <a:p>
+                      <a:r>
+                        <a:rPr lang="en-US" sz="1000">
+                          <a:hlinkClick r:id="rId13"/>
+                        </a:rPr>
+                        <a:t>Random Forest</a:t>
+                      </a:r>
+                      <a:endParaRPr lang="en-US" sz="1000"/>
+                    </a:p>
+                  </a:txBody>
+                  <a:tcPr marL="52666" marR="52666" marT="26333" marB="26333" anchor="ctr">
+                    <a:lnL>
+                      <a:noFill/>
+                    </a:lnL>
+                    <a:lnR>
+                      <a:noFill/>
+                    </a:lnR>
+                    <a:lnT>
+                      <a:noFill/>
+                    </a:lnT>
+                    <a:lnB>
+                      <a:noFill/>
+                    </a:lnB>
+                  </a:tcPr>
+                </a:tc>
+                <a:tc>
+                  <a:txBody>
+                    <a:bodyPr/>
+                    <a:lstStyle/>
+                    <a:p>
+                      <a:r>
+                        <a:rPr lang="en-US" sz="1000">
+                          <a:hlinkClick r:id="rId13"/>
+                        </a:rPr>
+                        <a:t>Random Forest</a:t>
+                      </a:r>
+                      <a:endParaRPr lang="en-US" sz="1000"/>
+                    </a:p>
+                  </a:txBody>
+                  <a:tcPr marL="52666" marR="52666" marT="26333" marB="26333" anchor="ctr">
+                    <a:lnL>
+                      <a:noFill/>
+                    </a:lnL>
+                    <a:lnR>
+                      <a:noFill/>
+                    </a:lnR>
+                    <a:lnT>
+                      <a:noFill/>
+                    </a:lnT>
+                    <a:lnB>
+                      <a:noFill/>
+                    </a:lnB>
+                  </a:tcPr>
+                </a:tc>
+                <a:extLst>
+                  <a:ext uri="{0D108BD9-81ED-4DB2-BD59-A6C34878D82A}">
+                    <a16:rowId xmlns:a16="http://schemas.microsoft.com/office/drawing/2014/main" val="1521599616"/>
+                  </a:ext>
+                </a:extLst>
+              </a:tr>
+              <a:tr h="303944">
+                <a:tc>
+                  <a:txBody>
+                    <a:bodyPr/>
+                    <a:lstStyle/>
+                    <a:p>
+                      <a:r>
+                        <a:rPr lang="en-US" sz="1000">
+                          <a:hlinkClick r:id="rId14"/>
+                        </a:rPr>
+                        <a:t>Extremely Randomized Trees</a:t>
+                      </a:r>
+                      <a:endParaRPr lang="en-US" sz="1000"/>
+                    </a:p>
+                  </a:txBody>
+                  <a:tcPr marL="52666" marR="52666" marT="26333" marB="26333" anchor="ctr">
+                    <a:lnL>
+                      <a:noFill/>
+                    </a:lnL>
+                    <a:lnR>
+                      <a:noFill/>
+                    </a:lnR>
+                    <a:lnT>
+                      <a:noFill/>
+                    </a:lnT>
+                    <a:lnB>
+                      <a:noFill/>
+                    </a:lnB>
+                  </a:tcPr>
+                </a:tc>
+                <a:tc>
+                  <a:txBody>
+                    <a:bodyPr/>
+                    <a:lstStyle/>
+                    <a:p>
+                      <a:r>
+                        <a:rPr lang="en-US" sz="1000">
+                          <a:hlinkClick r:id="rId14"/>
+                        </a:rPr>
+                        <a:t>Extremely Randomized Trees</a:t>
+                      </a:r>
+                      <a:endParaRPr lang="en-US" sz="1000"/>
+                    </a:p>
+                  </a:txBody>
+                  <a:tcPr marL="52666" marR="52666" marT="26333" marB="26333" anchor="ctr">
+                    <a:lnL>
+                      <a:noFill/>
+                    </a:lnL>
+                    <a:lnR>
+                      <a:noFill/>
+                    </a:lnR>
+                    <a:lnT>
+                      <a:noFill/>
+                    </a:lnT>
+                    <a:lnB>
+                      <a:noFill/>
+                    </a:lnB>
+                  </a:tcPr>
+                </a:tc>
+                <a:extLst>
+                  <a:ext uri="{0D108BD9-81ED-4DB2-BD59-A6C34878D82A}">
+                    <a16:rowId xmlns:a16="http://schemas.microsoft.com/office/drawing/2014/main" val="1154399125"/>
+                  </a:ext>
+                </a:extLst>
+              </a:tr>
+              <a:tr h="178790">
+                <a:tc>
+                  <a:txBody>
+                    <a:bodyPr/>
+                    <a:lstStyle/>
+                    <a:p>
+                      <a:r>
+                        <a:rPr lang="en-US" sz="1000" dirty="0" err="1">
+                          <a:hlinkClick r:id="rId15"/>
+                        </a:rPr>
+                        <a:t>Xgboost</a:t>
+                      </a:r>
+                      <a:endParaRPr lang="en-US" sz="1000" dirty="0"/>
+                    </a:p>
+                  </a:txBody>
+                  <a:tcPr marL="52666" marR="52666" marT="26333" marB="26333" anchor="ctr">
+                    <a:lnL>
+                      <a:noFill/>
+                    </a:lnL>
+                    <a:lnR>
+                      <a:noFill/>
+                    </a:lnR>
+                    <a:lnT>
+                      <a:noFill/>
+                    </a:lnT>
+                    <a:lnB>
+                      <a:noFill/>
+                    </a:lnB>
+                  </a:tcPr>
+                </a:tc>
+                <a:tc>
+                  <a:txBody>
+                    <a:bodyPr/>
+                    <a:lstStyle/>
+                    <a:p>
+                      <a:r>
+                        <a:rPr lang="en-US" sz="1000">
+                          <a:hlinkClick r:id="rId15"/>
+                        </a:rPr>
+                        <a:t>Xgboost</a:t>
+                      </a:r>
+                      <a:endParaRPr lang="en-US" sz="1000"/>
+                    </a:p>
+                  </a:txBody>
+                  <a:tcPr marL="52666" marR="52666" marT="26333" marB="26333" anchor="ctr">
+                    <a:lnL>
+                      <a:noFill/>
+                    </a:lnL>
+                    <a:lnR>
+                      <a:noFill/>
+                    </a:lnR>
+                    <a:lnT>
+                      <a:noFill/>
+                    </a:lnT>
+                    <a:lnB>
+                      <a:noFill/>
+                    </a:lnB>
+                  </a:tcPr>
+                </a:tc>
+                <a:extLst>
+                  <a:ext uri="{0D108BD9-81ED-4DB2-BD59-A6C34878D82A}">
+                    <a16:rowId xmlns:a16="http://schemas.microsoft.com/office/drawing/2014/main" val="3537502937"/>
+                  </a:ext>
+                </a:extLst>
+              </a:tr>
+              <a:tr h="178790">
+                <a:tc>
+                  <a:txBody>
+                    <a:bodyPr/>
+                    <a:lstStyle/>
+                    <a:p>
+                      <a:r>
+                        <a:rPr lang="en-US" sz="1000">
+                          <a:hlinkClick r:id="rId16"/>
+                        </a:rPr>
+                        <a:t>DNN Classifier</a:t>
+                      </a:r>
+                      <a:endParaRPr lang="en-US" sz="1000"/>
+                    </a:p>
+                  </a:txBody>
+                  <a:tcPr marL="52666" marR="52666" marT="26333" marB="26333" anchor="ctr">
+                    <a:lnL>
+                      <a:noFill/>
+                    </a:lnL>
+                    <a:lnR>
+                      <a:noFill/>
+                    </a:lnR>
+                    <a:lnT>
+                      <a:noFill/>
+                    </a:lnT>
+                    <a:lnB>
+                      <a:noFill/>
+                    </a:lnB>
+                  </a:tcPr>
+                </a:tc>
+                <a:tc>
+                  <a:txBody>
+                    <a:bodyPr/>
+                    <a:lstStyle/>
+                    <a:p>
+                      <a:r>
+                        <a:rPr lang="en-US" sz="1000">
+                          <a:hlinkClick r:id="rId17"/>
+                        </a:rPr>
+                        <a:t>DNN Regressor</a:t>
+                      </a:r>
+                      <a:endParaRPr lang="en-US" sz="1000"/>
+                    </a:p>
+                  </a:txBody>
+                  <a:tcPr marL="52666" marR="52666" marT="26333" marB="26333" anchor="ctr">
+                    <a:lnL>
+                      <a:noFill/>
+                    </a:lnL>
+                    <a:lnR>
+                      <a:noFill/>
+                    </a:lnR>
+                    <a:lnT>
+                      <a:noFill/>
+                    </a:lnT>
+                    <a:lnB>
+                      <a:noFill/>
+                    </a:lnB>
+                  </a:tcPr>
+                </a:tc>
+                <a:extLst>
+                  <a:ext uri="{0D108BD9-81ED-4DB2-BD59-A6C34878D82A}">
+                    <a16:rowId xmlns:a16="http://schemas.microsoft.com/office/drawing/2014/main" val="1708269267"/>
+                  </a:ext>
+                </a:extLst>
+              </a:tr>
+              <a:tr h="178790">
+                <a:tc>
+                  <a:txBody>
+                    <a:bodyPr/>
+                    <a:lstStyle/>
+                    <a:p>
+                      <a:r>
+                        <a:rPr lang="en-US" sz="1000">
+                          <a:hlinkClick r:id="rId18"/>
+                        </a:rPr>
+                        <a:t>DNN Linear Classifier</a:t>
+                      </a:r>
+                      <a:endParaRPr lang="en-US" sz="1000"/>
+                    </a:p>
+                  </a:txBody>
+                  <a:tcPr marL="52666" marR="52666" marT="26333" marB="26333" anchor="ctr">
+                    <a:lnL>
+                      <a:noFill/>
+                    </a:lnL>
+                    <a:lnR>
+                      <a:noFill/>
+                    </a:lnR>
+                    <a:lnT>
+                      <a:noFill/>
+                    </a:lnT>
+                    <a:lnB>
+                      <a:noFill/>
+                    </a:lnB>
+                  </a:tcPr>
+                </a:tc>
+                <a:tc>
+                  <a:txBody>
+                    <a:bodyPr/>
+                    <a:lstStyle/>
+                    <a:p>
+                      <a:r>
+                        <a:rPr lang="en-US" sz="1000">
+                          <a:hlinkClick r:id="rId19"/>
+                        </a:rPr>
+                        <a:t>Linear Regressor</a:t>
+                      </a:r>
+                      <a:endParaRPr lang="en-US" sz="1000"/>
+                    </a:p>
+                  </a:txBody>
+                  <a:tcPr marL="52666" marR="52666" marT="26333" marB="26333" anchor="ctr">
+                    <a:lnL>
+                      <a:noFill/>
+                    </a:lnL>
+                    <a:lnR>
+                      <a:noFill/>
+                    </a:lnR>
+                    <a:lnT>
+                      <a:noFill/>
+                    </a:lnT>
+                    <a:lnB>
+                      <a:noFill/>
+                    </a:lnB>
+                  </a:tcPr>
+                </a:tc>
+                <a:extLst>
+                  <a:ext uri="{0D108BD9-81ED-4DB2-BD59-A6C34878D82A}">
+                    <a16:rowId xmlns:a16="http://schemas.microsoft.com/office/drawing/2014/main" val="3239242384"/>
+                  </a:ext>
+                </a:extLst>
+              </a:tr>
+              <a:tr h="178790">
+                <a:tc>
+                  <a:txBody>
+                    <a:bodyPr/>
+                    <a:lstStyle/>
+                    <a:p>
+                      <a:r>
+                        <a:rPr lang="en-US" sz="1000">
+                          <a:hlinkClick r:id="rId20"/>
+                        </a:rPr>
+                        <a:t>Naive Bayes</a:t>
+                      </a:r>
+                      <a:endParaRPr lang="en-US" sz="1000"/>
+                    </a:p>
+                  </a:txBody>
+                  <a:tcPr marL="52666" marR="52666" marT="26333" marB="26333" anchor="ctr">
+                    <a:lnL>
+                      <a:noFill/>
+                    </a:lnL>
+                    <a:lnR>
+                      <a:noFill/>
+                    </a:lnR>
+                    <a:lnT>
+                      <a:noFill/>
+                    </a:lnT>
+                    <a:lnB>
+                      <a:noFill/>
+                    </a:lnB>
+                  </a:tcPr>
+                </a:tc>
+                <a:tc>
+                  <a:txBody>
+                    <a:bodyPr/>
+                    <a:lstStyle/>
+                    <a:p>
+                      <a:endParaRPr lang="en-US" sz="1000"/>
+                    </a:p>
+                  </a:txBody>
+                  <a:tcPr marL="52666" marR="52666" marT="26333" marB="26333" anchor="ctr">
+                    <a:lnL>
+                      <a:noFill/>
+                    </a:lnL>
+                    <a:lnR>
+                      <a:noFill/>
+                    </a:lnR>
+                    <a:lnT>
+                      <a:noFill/>
+                    </a:lnT>
+                    <a:lnB>
+                      <a:noFill/>
+                    </a:lnB>
+                  </a:tcPr>
+                </a:tc>
+                <a:extLst>
+                  <a:ext uri="{0D108BD9-81ED-4DB2-BD59-A6C34878D82A}">
+                    <a16:rowId xmlns:a16="http://schemas.microsoft.com/office/drawing/2014/main" val="341898756"/>
+                  </a:ext>
+                </a:extLst>
+              </a:tr>
+              <a:tr h="303944">
+                <a:tc>
+                  <a:txBody>
+                    <a:bodyPr/>
+                    <a:lstStyle/>
+                    <a:p>
+                      <a:r>
+                        <a:rPr lang="en-US" sz="1000">
+                          <a:hlinkClick r:id="rId21"/>
+                        </a:rPr>
+                        <a:t>Stochastic Gradient Descent (SGD)</a:t>
+                      </a:r>
+                      <a:endParaRPr lang="en-US" sz="1000"/>
+                    </a:p>
+                  </a:txBody>
+                  <a:tcPr marL="52666" marR="52666" marT="26333" marB="26333" anchor="ctr">
+                    <a:lnL>
+                      <a:noFill/>
+                    </a:lnL>
+                    <a:lnR>
+                      <a:noFill/>
+                    </a:lnR>
+                    <a:lnT>
+                      <a:noFill/>
+                    </a:lnT>
+                    <a:lnB>
+                      <a:noFill/>
+                    </a:lnB>
+                  </a:tcPr>
+                </a:tc>
+                <a:tc>
+                  <a:txBody>
+                    <a:bodyPr/>
+                    <a:lstStyle/>
+                    <a:p>
+                      <a:endParaRPr lang="en-US" sz="1000" dirty="0"/>
+                    </a:p>
+                  </a:txBody>
+                  <a:tcPr marL="52666" marR="52666" marT="26333" marB="26333" anchor="ctr">
+                    <a:lnL>
+                      <a:noFill/>
+                    </a:lnL>
+                    <a:lnR>
+                      <a:noFill/>
+                    </a:lnR>
+                    <a:lnT>
+                      <a:noFill/>
+                    </a:lnT>
+                    <a:lnB>
+                      <a:noFill/>
+                    </a:lnB>
+                  </a:tcPr>
+                </a:tc>
+                <a:extLst>
+                  <a:ext uri="{0D108BD9-81ED-4DB2-BD59-A6C34878D82A}">
+                    <a16:rowId xmlns:a16="http://schemas.microsoft.com/office/drawing/2014/main" val="3966003278"/>
+                  </a:ext>
+                </a:extLst>
+              </a:tr>
+            </a:tbl>
+          </a:graphicData>
+        </a:graphic>
+      </p:graphicFrame>
+      <p:sp>
+        <p:nvSpPr>
+          <p:cNvPr id="6" name="Rectangle 5">
+            <a:extLst>
+              <a:ext uri="{FF2B5EF4-FFF2-40B4-BE49-F238E27FC236}">
+                <a16:creationId xmlns:a16="http://schemas.microsoft.com/office/drawing/2014/main" id="{C96C4D95-99B7-4E6E-A3D2-B6969D97C36B}"/>
+              </a:ext>
+            </a:extLst>
+          </p:cNvPr>
+          <p:cNvSpPr/>
+          <p:nvPr/>
+        </p:nvSpPr>
+        <p:spPr>
+          <a:xfrm>
+            <a:off x="3178609" y="4831794"/>
+            <a:ext cx="6144490" cy="261610"/>
+          </a:xfrm>
+          <a:prstGeom prst="rect">
+            <a:avLst/>
+          </a:prstGeom>
+        </p:spPr>
+        <p:txBody>
+          <a:bodyPr wrap="square">
+            <a:spAutoFit/>
+          </a:bodyPr>
+          <a:lstStyle/>
+          <a:p>
+            <a:r>
+              <a:rPr lang="en-US" sz="1100" dirty="0">
+                <a:hlinkClick r:id="rId22"/>
+              </a:rPr>
+              <a:t>https://docs.microsoft.com/en-us/azure/machine-learning/service/how-to-configure-auto-train</a:t>
+            </a:r>
+            <a:endParaRPr lang="en-US" sz="1100" dirty="0"/>
+          </a:p>
+        </p:txBody>
+      </p:sp>
+    </p:spTree>
+    <p:extLst>
+      <p:ext uri="{BB962C8B-B14F-4D97-AF65-F5344CB8AC3E}">
+        <p14:creationId xmlns:p14="http://schemas.microsoft.com/office/powerpoint/2010/main" val="3669653429"/>
+      </p:ext>
+    </p:extLst>
+  </p:cSld>
+  <p:clrMapOvr>
+    <a:masterClrMapping/>
+  </p:clrMapOvr>
+</p:sld>
+</file>
+
+<file path=ppt/slides/slide12.xml><?xml version="1.0" encoding="utf-8"?>
+<p:sld xmlns:a="http://schemas.openxmlformats.org/drawingml/2006/main" xmlns:r="http://schemas.openxmlformats.org/officeDocument/2006/relationships" xmlns:p="http://schemas.openxmlformats.org/presentationml/2006/main">
+  <p:cSld>
+    <p:spTree>
+      <p:nvGrpSpPr>
+        <p:cNvPr id="1" name=""/>
+        <p:cNvGrpSpPr/>
+        <p:nvPr/>
+      </p:nvGrpSpPr>
+      <p:grpSpPr>
+        <a:xfrm>
+          <a:off x="0" y="0"/>
+          <a:ext cx="0" cy="0"/>
+          <a:chOff x="0" y="0"/>
+          <a:chExt cx="0" cy="0"/>
+        </a:xfrm>
+      </p:grpSpPr>
+      <p:sp>
+        <p:nvSpPr>
+          <p:cNvPr id="2" name="Title 1">
+            <a:extLst>
+              <a:ext uri="{FF2B5EF4-FFF2-40B4-BE49-F238E27FC236}">
+                <a16:creationId xmlns:a16="http://schemas.microsoft.com/office/drawing/2014/main" id="{B01CFD37-EDF7-42F2-9518-A10251253ABA}"/>
+              </a:ext>
+            </a:extLst>
+          </p:cNvPr>
+          <p:cNvSpPr>
+            <a:spLocks noGrp="1"/>
+          </p:cNvSpPr>
+          <p:nvPr>
+            <p:ph type="title"/>
+          </p:nvPr>
+        </p:nvSpPr>
+        <p:spPr/>
+        <p:txBody>
+          <a:bodyPr/>
+          <a:lstStyle/>
+          <a:p>
+            <a:r>
+              <a:rPr lang="en-US" dirty="0"/>
+              <a:t>Picking the Best Model</a:t>
+            </a:r>
+          </a:p>
+        </p:txBody>
+      </p:sp>
+      <p:sp>
+        <p:nvSpPr>
+          <p:cNvPr id="3" name="Text Placeholder 2">
+            <a:extLst>
+              <a:ext uri="{FF2B5EF4-FFF2-40B4-BE49-F238E27FC236}">
+                <a16:creationId xmlns:a16="http://schemas.microsoft.com/office/drawing/2014/main" id="{7B559461-43BB-4521-B584-E6B31A283F52}"/>
+              </a:ext>
+            </a:extLst>
+          </p:cNvPr>
+          <p:cNvSpPr>
+            <a:spLocks noGrp="1"/>
+          </p:cNvSpPr>
+          <p:nvPr>
+            <p:ph type="body" idx="1"/>
+          </p:nvPr>
+        </p:nvSpPr>
+        <p:spPr>
+          <a:xfrm>
+            <a:off x="422028" y="1565150"/>
+            <a:ext cx="3071400" cy="3002400"/>
+          </a:xfrm>
+        </p:spPr>
+        <p:txBody>
+          <a:bodyPr>
+            <a:normAutofit fontScale="92500" lnSpcReduction="20000"/>
+          </a:bodyPr>
+          <a:lstStyle/>
+          <a:p>
+            <a:r>
+              <a:rPr lang="en-US" dirty="0"/>
+              <a:t>Picks a best model(s) based on a Primary Metric</a:t>
+            </a:r>
+          </a:p>
+          <a:p>
+            <a:pPr lvl="1">
+              <a:spcBef>
+                <a:spcPts val="600"/>
+              </a:spcBef>
+            </a:pPr>
+            <a:r>
+              <a:rPr lang="en-US" dirty="0"/>
+              <a:t>In Classification Problems:</a:t>
+            </a:r>
+          </a:p>
+          <a:p>
+            <a:pPr lvl="2">
+              <a:spcBef>
+                <a:spcPts val="600"/>
+              </a:spcBef>
+            </a:pPr>
+            <a:r>
+              <a:rPr lang="en-US" dirty="0"/>
+              <a:t>Accuracy, Weighted AUC, Average Weighted Precision Score, Normalized Macro Recall, Weighted Precision Score</a:t>
+            </a:r>
+          </a:p>
+          <a:p>
+            <a:pPr lvl="1">
+              <a:spcBef>
+                <a:spcPts val="600"/>
+              </a:spcBef>
+            </a:pPr>
+            <a:r>
+              <a:rPr lang="en-US" dirty="0"/>
+              <a:t>In Regression/Forecasting Problems:</a:t>
+            </a:r>
+          </a:p>
+          <a:p>
+            <a:pPr lvl="2">
+              <a:spcBef>
+                <a:spcPts val="600"/>
+              </a:spcBef>
+            </a:pPr>
+            <a:r>
+              <a:rPr lang="en-US" dirty="0"/>
+              <a:t>Spearman Correlation, Normalized RMSE, R</a:t>
+            </a:r>
+            <a:r>
+              <a:rPr lang="en-US" baseline="30000" dirty="0"/>
+              <a:t>2</a:t>
+            </a:r>
+            <a:r>
+              <a:rPr lang="en-US" dirty="0"/>
+              <a:t>, Normalized MAE</a:t>
+            </a:r>
+          </a:p>
+          <a:p>
+            <a:endParaRPr lang="en-US" dirty="0"/>
+          </a:p>
+        </p:txBody>
+      </p:sp>
+      <p:sp>
+        <p:nvSpPr>
+          <p:cNvPr id="4" name="Rectangle 3">
+            <a:extLst>
+              <a:ext uri="{FF2B5EF4-FFF2-40B4-BE49-F238E27FC236}">
+                <a16:creationId xmlns:a16="http://schemas.microsoft.com/office/drawing/2014/main" id="{E874D10C-6D65-4617-8879-A22C02FF83D3}"/>
+              </a:ext>
+            </a:extLst>
+          </p:cNvPr>
+          <p:cNvSpPr/>
+          <p:nvPr/>
+        </p:nvSpPr>
+        <p:spPr>
+          <a:xfrm>
+            <a:off x="319500" y="4807508"/>
+            <a:ext cx="4662054" cy="215444"/>
+          </a:xfrm>
+          <a:prstGeom prst="rect">
+            <a:avLst/>
+          </a:prstGeom>
+        </p:spPr>
+        <p:txBody>
+          <a:bodyPr wrap="square">
+            <a:spAutoFit/>
+          </a:bodyPr>
+          <a:lstStyle/>
+          <a:p>
+            <a:r>
+              <a:rPr lang="en-US" sz="800" dirty="0">
+                <a:hlinkClick r:id="rId2"/>
+              </a:rPr>
+              <a:t>https://docs.microsoft.com/en-us/azure/machine-learning/service/how-to-understand-automated-ml</a:t>
+            </a:r>
+            <a:endParaRPr lang="en-US" sz="800" dirty="0"/>
+          </a:p>
+        </p:txBody>
+      </p:sp>
+      <p:pic>
+        <p:nvPicPr>
+          <p:cNvPr id="7" name="Picture 6">
+            <a:extLst>
+              <a:ext uri="{FF2B5EF4-FFF2-40B4-BE49-F238E27FC236}">
+                <a16:creationId xmlns:a16="http://schemas.microsoft.com/office/drawing/2014/main" id="{BE0C4B95-9A79-44B8-9528-F9DF165F32E8}"/>
+              </a:ext>
+            </a:extLst>
+          </p:cNvPr>
+          <p:cNvPicPr>
+            <a:picLocks noChangeAspect="1"/>
+          </p:cNvPicPr>
+          <p:nvPr/>
+        </p:nvPicPr>
+        <p:blipFill>
+          <a:blip r:embed="rId3"/>
+          <a:stretch>
+            <a:fillRect/>
+          </a:stretch>
+        </p:blipFill>
+        <p:spPr>
+          <a:xfrm>
+            <a:off x="3851564" y="1451308"/>
+            <a:ext cx="4613562" cy="2825324"/>
+          </a:xfrm>
+          <a:prstGeom prst="rect">
+            <a:avLst/>
+          </a:prstGeom>
+        </p:spPr>
+      </p:pic>
+    </p:spTree>
+    <p:extLst>
+      <p:ext uri="{BB962C8B-B14F-4D97-AF65-F5344CB8AC3E}">
+        <p14:creationId xmlns:p14="http://schemas.microsoft.com/office/powerpoint/2010/main" val="1146714717"/>
+      </p:ext>
+    </p:extLst>
+  </p:cSld>
+  <p:clrMapOvr>
+    <a:masterClrMapping/>
+  </p:clrMapOvr>
+</p:sld>
+</file>
+
+<file path=ppt/slides/slide13.xml><?xml version="1.0" encoding="utf-8"?>
+<p:sld xmlns:a="http://schemas.openxmlformats.org/drawingml/2006/main" xmlns:r="http://schemas.openxmlformats.org/officeDocument/2006/relationships" xmlns:p="http://schemas.openxmlformats.org/presentationml/2006/main">
+  <p:cSld>
+    <p:spTree>
+      <p:nvGrpSpPr>
+        <p:cNvPr id="1" name=""/>
+        <p:cNvGrpSpPr/>
+        <p:nvPr/>
+      </p:nvGrpSpPr>
+      <p:grpSpPr>
+        <a:xfrm>
+          <a:off x="0" y="0"/>
+          <a:ext cx="0" cy="0"/>
+          <a:chOff x="0" y="0"/>
+          <a:chExt cx="0" cy="0"/>
+        </a:xfrm>
+      </p:grpSpPr>
+      <p:sp>
+        <p:nvSpPr>
+          <p:cNvPr id="2" name="Title 1">
+            <a:extLst>
+              <a:ext uri="{FF2B5EF4-FFF2-40B4-BE49-F238E27FC236}">
                 <a16:creationId xmlns:a16="http://schemas.microsoft.com/office/drawing/2014/main" id="{6FF3B6CD-C287-4358-8518-0002892C1F0F}"/>
               </a:ext>
             </a:extLst>
@@ -8530,7 +10060,7 @@
 </p:sld>
 </file>
 
-<file path=ppt/slides/slide12.xml><?xml version="1.0" encoding="utf-8"?>
+<file path=ppt/slides/slide14.xml><?xml version="1.0" encoding="utf-8"?>
 <p:sld xmlns:a="http://schemas.openxmlformats.org/drawingml/2006/main" xmlns:r="http://schemas.openxmlformats.org/officeDocument/2006/relationships" xmlns:p="http://schemas.openxmlformats.org/presentationml/2006/main">
   <p:cSld>
     <p:spTree>
@@ -9927,7 +11457,7 @@
 </p:sld>
 </file>
 
-<file path=ppt/slides/slide13.xml><?xml version="1.0" encoding="utf-8"?>
+<file path=ppt/slides/slide15.xml><?xml version="1.0" encoding="utf-8"?>
 <p:sld xmlns:a="http://schemas.openxmlformats.org/drawingml/2006/main" xmlns:r="http://schemas.openxmlformats.org/officeDocument/2006/relationships" xmlns:p="http://schemas.openxmlformats.org/presentationml/2006/main">
   <p:cSld>
     <p:spTree>
@@ -10687,7 +12217,7 @@
 </p:sld>
 </file>
 
-<file path=ppt/slides/slide14.xml><?xml version="1.0" encoding="utf-8"?>
+<file path=ppt/slides/slide16.xml><?xml version="1.0" encoding="utf-8"?>
 <p:sld xmlns:a="http://schemas.openxmlformats.org/drawingml/2006/main" xmlns:r="http://schemas.openxmlformats.org/officeDocument/2006/relationships" xmlns:p="http://schemas.openxmlformats.org/presentationml/2006/main">
   <p:cSld>
     <p:spTree>
@@ -10899,7 +12429,7 @@
 </p:sld>
 </file>
 
-<file path=ppt/slides/slide15.xml><?xml version="1.0" encoding="utf-8"?>
+<file path=ppt/slides/slide17.xml><?xml version="1.0" encoding="utf-8"?>
 <p:sld xmlns:a="http://schemas.openxmlformats.org/drawingml/2006/main" xmlns:r="http://schemas.openxmlformats.org/officeDocument/2006/relationships" xmlns:p="http://schemas.openxmlformats.org/presentationml/2006/main">
   <p:cSld>
     <p:spTree>
@@ -10958,7 +12488,7 @@
             <a:fld id="{EFD79178-3801-442D-9A2F-5D922A383BA0}" type="slidenum">
               <a:rPr lang="tr-TR"/>
               <a:pPr/>
-              <a:t>15</a:t>
+              <a:t>17</a:t>
             </a:fld>
             <a:endParaRPr lang="tr-TR"/>
           </a:p>
@@ -11380,7 +12910,7 @@
 </p:sld>
 </file>
 
-<file path=ppt/slides/slide16.xml><?xml version="1.0" encoding="utf-8"?>
+<file path=ppt/slides/slide18.xml><?xml version="1.0" encoding="utf-8"?>
 <p:sld xmlns:a="http://schemas.openxmlformats.org/drawingml/2006/main" xmlns:r="http://schemas.openxmlformats.org/officeDocument/2006/relationships" xmlns:p="http://schemas.openxmlformats.org/presentationml/2006/main">
   <p:cSld>
     <p:spTree>
@@ -11441,7 +12971,7 @@
             <a:fld id="{F6E1DC87-3DF8-4536-96F3-3C9B9F8DA82B}" type="slidenum">
               <a:rPr lang="tr-TR"/>
               <a:pPr/>
-              <a:t>16</a:t>
+              <a:t>18</a:t>
             </a:fld>
             <a:endParaRPr lang="tr-TR"/>
           </a:p>
@@ -11465,7 +12995,7 @@
           <a:graphicData uri="http://schemas.openxmlformats.org/presentationml/2006/ole">
             <mc:AlternateContent xmlns:mc="http://schemas.openxmlformats.org/markup-compatibility/2006">
               <mc:Choice xmlns:v="urn:schemas-microsoft-com:vml" Requires="v">
-                <p:oleObj spid="_x0000_s1076" name="Equation" r:id="rId3" imgW="1333440" imgH="457200" progId="Equation.3">
+                <p:oleObj spid="_x0000_s1080" name="Equation" r:id="rId3" imgW="1333440" imgH="457200" progId="Equation.3">
                   <p:embed/>
                 </p:oleObj>
               </mc:Choice>
@@ -11861,7 +13391,7 @@
           <a:graphicData uri="http://schemas.openxmlformats.org/presentationml/2006/ole">
             <mc:AlternateContent xmlns:mc="http://schemas.openxmlformats.org/markup-compatibility/2006">
               <mc:Choice xmlns:v="urn:schemas-microsoft-com:vml" Requires="v">
-                <p:oleObj spid="_x0000_s1077" name="Equation" r:id="rId5" imgW="1180800" imgH="431640" progId="Equation.3">
+                <p:oleObj spid="_x0000_s1081" name="Equation" r:id="rId5" imgW="1180800" imgH="431640" progId="Equation.3">
                   <p:embed/>
                 </p:oleObj>
               </mc:Choice>
@@ -11956,7 +13486,7 @@
 </p:sld>
 </file>
 
-<file path=ppt/slides/slide17.xml><?xml version="1.0" encoding="utf-8"?>
+<file path=ppt/slides/slide19.xml><?xml version="1.0" encoding="utf-8"?>
 <p:sld xmlns:a="http://schemas.openxmlformats.org/drawingml/2006/main" xmlns:r="http://schemas.openxmlformats.org/officeDocument/2006/relationships" xmlns:p="http://schemas.openxmlformats.org/presentationml/2006/main">
   <p:cSld>
     <p:spTree>
@@ -12219,7 +13749,7 @@
             <a:fld id="{55EF7AAF-5E6B-4622-8B02-2B6C4703C2FB}" type="slidenum">
               <a:rPr lang="tr-TR"/>
               <a:pPr/>
-              <a:t>17</a:t>
+              <a:t>19</a:t>
             </a:fld>
             <a:endParaRPr lang="tr-TR" dirty="0"/>
           </a:p>
@@ -12243,7 +13773,7 @@
           <a:graphicData uri="http://schemas.openxmlformats.org/presentationml/2006/ole">
             <mc:AlternateContent xmlns:mc="http://schemas.openxmlformats.org/markup-compatibility/2006">
               <mc:Choice xmlns:v="urn:schemas-microsoft-com:vml" Requires="v">
-                <p:oleObj spid="_x0000_s2100" name="Equation" r:id="rId3" imgW="1498320" imgH="482400" progId="Equation.3">
+                <p:oleObj spid="_x0000_s2104" name="Equation" r:id="rId3" imgW="1498320" imgH="482400" progId="Equation.3">
                   <p:embed/>
                 </p:oleObj>
               </mc:Choice>
@@ -12315,7 +13845,7 @@
           <a:graphicData uri="http://schemas.openxmlformats.org/presentationml/2006/ole">
             <mc:AlternateContent xmlns:mc="http://schemas.openxmlformats.org/markup-compatibility/2006">
               <mc:Choice xmlns:v="urn:schemas-microsoft-com:vml" Requires="v">
-                <p:oleObj spid="_x0000_s2101" name="Equation" r:id="rId5" imgW="1663560" imgH="444240" progId="Equation.3">
+                <p:oleObj spid="_x0000_s2105" name="Equation" r:id="rId5" imgW="1663560" imgH="444240" progId="Equation.3">
                   <p:embed/>
                 </p:oleObj>
               </mc:Choice>
@@ -12377,7 +13907,210 @@
 </p:sld>
 </file>
 
-<file path=ppt/slides/slide18.xml><?xml version="1.0" encoding="utf-8"?>
+<file path=ppt/slides/slide2.xml><?xml version="1.0" encoding="utf-8"?>
+<p:sld xmlns:a="http://schemas.openxmlformats.org/drawingml/2006/main" xmlns:r="http://schemas.openxmlformats.org/officeDocument/2006/relationships" xmlns:p="http://schemas.openxmlformats.org/presentationml/2006/main">
+  <p:cSld>
+    <p:spTree>
+      <p:nvGrpSpPr>
+        <p:cNvPr id="1" name="Shape 77"/>
+        <p:cNvGrpSpPr/>
+        <p:nvPr/>
+      </p:nvGrpSpPr>
+      <p:grpSpPr>
+        <a:xfrm>
+          <a:off x="0" y="0"/>
+          <a:ext cx="0" cy="0"/>
+          <a:chOff x="0" y="0"/>
+          <a:chExt cx="0" cy="0"/>
+        </a:xfrm>
+      </p:grpSpPr>
+      <p:sp>
+        <p:nvSpPr>
+          <p:cNvPr id="78" name="Google Shape;78;p14"/>
+          <p:cNvSpPr txBox="1">
+            <a:spLocks noGrp="1"/>
+          </p:cNvSpPr>
+          <p:nvPr>
+            <p:ph type="title"/>
+          </p:nvPr>
+        </p:nvSpPr>
+        <p:spPr>
+          <a:xfrm>
+            <a:off x="265500" y="1912650"/>
+            <a:ext cx="4045200" cy="1318200"/>
+          </a:xfrm>
+          <a:prstGeom prst="rect">
+            <a:avLst/>
+          </a:prstGeom>
+        </p:spPr>
+        <p:txBody>
+          <a:bodyPr spcFirstLastPara="1" wrap="square" lIns="91425" tIns="91425" rIns="91425" bIns="91425" anchor="ctr" anchorCtr="0">
+            <a:noAutofit/>
+          </a:bodyPr>
+          <a:lstStyle/>
+          <a:p>
+            <a:pPr marL="0" lvl="0" indent="0" algn="ctr" rtl="0">
+              <a:spcBef>
+                <a:spcPts val="0"/>
+              </a:spcBef>
+              <a:spcAft>
+                <a:spcPts val="0"/>
+              </a:spcAft>
+              <a:buNone/>
+            </a:pPr>
+            <a:r>
+              <a:rPr lang="en" dirty="0"/>
+              <a:t>Overview</a:t>
+            </a:r>
+            <a:endParaRPr dirty="0"/>
+          </a:p>
+        </p:txBody>
+      </p:sp>
+      <p:sp>
+        <p:nvSpPr>
+          <p:cNvPr id="79" name="Google Shape;79;p14"/>
+          <p:cNvSpPr txBox="1">
+            <a:spLocks noGrp="1"/>
+          </p:cNvSpPr>
+          <p:nvPr>
+            <p:ph type="body" idx="2"/>
+          </p:nvPr>
+        </p:nvSpPr>
+        <p:spPr>
+          <a:xfrm>
+            <a:off x="4939500" y="394854"/>
+            <a:ext cx="3837000" cy="3719945"/>
+          </a:xfrm>
+          <a:prstGeom prst="rect">
+            <a:avLst/>
+          </a:prstGeom>
+        </p:spPr>
+        <p:txBody>
+          <a:bodyPr spcFirstLastPara="1" wrap="square" lIns="91425" tIns="91425" rIns="91425" bIns="91425" anchor="ctr" anchorCtr="0">
+            <a:noAutofit/>
+          </a:bodyPr>
+          <a:lstStyle/>
+          <a:p>
+            <a:pPr marL="0" indent="0">
+              <a:spcBef>
+                <a:spcPts val="1600"/>
+              </a:spcBef>
+              <a:buNone/>
+            </a:pPr>
+            <a:r>
+              <a:rPr lang="en-US" sz="1400" b="1" dirty="0"/>
+              <a:t>Intro to Machine Learning</a:t>
+            </a:r>
+          </a:p>
+          <a:p>
+            <a:pPr marL="0" indent="0">
+              <a:buNone/>
+            </a:pPr>
+            <a:r>
+              <a:rPr lang="en-US" sz="1400" b="1" dirty="0"/>
+              <a:t>Machine Learning in the Cloud</a:t>
+            </a:r>
+          </a:p>
+          <a:p>
+            <a:pPr marL="0" indent="0">
+              <a:buNone/>
+            </a:pPr>
+            <a:r>
+              <a:rPr lang="en-US" sz="1400" b="1" dirty="0"/>
+              <a:t>Cognitive Services</a:t>
+            </a:r>
+          </a:p>
+          <a:p>
+            <a:pPr marL="0" indent="0">
+              <a:buNone/>
+            </a:pPr>
+            <a:r>
+              <a:rPr lang="en-US" sz="1400" b="1" dirty="0" err="1"/>
+              <a:t>AutoML</a:t>
+            </a:r>
+            <a:endParaRPr lang="en-US" sz="1400" b="1" dirty="0"/>
+          </a:p>
+          <a:p>
+            <a:pPr marL="0" indent="0">
+              <a:spcBef>
+                <a:spcPts val="1600"/>
+              </a:spcBef>
+              <a:buNone/>
+            </a:pPr>
+            <a:r>
+              <a:rPr lang="en-US" sz="1400" b="1" dirty="0"/>
+              <a:t>Basics of Algorithms</a:t>
+            </a:r>
+          </a:p>
+          <a:p>
+            <a:pPr marL="285750" indent="-285750"/>
+            <a:r>
+              <a:rPr lang="en-US" sz="1400" b="1" dirty="0"/>
+              <a:t>Regression</a:t>
+            </a:r>
+          </a:p>
+          <a:p>
+            <a:pPr marL="285750" indent="-285750"/>
+            <a:r>
+              <a:rPr lang="en-US" sz="1400" b="1" dirty="0"/>
+              <a:t>Classification</a:t>
+            </a:r>
+          </a:p>
+          <a:p>
+            <a:pPr marL="285750" indent="-285750"/>
+            <a:r>
+              <a:rPr lang="en-US" sz="1400" b="1" dirty="0"/>
+              <a:t>Clustering</a:t>
+            </a:r>
+          </a:p>
+          <a:p>
+            <a:pPr marL="0" indent="0">
+              <a:spcBef>
+                <a:spcPts val="1600"/>
+              </a:spcBef>
+              <a:buNone/>
+            </a:pPr>
+            <a:r>
+              <a:rPr lang="en-US" sz="1400" b="1" dirty="0"/>
+              <a:t>Scaling Up with Parallelization</a:t>
+            </a:r>
+          </a:p>
+          <a:p>
+            <a:pPr marL="285750" indent="-285750"/>
+            <a:r>
+              <a:rPr lang="en-US" sz="1400" b="1" dirty="0"/>
+              <a:t>Training</a:t>
+            </a:r>
+          </a:p>
+          <a:p>
+            <a:pPr marL="285750" indent="-285750"/>
+            <a:r>
+              <a:rPr lang="en-US" sz="1400" b="1" dirty="0"/>
+              <a:t>Cross-Validation</a:t>
+            </a:r>
+          </a:p>
+          <a:p>
+            <a:pPr marL="285750" indent="-285750"/>
+            <a:r>
+              <a:rPr lang="en-US" sz="1400" b="1" dirty="0"/>
+              <a:t>Parameter Tuning</a:t>
+            </a:r>
+          </a:p>
+          <a:p>
+            <a:pPr marL="285750" indent="-285750"/>
+            <a:endParaRPr lang="en-US" sz="1400" b="1" dirty="0"/>
+          </a:p>
+        </p:txBody>
+      </p:sp>
+    </p:spTree>
+  </p:cSld>
+  <p:clrMapOvr>
+    <a:masterClrMapping/>
+  </p:clrMapOvr>
+</p:sld>
+</file>
+
+<file path=ppt/slides/slide20.xml><?xml version="1.0" encoding="utf-8"?>
 <p:sld xmlns:a="http://schemas.openxmlformats.org/drawingml/2006/main" xmlns:r="http://schemas.openxmlformats.org/officeDocument/2006/relationships" xmlns:p="http://schemas.openxmlformats.org/presentationml/2006/main">
   <p:cSld>
     <p:spTree>
@@ -12436,7 +14169,7 @@
             <a:fld id="{B5F69795-7180-4348-84C5-5ED87E19885F}" type="slidenum">
               <a:rPr lang="tr-TR"/>
               <a:pPr/>
-              <a:t>18</a:t>
+              <a:t>20</a:t>
             </a:fld>
             <a:endParaRPr lang="tr-TR"/>
           </a:p>
@@ -12512,7 +14245,7 @@
 </p:sld>
 </file>
 
-<file path=ppt/slides/slide19.xml><?xml version="1.0" encoding="utf-8"?>
+<file path=ppt/slides/slide21.xml><?xml version="1.0" encoding="utf-8"?>
 <p:sld xmlns:a="http://schemas.openxmlformats.org/drawingml/2006/main" xmlns:r="http://schemas.openxmlformats.org/officeDocument/2006/relationships" xmlns:p="http://schemas.openxmlformats.org/presentationml/2006/main">
   <p:cSld>
     <p:spTree>
@@ -12592,210 +14325,7 @@
 </p:sld>
 </file>
 
-<file path=ppt/slides/slide2.xml><?xml version="1.0" encoding="utf-8"?>
-<p:sld xmlns:a="http://schemas.openxmlformats.org/drawingml/2006/main" xmlns:r="http://schemas.openxmlformats.org/officeDocument/2006/relationships" xmlns:p="http://schemas.openxmlformats.org/presentationml/2006/main">
-  <p:cSld>
-    <p:spTree>
-      <p:nvGrpSpPr>
-        <p:cNvPr id="1" name="Shape 77"/>
-        <p:cNvGrpSpPr/>
-        <p:nvPr/>
-      </p:nvGrpSpPr>
-      <p:grpSpPr>
-        <a:xfrm>
-          <a:off x="0" y="0"/>
-          <a:ext cx="0" cy="0"/>
-          <a:chOff x="0" y="0"/>
-          <a:chExt cx="0" cy="0"/>
-        </a:xfrm>
-      </p:grpSpPr>
-      <p:sp>
-        <p:nvSpPr>
-          <p:cNvPr id="78" name="Google Shape;78;p14"/>
-          <p:cNvSpPr txBox="1">
-            <a:spLocks noGrp="1"/>
-          </p:cNvSpPr>
-          <p:nvPr>
-            <p:ph type="title"/>
-          </p:nvPr>
-        </p:nvSpPr>
-        <p:spPr>
-          <a:xfrm>
-            <a:off x="265500" y="1912650"/>
-            <a:ext cx="4045200" cy="1318200"/>
-          </a:xfrm>
-          <a:prstGeom prst="rect">
-            <a:avLst/>
-          </a:prstGeom>
-        </p:spPr>
-        <p:txBody>
-          <a:bodyPr spcFirstLastPara="1" wrap="square" lIns="91425" tIns="91425" rIns="91425" bIns="91425" anchor="ctr" anchorCtr="0">
-            <a:noAutofit/>
-          </a:bodyPr>
-          <a:lstStyle/>
-          <a:p>
-            <a:pPr marL="0" lvl="0" indent="0" algn="ctr" rtl="0">
-              <a:spcBef>
-                <a:spcPts val="0"/>
-              </a:spcBef>
-              <a:spcAft>
-                <a:spcPts val="0"/>
-              </a:spcAft>
-              <a:buNone/>
-            </a:pPr>
-            <a:r>
-              <a:rPr lang="en" dirty="0"/>
-              <a:t>Overview</a:t>
-            </a:r>
-            <a:endParaRPr dirty="0"/>
-          </a:p>
-        </p:txBody>
-      </p:sp>
-      <p:sp>
-        <p:nvSpPr>
-          <p:cNvPr id="79" name="Google Shape;79;p14"/>
-          <p:cNvSpPr txBox="1">
-            <a:spLocks noGrp="1"/>
-          </p:cNvSpPr>
-          <p:nvPr>
-            <p:ph type="body" idx="2"/>
-          </p:nvPr>
-        </p:nvSpPr>
-        <p:spPr>
-          <a:xfrm>
-            <a:off x="4939500" y="394854"/>
-            <a:ext cx="3837000" cy="3719945"/>
-          </a:xfrm>
-          <a:prstGeom prst="rect">
-            <a:avLst/>
-          </a:prstGeom>
-        </p:spPr>
-        <p:txBody>
-          <a:bodyPr spcFirstLastPara="1" wrap="square" lIns="91425" tIns="91425" rIns="91425" bIns="91425" anchor="ctr" anchorCtr="0">
-            <a:noAutofit/>
-          </a:bodyPr>
-          <a:lstStyle/>
-          <a:p>
-            <a:pPr marL="0" indent="0">
-              <a:spcBef>
-                <a:spcPts val="1600"/>
-              </a:spcBef>
-              <a:buNone/>
-            </a:pPr>
-            <a:r>
-              <a:rPr lang="en-US" sz="1400" b="1" dirty="0"/>
-              <a:t>Intro to Machine Learning</a:t>
-            </a:r>
-          </a:p>
-          <a:p>
-            <a:pPr marL="0" indent="0">
-              <a:buNone/>
-            </a:pPr>
-            <a:r>
-              <a:rPr lang="en-US" sz="1400" b="1" dirty="0"/>
-              <a:t>Machine Learning in the Cloud</a:t>
-            </a:r>
-          </a:p>
-          <a:p>
-            <a:pPr marL="0" indent="0">
-              <a:buNone/>
-            </a:pPr>
-            <a:r>
-              <a:rPr lang="en-US" sz="1400" b="1" dirty="0"/>
-              <a:t>Cognitive Services</a:t>
-            </a:r>
-          </a:p>
-          <a:p>
-            <a:pPr marL="0" indent="0">
-              <a:spcBef>
-                <a:spcPts val="1600"/>
-              </a:spcBef>
-              <a:buNone/>
-            </a:pPr>
-            <a:r>
-              <a:rPr lang="en-US" sz="1400" b="1" dirty="0"/>
-              <a:t>Basics of Algorithms</a:t>
-            </a:r>
-          </a:p>
-          <a:p>
-            <a:pPr marL="285750" indent="-285750"/>
-            <a:r>
-              <a:rPr lang="en-US" sz="1400" b="1" dirty="0"/>
-              <a:t>Regression</a:t>
-            </a:r>
-          </a:p>
-          <a:p>
-            <a:pPr marL="285750" indent="-285750"/>
-            <a:r>
-              <a:rPr lang="en-US" sz="1400" b="1" dirty="0"/>
-              <a:t>Classification</a:t>
-            </a:r>
-          </a:p>
-          <a:p>
-            <a:pPr marL="285750" indent="-285750"/>
-            <a:r>
-              <a:rPr lang="en-US" sz="1400" b="1" dirty="0"/>
-              <a:t>Clustering</a:t>
-            </a:r>
-          </a:p>
-          <a:p>
-            <a:pPr marL="0" indent="0">
-              <a:spcBef>
-                <a:spcPts val="1600"/>
-              </a:spcBef>
-              <a:buNone/>
-            </a:pPr>
-            <a:r>
-              <a:rPr lang="en-US" sz="1400" b="1" dirty="0"/>
-              <a:t>Scaling Up with Parallelization</a:t>
-            </a:r>
-          </a:p>
-          <a:p>
-            <a:pPr marL="285750" indent="-285750"/>
-            <a:r>
-              <a:rPr lang="en-US" sz="1400" b="1" dirty="0"/>
-              <a:t>Training</a:t>
-            </a:r>
-          </a:p>
-          <a:p>
-            <a:pPr marL="285750" indent="-285750"/>
-            <a:r>
-              <a:rPr lang="en-US" sz="1400" b="1" dirty="0"/>
-              <a:t>Cross-Validation</a:t>
-            </a:r>
-          </a:p>
-          <a:p>
-            <a:pPr marL="285750" indent="-285750"/>
-            <a:r>
-              <a:rPr lang="en-US" sz="1400" b="1" dirty="0"/>
-              <a:t>Parameter Tuning</a:t>
-            </a:r>
-          </a:p>
-          <a:p>
-            <a:pPr marL="285750" indent="-285750"/>
-            <a:endParaRPr lang="en-US" sz="1400" b="1" dirty="0"/>
-          </a:p>
-          <a:p>
-            <a:pPr marL="0" indent="0">
-              <a:buNone/>
-            </a:pPr>
-            <a:r>
-              <a:rPr lang="en-US" sz="1400" b="1" dirty="0" err="1"/>
-              <a:t>AutoML</a:t>
-            </a:r>
-            <a:endParaRPr lang="en-US" sz="1400" b="1" dirty="0"/>
-          </a:p>
-        </p:txBody>
-      </p:sp>
-    </p:spTree>
-  </p:cSld>
-  <p:clrMapOvr>
-    <a:masterClrMapping/>
-  </p:clrMapOvr>
-</p:sld>
-</file>
-
-<file path=ppt/slides/slide20.xml><?xml version="1.0" encoding="utf-8"?>
+<file path=ppt/slides/slide22.xml><?xml version="1.0" encoding="utf-8"?>
 <p:sld xmlns:a="http://schemas.openxmlformats.org/drawingml/2006/main" xmlns:r="http://schemas.openxmlformats.org/officeDocument/2006/relationships" xmlns:p="http://schemas.openxmlformats.org/presentationml/2006/main">
   <p:cSld>
     <p:spTree>
@@ -13489,7 +15019,7 @@
 </p:sld>
 </file>
 
-<file path=ppt/slides/slide21.xml><?xml version="1.0" encoding="utf-8"?>
+<file path=ppt/slides/slide23.xml><?xml version="1.0" encoding="utf-8"?>
 <p:sld xmlns:a="http://schemas.openxmlformats.org/drawingml/2006/main" xmlns:r="http://schemas.openxmlformats.org/officeDocument/2006/relationships" xmlns:p="http://schemas.openxmlformats.org/presentationml/2006/main">
   <p:cSld>
     <p:spTree>
@@ -13762,7 +15292,7 @@
 </p:sld>
 </file>
 
-<file path=ppt/slides/slide22.xml><?xml version="1.0" encoding="utf-8"?>
+<file path=ppt/slides/slide24.xml><?xml version="1.0" encoding="utf-8"?>
 <p:sld xmlns:a="http://schemas.openxmlformats.org/drawingml/2006/main" xmlns:r="http://schemas.openxmlformats.org/officeDocument/2006/relationships" xmlns:p="http://schemas.openxmlformats.org/presentationml/2006/main">
   <p:cSld>
     <p:spTree>
@@ -15589,7 +17119,7 @@
 </p:sld>
 </file>
 
-<file path=ppt/slides/slide23.xml><?xml version="1.0" encoding="utf-8"?>
+<file path=ppt/slides/slide25.xml><?xml version="1.0" encoding="utf-8"?>
 <p:sld xmlns:a="http://schemas.openxmlformats.org/drawingml/2006/main" xmlns:r="http://schemas.openxmlformats.org/officeDocument/2006/relationships" xmlns:p="http://schemas.openxmlformats.org/presentationml/2006/main">
   <p:cSld>
     <p:spTree>
@@ -15846,7 +17376,7 @@
 </p:sld>
 </file>
 
-<file path=ppt/slides/slide24.xml><?xml version="1.0" encoding="utf-8"?>
+<file path=ppt/slides/slide26.xml><?xml version="1.0" encoding="utf-8"?>
 <p:sld xmlns:a="http://schemas.openxmlformats.org/drawingml/2006/main" xmlns:r="http://schemas.openxmlformats.org/officeDocument/2006/relationships" xmlns:p="http://schemas.openxmlformats.org/presentationml/2006/main">
   <p:cSld>
     <p:spTree>
@@ -19085,7 +20615,7 @@
 </p:sld>
 </file>
 
-<file path=ppt/slides/slide25.xml><?xml version="1.0" encoding="utf-8"?>
+<file path=ppt/slides/slide27.xml><?xml version="1.0" encoding="utf-8"?>
 <p:sld xmlns:a="http://schemas.openxmlformats.org/drawingml/2006/main" xmlns:r="http://schemas.openxmlformats.org/officeDocument/2006/relationships" xmlns:p="http://schemas.openxmlformats.org/presentationml/2006/main">
   <p:cSld>
     <p:spTree>
@@ -20126,7 +21656,7 @@
 </p:sld>
 </file>
 
-<file path=ppt/slides/slide26.xml><?xml version="1.0" encoding="utf-8"?>
+<file path=ppt/slides/slide28.xml><?xml version="1.0" encoding="utf-8"?>
 <p:sld xmlns:a="http://schemas.openxmlformats.org/drawingml/2006/main" xmlns:r="http://schemas.openxmlformats.org/officeDocument/2006/relationships" xmlns:p="http://schemas.openxmlformats.org/presentationml/2006/main">
   <p:cSld>
     <p:spTree>
@@ -20538,7 +22068,7 @@
 </p:sld>
 </file>
 
-<file path=ppt/slides/slide27.xml><?xml version="1.0" encoding="utf-8"?>
+<file path=ppt/slides/slide29.xml><?xml version="1.0" encoding="utf-8"?>
 <p:sld xmlns:a="http://schemas.openxmlformats.org/drawingml/2006/main" xmlns:r="http://schemas.openxmlformats.org/officeDocument/2006/relationships" xmlns:p="http://schemas.openxmlformats.org/presentationml/2006/main">
   <p:cSld>
     <p:spTree>
@@ -21611,7 +23141,470 @@
 </p:sld>
 </file>
 
-<file path=ppt/slides/slide28.xml><?xml version="1.0" encoding="utf-8"?>
+<file path=ppt/slides/slide3.xml><?xml version="1.0" encoding="utf-8"?>
+<p:sld xmlns:a="http://schemas.openxmlformats.org/drawingml/2006/main" xmlns:r="http://schemas.openxmlformats.org/officeDocument/2006/relationships" xmlns:p="http://schemas.openxmlformats.org/presentationml/2006/main">
+  <p:cSld>
+    <p:spTree>
+      <p:nvGrpSpPr>
+        <p:cNvPr id="1" name="Shape 97"/>
+        <p:cNvGrpSpPr/>
+        <p:nvPr/>
+      </p:nvGrpSpPr>
+      <p:grpSpPr>
+        <a:xfrm>
+          <a:off x="0" y="0"/>
+          <a:ext cx="0" cy="0"/>
+          <a:chOff x="0" y="0"/>
+          <a:chExt cx="0" cy="0"/>
+        </a:xfrm>
+      </p:grpSpPr>
+      <p:sp>
+        <p:nvSpPr>
+          <p:cNvPr id="98" name="Google Shape;98;p17"/>
+          <p:cNvSpPr txBox="1">
+            <a:spLocks noGrp="1"/>
+          </p:cNvSpPr>
+          <p:nvPr>
+            <p:ph type="title"/>
+          </p:nvPr>
+        </p:nvSpPr>
+        <p:spPr>
+          <a:xfrm>
+            <a:off x="2400250" y="575950"/>
+            <a:ext cx="6321600" cy="635400"/>
+          </a:xfrm>
+          <a:prstGeom prst="rect">
+            <a:avLst/>
+          </a:prstGeom>
+        </p:spPr>
+        <p:txBody>
+          <a:bodyPr spcFirstLastPara="1" wrap="square" lIns="91425" tIns="91425" rIns="91425" bIns="91425" anchor="t" anchorCtr="0">
+            <a:noAutofit/>
+          </a:bodyPr>
+          <a:lstStyle/>
+          <a:p>
+            <a:pPr marL="0" lvl="0" indent="0" algn="l" rtl="0">
+              <a:spcBef>
+                <a:spcPts val="0"/>
+              </a:spcBef>
+              <a:spcAft>
+                <a:spcPts val="0"/>
+              </a:spcAft>
+              <a:buNone/>
+            </a:pPr>
+            <a:r>
+              <a:rPr lang="en-US" dirty="0"/>
+              <a:t>Intro to Machine Learning</a:t>
+            </a:r>
+            <a:endParaRPr dirty="0"/>
+          </a:p>
+        </p:txBody>
+      </p:sp>
+      <p:pic>
+        <p:nvPicPr>
+          <p:cNvPr id="3" name="Graphic 2">
+            <a:extLst>
+              <a:ext uri="{FF2B5EF4-FFF2-40B4-BE49-F238E27FC236}">
+                <a16:creationId xmlns:a16="http://schemas.microsoft.com/office/drawing/2014/main" id="{78C8C304-C32B-473B-9148-F975AB8B26E7}"/>
+              </a:ext>
+            </a:extLst>
+          </p:cNvPr>
+          <p:cNvPicPr>
+            <a:picLocks noChangeAspect="1"/>
+          </p:cNvPicPr>
+          <p:nvPr/>
+        </p:nvPicPr>
+        <p:blipFill>
+          <a:blip r:embed="rId3">
+            <a:extLst>
+              <a:ext uri="{96DAC541-7B7A-43D3-8B79-37D633B846F1}">
+                <asvg:svgBlip xmlns:asvg="http://schemas.microsoft.com/office/drawing/2016/SVG/main" r:embed="rId4"/>
+              </a:ext>
+            </a:extLst>
+          </a:blip>
+          <a:stretch>
+            <a:fillRect/>
+          </a:stretch>
+        </p:blipFill>
+        <p:spPr>
+          <a:xfrm>
+            <a:off x="1539875" y="1867003"/>
+            <a:ext cx="1047750" cy="1133475"/>
+          </a:xfrm>
+          <a:prstGeom prst="rect">
+            <a:avLst/>
+          </a:prstGeom>
+        </p:spPr>
+      </p:pic>
+      <p:pic>
+        <p:nvPicPr>
+          <p:cNvPr id="5" name="Graphic 4">
+            <a:extLst>
+              <a:ext uri="{FF2B5EF4-FFF2-40B4-BE49-F238E27FC236}">
+                <a16:creationId xmlns:a16="http://schemas.microsoft.com/office/drawing/2014/main" id="{59B15D61-728B-4CD1-B6B9-F6FF91B69C7D}"/>
+              </a:ext>
+            </a:extLst>
+          </p:cNvPr>
+          <p:cNvPicPr>
+            <a:picLocks noChangeAspect="1"/>
+          </p:cNvPicPr>
+          <p:nvPr/>
+        </p:nvPicPr>
+        <p:blipFill>
+          <a:blip r:embed="rId5">
+            <a:extLst>
+              <a:ext uri="{96DAC541-7B7A-43D3-8B79-37D633B846F1}">
+                <asvg:svgBlip xmlns:asvg="http://schemas.microsoft.com/office/drawing/2016/SVG/main" r:embed="rId6"/>
+              </a:ext>
+            </a:extLst>
+          </a:blip>
+          <a:stretch>
+            <a:fillRect/>
+          </a:stretch>
+        </p:blipFill>
+        <p:spPr>
+          <a:xfrm>
+            <a:off x="4019550" y="1857478"/>
+            <a:ext cx="1104900" cy="1143000"/>
+          </a:xfrm>
+          <a:prstGeom prst="rect">
+            <a:avLst/>
+          </a:prstGeom>
+        </p:spPr>
+      </p:pic>
+      <p:pic>
+        <p:nvPicPr>
+          <p:cNvPr id="8" name="Graphic 7">
+            <a:extLst>
+              <a:ext uri="{FF2B5EF4-FFF2-40B4-BE49-F238E27FC236}">
+                <a16:creationId xmlns:a16="http://schemas.microsoft.com/office/drawing/2014/main" id="{FE6071CA-2A64-493D-991D-9F2BC26A2088}"/>
+              </a:ext>
+            </a:extLst>
+          </p:cNvPr>
+          <p:cNvPicPr>
+            <a:picLocks noChangeAspect="1"/>
+          </p:cNvPicPr>
+          <p:nvPr/>
+        </p:nvPicPr>
+        <p:blipFill>
+          <a:blip r:embed="rId7">
+            <a:extLst>
+              <a:ext uri="{96DAC541-7B7A-43D3-8B79-37D633B846F1}">
+                <asvg:svgBlip xmlns:asvg="http://schemas.microsoft.com/office/drawing/2016/SVG/main" r:embed="rId8"/>
+              </a:ext>
+            </a:extLst>
+          </a:blip>
+          <a:stretch>
+            <a:fillRect/>
+          </a:stretch>
+        </p:blipFill>
+        <p:spPr>
+          <a:xfrm>
+            <a:off x="6556375" y="1852716"/>
+            <a:ext cx="1143000" cy="1143000"/>
+          </a:xfrm>
+          <a:prstGeom prst="rect">
+            <a:avLst/>
+          </a:prstGeom>
+        </p:spPr>
+      </p:pic>
+      <p:sp>
+        <p:nvSpPr>
+          <p:cNvPr id="9" name="TextBox 8">
+            <a:extLst>
+              <a:ext uri="{FF2B5EF4-FFF2-40B4-BE49-F238E27FC236}">
+                <a16:creationId xmlns:a16="http://schemas.microsoft.com/office/drawing/2014/main" id="{91DF9330-039A-4F13-8D49-1DCD1A798668}"/>
+              </a:ext>
+            </a:extLst>
+          </p:cNvPr>
+          <p:cNvSpPr txBox="1"/>
+          <p:nvPr/>
+        </p:nvSpPr>
+        <p:spPr>
+          <a:xfrm>
+            <a:off x="1539875" y="3094141"/>
+            <a:ext cx="1047750" cy="261610"/>
+          </a:xfrm>
+          <a:prstGeom prst="rect">
+            <a:avLst/>
+          </a:prstGeom>
+          <a:noFill/>
+        </p:spPr>
+        <p:txBody>
+          <a:bodyPr wrap="square" rtlCol="0">
+            <a:spAutoFit/>
+          </a:bodyPr>
+          <a:lstStyle/>
+          <a:p>
+            <a:pPr algn="ctr"/>
+            <a:r>
+              <a:rPr lang="en-US" sz="1100" b="1" dirty="0"/>
+              <a:t>Prepare Data</a:t>
+            </a:r>
+          </a:p>
+        </p:txBody>
+      </p:sp>
+      <p:sp>
+        <p:nvSpPr>
+          <p:cNvPr id="11" name="TextBox 10">
+            <a:extLst>
+              <a:ext uri="{FF2B5EF4-FFF2-40B4-BE49-F238E27FC236}">
+                <a16:creationId xmlns:a16="http://schemas.microsoft.com/office/drawing/2014/main" id="{AE5883D3-CF3B-4C5A-B81B-9250E92B2F3D}"/>
+              </a:ext>
+            </a:extLst>
+          </p:cNvPr>
+          <p:cNvSpPr txBox="1"/>
+          <p:nvPr/>
+        </p:nvSpPr>
+        <p:spPr>
+          <a:xfrm>
+            <a:off x="4067175" y="3094141"/>
+            <a:ext cx="1104900" cy="261610"/>
+          </a:xfrm>
+          <a:prstGeom prst="rect">
+            <a:avLst/>
+          </a:prstGeom>
+          <a:noFill/>
+        </p:spPr>
+        <p:txBody>
+          <a:bodyPr wrap="square" rtlCol="0">
+            <a:spAutoFit/>
+          </a:bodyPr>
+          <a:lstStyle/>
+          <a:p>
+            <a:pPr algn="ctr"/>
+            <a:r>
+              <a:rPr lang="en-US" sz="1100" b="1" dirty="0"/>
+              <a:t>Build &amp; Train</a:t>
+            </a:r>
+          </a:p>
+        </p:txBody>
+      </p:sp>
+      <p:sp>
+        <p:nvSpPr>
+          <p:cNvPr id="12" name="TextBox 11">
+            <a:extLst>
+              <a:ext uri="{FF2B5EF4-FFF2-40B4-BE49-F238E27FC236}">
+                <a16:creationId xmlns:a16="http://schemas.microsoft.com/office/drawing/2014/main" id="{40662C72-0E90-44C7-9621-AD55CA9014E1}"/>
+              </a:ext>
+            </a:extLst>
+          </p:cNvPr>
+          <p:cNvSpPr txBox="1"/>
+          <p:nvPr/>
+        </p:nvSpPr>
+        <p:spPr>
+          <a:xfrm>
+            <a:off x="6575425" y="3063651"/>
+            <a:ext cx="1104900" cy="261610"/>
+          </a:xfrm>
+          <a:prstGeom prst="rect">
+            <a:avLst/>
+          </a:prstGeom>
+          <a:noFill/>
+        </p:spPr>
+        <p:txBody>
+          <a:bodyPr wrap="square" rtlCol="0">
+            <a:spAutoFit/>
+          </a:bodyPr>
+          <a:lstStyle/>
+          <a:p>
+            <a:pPr algn="ctr"/>
+            <a:r>
+              <a:rPr lang="en-US" sz="1100" b="1" dirty="0"/>
+              <a:t>Deploy</a:t>
+            </a:r>
+          </a:p>
+        </p:txBody>
+      </p:sp>
+      <p:sp>
+        <p:nvSpPr>
+          <p:cNvPr id="10" name="TextBox 9">
+            <a:extLst>
+              <a:ext uri="{FF2B5EF4-FFF2-40B4-BE49-F238E27FC236}">
+                <a16:creationId xmlns:a16="http://schemas.microsoft.com/office/drawing/2014/main" id="{D3A76173-9DBF-4A7A-8E89-A8C62D35FC07}"/>
+              </a:ext>
+            </a:extLst>
+          </p:cNvPr>
+          <p:cNvSpPr txBox="1"/>
+          <p:nvPr/>
+        </p:nvSpPr>
+        <p:spPr>
+          <a:xfrm>
+            <a:off x="1539875" y="3355751"/>
+            <a:ext cx="1047750" cy="507831"/>
+          </a:xfrm>
+          <a:prstGeom prst="rect">
+            <a:avLst/>
+          </a:prstGeom>
+          <a:noFill/>
+        </p:spPr>
+        <p:txBody>
+          <a:bodyPr wrap="square" rtlCol="0">
+            <a:spAutoFit/>
+          </a:bodyPr>
+          <a:lstStyle/>
+          <a:p>
+            <a:pPr algn="ctr"/>
+            <a:r>
+              <a:rPr lang="en-US" sz="900" dirty="0"/>
+              <a:t>Connect to various sources to ingest data</a:t>
+            </a:r>
+          </a:p>
+        </p:txBody>
+      </p:sp>
+      <p:sp>
+        <p:nvSpPr>
+          <p:cNvPr id="14" name="TextBox 13">
+            <a:extLst>
+              <a:ext uri="{FF2B5EF4-FFF2-40B4-BE49-F238E27FC236}">
+                <a16:creationId xmlns:a16="http://schemas.microsoft.com/office/drawing/2014/main" id="{C05B552E-81DC-4FEC-A143-5C0747DC664E}"/>
+              </a:ext>
+            </a:extLst>
+          </p:cNvPr>
+          <p:cNvSpPr txBox="1"/>
+          <p:nvPr/>
+        </p:nvSpPr>
+        <p:spPr>
+          <a:xfrm>
+            <a:off x="4095750" y="3355751"/>
+            <a:ext cx="1047750" cy="507831"/>
+          </a:xfrm>
+          <a:prstGeom prst="rect">
+            <a:avLst/>
+          </a:prstGeom>
+          <a:noFill/>
+        </p:spPr>
+        <p:txBody>
+          <a:bodyPr wrap="square" rtlCol="0">
+            <a:spAutoFit/>
+          </a:bodyPr>
+          <a:lstStyle/>
+          <a:p>
+            <a:pPr algn="ctr"/>
+            <a:r>
+              <a:rPr lang="en-US" sz="900" dirty="0"/>
+              <a:t>Train with the data to establish a model</a:t>
+            </a:r>
+          </a:p>
+        </p:txBody>
+      </p:sp>
+      <p:sp>
+        <p:nvSpPr>
+          <p:cNvPr id="15" name="TextBox 14">
+            <a:extLst>
+              <a:ext uri="{FF2B5EF4-FFF2-40B4-BE49-F238E27FC236}">
+                <a16:creationId xmlns:a16="http://schemas.microsoft.com/office/drawing/2014/main" id="{80729A86-9638-44D5-8C10-6F278DF707AD}"/>
+              </a:ext>
+            </a:extLst>
+          </p:cNvPr>
+          <p:cNvSpPr txBox="1"/>
+          <p:nvPr/>
+        </p:nvSpPr>
+        <p:spPr>
+          <a:xfrm>
+            <a:off x="6604000" y="3355751"/>
+            <a:ext cx="1047750" cy="507831"/>
+          </a:xfrm>
+          <a:prstGeom prst="rect">
+            <a:avLst/>
+          </a:prstGeom>
+          <a:noFill/>
+        </p:spPr>
+        <p:txBody>
+          <a:bodyPr wrap="square" rtlCol="0">
+            <a:spAutoFit/>
+          </a:bodyPr>
+          <a:lstStyle/>
+          <a:p>
+            <a:pPr algn="ctr"/>
+            <a:r>
+              <a:rPr lang="en-US" sz="900" dirty="0"/>
+              <a:t>Deploy the model and track performance</a:t>
+            </a:r>
+          </a:p>
+        </p:txBody>
+      </p:sp>
+      <p:pic>
+        <p:nvPicPr>
+          <p:cNvPr id="16" name="Graphic 15" descr="Play">
+            <a:extLst>
+              <a:ext uri="{FF2B5EF4-FFF2-40B4-BE49-F238E27FC236}">
+                <a16:creationId xmlns:a16="http://schemas.microsoft.com/office/drawing/2014/main" id="{49536FD1-4803-4922-96C8-044C3502FE51}"/>
+              </a:ext>
+            </a:extLst>
+          </p:cNvPr>
+          <p:cNvPicPr>
+            <a:picLocks noChangeAspect="1"/>
+          </p:cNvPicPr>
+          <p:nvPr/>
+        </p:nvPicPr>
+        <p:blipFill>
+          <a:blip r:embed="rId9">
+            <a:extLst>
+              <a:ext uri="{96DAC541-7B7A-43D3-8B79-37D633B846F1}">
+                <asvg:svgBlip xmlns:asvg="http://schemas.microsoft.com/office/drawing/2016/SVG/main" r:embed="rId10"/>
+              </a:ext>
+            </a:extLst>
+          </a:blip>
+          <a:stretch>
+            <a:fillRect/>
+          </a:stretch>
+        </p:blipFill>
+        <p:spPr>
+          <a:xfrm>
+            <a:off x="2971308" y="2091937"/>
+            <a:ext cx="664558" cy="664558"/>
+          </a:xfrm>
+          <a:prstGeom prst="rect">
+            <a:avLst/>
+          </a:prstGeom>
+        </p:spPr>
+      </p:pic>
+      <p:pic>
+        <p:nvPicPr>
+          <p:cNvPr id="18" name="Graphic 17" descr="Play">
+            <a:extLst>
+              <a:ext uri="{FF2B5EF4-FFF2-40B4-BE49-F238E27FC236}">
+                <a16:creationId xmlns:a16="http://schemas.microsoft.com/office/drawing/2014/main" id="{D4A64896-F3E4-4705-A9C5-AD8C4F02BCF3}"/>
+              </a:ext>
+            </a:extLst>
+          </p:cNvPr>
+          <p:cNvPicPr>
+            <a:picLocks noChangeAspect="1"/>
+          </p:cNvPicPr>
+          <p:nvPr/>
+        </p:nvPicPr>
+        <p:blipFill>
+          <a:blip r:embed="rId9">
+            <a:extLst>
+              <a:ext uri="{96DAC541-7B7A-43D3-8B79-37D633B846F1}">
+                <asvg:svgBlip xmlns:asvg="http://schemas.microsoft.com/office/drawing/2016/SVG/main" r:embed="rId10"/>
+              </a:ext>
+            </a:extLst>
+          </a:blip>
+          <a:stretch>
+            <a:fillRect/>
+          </a:stretch>
+        </p:blipFill>
+        <p:spPr>
+          <a:xfrm>
+            <a:off x="5508133" y="2091937"/>
+            <a:ext cx="664558" cy="664558"/>
+          </a:xfrm>
+          <a:prstGeom prst="rect">
+            <a:avLst/>
+          </a:prstGeom>
+        </p:spPr>
+      </p:pic>
+    </p:spTree>
+  </p:cSld>
+  <p:clrMapOvr>
+    <a:masterClrMapping/>
+  </p:clrMapOvr>
+</p:sld>
+</file>
+
+<file path=ppt/slides/slide30.xml><?xml version="1.0" encoding="utf-8"?>
 <p:sld xmlns:a="http://schemas.openxmlformats.org/drawingml/2006/main" xmlns:r="http://schemas.openxmlformats.org/officeDocument/2006/relationships" xmlns:p="http://schemas.openxmlformats.org/presentationml/2006/main">
   <p:cSld>
     <p:spTree>
@@ -22004,1945 +23997,6 @@
     <p:extLst>
       <p:ext uri="{BB962C8B-B14F-4D97-AF65-F5344CB8AC3E}">
         <p14:creationId xmlns:p14="http://schemas.microsoft.com/office/powerpoint/2010/main" val="827475437"/>
-      </p:ext>
-    </p:extLst>
-  </p:cSld>
-  <p:clrMapOvr>
-    <a:masterClrMapping/>
-  </p:clrMapOvr>
-</p:sld>
-</file>
-
-<file path=ppt/slides/slide29.xml><?xml version="1.0" encoding="utf-8"?>
-<p:sld xmlns:a="http://schemas.openxmlformats.org/drawingml/2006/main" xmlns:r="http://schemas.openxmlformats.org/officeDocument/2006/relationships" xmlns:p="http://schemas.openxmlformats.org/presentationml/2006/main">
-  <p:cSld>
-    <p:spTree>
-      <p:nvGrpSpPr>
-        <p:cNvPr id="1" name=""/>
-        <p:cNvGrpSpPr/>
-        <p:nvPr/>
-      </p:nvGrpSpPr>
-      <p:grpSpPr>
-        <a:xfrm>
-          <a:off x="0" y="0"/>
-          <a:ext cx="0" cy="0"/>
-          <a:chOff x="0" y="0"/>
-          <a:chExt cx="0" cy="0"/>
-        </a:xfrm>
-      </p:grpSpPr>
-      <p:sp>
-        <p:nvSpPr>
-          <p:cNvPr id="2" name="Title 1">
-            <a:extLst>
-              <a:ext uri="{FF2B5EF4-FFF2-40B4-BE49-F238E27FC236}">
-                <a16:creationId xmlns:a16="http://schemas.microsoft.com/office/drawing/2014/main" id="{B2E6EB5F-C563-4961-BA02-2702B9C5AF3C}"/>
-              </a:ext>
-            </a:extLst>
-          </p:cNvPr>
-          <p:cNvSpPr>
-            <a:spLocks noGrp="1"/>
-          </p:cNvSpPr>
-          <p:nvPr>
-            <p:ph type="title"/>
-          </p:nvPr>
-        </p:nvSpPr>
-        <p:spPr>
-          <a:xfrm>
-            <a:off x="319500" y="180900"/>
-            <a:ext cx="2808000" cy="755700"/>
-          </a:xfrm>
-        </p:spPr>
-        <p:txBody>
-          <a:bodyPr/>
-          <a:lstStyle/>
-          <a:p>
-            <a:r>
-              <a:rPr lang="en-US" dirty="0" err="1"/>
-              <a:t>AutoML</a:t>
-            </a:r>
-            <a:endParaRPr lang="en-US" dirty="0"/>
-          </a:p>
-        </p:txBody>
-      </p:sp>
-      <p:sp>
-        <p:nvSpPr>
-          <p:cNvPr id="3" name="Text Placeholder 2">
-            <a:extLst>
-              <a:ext uri="{FF2B5EF4-FFF2-40B4-BE49-F238E27FC236}">
-                <a16:creationId xmlns:a16="http://schemas.microsoft.com/office/drawing/2014/main" id="{0A6D9E67-C183-48CE-A744-2C8AB740048D}"/>
-              </a:ext>
-            </a:extLst>
-          </p:cNvPr>
-          <p:cNvSpPr>
-            <a:spLocks noGrp="1"/>
-          </p:cNvSpPr>
-          <p:nvPr>
-            <p:ph type="body" idx="1"/>
-          </p:nvPr>
-        </p:nvSpPr>
-        <p:spPr>
-          <a:xfrm>
-            <a:off x="319499" y="936600"/>
-            <a:ext cx="3552845" cy="3716404"/>
-          </a:xfrm>
-        </p:spPr>
-        <p:txBody>
-          <a:bodyPr/>
-          <a:lstStyle/>
-          <a:p>
-            <a:pPr>
-              <a:spcBef>
-                <a:spcPts val="600"/>
-              </a:spcBef>
-            </a:pPr>
-            <a:r>
-              <a:rPr lang="en-US" dirty="0"/>
-              <a:t>Automatically test various algorithms, hyperparameters, and scaling techniques</a:t>
-            </a:r>
-          </a:p>
-          <a:p>
-            <a:pPr>
-              <a:spcBef>
-                <a:spcPts val="600"/>
-              </a:spcBef>
-            </a:pPr>
-            <a:r>
-              <a:rPr lang="en-US" dirty="0"/>
-              <a:t>Three Experiment Types:</a:t>
-            </a:r>
-          </a:p>
-          <a:p>
-            <a:pPr lvl="1">
-              <a:spcBef>
-                <a:spcPts val="600"/>
-              </a:spcBef>
-            </a:pPr>
-            <a:r>
-              <a:rPr lang="en-US" dirty="0"/>
-              <a:t>Classification</a:t>
-            </a:r>
-          </a:p>
-          <a:p>
-            <a:pPr lvl="1">
-              <a:spcBef>
-                <a:spcPts val="600"/>
-              </a:spcBef>
-            </a:pPr>
-            <a:r>
-              <a:rPr lang="en-US" dirty="0"/>
-              <a:t>Regression</a:t>
-            </a:r>
-          </a:p>
-          <a:p>
-            <a:pPr lvl="1">
-              <a:spcBef>
-                <a:spcPts val="600"/>
-              </a:spcBef>
-            </a:pPr>
-            <a:r>
-              <a:rPr lang="en-US" dirty="0"/>
-              <a:t>Forecasting</a:t>
-            </a:r>
-          </a:p>
-          <a:p>
-            <a:pPr>
-              <a:spcBef>
-                <a:spcPts val="600"/>
-              </a:spcBef>
-            </a:pPr>
-            <a:r>
-              <a:rPr lang="en-US" dirty="0"/>
-              <a:t>Steps:</a:t>
-            </a:r>
-          </a:p>
-          <a:p>
-            <a:pPr lvl="1">
-              <a:spcBef>
-                <a:spcPts val="600"/>
-              </a:spcBef>
-            </a:pPr>
-            <a:r>
-              <a:rPr lang="en-US" dirty="0"/>
-              <a:t>Preprocessing &amp; Scaling</a:t>
-            </a:r>
-          </a:p>
-          <a:p>
-            <a:pPr lvl="1">
-              <a:spcBef>
-                <a:spcPts val="600"/>
-              </a:spcBef>
-            </a:pPr>
-            <a:r>
-              <a:rPr lang="en-US" dirty="0"/>
-              <a:t>Featurization</a:t>
-            </a:r>
-          </a:p>
-          <a:p>
-            <a:pPr lvl="1">
-              <a:spcBef>
-                <a:spcPts val="600"/>
-              </a:spcBef>
-            </a:pPr>
-            <a:r>
-              <a:rPr lang="en-US" dirty="0"/>
-              <a:t>Cross-Validation</a:t>
-            </a:r>
-          </a:p>
-          <a:p>
-            <a:pPr lvl="1">
-              <a:spcBef>
-                <a:spcPts val="600"/>
-              </a:spcBef>
-            </a:pPr>
-            <a:r>
-              <a:rPr lang="en-US" dirty="0" err="1"/>
-              <a:t>Ensembling</a:t>
-            </a:r>
-            <a:endParaRPr lang="en-US" dirty="0"/>
-          </a:p>
-          <a:p>
-            <a:pPr lvl="1">
-              <a:spcBef>
-                <a:spcPts val="600"/>
-              </a:spcBef>
-            </a:pPr>
-            <a:endParaRPr lang="en-US" dirty="0"/>
-          </a:p>
-        </p:txBody>
-      </p:sp>
-      <p:graphicFrame>
-        <p:nvGraphicFramePr>
-          <p:cNvPr id="4" name="Table 3">
-            <a:extLst>
-              <a:ext uri="{FF2B5EF4-FFF2-40B4-BE49-F238E27FC236}">
-                <a16:creationId xmlns:a16="http://schemas.microsoft.com/office/drawing/2014/main" id="{287E4274-7456-4C85-ACEB-DF88F6F79EF5}"/>
-              </a:ext>
-            </a:extLst>
-          </p:cNvPr>
-          <p:cNvGraphicFramePr>
-            <a:graphicFrameLocks noGrp="1"/>
-          </p:cNvGraphicFramePr>
-          <p:nvPr>
-            <p:extLst>
-              <p:ext uri="{D42A27DB-BD31-4B8C-83A1-F6EECF244321}">
-                <p14:modId xmlns:p14="http://schemas.microsoft.com/office/powerpoint/2010/main" val="2433286491"/>
-              </p:ext>
-            </p:extLst>
-          </p:nvPr>
-        </p:nvGraphicFramePr>
-        <p:xfrm>
-          <a:off x="3817974" y="640146"/>
-          <a:ext cx="4865759" cy="3585984"/>
-        </p:xfrm>
-        <a:graphic>
-          <a:graphicData uri="http://schemas.openxmlformats.org/drawingml/2006/table">
-            <a:tbl>
-              <a:tblPr/>
-              <a:tblGrid>
-                <a:gridCol w="2418557">
-                  <a:extLst>
-                    <a:ext uri="{9D8B030D-6E8A-4147-A177-3AD203B41FA5}">
-                      <a16:colId xmlns:a16="http://schemas.microsoft.com/office/drawing/2014/main" val="1089580484"/>
-                    </a:ext>
-                  </a:extLst>
-                </a:gridCol>
-                <a:gridCol w="2447202">
-                  <a:extLst>
-                    <a:ext uri="{9D8B030D-6E8A-4147-A177-3AD203B41FA5}">
-                      <a16:colId xmlns:a16="http://schemas.microsoft.com/office/drawing/2014/main" val="1382446080"/>
-                    </a:ext>
-                  </a:extLst>
-                </a:gridCol>
-              </a:tblGrid>
-              <a:tr h="178790">
-                <a:tc>
-                  <a:txBody>
-                    <a:bodyPr/>
-                    <a:lstStyle/>
-                    <a:p>
-                      <a:pPr algn="ctr"/>
-                      <a:r>
-                        <a:rPr lang="en-US" sz="1200" b="1"/>
-                        <a:t>Classification</a:t>
-                      </a:r>
-                    </a:p>
-                  </a:txBody>
-                  <a:tcPr marL="52666" marR="52666" marT="26333" marB="26333" anchor="ctr">
-                    <a:lnL>
-                      <a:noFill/>
-                    </a:lnL>
-                    <a:lnR>
-                      <a:noFill/>
-                    </a:lnR>
-                    <a:lnT>
-                      <a:noFill/>
-                    </a:lnT>
-                    <a:lnB>
-                      <a:noFill/>
-                    </a:lnB>
-                  </a:tcPr>
-                </a:tc>
-                <a:tc>
-                  <a:txBody>
-                    <a:bodyPr/>
-                    <a:lstStyle/>
-                    <a:p>
-                      <a:pPr algn="ctr"/>
-                      <a:r>
-                        <a:rPr lang="en-US" sz="1200" b="1" dirty="0"/>
-                        <a:t>Regression &amp;</a:t>
-                      </a:r>
-                    </a:p>
-                    <a:p>
-                      <a:pPr algn="ctr"/>
-                      <a:r>
-                        <a:rPr lang="en-US" sz="1200" b="1" dirty="0"/>
-                        <a:t>Time Series Forecasting</a:t>
-                      </a:r>
-                    </a:p>
-                  </a:txBody>
-                  <a:tcPr marL="52666" marR="52666" marT="26333" marB="26333" anchor="ctr">
-                    <a:lnL>
-                      <a:noFill/>
-                    </a:lnL>
-                    <a:lnR>
-                      <a:noFill/>
-                    </a:lnR>
-                    <a:lnT>
-                      <a:noFill/>
-                    </a:lnT>
-                    <a:lnB>
-                      <a:noFill/>
-                    </a:lnB>
-                  </a:tcPr>
-                </a:tc>
-                <a:extLst>
-                  <a:ext uri="{0D108BD9-81ED-4DB2-BD59-A6C34878D82A}">
-                    <a16:rowId xmlns:a16="http://schemas.microsoft.com/office/drawing/2014/main" val="3301145887"/>
-                  </a:ext>
-                </a:extLst>
-              </a:tr>
-              <a:tr h="178790">
-                <a:tc>
-                  <a:txBody>
-                    <a:bodyPr/>
-                    <a:lstStyle/>
-                    <a:p>
-                      <a:r>
-                        <a:rPr lang="en-US" sz="1000">
-                          <a:hlinkClick r:id="rId2"/>
-                        </a:rPr>
-                        <a:t>Logistic Regression</a:t>
-                      </a:r>
-                      <a:endParaRPr lang="en-US" sz="1000"/>
-                    </a:p>
-                  </a:txBody>
-                  <a:tcPr marL="52666" marR="52666" marT="26333" marB="26333" anchor="ctr">
-                    <a:lnL>
-                      <a:noFill/>
-                    </a:lnL>
-                    <a:lnR>
-                      <a:noFill/>
-                    </a:lnR>
-                    <a:lnT>
-                      <a:noFill/>
-                    </a:lnT>
-                    <a:lnB>
-                      <a:noFill/>
-                    </a:lnB>
-                  </a:tcPr>
-                </a:tc>
-                <a:tc>
-                  <a:txBody>
-                    <a:bodyPr/>
-                    <a:lstStyle/>
-                    <a:p>
-                      <a:r>
-                        <a:rPr lang="en-US" sz="1000" dirty="0">
-                          <a:hlinkClick r:id="rId3"/>
-                        </a:rPr>
-                        <a:t>Elastic Net</a:t>
-                      </a:r>
-                      <a:endParaRPr lang="en-US" sz="1000" dirty="0"/>
-                    </a:p>
-                  </a:txBody>
-                  <a:tcPr marL="52666" marR="52666" marT="26333" marB="26333" anchor="ctr">
-                    <a:lnL>
-                      <a:noFill/>
-                    </a:lnL>
-                    <a:lnR>
-                      <a:noFill/>
-                    </a:lnR>
-                    <a:lnT>
-                      <a:noFill/>
-                    </a:lnT>
-                    <a:lnB>
-                      <a:noFill/>
-                    </a:lnB>
-                  </a:tcPr>
-                </a:tc>
-                <a:extLst>
-                  <a:ext uri="{0D108BD9-81ED-4DB2-BD59-A6C34878D82A}">
-                    <a16:rowId xmlns:a16="http://schemas.microsoft.com/office/drawing/2014/main" val="801165373"/>
-                  </a:ext>
-                </a:extLst>
-              </a:tr>
-              <a:tr h="178790">
-                <a:tc>
-                  <a:txBody>
-                    <a:bodyPr/>
-                    <a:lstStyle/>
-                    <a:p>
-                      <a:r>
-                        <a:rPr lang="en-US" sz="1000">
-                          <a:hlinkClick r:id="rId4"/>
-                        </a:rPr>
-                        <a:t>Light GBM</a:t>
-                      </a:r>
-                      <a:endParaRPr lang="en-US" sz="1000"/>
-                    </a:p>
-                  </a:txBody>
-                  <a:tcPr marL="52666" marR="52666" marT="26333" marB="26333" anchor="ctr">
-                    <a:lnL>
-                      <a:noFill/>
-                    </a:lnL>
-                    <a:lnR>
-                      <a:noFill/>
-                    </a:lnR>
-                    <a:lnT>
-                      <a:noFill/>
-                    </a:lnT>
-                    <a:lnB>
-                      <a:noFill/>
-                    </a:lnB>
-                  </a:tcPr>
-                </a:tc>
-                <a:tc>
-                  <a:txBody>
-                    <a:bodyPr/>
-                    <a:lstStyle/>
-                    <a:p>
-                      <a:r>
-                        <a:rPr lang="en-US" sz="1000">
-                          <a:hlinkClick r:id="rId4"/>
-                        </a:rPr>
-                        <a:t>Light GBM</a:t>
-                      </a:r>
-                      <a:endParaRPr lang="en-US" sz="1000"/>
-                    </a:p>
-                  </a:txBody>
-                  <a:tcPr marL="52666" marR="52666" marT="26333" marB="26333" anchor="ctr">
-                    <a:lnL>
-                      <a:noFill/>
-                    </a:lnL>
-                    <a:lnR>
-                      <a:noFill/>
-                    </a:lnR>
-                    <a:lnT>
-                      <a:noFill/>
-                    </a:lnT>
-                    <a:lnB>
-                      <a:noFill/>
-                    </a:lnB>
-                  </a:tcPr>
-                </a:tc>
-                <a:extLst>
-                  <a:ext uri="{0D108BD9-81ED-4DB2-BD59-A6C34878D82A}">
-                    <a16:rowId xmlns:a16="http://schemas.microsoft.com/office/drawing/2014/main" val="1291908786"/>
-                  </a:ext>
-                </a:extLst>
-              </a:tr>
-              <a:tr h="178790">
-                <a:tc>
-                  <a:txBody>
-                    <a:bodyPr/>
-                    <a:lstStyle/>
-                    <a:p>
-                      <a:r>
-                        <a:rPr lang="en-US" sz="1000">
-                          <a:hlinkClick r:id="rId5"/>
-                        </a:rPr>
-                        <a:t>Gradient Boosting</a:t>
-                      </a:r>
-                      <a:endParaRPr lang="en-US" sz="1000"/>
-                    </a:p>
-                  </a:txBody>
-                  <a:tcPr marL="52666" marR="52666" marT="26333" marB="26333" anchor="ctr">
-                    <a:lnL>
-                      <a:noFill/>
-                    </a:lnL>
-                    <a:lnR>
-                      <a:noFill/>
-                    </a:lnR>
-                    <a:lnT>
-                      <a:noFill/>
-                    </a:lnT>
-                    <a:lnB>
-                      <a:noFill/>
-                    </a:lnB>
-                  </a:tcPr>
-                </a:tc>
-                <a:tc>
-                  <a:txBody>
-                    <a:bodyPr/>
-                    <a:lstStyle/>
-                    <a:p>
-                      <a:r>
-                        <a:rPr lang="en-US" sz="1000">
-                          <a:hlinkClick r:id="rId6"/>
-                        </a:rPr>
-                        <a:t>Gradient Boosting</a:t>
-                      </a:r>
-                      <a:endParaRPr lang="en-US" sz="1000"/>
-                    </a:p>
-                  </a:txBody>
-                  <a:tcPr marL="52666" marR="52666" marT="26333" marB="26333" anchor="ctr">
-                    <a:lnL>
-                      <a:noFill/>
-                    </a:lnL>
-                    <a:lnR>
-                      <a:noFill/>
-                    </a:lnR>
-                    <a:lnT>
-                      <a:noFill/>
-                    </a:lnT>
-                    <a:lnB>
-                      <a:noFill/>
-                    </a:lnB>
-                  </a:tcPr>
-                </a:tc>
-                <a:extLst>
-                  <a:ext uri="{0D108BD9-81ED-4DB2-BD59-A6C34878D82A}">
-                    <a16:rowId xmlns:a16="http://schemas.microsoft.com/office/drawing/2014/main" val="1841407873"/>
-                  </a:ext>
-                </a:extLst>
-              </a:tr>
-              <a:tr h="178790">
-                <a:tc>
-                  <a:txBody>
-                    <a:bodyPr/>
-                    <a:lstStyle/>
-                    <a:p>
-                      <a:r>
-                        <a:rPr lang="en-US" sz="1000">
-                          <a:hlinkClick r:id="rId7"/>
-                        </a:rPr>
-                        <a:t>Decision Tree</a:t>
-                      </a:r>
-                      <a:endParaRPr lang="en-US" sz="1000"/>
-                    </a:p>
-                  </a:txBody>
-                  <a:tcPr marL="52666" marR="52666" marT="26333" marB="26333" anchor="ctr">
-                    <a:lnL>
-                      <a:noFill/>
-                    </a:lnL>
-                    <a:lnR>
-                      <a:noFill/>
-                    </a:lnR>
-                    <a:lnT>
-                      <a:noFill/>
-                    </a:lnT>
-                    <a:lnB>
-                      <a:noFill/>
-                    </a:lnB>
-                  </a:tcPr>
-                </a:tc>
-                <a:tc>
-                  <a:txBody>
-                    <a:bodyPr/>
-                    <a:lstStyle/>
-                    <a:p>
-                      <a:r>
-                        <a:rPr lang="en-US" sz="1000">
-                          <a:hlinkClick r:id="rId8"/>
-                        </a:rPr>
-                        <a:t>Decision Tree</a:t>
-                      </a:r>
-                      <a:endParaRPr lang="en-US" sz="1000"/>
-                    </a:p>
-                  </a:txBody>
-                  <a:tcPr marL="52666" marR="52666" marT="26333" marB="26333" anchor="ctr">
-                    <a:lnL>
-                      <a:noFill/>
-                    </a:lnL>
-                    <a:lnR>
-                      <a:noFill/>
-                    </a:lnR>
-                    <a:lnT>
-                      <a:noFill/>
-                    </a:lnT>
-                    <a:lnB>
-                      <a:noFill/>
-                    </a:lnB>
-                  </a:tcPr>
-                </a:tc>
-                <a:extLst>
-                  <a:ext uri="{0D108BD9-81ED-4DB2-BD59-A6C34878D82A}">
-                    <a16:rowId xmlns:a16="http://schemas.microsoft.com/office/drawing/2014/main" val="833870345"/>
-                  </a:ext>
-                </a:extLst>
-              </a:tr>
-              <a:tr h="178790">
-                <a:tc>
-                  <a:txBody>
-                    <a:bodyPr/>
-                    <a:lstStyle/>
-                    <a:p>
-                      <a:r>
-                        <a:rPr lang="en-US" sz="1000">
-                          <a:hlinkClick r:id="rId9"/>
-                        </a:rPr>
-                        <a:t>K Nearest Neighbors</a:t>
-                      </a:r>
-                      <a:endParaRPr lang="en-US" sz="1000"/>
-                    </a:p>
-                  </a:txBody>
-                  <a:tcPr marL="52666" marR="52666" marT="26333" marB="26333" anchor="ctr">
-                    <a:lnL>
-                      <a:noFill/>
-                    </a:lnL>
-                    <a:lnR>
-                      <a:noFill/>
-                    </a:lnR>
-                    <a:lnT>
-                      <a:noFill/>
-                    </a:lnT>
-                    <a:lnB>
-                      <a:noFill/>
-                    </a:lnB>
-                  </a:tcPr>
-                </a:tc>
-                <a:tc>
-                  <a:txBody>
-                    <a:bodyPr/>
-                    <a:lstStyle/>
-                    <a:p>
-                      <a:r>
-                        <a:rPr lang="en-US" sz="1000">
-                          <a:hlinkClick r:id="rId9"/>
-                        </a:rPr>
-                        <a:t>K Nearest Neighbors</a:t>
-                      </a:r>
-                      <a:endParaRPr lang="en-US" sz="1000"/>
-                    </a:p>
-                  </a:txBody>
-                  <a:tcPr marL="52666" marR="52666" marT="26333" marB="26333" anchor="ctr">
-                    <a:lnL>
-                      <a:noFill/>
-                    </a:lnL>
-                    <a:lnR>
-                      <a:noFill/>
-                    </a:lnR>
-                    <a:lnT>
-                      <a:noFill/>
-                    </a:lnT>
-                    <a:lnB>
-                      <a:noFill/>
-                    </a:lnB>
-                  </a:tcPr>
-                </a:tc>
-                <a:extLst>
-                  <a:ext uri="{0D108BD9-81ED-4DB2-BD59-A6C34878D82A}">
-                    <a16:rowId xmlns:a16="http://schemas.microsoft.com/office/drawing/2014/main" val="2832259499"/>
-                  </a:ext>
-                </a:extLst>
-              </a:tr>
-              <a:tr h="178790">
-                <a:tc>
-                  <a:txBody>
-                    <a:bodyPr/>
-                    <a:lstStyle/>
-                    <a:p>
-                      <a:r>
-                        <a:rPr lang="en-US" sz="1000">
-                          <a:hlinkClick r:id="rId10"/>
-                        </a:rPr>
-                        <a:t>Linear SVC</a:t>
-                      </a:r>
-                      <a:endParaRPr lang="en-US" sz="1000"/>
-                    </a:p>
-                  </a:txBody>
-                  <a:tcPr marL="52666" marR="52666" marT="26333" marB="26333" anchor="ctr">
-                    <a:lnL>
-                      <a:noFill/>
-                    </a:lnL>
-                    <a:lnR>
-                      <a:noFill/>
-                    </a:lnR>
-                    <a:lnT>
-                      <a:noFill/>
-                    </a:lnT>
-                    <a:lnB>
-                      <a:noFill/>
-                    </a:lnB>
-                  </a:tcPr>
-                </a:tc>
-                <a:tc>
-                  <a:txBody>
-                    <a:bodyPr/>
-                    <a:lstStyle/>
-                    <a:p>
-                      <a:r>
-                        <a:rPr lang="en-US" sz="1000">
-                          <a:hlinkClick r:id="rId11"/>
-                        </a:rPr>
-                        <a:t>LARS Lasso</a:t>
-                      </a:r>
-                      <a:endParaRPr lang="en-US" sz="1000"/>
-                    </a:p>
-                  </a:txBody>
-                  <a:tcPr marL="52666" marR="52666" marT="26333" marB="26333" anchor="ctr">
-                    <a:lnL>
-                      <a:noFill/>
-                    </a:lnL>
-                    <a:lnR>
-                      <a:noFill/>
-                    </a:lnR>
-                    <a:lnT>
-                      <a:noFill/>
-                    </a:lnT>
-                    <a:lnB>
-                      <a:noFill/>
-                    </a:lnB>
-                  </a:tcPr>
-                </a:tc>
-                <a:extLst>
-                  <a:ext uri="{0D108BD9-81ED-4DB2-BD59-A6C34878D82A}">
-                    <a16:rowId xmlns:a16="http://schemas.microsoft.com/office/drawing/2014/main" val="228754427"/>
-                  </a:ext>
-                </a:extLst>
-              </a:tr>
-              <a:tr h="303944">
-                <a:tc>
-                  <a:txBody>
-                    <a:bodyPr/>
-                    <a:lstStyle/>
-                    <a:p>
-                      <a:r>
-                        <a:rPr lang="en-US" sz="1000">
-                          <a:hlinkClick r:id="rId10"/>
-                        </a:rPr>
-                        <a:t>C-Support Vector Classification (SVC)</a:t>
-                      </a:r>
-                      <a:endParaRPr lang="en-US" sz="1000"/>
-                    </a:p>
-                  </a:txBody>
-                  <a:tcPr marL="52666" marR="52666" marT="26333" marB="26333" anchor="ctr">
-                    <a:lnL>
-                      <a:noFill/>
-                    </a:lnL>
-                    <a:lnR>
-                      <a:noFill/>
-                    </a:lnR>
-                    <a:lnT>
-                      <a:noFill/>
-                    </a:lnT>
-                    <a:lnB>
-                      <a:noFill/>
-                    </a:lnB>
-                  </a:tcPr>
-                </a:tc>
-                <a:tc>
-                  <a:txBody>
-                    <a:bodyPr/>
-                    <a:lstStyle/>
-                    <a:p>
-                      <a:r>
-                        <a:rPr lang="en-US" sz="1000">
-                          <a:hlinkClick r:id="rId12"/>
-                        </a:rPr>
-                        <a:t>Stochastic Gradient Descent (SGD)</a:t>
-                      </a:r>
-                      <a:endParaRPr lang="en-US" sz="1000"/>
-                    </a:p>
-                  </a:txBody>
-                  <a:tcPr marL="52666" marR="52666" marT="26333" marB="26333" anchor="ctr">
-                    <a:lnL>
-                      <a:noFill/>
-                    </a:lnL>
-                    <a:lnR>
-                      <a:noFill/>
-                    </a:lnR>
-                    <a:lnT>
-                      <a:noFill/>
-                    </a:lnT>
-                    <a:lnB>
-                      <a:noFill/>
-                    </a:lnB>
-                  </a:tcPr>
-                </a:tc>
-                <a:extLst>
-                  <a:ext uri="{0D108BD9-81ED-4DB2-BD59-A6C34878D82A}">
-                    <a16:rowId xmlns:a16="http://schemas.microsoft.com/office/drawing/2014/main" val="482337621"/>
-                  </a:ext>
-                </a:extLst>
-              </a:tr>
-              <a:tr h="178790">
-                <a:tc>
-                  <a:txBody>
-                    <a:bodyPr/>
-                    <a:lstStyle/>
-                    <a:p>
-                      <a:r>
-                        <a:rPr lang="en-US" sz="1000">
-                          <a:hlinkClick r:id="rId13"/>
-                        </a:rPr>
-                        <a:t>Random Forest</a:t>
-                      </a:r>
-                      <a:endParaRPr lang="en-US" sz="1000"/>
-                    </a:p>
-                  </a:txBody>
-                  <a:tcPr marL="52666" marR="52666" marT="26333" marB="26333" anchor="ctr">
-                    <a:lnL>
-                      <a:noFill/>
-                    </a:lnL>
-                    <a:lnR>
-                      <a:noFill/>
-                    </a:lnR>
-                    <a:lnT>
-                      <a:noFill/>
-                    </a:lnT>
-                    <a:lnB>
-                      <a:noFill/>
-                    </a:lnB>
-                  </a:tcPr>
-                </a:tc>
-                <a:tc>
-                  <a:txBody>
-                    <a:bodyPr/>
-                    <a:lstStyle/>
-                    <a:p>
-                      <a:r>
-                        <a:rPr lang="en-US" sz="1000">
-                          <a:hlinkClick r:id="rId13"/>
-                        </a:rPr>
-                        <a:t>Random Forest</a:t>
-                      </a:r>
-                      <a:endParaRPr lang="en-US" sz="1000"/>
-                    </a:p>
-                  </a:txBody>
-                  <a:tcPr marL="52666" marR="52666" marT="26333" marB="26333" anchor="ctr">
-                    <a:lnL>
-                      <a:noFill/>
-                    </a:lnL>
-                    <a:lnR>
-                      <a:noFill/>
-                    </a:lnR>
-                    <a:lnT>
-                      <a:noFill/>
-                    </a:lnT>
-                    <a:lnB>
-                      <a:noFill/>
-                    </a:lnB>
-                  </a:tcPr>
-                </a:tc>
-                <a:extLst>
-                  <a:ext uri="{0D108BD9-81ED-4DB2-BD59-A6C34878D82A}">
-                    <a16:rowId xmlns:a16="http://schemas.microsoft.com/office/drawing/2014/main" val="1521599616"/>
-                  </a:ext>
-                </a:extLst>
-              </a:tr>
-              <a:tr h="303944">
-                <a:tc>
-                  <a:txBody>
-                    <a:bodyPr/>
-                    <a:lstStyle/>
-                    <a:p>
-                      <a:r>
-                        <a:rPr lang="en-US" sz="1000">
-                          <a:hlinkClick r:id="rId14"/>
-                        </a:rPr>
-                        <a:t>Extremely Randomized Trees</a:t>
-                      </a:r>
-                      <a:endParaRPr lang="en-US" sz="1000"/>
-                    </a:p>
-                  </a:txBody>
-                  <a:tcPr marL="52666" marR="52666" marT="26333" marB="26333" anchor="ctr">
-                    <a:lnL>
-                      <a:noFill/>
-                    </a:lnL>
-                    <a:lnR>
-                      <a:noFill/>
-                    </a:lnR>
-                    <a:lnT>
-                      <a:noFill/>
-                    </a:lnT>
-                    <a:lnB>
-                      <a:noFill/>
-                    </a:lnB>
-                  </a:tcPr>
-                </a:tc>
-                <a:tc>
-                  <a:txBody>
-                    <a:bodyPr/>
-                    <a:lstStyle/>
-                    <a:p>
-                      <a:r>
-                        <a:rPr lang="en-US" sz="1000">
-                          <a:hlinkClick r:id="rId14"/>
-                        </a:rPr>
-                        <a:t>Extremely Randomized Trees</a:t>
-                      </a:r>
-                      <a:endParaRPr lang="en-US" sz="1000"/>
-                    </a:p>
-                  </a:txBody>
-                  <a:tcPr marL="52666" marR="52666" marT="26333" marB="26333" anchor="ctr">
-                    <a:lnL>
-                      <a:noFill/>
-                    </a:lnL>
-                    <a:lnR>
-                      <a:noFill/>
-                    </a:lnR>
-                    <a:lnT>
-                      <a:noFill/>
-                    </a:lnT>
-                    <a:lnB>
-                      <a:noFill/>
-                    </a:lnB>
-                  </a:tcPr>
-                </a:tc>
-                <a:extLst>
-                  <a:ext uri="{0D108BD9-81ED-4DB2-BD59-A6C34878D82A}">
-                    <a16:rowId xmlns:a16="http://schemas.microsoft.com/office/drawing/2014/main" val="1154399125"/>
-                  </a:ext>
-                </a:extLst>
-              </a:tr>
-              <a:tr h="178790">
-                <a:tc>
-                  <a:txBody>
-                    <a:bodyPr/>
-                    <a:lstStyle/>
-                    <a:p>
-                      <a:r>
-                        <a:rPr lang="en-US" sz="1000" dirty="0" err="1">
-                          <a:hlinkClick r:id="rId15"/>
-                        </a:rPr>
-                        <a:t>Xgboost</a:t>
-                      </a:r>
-                      <a:endParaRPr lang="en-US" sz="1000" dirty="0"/>
-                    </a:p>
-                  </a:txBody>
-                  <a:tcPr marL="52666" marR="52666" marT="26333" marB="26333" anchor="ctr">
-                    <a:lnL>
-                      <a:noFill/>
-                    </a:lnL>
-                    <a:lnR>
-                      <a:noFill/>
-                    </a:lnR>
-                    <a:lnT>
-                      <a:noFill/>
-                    </a:lnT>
-                    <a:lnB>
-                      <a:noFill/>
-                    </a:lnB>
-                  </a:tcPr>
-                </a:tc>
-                <a:tc>
-                  <a:txBody>
-                    <a:bodyPr/>
-                    <a:lstStyle/>
-                    <a:p>
-                      <a:r>
-                        <a:rPr lang="en-US" sz="1000">
-                          <a:hlinkClick r:id="rId15"/>
-                        </a:rPr>
-                        <a:t>Xgboost</a:t>
-                      </a:r>
-                      <a:endParaRPr lang="en-US" sz="1000"/>
-                    </a:p>
-                  </a:txBody>
-                  <a:tcPr marL="52666" marR="52666" marT="26333" marB="26333" anchor="ctr">
-                    <a:lnL>
-                      <a:noFill/>
-                    </a:lnL>
-                    <a:lnR>
-                      <a:noFill/>
-                    </a:lnR>
-                    <a:lnT>
-                      <a:noFill/>
-                    </a:lnT>
-                    <a:lnB>
-                      <a:noFill/>
-                    </a:lnB>
-                  </a:tcPr>
-                </a:tc>
-                <a:extLst>
-                  <a:ext uri="{0D108BD9-81ED-4DB2-BD59-A6C34878D82A}">
-                    <a16:rowId xmlns:a16="http://schemas.microsoft.com/office/drawing/2014/main" val="3537502937"/>
-                  </a:ext>
-                </a:extLst>
-              </a:tr>
-              <a:tr h="178790">
-                <a:tc>
-                  <a:txBody>
-                    <a:bodyPr/>
-                    <a:lstStyle/>
-                    <a:p>
-                      <a:r>
-                        <a:rPr lang="en-US" sz="1000">
-                          <a:hlinkClick r:id="rId16"/>
-                        </a:rPr>
-                        <a:t>DNN Classifier</a:t>
-                      </a:r>
-                      <a:endParaRPr lang="en-US" sz="1000"/>
-                    </a:p>
-                  </a:txBody>
-                  <a:tcPr marL="52666" marR="52666" marT="26333" marB="26333" anchor="ctr">
-                    <a:lnL>
-                      <a:noFill/>
-                    </a:lnL>
-                    <a:lnR>
-                      <a:noFill/>
-                    </a:lnR>
-                    <a:lnT>
-                      <a:noFill/>
-                    </a:lnT>
-                    <a:lnB>
-                      <a:noFill/>
-                    </a:lnB>
-                  </a:tcPr>
-                </a:tc>
-                <a:tc>
-                  <a:txBody>
-                    <a:bodyPr/>
-                    <a:lstStyle/>
-                    <a:p>
-                      <a:r>
-                        <a:rPr lang="en-US" sz="1000">
-                          <a:hlinkClick r:id="rId17"/>
-                        </a:rPr>
-                        <a:t>DNN Regressor</a:t>
-                      </a:r>
-                      <a:endParaRPr lang="en-US" sz="1000"/>
-                    </a:p>
-                  </a:txBody>
-                  <a:tcPr marL="52666" marR="52666" marT="26333" marB="26333" anchor="ctr">
-                    <a:lnL>
-                      <a:noFill/>
-                    </a:lnL>
-                    <a:lnR>
-                      <a:noFill/>
-                    </a:lnR>
-                    <a:lnT>
-                      <a:noFill/>
-                    </a:lnT>
-                    <a:lnB>
-                      <a:noFill/>
-                    </a:lnB>
-                  </a:tcPr>
-                </a:tc>
-                <a:extLst>
-                  <a:ext uri="{0D108BD9-81ED-4DB2-BD59-A6C34878D82A}">
-                    <a16:rowId xmlns:a16="http://schemas.microsoft.com/office/drawing/2014/main" val="1708269267"/>
-                  </a:ext>
-                </a:extLst>
-              </a:tr>
-              <a:tr h="178790">
-                <a:tc>
-                  <a:txBody>
-                    <a:bodyPr/>
-                    <a:lstStyle/>
-                    <a:p>
-                      <a:r>
-                        <a:rPr lang="en-US" sz="1000">
-                          <a:hlinkClick r:id="rId18"/>
-                        </a:rPr>
-                        <a:t>DNN Linear Classifier</a:t>
-                      </a:r>
-                      <a:endParaRPr lang="en-US" sz="1000"/>
-                    </a:p>
-                  </a:txBody>
-                  <a:tcPr marL="52666" marR="52666" marT="26333" marB="26333" anchor="ctr">
-                    <a:lnL>
-                      <a:noFill/>
-                    </a:lnL>
-                    <a:lnR>
-                      <a:noFill/>
-                    </a:lnR>
-                    <a:lnT>
-                      <a:noFill/>
-                    </a:lnT>
-                    <a:lnB>
-                      <a:noFill/>
-                    </a:lnB>
-                  </a:tcPr>
-                </a:tc>
-                <a:tc>
-                  <a:txBody>
-                    <a:bodyPr/>
-                    <a:lstStyle/>
-                    <a:p>
-                      <a:r>
-                        <a:rPr lang="en-US" sz="1000">
-                          <a:hlinkClick r:id="rId19"/>
-                        </a:rPr>
-                        <a:t>Linear Regressor</a:t>
-                      </a:r>
-                      <a:endParaRPr lang="en-US" sz="1000"/>
-                    </a:p>
-                  </a:txBody>
-                  <a:tcPr marL="52666" marR="52666" marT="26333" marB="26333" anchor="ctr">
-                    <a:lnL>
-                      <a:noFill/>
-                    </a:lnL>
-                    <a:lnR>
-                      <a:noFill/>
-                    </a:lnR>
-                    <a:lnT>
-                      <a:noFill/>
-                    </a:lnT>
-                    <a:lnB>
-                      <a:noFill/>
-                    </a:lnB>
-                  </a:tcPr>
-                </a:tc>
-                <a:extLst>
-                  <a:ext uri="{0D108BD9-81ED-4DB2-BD59-A6C34878D82A}">
-                    <a16:rowId xmlns:a16="http://schemas.microsoft.com/office/drawing/2014/main" val="3239242384"/>
-                  </a:ext>
-                </a:extLst>
-              </a:tr>
-              <a:tr h="178790">
-                <a:tc>
-                  <a:txBody>
-                    <a:bodyPr/>
-                    <a:lstStyle/>
-                    <a:p>
-                      <a:r>
-                        <a:rPr lang="en-US" sz="1000">
-                          <a:hlinkClick r:id="rId20"/>
-                        </a:rPr>
-                        <a:t>Naive Bayes</a:t>
-                      </a:r>
-                      <a:endParaRPr lang="en-US" sz="1000"/>
-                    </a:p>
-                  </a:txBody>
-                  <a:tcPr marL="52666" marR="52666" marT="26333" marB="26333" anchor="ctr">
-                    <a:lnL>
-                      <a:noFill/>
-                    </a:lnL>
-                    <a:lnR>
-                      <a:noFill/>
-                    </a:lnR>
-                    <a:lnT>
-                      <a:noFill/>
-                    </a:lnT>
-                    <a:lnB>
-                      <a:noFill/>
-                    </a:lnB>
-                  </a:tcPr>
-                </a:tc>
-                <a:tc>
-                  <a:txBody>
-                    <a:bodyPr/>
-                    <a:lstStyle/>
-                    <a:p>
-                      <a:endParaRPr lang="en-US" sz="1000"/>
-                    </a:p>
-                  </a:txBody>
-                  <a:tcPr marL="52666" marR="52666" marT="26333" marB="26333" anchor="ctr">
-                    <a:lnL>
-                      <a:noFill/>
-                    </a:lnL>
-                    <a:lnR>
-                      <a:noFill/>
-                    </a:lnR>
-                    <a:lnT>
-                      <a:noFill/>
-                    </a:lnT>
-                    <a:lnB>
-                      <a:noFill/>
-                    </a:lnB>
-                  </a:tcPr>
-                </a:tc>
-                <a:extLst>
-                  <a:ext uri="{0D108BD9-81ED-4DB2-BD59-A6C34878D82A}">
-                    <a16:rowId xmlns:a16="http://schemas.microsoft.com/office/drawing/2014/main" val="341898756"/>
-                  </a:ext>
-                </a:extLst>
-              </a:tr>
-              <a:tr h="303944">
-                <a:tc>
-                  <a:txBody>
-                    <a:bodyPr/>
-                    <a:lstStyle/>
-                    <a:p>
-                      <a:r>
-                        <a:rPr lang="en-US" sz="1000">
-                          <a:hlinkClick r:id="rId21"/>
-                        </a:rPr>
-                        <a:t>Stochastic Gradient Descent (SGD)</a:t>
-                      </a:r>
-                      <a:endParaRPr lang="en-US" sz="1000"/>
-                    </a:p>
-                  </a:txBody>
-                  <a:tcPr marL="52666" marR="52666" marT="26333" marB="26333" anchor="ctr">
-                    <a:lnL>
-                      <a:noFill/>
-                    </a:lnL>
-                    <a:lnR>
-                      <a:noFill/>
-                    </a:lnR>
-                    <a:lnT>
-                      <a:noFill/>
-                    </a:lnT>
-                    <a:lnB>
-                      <a:noFill/>
-                    </a:lnB>
-                  </a:tcPr>
-                </a:tc>
-                <a:tc>
-                  <a:txBody>
-                    <a:bodyPr/>
-                    <a:lstStyle/>
-                    <a:p>
-                      <a:endParaRPr lang="en-US" sz="1000" dirty="0"/>
-                    </a:p>
-                  </a:txBody>
-                  <a:tcPr marL="52666" marR="52666" marT="26333" marB="26333" anchor="ctr">
-                    <a:lnL>
-                      <a:noFill/>
-                    </a:lnL>
-                    <a:lnR>
-                      <a:noFill/>
-                    </a:lnR>
-                    <a:lnT>
-                      <a:noFill/>
-                    </a:lnT>
-                    <a:lnB>
-                      <a:noFill/>
-                    </a:lnB>
-                  </a:tcPr>
-                </a:tc>
-                <a:extLst>
-                  <a:ext uri="{0D108BD9-81ED-4DB2-BD59-A6C34878D82A}">
-                    <a16:rowId xmlns:a16="http://schemas.microsoft.com/office/drawing/2014/main" val="3966003278"/>
-                  </a:ext>
-                </a:extLst>
-              </a:tr>
-            </a:tbl>
-          </a:graphicData>
-        </a:graphic>
-      </p:graphicFrame>
-      <p:sp>
-        <p:nvSpPr>
-          <p:cNvPr id="6" name="Rectangle 5">
-            <a:extLst>
-              <a:ext uri="{FF2B5EF4-FFF2-40B4-BE49-F238E27FC236}">
-                <a16:creationId xmlns:a16="http://schemas.microsoft.com/office/drawing/2014/main" id="{C96C4D95-99B7-4E6E-A3D2-B6969D97C36B}"/>
-              </a:ext>
-            </a:extLst>
-          </p:cNvPr>
-          <p:cNvSpPr/>
-          <p:nvPr/>
-        </p:nvSpPr>
-        <p:spPr>
-          <a:xfrm>
-            <a:off x="3178609" y="4831794"/>
-            <a:ext cx="6144490" cy="261610"/>
-          </a:xfrm>
-          <a:prstGeom prst="rect">
-            <a:avLst/>
-          </a:prstGeom>
-        </p:spPr>
-        <p:txBody>
-          <a:bodyPr wrap="square">
-            <a:spAutoFit/>
-          </a:bodyPr>
-          <a:lstStyle/>
-          <a:p>
-            <a:r>
-              <a:rPr lang="en-US" sz="1100" dirty="0">
-                <a:hlinkClick r:id="rId22"/>
-              </a:rPr>
-              <a:t>https://docs.microsoft.com/en-us/azure/machine-learning/service/how-to-configure-auto-train</a:t>
-            </a:r>
-            <a:endParaRPr lang="en-US" sz="1100" dirty="0"/>
-          </a:p>
-        </p:txBody>
-      </p:sp>
-    </p:spTree>
-    <p:extLst>
-      <p:ext uri="{BB962C8B-B14F-4D97-AF65-F5344CB8AC3E}">
-        <p14:creationId xmlns:p14="http://schemas.microsoft.com/office/powerpoint/2010/main" val="2350663502"/>
-      </p:ext>
-    </p:extLst>
-  </p:cSld>
-  <p:clrMapOvr>
-    <a:masterClrMapping/>
-  </p:clrMapOvr>
-</p:sld>
-</file>
-
-<file path=ppt/slides/slide3.xml><?xml version="1.0" encoding="utf-8"?>
-<p:sld xmlns:a="http://schemas.openxmlformats.org/drawingml/2006/main" xmlns:r="http://schemas.openxmlformats.org/officeDocument/2006/relationships" xmlns:p="http://schemas.openxmlformats.org/presentationml/2006/main">
-  <p:cSld>
-    <p:spTree>
-      <p:nvGrpSpPr>
-        <p:cNvPr id="1" name="Shape 97"/>
-        <p:cNvGrpSpPr/>
-        <p:nvPr/>
-      </p:nvGrpSpPr>
-      <p:grpSpPr>
-        <a:xfrm>
-          <a:off x="0" y="0"/>
-          <a:ext cx="0" cy="0"/>
-          <a:chOff x="0" y="0"/>
-          <a:chExt cx="0" cy="0"/>
-        </a:xfrm>
-      </p:grpSpPr>
-      <p:sp>
-        <p:nvSpPr>
-          <p:cNvPr id="98" name="Google Shape;98;p17"/>
-          <p:cNvSpPr txBox="1">
-            <a:spLocks noGrp="1"/>
-          </p:cNvSpPr>
-          <p:nvPr>
-            <p:ph type="title"/>
-          </p:nvPr>
-        </p:nvSpPr>
-        <p:spPr>
-          <a:xfrm>
-            <a:off x="2400250" y="575950"/>
-            <a:ext cx="6321600" cy="635400"/>
-          </a:xfrm>
-          <a:prstGeom prst="rect">
-            <a:avLst/>
-          </a:prstGeom>
-        </p:spPr>
-        <p:txBody>
-          <a:bodyPr spcFirstLastPara="1" wrap="square" lIns="91425" tIns="91425" rIns="91425" bIns="91425" anchor="t" anchorCtr="0">
-            <a:noAutofit/>
-          </a:bodyPr>
-          <a:lstStyle/>
-          <a:p>
-            <a:pPr marL="0" lvl="0" indent="0" algn="l" rtl="0">
-              <a:spcBef>
-                <a:spcPts val="0"/>
-              </a:spcBef>
-              <a:spcAft>
-                <a:spcPts val="0"/>
-              </a:spcAft>
-              <a:buNone/>
-            </a:pPr>
-            <a:r>
-              <a:rPr lang="en-US" dirty="0"/>
-              <a:t>Intro to Machine Learning</a:t>
-            </a:r>
-            <a:endParaRPr dirty="0"/>
-          </a:p>
-        </p:txBody>
-      </p:sp>
-      <p:pic>
-        <p:nvPicPr>
-          <p:cNvPr id="3" name="Graphic 2">
-            <a:extLst>
-              <a:ext uri="{FF2B5EF4-FFF2-40B4-BE49-F238E27FC236}">
-                <a16:creationId xmlns:a16="http://schemas.microsoft.com/office/drawing/2014/main" id="{78C8C304-C32B-473B-9148-F975AB8B26E7}"/>
-              </a:ext>
-            </a:extLst>
-          </p:cNvPr>
-          <p:cNvPicPr>
-            <a:picLocks noChangeAspect="1"/>
-          </p:cNvPicPr>
-          <p:nvPr/>
-        </p:nvPicPr>
-        <p:blipFill>
-          <a:blip r:embed="rId3">
-            <a:extLst>
-              <a:ext uri="{96DAC541-7B7A-43D3-8B79-37D633B846F1}">
-                <asvg:svgBlip xmlns:asvg="http://schemas.microsoft.com/office/drawing/2016/SVG/main" r:embed="rId4"/>
-              </a:ext>
-            </a:extLst>
-          </a:blip>
-          <a:stretch>
-            <a:fillRect/>
-          </a:stretch>
-        </p:blipFill>
-        <p:spPr>
-          <a:xfrm>
-            <a:off x="1539875" y="1867003"/>
-            <a:ext cx="1047750" cy="1133475"/>
-          </a:xfrm>
-          <a:prstGeom prst="rect">
-            <a:avLst/>
-          </a:prstGeom>
-        </p:spPr>
-      </p:pic>
-      <p:pic>
-        <p:nvPicPr>
-          <p:cNvPr id="5" name="Graphic 4">
-            <a:extLst>
-              <a:ext uri="{FF2B5EF4-FFF2-40B4-BE49-F238E27FC236}">
-                <a16:creationId xmlns:a16="http://schemas.microsoft.com/office/drawing/2014/main" id="{59B15D61-728B-4CD1-B6B9-F6FF91B69C7D}"/>
-              </a:ext>
-            </a:extLst>
-          </p:cNvPr>
-          <p:cNvPicPr>
-            <a:picLocks noChangeAspect="1"/>
-          </p:cNvPicPr>
-          <p:nvPr/>
-        </p:nvPicPr>
-        <p:blipFill>
-          <a:blip r:embed="rId5">
-            <a:extLst>
-              <a:ext uri="{96DAC541-7B7A-43D3-8B79-37D633B846F1}">
-                <asvg:svgBlip xmlns:asvg="http://schemas.microsoft.com/office/drawing/2016/SVG/main" r:embed="rId6"/>
-              </a:ext>
-            </a:extLst>
-          </a:blip>
-          <a:stretch>
-            <a:fillRect/>
-          </a:stretch>
-        </p:blipFill>
-        <p:spPr>
-          <a:xfrm>
-            <a:off x="4019550" y="1857478"/>
-            <a:ext cx="1104900" cy="1143000"/>
-          </a:xfrm>
-          <a:prstGeom prst="rect">
-            <a:avLst/>
-          </a:prstGeom>
-        </p:spPr>
-      </p:pic>
-      <p:pic>
-        <p:nvPicPr>
-          <p:cNvPr id="8" name="Graphic 7">
-            <a:extLst>
-              <a:ext uri="{FF2B5EF4-FFF2-40B4-BE49-F238E27FC236}">
-                <a16:creationId xmlns:a16="http://schemas.microsoft.com/office/drawing/2014/main" id="{FE6071CA-2A64-493D-991D-9F2BC26A2088}"/>
-              </a:ext>
-            </a:extLst>
-          </p:cNvPr>
-          <p:cNvPicPr>
-            <a:picLocks noChangeAspect="1"/>
-          </p:cNvPicPr>
-          <p:nvPr/>
-        </p:nvPicPr>
-        <p:blipFill>
-          <a:blip r:embed="rId7">
-            <a:extLst>
-              <a:ext uri="{96DAC541-7B7A-43D3-8B79-37D633B846F1}">
-                <asvg:svgBlip xmlns:asvg="http://schemas.microsoft.com/office/drawing/2016/SVG/main" r:embed="rId8"/>
-              </a:ext>
-            </a:extLst>
-          </a:blip>
-          <a:stretch>
-            <a:fillRect/>
-          </a:stretch>
-        </p:blipFill>
-        <p:spPr>
-          <a:xfrm>
-            <a:off x="6556375" y="1852716"/>
-            <a:ext cx="1143000" cy="1143000"/>
-          </a:xfrm>
-          <a:prstGeom prst="rect">
-            <a:avLst/>
-          </a:prstGeom>
-        </p:spPr>
-      </p:pic>
-      <p:sp>
-        <p:nvSpPr>
-          <p:cNvPr id="9" name="TextBox 8">
-            <a:extLst>
-              <a:ext uri="{FF2B5EF4-FFF2-40B4-BE49-F238E27FC236}">
-                <a16:creationId xmlns:a16="http://schemas.microsoft.com/office/drawing/2014/main" id="{91DF9330-039A-4F13-8D49-1DCD1A798668}"/>
-              </a:ext>
-            </a:extLst>
-          </p:cNvPr>
-          <p:cNvSpPr txBox="1"/>
-          <p:nvPr/>
-        </p:nvSpPr>
-        <p:spPr>
-          <a:xfrm>
-            <a:off x="1539875" y="3094141"/>
-            <a:ext cx="1047750" cy="261610"/>
-          </a:xfrm>
-          <a:prstGeom prst="rect">
-            <a:avLst/>
-          </a:prstGeom>
-          <a:noFill/>
-        </p:spPr>
-        <p:txBody>
-          <a:bodyPr wrap="square" rtlCol="0">
-            <a:spAutoFit/>
-          </a:bodyPr>
-          <a:lstStyle/>
-          <a:p>
-            <a:pPr algn="ctr"/>
-            <a:r>
-              <a:rPr lang="en-US" sz="1100" b="1" dirty="0"/>
-              <a:t>Prepare Data</a:t>
-            </a:r>
-          </a:p>
-        </p:txBody>
-      </p:sp>
-      <p:sp>
-        <p:nvSpPr>
-          <p:cNvPr id="11" name="TextBox 10">
-            <a:extLst>
-              <a:ext uri="{FF2B5EF4-FFF2-40B4-BE49-F238E27FC236}">
-                <a16:creationId xmlns:a16="http://schemas.microsoft.com/office/drawing/2014/main" id="{AE5883D3-CF3B-4C5A-B81B-9250E92B2F3D}"/>
-              </a:ext>
-            </a:extLst>
-          </p:cNvPr>
-          <p:cNvSpPr txBox="1"/>
-          <p:nvPr/>
-        </p:nvSpPr>
-        <p:spPr>
-          <a:xfrm>
-            <a:off x="4067175" y="3094141"/>
-            <a:ext cx="1104900" cy="261610"/>
-          </a:xfrm>
-          <a:prstGeom prst="rect">
-            <a:avLst/>
-          </a:prstGeom>
-          <a:noFill/>
-        </p:spPr>
-        <p:txBody>
-          <a:bodyPr wrap="square" rtlCol="0">
-            <a:spAutoFit/>
-          </a:bodyPr>
-          <a:lstStyle/>
-          <a:p>
-            <a:pPr algn="ctr"/>
-            <a:r>
-              <a:rPr lang="en-US" sz="1100" b="1" dirty="0"/>
-              <a:t>Build &amp; Train</a:t>
-            </a:r>
-          </a:p>
-        </p:txBody>
-      </p:sp>
-      <p:sp>
-        <p:nvSpPr>
-          <p:cNvPr id="12" name="TextBox 11">
-            <a:extLst>
-              <a:ext uri="{FF2B5EF4-FFF2-40B4-BE49-F238E27FC236}">
-                <a16:creationId xmlns:a16="http://schemas.microsoft.com/office/drawing/2014/main" id="{40662C72-0E90-44C7-9621-AD55CA9014E1}"/>
-              </a:ext>
-            </a:extLst>
-          </p:cNvPr>
-          <p:cNvSpPr txBox="1"/>
-          <p:nvPr/>
-        </p:nvSpPr>
-        <p:spPr>
-          <a:xfrm>
-            <a:off x="6575425" y="3063651"/>
-            <a:ext cx="1104900" cy="261610"/>
-          </a:xfrm>
-          <a:prstGeom prst="rect">
-            <a:avLst/>
-          </a:prstGeom>
-          <a:noFill/>
-        </p:spPr>
-        <p:txBody>
-          <a:bodyPr wrap="square" rtlCol="0">
-            <a:spAutoFit/>
-          </a:bodyPr>
-          <a:lstStyle/>
-          <a:p>
-            <a:pPr algn="ctr"/>
-            <a:r>
-              <a:rPr lang="en-US" sz="1100" b="1" dirty="0"/>
-              <a:t>Deploy</a:t>
-            </a:r>
-          </a:p>
-        </p:txBody>
-      </p:sp>
-      <p:sp>
-        <p:nvSpPr>
-          <p:cNvPr id="10" name="TextBox 9">
-            <a:extLst>
-              <a:ext uri="{FF2B5EF4-FFF2-40B4-BE49-F238E27FC236}">
-                <a16:creationId xmlns:a16="http://schemas.microsoft.com/office/drawing/2014/main" id="{D3A76173-9DBF-4A7A-8E89-A8C62D35FC07}"/>
-              </a:ext>
-            </a:extLst>
-          </p:cNvPr>
-          <p:cNvSpPr txBox="1"/>
-          <p:nvPr/>
-        </p:nvSpPr>
-        <p:spPr>
-          <a:xfrm>
-            <a:off x="1539875" y="3355751"/>
-            <a:ext cx="1047750" cy="507831"/>
-          </a:xfrm>
-          <a:prstGeom prst="rect">
-            <a:avLst/>
-          </a:prstGeom>
-          <a:noFill/>
-        </p:spPr>
-        <p:txBody>
-          <a:bodyPr wrap="square" rtlCol="0">
-            <a:spAutoFit/>
-          </a:bodyPr>
-          <a:lstStyle/>
-          <a:p>
-            <a:pPr algn="ctr"/>
-            <a:r>
-              <a:rPr lang="en-US" sz="900" dirty="0"/>
-              <a:t>Connect to various sources to ingest data</a:t>
-            </a:r>
-          </a:p>
-        </p:txBody>
-      </p:sp>
-      <p:sp>
-        <p:nvSpPr>
-          <p:cNvPr id="14" name="TextBox 13">
-            <a:extLst>
-              <a:ext uri="{FF2B5EF4-FFF2-40B4-BE49-F238E27FC236}">
-                <a16:creationId xmlns:a16="http://schemas.microsoft.com/office/drawing/2014/main" id="{C05B552E-81DC-4FEC-A143-5C0747DC664E}"/>
-              </a:ext>
-            </a:extLst>
-          </p:cNvPr>
-          <p:cNvSpPr txBox="1"/>
-          <p:nvPr/>
-        </p:nvSpPr>
-        <p:spPr>
-          <a:xfrm>
-            <a:off x="4095750" y="3355751"/>
-            <a:ext cx="1047750" cy="507831"/>
-          </a:xfrm>
-          <a:prstGeom prst="rect">
-            <a:avLst/>
-          </a:prstGeom>
-          <a:noFill/>
-        </p:spPr>
-        <p:txBody>
-          <a:bodyPr wrap="square" rtlCol="0">
-            <a:spAutoFit/>
-          </a:bodyPr>
-          <a:lstStyle/>
-          <a:p>
-            <a:pPr algn="ctr"/>
-            <a:r>
-              <a:rPr lang="en-US" sz="900" dirty="0"/>
-              <a:t>Train with the data to establish a model</a:t>
-            </a:r>
-          </a:p>
-        </p:txBody>
-      </p:sp>
-      <p:sp>
-        <p:nvSpPr>
-          <p:cNvPr id="15" name="TextBox 14">
-            <a:extLst>
-              <a:ext uri="{FF2B5EF4-FFF2-40B4-BE49-F238E27FC236}">
-                <a16:creationId xmlns:a16="http://schemas.microsoft.com/office/drawing/2014/main" id="{80729A86-9638-44D5-8C10-6F278DF707AD}"/>
-              </a:ext>
-            </a:extLst>
-          </p:cNvPr>
-          <p:cNvSpPr txBox="1"/>
-          <p:nvPr/>
-        </p:nvSpPr>
-        <p:spPr>
-          <a:xfrm>
-            <a:off x="6604000" y="3355751"/>
-            <a:ext cx="1047750" cy="507831"/>
-          </a:xfrm>
-          <a:prstGeom prst="rect">
-            <a:avLst/>
-          </a:prstGeom>
-          <a:noFill/>
-        </p:spPr>
-        <p:txBody>
-          <a:bodyPr wrap="square" rtlCol="0">
-            <a:spAutoFit/>
-          </a:bodyPr>
-          <a:lstStyle/>
-          <a:p>
-            <a:pPr algn="ctr"/>
-            <a:r>
-              <a:rPr lang="en-US" sz="900" dirty="0"/>
-              <a:t>Deploy the model and track performance</a:t>
-            </a:r>
-          </a:p>
-        </p:txBody>
-      </p:sp>
-      <p:pic>
-        <p:nvPicPr>
-          <p:cNvPr id="16" name="Graphic 15" descr="Play">
-            <a:extLst>
-              <a:ext uri="{FF2B5EF4-FFF2-40B4-BE49-F238E27FC236}">
-                <a16:creationId xmlns:a16="http://schemas.microsoft.com/office/drawing/2014/main" id="{49536FD1-4803-4922-96C8-044C3502FE51}"/>
-              </a:ext>
-            </a:extLst>
-          </p:cNvPr>
-          <p:cNvPicPr>
-            <a:picLocks noChangeAspect="1"/>
-          </p:cNvPicPr>
-          <p:nvPr/>
-        </p:nvPicPr>
-        <p:blipFill>
-          <a:blip r:embed="rId9">
-            <a:extLst>
-              <a:ext uri="{96DAC541-7B7A-43D3-8B79-37D633B846F1}">
-                <asvg:svgBlip xmlns:asvg="http://schemas.microsoft.com/office/drawing/2016/SVG/main" r:embed="rId10"/>
-              </a:ext>
-            </a:extLst>
-          </a:blip>
-          <a:stretch>
-            <a:fillRect/>
-          </a:stretch>
-        </p:blipFill>
-        <p:spPr>
-          <a:xfrm>
-            <a:off x="2971308" y="2091937"/>
-            <a:ext cx="664558" cy="664558"/>
-          </a:xfrm>
-          <a:prstGeom prst="rect">
-            <a:avLst/>
-          </a:prstGeom>
-        </p:spPr>
-      </p:pic>
-      <p:pic>
-        <p:nvPicPr>
-          <p:cNvPr id="18" name="Graphic 17" descr="Play">
-            <a:extLst>
-              <a:ext uri="{FF2B5EF4-FFF2-40B4-BE49-F238E27FC236}">
-                <a16:creationId xmlns:a16="http://schemas.microsoft.com/office/drawing/2014/main" id="{D4A64896-F3E4-4705-A9C5-AD8C4F02BCF3}"/>
-              </a:ext>
-            </a:extLst>
-          </p:cNvPr>
-          <p:cNvPicPr>
-            <a:picLocks noChangeAspect="1"/>
-          </p:cNvPicPr>
-          <p:nvPr/>
-        </p:nvPicPr>
-        <p:blipFill>
-          <a:blip r:embed="rId9">
-            <a:extLst>
-              <a:ext uri="{96DAC541-7B7A-43D3-8B79-37D633B846F1}">
-                <asvg:svgBlip xmlns:asvg="http://schemas.microsoft.com/office/drawing/2016/SVG/main" r:embed="rId10"/>
-              </a:ext>
-            </a:extLst>
-          </a:blip>
-          <a:stretch>
-            <a:fillRect/>
-          </a:stretch>
-        </p:blipFill>
-        <p:spPr>
-          <a:xfrm>
-            <a:off x="5508133" y="2091937"/>
-            <a:ext cx="664558" cy="664558"/>
-          </a:xfrm>
-          <a:prstGeom prst="rect">
-            <a:avLst/>
-          </a:prstGeom>
-        </p:spPr>
-      </p:pic>
-    </p:spTree>
-  </p:cSld>
-  <p:clrMapOvr>
-    <a:masterClrMapping/>
-  </p:clrMapOvr>
-</p:sld>
-</file>
-
-<file path=ppt/slides/slide30.xml><?xml version="1.0" encoding="utf-8"?>
-<p:sld xmlns:a="http://schemas.openxmlformats.org/drawingml/2006/main" xmlns:r="http://schemas.openxmlformats.org/officeDocument/2006/relationships" xmlns:p="http://schemas.openxmlformats.org/presentationml/2006/main">
-  <p:cSld>
-    <p:spTree>
-      <p:nvGrpSpPr>
-        <p:cNvPr id="1" name=""/>
-        <p:cNvGrpSpPr/>
-        <p:nvPr/>
-      </p:nvGrpSpPr>
-      <p:grpSpPr>
-        <a:xfrm>
-          <a:off x="0" y="0"/>
-          <a:ext cx="0" cy="0"/>
-          <a:chOff x="0" y="0"/>
-          <a:chExt cx="0" cy="0"/>
-        </a:xfrm>
-      </p:grpSpPr>
-      <p:sp>
-        <p:nvSpPr>
-          <p:cNvPr id="2" name="Title 1">
-            <a:extLst>
-              <a:ext uri="{FF2B5EF4-FFF2-40B4-BE49-F238E27FC236}">
-                <a16:creationId xmlns:a16="http://schemas.microsoft.com/office/drawing/2014/main" id="{B01CFD37-EDF7-42F2-9518-A10251253ABA}"/>
-              </a:ext>
-            </a:extLst>
-          </p:cNvPr>
-          <p:cNvSpPr>
-            <a:spLocks noGrp="1"/>
-          </p:cNvSpPr>
-          <p:nvPr>
-            <p:ph type="title"/>
-          </p:nvPr>
-        </p:nvSpPr>
-        <p:spPr/>
-        <p:txBody>
-          <a:bodyPr/>
-          <a:lstStyle/>
-          <a:p>
-            <a:r>
-              <a:rPr lang="en-US" dirty="0"/>
-              <a:t>Picking the Best Model</a:t>
-            </a:r>
-          </a:p>
-        </p:txBody>
-      </p:sp>
-      <p:sp>
-        <p:nvSpPr>
-          <p:cNvPr id="3" name="Text Placeholder 2">
-            <a:extLst>
-              <a:ext uri="{FF2B5EF4-FFF2-40B4-BE49-F238E27FC236}">
-                <a16:creationId xmlns:a16="http://schemas.microsoft.com/office/drawing/2014/main" id="{7B559461-43BB-4521-B584-E6B31A283F52}"/>
-              </a:ext>
-            </a:extLst>
-          </p:cNvPr>
-          <p:cNvSpPr>
-            <a:spLocks noGrp="1"/>
-          </p:cNvSpPr>
-          <p:nvPr>
-            <p:ph type="body" idx="1"/>
-          </p:nvPr>
-        </p:nvSpPr>
-        <p:spPr>
-          <a:xfrm>
-            <a:off x="422028" y="1565150"/>
-            <a:ext cx="3071400" cy="3002400"/>
-          </a:xfrm>
-        </p:spPr>
-        <p:txBody>
-          <a:bodyPr>
-            <a:normAutofit fontScale="92500" lnSpcReduction="20000"/>
-          </a:bodyPr>
-          <a:lstStyle/>
-          <a:p>
-            <a:r>
-              <a:rPr lang="en-US" dirty="0"/>
-              <a:t>Picks a best model(s) based on a Primary Metric</a:t>
-            </a:r>
-          </a:p>
-          <a:p>
-            <a:pPr lvl="1">
-              <a:spcBef>
-                <a:spcPts val="600"/>
-              </a:spcBef>
-            </a:pPr>
-            <a:r>
-              <a:rPr lang="en-US" dirty="0"/>
-              <a:t>In Classification Problems:</a:t>
-            </a:r>
-          </a:p>
-          <a:p>
-            <a:pPr lvl="2">
-              <a:spcBef>
-                <a:spcPts val="600"/>
-              </a:spcBef>
-            </a:pPr>
-            <a:r>
-              <a:rPr lang="en-US" dirty="0"/>
-              <a:t>Accuracy, Weighted AUC, Average Weighted Precision Score, Normalized Macro Recall, Weighted Precision Score</a:t>
-            </a:r>
-          </a:p>
-          <a:p>
-            <a:pPr lvl="1">
-              <a:spcBef>
-                <a:spcPts val="600"/>
-              </a:spcBef>
-            </a:pPr>
-            <a:r>
-              <a:rPr lang="en-US" dirty="0"/>
-              <a:t>In Regression/Forecasting Problems:</a:t>
-            </a:r>
-          </a:p>
-          <a:p>
-            <a:pPr lvl="2">
-              <a:spcBef>
-                <a:spcPts val="600"/>
-              </a:spcBef>
-            </a:pPr>
-            <a:r>
-              <a:rPr lang="en-US" dirty="0"/>
-              <a:t>Spearman Correlation, Normalized RMSE, R</a:t>
-            </a:r>
-            <a:r>
-              <a:rPr lang="en-US" baseline="30000" dirty="0"/>
-              <a:t>2</a:t>
-            </a:r>
-            <a:r>
-              <a:rPr lang="en-US" dirty="0"/>
-              <a:t>, Normalized MAE</a:t>
-            </a:r>
-          </a:p>
-          <a:p>
-            <a:endParaRPr lang="en-US" dirty="0"/>
-          </a:p>
-        </p:txBody>
-      </p:sp>
-      <p:sp>
-        <p:nvSpPr>
-          <p:cNvPr id="4" name="Rectangle 3">
-            <a:extLst>
-              <a:ext uri="{FF2B5EF4-FFF2-40B4-BE49-F238E27FC236}">
-                <a16:creationId xmlns:a16="http://schemas.microsoft.com/office/drawing/2014/main" id="{E874D10C-6D65-4617-8879-A22C02FF83D3}"/>
-              </a:ext>
-            </a:extLst>
-          </p:cNvPr>
-          <p:cNvSpPr/>
-          <p:nvPr/>
-        </p:nvSpPr>
-        <p:spPr>
-          <a:xfrm>
-            <a:off x="319500" y="4807508"/>
-            <a:ext cx="4662054" cy="215444"/>
-          </a:xfrm>
-          <a:prstGeom prst="rect">
-            <a:avLst/>
-          </a:prstGeom>
-        </p:spPr>
-        <p:txBody>
-          <a:bodyPr wrap="square">
-            <a:spAutoFit/>
-          </a:bodyPr>
-          <a:lstStyle/>
-          <a:p>
-            <a:r>
-              <a:rPr lang="en-US" sz="800" dirty="0">
-                <a:hlinkClick r:id="rId2"/>
-              </a:rPr>
-              <a:t>https://docs.microsoft.com/en-us/azure/machine-learning/service/how-to-understand-automated-ml</a:t>
-            </a:r>
-            <a:endParaRPr lang="en-US" sz="800" dirty="0"/>
-          </a:p>
-        </p:txBody>
-      </p:sp>
-      <p:pic>
-        <p:nvPicPr>
-          <p:cNvPr id="7" name="Picture 6">
-            <a:extLst>
-              <a:ext uri="{FF2B5EF4-FFF2-40B4-BE49-F238E27FC236}">
-                <a16:creationId xmlns:a16="http://schemas.microsoft.com/office/drawing/2014/main" id="{BE0C4B95-9A79-44B8-9528-F9DF165F32E8}"/>
-              </a:ext>
-            </a:extLst>
-          </p:cNvPr>
-          <p:cNvPicPr>
-            <a:picLocks noChangeAspect="1"/>
-          </p:cNvPicPr>
-          <p:nvPr/>
-        </p:nvPicPr>
-        <p:blipFill>
-          <a:blip r:embed="rId3"/>
-          <a:stretch>
-            <a:fillRect/>
-          </a:stretch>
-        </p:blipFill>
-        <p:spPr>
-          <a:xfrm>
-            <a:off x="3851564" y="1451308"/>
-            <a:ext cx="4613562" cy="2825324"/>
-          </a:xfrm>
-          <a:prstGeom prst="rect">
-            <a:avLst/>
-          </a:prstGeom>
-        </p:spPr>
-      </p:pic>
-    </p:spTree>
-    <p:extLst>
-      <p:ext uri="{BB962C8B-B14F-4D97-AF65-F5344CB8AC3E}">
-        <p14:creationId xmlns:p14="http://schemas.microsoft.com/office/powerpoint/2010/main" val="1759626261"/>
       </p:ext>
     </p:extLst>
   </p:cSld>

</xml_diff>

<commit_message>
Fix typos in ML presentation
</commit_message>
<xml_diff>
--- a/3 - Machine Learning/MachineLearning.pptx
+++ b/3 - Machine Learning/MachineLearning.pptx
@@ -54,14 +54,14 @@
       <p:boldItalic r:id="rId37"/>
     </p:embeddedFont>
     <p:embeddedFont>
-      <p:font typeface="Lato" panose="020F0502020204030203" pitchFamily="34" charset="0"/>
+      <p:font typeface="Lato" panose="020B0604020202020204" charset="0"/>
       <p:regular r:id="rId38"/>
       <p:bold r:id="rId39"/>
       <p:italic r:id="rId40"/>
       <p:boldItalic r:id="rId41"/>
     </p:embeddedFont>
     <p:embeddedFont>
-      <p:font typeface="Raleway" panose="020B0503030101060003" pitchFamily="34" charset="77"/>
+      <p:font typeface="Raleway" panose="020B0604020202020204" charset="0"/>
       <p:regular r:id="rId42"/>
       <p:bold r:id="rId43"/>
       <p:italic r:id="rId44"/>
@@ -6617,7 +6617,7 @@
           <a:p>
             <a:fld id="{123CBCE9-0914-4950-A986-7596C92667F1}" type="datetime1">
               <a:rPr lang="en-US" smtClean="0"/>
-              <a:t>9/18/19</a:t>
+              <a:t>9/19/2019</a:t>
             </a:fld>
             <a:endParaRPr lang="en-US"/>
           </a:p>
@@ -8279,7 +8279,7 @@
 </file>
 
 <file path=ppt/slides/slide10.xml><?xml version="1.0" encoding="utf-8"?>
-<p:sld xmlns:a="http://schemas.openxmlformats.org/drawingml/2006/main" xmlns:r="http://schemas.openxmlformats.org/officeDocument/2006/relationships" xmlns:p="http://schemas.openxmlformats.org/presentationml/2006/main" show="0">
+<p:sld xmlns:a="http://schemas.openxmlformats.org/drawingml/2006/main" xmlns:r="http://schemas.openxmlformats.org/officeDocument/2006/relationships" xmlns:p="http://schemas.openxmlformats.org/presentationml/2006/main">
   <p:cSld>
     <p:spTree>
       <p:nvGrpSpPr>
@@ -10103,8 +10103,8 @@
           </a:p>
         </p:txBody>
       </p:sp>
-      <mc:AlternateContent xmlns:mc="http://schemas.openxmlformats.org/markup-compatibility/2006" xmlns:a14="http://schemas.microsoft.com/office/drawing/2010/main">
-        <mc:Choice Requires="a14">
+      <mc:AlternateContent xmlns:mc="http://schemas.openxmlformats.org/markup-compatibility/2006">
+        <mc:Choice xmlns:a14="http://schemas.microsoft.com/office/drawing/2010/main" Requires="a14">
           <p:sp>
             <p:nvSpPr>
               <p:cNvPr id="3" name="Text Placeholder 2">
@@ -10972,48 +10972,67 @@
                         </a:rPr>
                         <m:t>=</m:t>
                       </m:r>
-                      <m:d>
-                        <m:dPr>
+                      <m:sSup>
+                        <m:sSupPr>
                           <m:ctrlPr>
                             <a:rPr lang="en-US" b="0" i="1" smtClean="0">
                               <a:latin typeface="Cambria Math" panose="02040503050406030204" pitchFamily="18" charset="0"/>
                             </a:rPr>
                           </m:ctrlPr>
-                        </m:dPr>
+                        </m:sSupPr>
                         <m:e>
-                          <m:sSup>
-                            <m:sSupPr>
+                          <m:d>
+                            <m:dPr>
                               <m:ctrlPr>
-                                <a:rPr lang="en-US" b="0" i="1" smtClean="0">
+                                <a:rPr lang="en-US" i="1">
                                   <a:latin typeface="Cambria Math" panose="02040503050406030204" pitchFamily="18" charset="0"/>
                                 </a:rPr>
                               </m:ctrlPr>
-                            </m:sSupPr>
+                            </m:dPr>
                             <m:e>
+                              <m:sSup>
+                                <m:sSupPr>
+                                  <m:ctrlPr>
+                                    <a:rPr lang="en-US" i="1">
+                                      <a:latin typeface="Cambria Math" panose="02040503050406030204" pitchFamily="18" charset="0"/>
+                                    </a:rPr>
+                                  </m:ctrlPr>
+                                </m:sSupPr>
+                                <m:e>
+                                  <m:r>
+                                    <a:rPr lang="en-US" i="1">
+                                      <a:latin typeface="Cambria Math" panose="02040503050406030204" pitchFamily="18" charset="0"/>
+                                    </a:rPr>
+                                    <m:t>𝑋</m:t>
+                                  </m:r>
+                                </m:e>
+                                <m:sup>
+                                  <m:r>
+                                    <a:rPr lang="en-US" i="1">
+                                      <a:latin typeface="Cambria Math" panose="02040503050406030204" pitchFamily="18" charset="0"/>
+                                    </a:rPr>
+                                    <m:t>𝑇</m:t>
+                                  </m:r>
+                                </m:sup>
+                              </m:sSup>
                               <m:r>
-                                <a:rPr lang="en-US" b="0" i="1" smtClean="0">
+                                <a:rPr lang="en-US" i="1">
                                   <a:latin typeface="Cambria Math" panose="02040503050406030204" pitchFamily="18" charset="0"/>
                                 </a:rPr>
                                 <m:t>𝑋</m:t>
                               </m:r>
                             </m:e>
-                            <m:sup>
-                              <m:r>
-                                <a:rPr lang="en-US" b="0" i="1" smtClean="0">
-                                  <a:latin typeface="Cambria Math" panose="02040503050406030204" pitchFamily="18" charset="0"/>
-                                </a:rPr>
-                                <m:t>𝑇</m:t>
-                              </m:r>
-                            </m:sup>
-                          </m:sSup>
+                          </m:d>
+                        </m:e>
+                        <m:sup>
                           <m:r>
                             <a:rPr lang="en-US" b="0" i="1" smtClean="0">
                               <a:latin typeface="Cambria Math" panose="02040503050406030204" pitchFamily="18" charset="0"/>
                             </a:rPr>
-                            <m:t>𝑋</m:t>
+                            <m:t>𝑇</m:t>
                           </m:r>
-                        </m:e>
-                      </m:d>
+                        </m:sup>
+                      </m:sSup>
                       <m:sSup>
                         <m:sSupPr>
                           <m:ctrlPr>
@@ -11053,7 +11072,7 @@
             </p:txBody>
           </p:sp>
         </mc:Choice>
-        <mc:Fallback xmlns="">
+        <mc:Fallback>
           <p:sp>
             <p:nvSpPr>
               <p:cNvPr id="3" name="Text Placeholder 2">
@@ -12993,7 +13012,7 @@
           <a:graphicData uri="http://schemas.openxmlformats.org/presentationml/2006/ole">
             <mc:AlternateContent xmlns:mc="http://schemas.openxmlformats.org/markup-compatibility/2006">
               <mc:Choice xmlns:v="urn:schemas-microsoft-com:vml" Requires="v">
-                <p:oleObj spid="_x0000_s1082" name="Equation" r:id="rId3" imgW="1333440" imgH="457200" progId="Equation.3">
+                <p:oleObj spid="_x0000_s1090" name="Equation" r:id="rId3" imgW="1333440" imgH="457200" progId="Equation.3">
                   <p:embed/>
                 </p:oleObj>
               </mc:Choice>
@@ -13389,7 +13408,7 @@
           <a:graphicData uri="http://schemas.openxmlformats.org/presentationml/2006/ole">
             <mc:AlternateContent xmlns:mc="http://schemas.openxmlformats.org/markup-compatibility/2006">
               <mc:Choice xmlns:v="urn:schemas-microsoft-com:vml" Requires="v">
-                <p:oleObj spid="_x0000_s1083" name="Equation" r:id="rId5" imgW="1180800" imgH="431640" progId="Equation.3">
+                <p:oleObj spid="_x0000_s1091" name="Equation" r:id="rId5" imgW="1180800" imgH="431640" progId="Equation.3">
                   <p:embed/>
                 </p:oleObj>
               </mc:Choice>
@@ -13771,7 +13790,7 @@
           <a:graphicData uri="http://schemas.openxmlformats.org/presentationml/2006/ole">
             <mc:AlternateContent xmlns:mc="http://schemas.openxmlformats.org/markup-compatibility/2006">
               <mc:Choice xmlns:v="urn:schemas-microsoft-com:vml" Requires="v">
-                <p:oleObj spid="_x0000_s2106" name="Equation" r:id="rId3" imgW="1498320" imgH="482400" progId="Equation.3">
+                <p:oleObj spid="_x0000_s2114" name="Equation" r:id="rId3" imgW="1498320" imgH="482400" progId="Equation.3">
                   <p:embed/>
                 </p:oleObj>
               </mc:Choice>
@@ -13843,7 +13862,7 @@
           <a:graphicData uri="http://schemas.openxmlformats.org/presentationml/2006/ole">
             <mc:AlternateContent xmlns:mc="http://schemas.openxmlformats.org/markup-compatibility/2006">
               <mc:Choice xmlns:v="urn:schemas-microsoft-com:vml" Requires="v">
-                <p:oleObj spid="_x0000_s2107" name="Equation" r:id="rId5" imgW="1663560" imgH="444240" progId="Equation.3">
+                <p:oleObj spid="_x0000_s2115" name="Equation" r:id="rId5" imgW="1663560" imgH="444240" progId="Equation.3">
                   <p:embed/>
                 </p:oleObj>
               </mc:Choice>
@@ -15379,8 +15398,8 @@
           </a:p>
         </p:txBody>
       </p:sp>
-      <mc:AlternateContent xmlns:mc="http://schemas.openxmlformats.org/markup-compatibility/2006" xmlns:a14="http://schemas.microsoft.com/office/drawing/2010/main">
-        <mc:Choice Requires="a14">
+      <mc:AlternateContent xmlns:mc="http://schemas.openxmlformats.org/markup-compatibility/2006">
+        <mc:Choice xmlns:a14="http://schemas.microsoft.com/office/drawing/2010/main" Requires="a14">
           <p:graphicFrame>
             <p:nvGraphicFramePr>
               <p:cNvPr id="5" name="Table 4">
@@ -15396,7 +15415,7 @@
               <p:nvPr>
                 <p:extLst>
                   <p:ext uri="{D42A27DB-BD31-4B8C-83A1-F6EECF244321}">
-                    <p14:modId xmlns:p14="http://schemas.microsoft.com/office/powerpoint/2010/main" val="3440784375"/>
+                    <p14:modId xmlns:p14="http://schemas.microsoft.com/office/powerpoint/2010/main" val="4283424805"/>
                   </p:ext>
                 </p:extLst>
               </p:nvPr>
@@ -15827,7 +15846,7 @@
                                   <a:rPr lang="en-US" b="0" i="1" smtClean="0">
                                     <a:latin typeface="Cambria Math" panose="02040503050406030204" pitchFamily="18" charset="0"/>
                                   </a:rPr>
-                                  <m:t>𝑝𝑎</m:t>
+                                  <m:t>𝑝</m:t>
                                 </m:r>
                                 <m:r>
                                   <a:rPr lang="en-US" b="0" i="1" smtClean="0">
@@ -16399,7 +16418,7 @@
             </a:graphic>
           </p:graphicFrame>
         </mc:Choice>
-        <mc:Fallback xmlns="">
+        <mc:Fallback>
           <p:graphicFrame>
             <p:nvGraphicFramePr>
               <p:cNvPr id="5" name="Table 4">
@@ -16415,7 +16434,7 @@
               <p:nvPr>
                 <p:extLst>
                   <p:ext uri="{D42A27DB-BD31-4B8C-83A1-F6EECF244321}">
-                    <p14:modId xmlns:p14="http://schemas.microsoft.com/office/powerpoint/2010/main" val="3440784375"/>
+                    <p14:modId xmlns:p14="http://schemas.microsoft.com/office/powerpoint/2010/main" val="4283424805"/>
                   </p:ext>
                 </p:extLst>
               </p:nvPr>

</xml_diff>

<commit_message>
Add Azure ML training examples
</commit_message>
<xml_diff>
--- a/3 - Machine Learning/MachineLearning.pptx
+++ b/3 - Machine Learning/MachineLearning.pptx
@@ -5,7 +5,7 @@
     <p:sldMasterId id="2147483659" r:id="rId1"/>
   </p:sldMasterIdLst>
   <p:notesMasterIdLst>
-    <p:notesMasterId r:id="rId37"/>
+    <p:notesMasterId r:id="rId38"/>
   </p:notesMasterIdLst>
   <p:sldIdLst>
     <p:sldId id="256" r:id="rId2"/>
@@ -21,70 +21,71 @@
     <p:sldId id="280" r:id="rId12"/>
     <p:sldId id="462" r:id="rId13"/>
     <p:sldId id="463" r:id="rId14"/>
-    <p:sldId id="281" r:id="rId15"/>
-    <p:sldId id="286" r:id="rId16"/>
-    <p:sldId id="289" r:id="rId17"/>
-    <p:sldId id="287" r:id="rId18"/>
-    <p:sldId id="446" r:id="rId19"/>
-    <p:sldId id="447" r:id="rId20"/>
-    <p:sldId id="448" r:id="rId21"/>
-    <p:sldId id="453" r:id="rId22"/>
-    <p:sldId id="455" r:id="rId23"/>
-    <p:sldId id="454" r:id="rId24"/>
-    <p:sldId id="288" r:id="rId25"/>
-    <p:sldId id="290" r:id="rId26"/>
-    <p:sldId id="456" r:id="rId27"/>
-    <p:sldId id="457" r:id="rId28"/>
-    <p:sldId id="460" r:id="rId29"/>
-    <p:sldId id="458" r:id="rId30"/>
-    <p:sldId id="461" r:id="rId31"/>
-    <p:sldId id="459" r:id="rId32"/>
-    <p:sldId id="467" r:id="rId33"/>
-    <p:sldId id="464" r:id="rId34"/>
-    <p:sldId id="466" r:id="rId35"/>
-    <p:sldId id="465" r:id="rId36"/>
+    <p:sldId id="470" r:id="rId15"/>
+    <p:sldId id="281" r:id="rId16"/>
+    <p:sldId id="286" r:id="rId17"/>
+    <p:sldId id="289" r:id="rId18"/>
+    <p:sldId id="287" r:id="rId19"/>
+    <p:sldId id="446" r:id="rId20"/>
+    <p:sldId id="447" r:id="rId21"/>
+    <p:sldId id="448" r:id="rId22"/>
+    <p:sldId id="453" r:id="rId23"/>
+    <p:sldId id="455" r:id="rId24"/>
+    <p:sldId id="454" r:id="rId25"/>
+    <p:sldId id="288" r:id="rId26"/>
+    <p:sldId id="290" r:id="rId27"/>
+    <p:sldId id="456" r:id="rId28"/>
+    <p:sldId id="457" r:id="rId29"/>
+    <p:sldId id="460" r:id="rId30"/>
+    <p:sldId id="458" r:id="rId31"/>
+    <p:sldId id="461" r:id="rId32"/>
+    <p:sldId id="459" r:id="rId33"/>
+    <p:sldId id="467" r:id="rId34"/>
+    <p:sldId id="464" r:id="rId35"/>
+    <p:sldId id="466" r:id="rId36"/>
+    <p:sldId id="465" r:id="rId37"/>
   </p:sldIdLst>
   <p:sldSz cx="9144000" cy="5143500" type="screen16x9"/>
   <p:notesSz cx="6858000" cy="9144000"/>
   <p:embeddedFontLst>
     <p:embeddedFont>
       <p:font typeface="Cambria" panose="02040503050406030204" pitchFamily="18" charset="0"/>
-      <p:regular r:id="rId38"/>
-      <p:bold r:id="rId39"/>
-      <p:italic r:id="rId40"/>
-      <p:boldItalic r:id="rId41"/>
+      <p:regular r:id="rId39"/>
+      <p:bold r:id="rId40"/>
+      <p:italic r:id="rId41"/>
+      <p:boldItalic r:id="rId42"/>
     </p:embeddedFont>
     <p:embeddedFont>
       <p:font typeface="Cambria Math" panose="02040503050406030204" pitchFamily="18" charset="0"/>
-      <p:regular r:id="rId42"/>
+      <p:regular r:id="rId43"/>
     </p:embeddedFont>
     <p:embeddedFont>
       <p:font typeface="Consolas" panose="020B0609020204030204" pitchFamily="49" charset="0"/>
-      <p:regular r:id="rId43"/>
-      <p:bold r:id="rId44"/>
-      <p:italic r:id="rId45"/>
-      <p:boldItalic r:id="rId46"/>
+      <p:regular r:id="rId44"/>
+      <p:bold r:id="rId45"/>
+      <p:italic r:id="rId46"/>
+      <p:boldItalic r:id="rId47"/>
     </p:embeddedFont>
     <p:embeddedFont>
       <p:font typeface="Lato" panose="020F0502020204030203" pitchFamily="34" charset="0"/>
-      <p:regular r:id="rId47"/>
-      <p:bold r:id="rId48"/>
-      <p:italic r:id="rId49"/>
-      <p:boldItalic r:id="rId50"/>
+      <p:regular r:id="rId48"/>
+      <p:bold r:id="rId49"/>
+      <p:italic r:id="rId50"/>
+      <p:boldItalic r:id="rId51"/>
     </p:embeddedFont>
     <p:embeddedFont>
       <p:font typeface="Raleway" panose="020B0503030101060003" pitchFamily="34" charset="0"/>
-      <p:regular r:id="rId51"/>
-      <p:bold r:id="rId52"/>
-      <p:italic r:id="rId53"/>
-      <p:boldItalic r:id="rId54"/>
+      <p:regular r:id="rId52"/>
+      <p:bold r:id="rId53"/>
+      <p:italic r:id="rId54"/>
+      <p:boldItalic r:id="rId55"/>
     </p:embeddedFont>
     <p:embeddedFont>
       <p:font typeface="Segoe UI" panose="020B0502040204020203" pitchFamily="34" charset="0"/>
-      <p:regular r:id="rId55"/>
-      <p:bold r:id="rId56"/>
-      <p:italic r:id="rId57"/>
-      <p:boldItalic r:id="rId58"/>
+      <p:regular r:id="rId56"/>
+      <p:bold r:id="rId57"/>
+      <p:italic r:id="rId58"/>
+      <p:boldItalic r:id="rId59"/>
     </p:embeddedFont>
   </p:embeddedFontLst>
   <p:defaultTextStyle>
@@ -15355,7 +15356,7 @@
           <a:p>
             <a:fld id="{123CBCE9-0914-4950-A986-7596C92667F1}" type="datetime1">
               <a:rPr lang="en-US" smtClean="0"/>
-              <a:t>2/9/2022</a:t>
+              <a:t>2/15/2022</a:t>
             </a:fld>
             <a:endParaRPr lang="en-US"/>
           </a:p>
@@ -18847,6 +18848,834 @@
           <p:cNvPr id="2" name="Title 1">
             <a:extLst>
               <a:ext uri="{FF2B5EF4-FFF2-40B4-BE49-F238E27FC236}">
+                <a16:creationId xmlns:a16="http://schemas.microsoft.com/office/drawing/2014/main" id="{26D25A46-9DA8-416A-9F05-8D4307462F08}"/>
+              </a:ext>
+            </a:extLst>
+          </p:cNvPr>
+          <p:cNvSpPr>
+            <a:spLocks noGrp="1"/>
+          </p:cNvSpPr>
+          <p:nvPr>
+            <p:ph type="title"/>
+          </p:nvPr>
+        </p:nvSpPr>
+        <p:spPr/>
+        <p:txBody>
+          <a:bodyPr/>
+          <a:lstStyle/>
+          <a:p>
+            <a:r>
+              <a:rPr lang="en-US" dirty="0"/>
+              <a:t>Tracking ML Experiments: Two Ways</a:t>
+            </a:r>
+          </a:p>
+        </p:txBody>
+      </p:sp>
+      <p:sp>
+        <p:nvSpPr>
+          <p:cNvPr id="8" name="Rectangle 7">
+            <a:extLst>
+              <a:ext uri="{FF2B5EF4-FFF2-40B4-BE49-F238E27FC236}">
+                <a16:creationId xmlns:a16="http://schemas.microsoft.com/office/drawing/2014/main" id="{D3E1171C-3862-4140-B248-A27893710230}"/>
+              </a:ext>
+            </a:extLst>
+          </p:cNvPr>
+          <p:cNvSpPr/>
+          <p:nvPr/>
+        </p:nvSpPr>
+        <p:spPr>
+          <a:xfrm>
+            <a:off x="117348" y="975425"/>
+            <a:ext cx="4454652" cy="441928"/>
+          </a:xfrm>
+          <a:prstGeom prst="rect">
+            <a:avLst/>
+          </a:prstGeom>
+        </p:spPr>
+        <p:style>
+          <a:lnRef idx="2">
+            <a:schemeClr val="dk1">
+              <a:shade val="50000"/>
+            </a:schemeClr>
+          </a:lnRef>
+          <a:fillRef idx="1">
+            <a:schemeClr val="dk1"/>
+          </a:fillRef>
+          <a:effectRef idx="0">
+            <a:schemeClr val="dk1"/>
+          </a:effectRef>
+          <a:fontRef idx="minor">
+            <a:schemeClr val="lt1"/>
+          </a:fontRef>
+        </p:style>
+        <p:txBody>
+          <a:bodyPr rtlCol="0" anchor="ctr"/>
+          <a:lstStyle/>
+          <a:p>
+            <a:pPr algn="ctr"/>
+            <a:r>
+              <a:rPr lang="en-US" dirty="0"/>
+              <a:t>Train Inside the Compute Instance,</a:t>
+            </a:r>
+          </a:p>
+          <a:p>
+            <a:pPr algn="ctr"/>
+            <a:r>
+              <a:rPr lang="en-US" dirty="0"/>
+              <a:t>Track Externally in Azure ML</a:t>
+            </a:r>
+          </a:p>
+        </p:txBody>
+      </p:sp>
+      <p:sp>
+        <p:nvSpPr>
+          <p:cNvPr id="9" name="Rectangle 8">
+            <a:extLst>
+              <a:ext uri="{FF2B5EF4-FFF2-40B4-BE49-F238E27FC236}">
+                <a16:creationId xmlns:a16="http://schemas.microsoft.com/office/drawing/2014/main" id="{D281EBFC-0A85-4BBA-A8BB-2AD6C2EEAF73}"/>
+              </a:ext>
+            </a:extLst>
+          </p:cNvPr>
+          <p:cNvSpPr/>
+          <p:nvPr/>
+        </p:nvSpPr>
+        <p:spPr>
+          <a:xfrm>
+            <a:off x="4618721" y="975425"/>
+            <a:ext cx="4454652" cy="441928"/>
+          </a:xfrm>
+          <a:prstGeom prst="rect">
+            <a:avLst/>
+          </a:prstGeom>
+        </p:spPr>
+        <p:style>
+          <a:lnRef idx="2">
+            <a:schemeClr val="accent3">
+              <a:shade val="50000"/>
+            </a:schemeClr>
+          </a:lnRef>
+          <a:fillRef idx="1">
+            <a:schemeClr val="accent3"/>
+          </a:fillRef>
+          <a:effectRef idx="0">
+            <a:schemeClr val="accent3"/>
+          </a:effectRef>
+          <a:fontRef idx="minor">
+            <a:schemeClr val="lt1"/>
+          </a:fontRef>
+        </p:style>
+        <p:txBody>
+          <a:bodyPr rtlCol="0" anchor="ctr"/>
+          <a:lstStyle/>
+          <a:p>
+            <a:pPr algn="ctr"/>
+            <a:r>
+              <a:rPr lang="en-US" dirty="0"/>
+              <a:t>Train Externally in a Compute Cluster,</a:t>
+            </a:r>
+          </a:p>
+          <a:p>
+            <a:pPr algn="ctr"/>
+            <a:r>
+              <a:rPr lang="en-US" dirty="0"/>
+              <a:t>Track Externally in Azure ML</a:t>
+            </a:r>
+          </a:p>
+        </p:txBody>
+      </p:sp>
+      <p:sp>
+        <p:nvSpPr>
+          <p:cNvPr id="11" name="TextBox 10">
+            <a:extLst>
+              <a:ext uri="{FF2B5EF4-FFF2-40B4-BE49-F238E27FC236}">
+                <a16:creationId xmlns:a16="http://schemas.microsoft.com/office/drawing/2014/main" id="{0AA2B8EB-7153-4B3A-9705-E76AC4BA0F3D}"/>
+              </a:ext>
+            </a:extLst>
+          </p:cNvPr>
+          <p:cNvSpPr txBox="1"/>
+          <p:nvPr/>
+        </p:nvSpPr>
+        <p:spPr>
+          <a:xfrm>
+            <a:off x="6034112" y="784268"/>
+            <a:ext cx="2992540" cy="184666"/>
+          </a:xfrm>
+          <a:prstGeom prst="rect">
+            <a:avLst/>
+          </a:prstGeom>
+          <a:noFill/>
+        </p:spPr>
+        <p:txBody>
+          <a:bodyPr wrap="square">
+            <a:spAutoFit/>
+          </a:bodyPr>
+          <a:lstStyle/>
+          <a:p>
+            <a:pPr algn="ctr"/>
+            <a:r>
+              <a:rPr lang="en-US" sz="600" dirty="0">
+                <a:hlinkClick r:id="rId2"/>
+              </a:rPr>
+              <a:t>https://docs.microsoft.com/en-us/azure/machine-learning/how-to-train-scikit-learn</a:t>
+            </a:r>
+            <a:endParaRPr lang="en-US" sz="600" dirty="0"/>
+          </a:p>
+        </p:txBody>
+      </p:sp>
+      <p:sp>
+        <p:nvSpPr>
+          <p:cNvPr id="12" name="TextBox 11">
+            <a:extLst>
+              <a:ext uri="{FF2B5EF4-FFF2-40B4-BE49-F238E27FC236}">
+                <a16:creationId xmlns:a16="http://schemas.microsoft.com/office/drawing/2014/main" id="{830870C5-D1F5-4383-96C8-E370EA907F63}"/>
+              </a:ext>
+            </a:extLst>
+          </p:cNvPr>
+          <p:cNvSpPr txBox="1"/>
+          <p:nvPr/>
+        </p:nvSpPr>
+        <p:spPr>
+          <a:xfrm>
+            <a:off x="117348" y="1614065"/>
+            <a:ext cx="4454652" cy="2308324"/>
+          </a:xfrm>
+          <a:prstGeom prst="rect">
+            <a:avLst/>
+          </a:prstGeom>
+          <a:solidFill>
+            <a:schemeClr val="tx2"/>
+          </a:solidFill>
+        </p:spPr>
+        <p:txBody>
+          <a:bodyPr wrap="square" rtlCol="0">
+            <a:spAutoFit/>
+          </a:bodyPr>
+          <a:lstStyle/>
+          <a:p>
+            <a:r>
+              <a:rPr lang="en-US" sz="900" dirty="0">
+                <a:latin typeface="Consolas" panose="020B0609020204030204" pitchFamily="49" charset="0"/>
+              </a:rPr>
+              <a:t>## Connect to Workspace</a:t>
+            </a:r>
+          </a:p>
+          <a:p>
+            <a:r>
+              <a:rPr lang="en-US" sz="900" dirty="0" err="1">
+                <a:latin typeface="Consolas" panose="020B0609020204030204" pitchFamily="49" charset="0"/>
+              </a:rPr>
+              <a:t>ws</a:t>
+            </a:r>
+            <a:r>
+              <a:rPr lang="en-US" sz="900" dirty="0">
+                <a:latin typeface="Consolas" panose="020B0609020204030204" pitchFamily="49" charset="0"/>
+              </a:rPr>
+              <a:t> = </a:t>
+            </a:r>
+            <a:r>
+              <a:rPr lang="en-US" sz="900" dirty="0" err="1">
+                <a:latin typeface="Consolas" panose="020B0609020204030204" pitchFamily="49" charset="0"/>
+              </a:rPr>
+              <a:t>Workspace.from_config</a:t>
+            </a:r>
+            <a:r>
+              <a:rPr lang="en-US" sz="900" dirty="0">
+                <a:latin typeface="Consolas" panose="020B0609020204030204" pitchFamily="49" charset="0"/>
+              </a:rPr>
+              <a:t>()</a:t>
+            </a:r>
+          </a:p>
+          <a:p>
+            <a:endParaRPr lang="en-US" sz="900" dirty="0">
+              <a:latin typeface="Consolas" panose="020B0609020204030204" pitchFamily="49" charset="0"/>
+            </a:endParaRPr>
+          </a:p>
+          <a:p>
+            <a:r>
+              <a:rPr lang="en-US" sz="900" dirty="0">
+                <a:latin typeface="Consolas" panose="020B0609020204030204" pitchFamily="49" charset="0"/>
+              </a:rPr>
+              <a:t>## Create Experiment</a:t>
+            </a:r>
+          </a:p>
+          <a:p>
+            <a:r>
+              <a:rPr lang="en-US" sz="900" dirty="0">
+                <a:latin typeface="Consolas" panose="020B0609020204030204" pitchFamily="49" charset="0"/>
+              </a:rPr>
+              <a:t>experiment = Experiment(workspace = </a:t>
+            </a:r>
+            <a:r>
+              <a:rPr lang="en-US" sz="900" dirty="0" err="1">
+                <a:latin typeface="Consolas" panose="020B0609020204030204" pitchFamily="49" charset="0"/>
+              </a:rPr>
+              <a:t>ws</a:t>
+            </a:r>
+            <a:r>
+              <a:rPr lang="en-US" sz="900" dirty="0">
+                <a:latin typeface="Consolas" panose="020B0609020204030204" pitchFamily="49" charset="0"/>
+              </a:rPr>
+              <a:t>, name = '&lt;group&gt;_diabetes')</a:t>
+            </a:r>
+          </a:p>
+          <a:p>
+            <a:endParaRPr lang="en-US" sz="900" dirty="0">
+              <a:latin typeface="Consolas" panose="020B0609020204030204" pitchFamily="49" charset="0"/>
+            </a:endParaRPr>
+          </a:p>
+          <a:p>
+            <a:r>
+              <a:rPr lang="en-US" sz="900" dirty="0">
+                <a:latin typeface="Consolas" panose="020B0609020204030204" pitchFamily="49" charset="0"/>
+              </a:rPr>
+              <a:t>## Create Run</a:t>
+            </a:r>
+          </a:p>
+          <a:p>
+            <a:r>
+              <a:rPr lang="en-US" sz="900" dirty="0">
+                <a:latin typeface="Consolas" panose="020B0609020204030204" pitchFamily="49" charset="0"/>
+              </a:rPr>
+              <a:t>run = </a:t>
+            </a:r>
+            <a:r>
+              <a:rPr lang="en-US" sz="900" dirty="0" err="1">
+                <a:latin typeface="Consolas" panose="020B0609020204030204" pitchFamily="49" charset="0"/>
+              </a:rPr>
+              <a:t>experiment.start_logging</a:t>
+            </a:r>
+            <a:r>
+              <a:rPr lang="en-US" sz="900" dirty="0">
+                <a:latin typeface="Consolas" panose="020B0609020204030204" pitchFamily="49" charset="0"/>
+              </a:rPr>
+              <a:t>(outputs=None, </a:t>
+            </a:r>
+            <a:r>
+              <a:rPr lang="en-US" sz="900" dirty="0" err="1">
+                <a:latin typeface="Consolas" panose="020B0609020204030204" pitchFamily="49" charset="0"/>
+              </a:rPr>
+              <a:t>snapshot_directory</a:t>
+            </a:r>
+            <a:r>
+              <a:rPr lang="en-US" sz="900" dirty="0">
+                <a:latin typeface="Consolas" panose="020B0609020204030204" pitchFamily="49" charset="0"/>
+              </a:rPr>
+              <a:t>=".", </a:t>
+            </a:r>
+            <a:r>
+              <a:rPr lang="en-US" sz="900" dirty="0" err="1">
+                <a:latin typeface="Consolas" panose="020B0609020204030204" pitchFamily="49" charset="0"/>
+              </a:rPr>
+              <a:t>display_name</a:t>
+            </a:r>
+            <a:r>
+              <a:rPr lang="en-US" sz="900" dirty="0">
+                <a:latin typeface="Consolas" panose="020B0609020204030204" pitchFamily="49" charset="0"/>
+              </a:rPr>
+              <a:t>="</a:t>
+            </a:r>
+            <a:r>
+              <a:rPr lang="en-US" sz="900" dirty="0" err="1">
+                <a:latin typeface="Consolas" panose="020B0609020204030204" pitchFamily="49" charset="0"/>
+              </a:rPr>
+              <a:t>run_name</a:t>
+            </a:r>
+            <a:r>
+              <a:rPr lang="en-US" sz="900" dirty="0">
+                <a:latin typeface="Consolas" panose="020B0609020204030204" pitchFamily="49" charset="0"/>
+              </a:rPr>
+              <a:t>")</a:t>
+            </a:r>
+          </a:p>
+          <a:p>
+            <a:endParaRPr lang="en-US" sz="900" dirty="0">
+              <a:latin typeface="Consolas" panose="020B0609020204030204" pitchFamily="49" charset="0"/>
+            </a:endParaRPr>
+          </a:p>
+          <a:p>
+            <a:r>
+              <a:rPr lang="en-US" sz="900" b="1" i="1" dirty="0">
+                <a:latin typeface="Consolas" panose="020B0609020204030204" pitchFamily="49" charset="0"/>
+              </a:rPr>
+              <a:t>&lt;ML STUFF HERE&gt;</a:t>
+            </a:r>
+          </a:p>
+          <a:p>
+            <a:endParaRPr lang="en-US" sz="900" dirty="0">
+              <a:latin typeface="Consolas" panose="020B0609020204030204" pitchFamily="49" charset="0"/>
+            </a:endParaRPr>
+          </a:p>
+          <a:p>
+            <a:r>
+              <a:rPr lang="en-US" sz="900" dirty="0">
+                <a:latin typeface="Consolas" panose="020B0609020204030204" pitchFamily="49" charset="0"/>
+              </a:rPr>
+              <a:t>## Log Metrics</a:t>
+            </a:r>
+          </a:p>
+          <a:p>
+            <a:r>
+              <a:rPr lang="en-US" sz="900" dirty="0">
+                <a:latin typeface="Consolas" panose="020B0609020204030204" pitchFamily="49" charset="0"/>
+              </a:rPr>
+              <a:t>run.log('</a:t>
+            </a:r>
+            <a:r>
+              <a:rPr lang="en-US" sz="900" dirty="0" err="1">
+                <a:latin typeface="Consolas" panose="020B0609020204030204" pitchFamily="49" charset="0"/>
+              </a:rPr>
+              <a:t>auc_train</a:t>
+            </a:r>
+            <a:r>
+              <a:rPr lang="en-US" sz="900" dirty="0">
+                <a:latin typeface="Consolas" panose="020B0609020204030204" pitchFamily="49" charset="0"/>
+              </a:rPr>
+              <a:t>', 0.85)</a:t>
+            </a:r>
+          </a:p>
+          <a:p>
+            <a:r>
+              <a:rPr lang="en-US" sz="900" dirty="0">
+                <a:latin typeface="Consolas" panose="020B0609020204030204" pitchFamily="49" charset="0"/>
+              </a:rPr>
+              <a:t>run.log('</a:t>
+            </a:r>
+            <a:r>
+              <a:rPr lang="en-US" sz="900" dirty="0" err="1">
+                <a:latin typeface="Consolas" panose="020B0609020204030204" pitchFamily="49" charset="0"/>
+              </a:rPr>
+              <a:t>auc_test</a:t>
+            </a:r>
+            <a:r>
+              <a:rPr lang="en-US" sz="900" dirty="0">
+                <a:latin typeface="Consolas" panose="020B0609020204030204" pitchFamily="49" charset="0"/>
+              </a:rPr>
+              <a:t>', 0.82)</a:t>
+            </a:r>
+          </a:p>
+          <a:p>
+            <a:r>
+              <a:rPr lang="en-US" sz="900" dirty="0" err="1">
+                <a:latin typeface="Consolas" panose="020B0609020204030204" pitchFamily="49" charset="0"/>
+              </a:rPr>
+              <a:t>run.complete</a:t>
+            </a:r>
+            <a:r>
+              <a:rPr lang="en-US" sz="900" dirty="0">
+                <a:latin typeface="Consolas" panose="020B0609020204030204" pitchFamily="49" charset="0"/>
+              </a:rPr>
+              <a:t>()</a:t>
+            </a:r>
+          </a:p>
+        </p:txBody>
+      </p:sp>
+      <p:sp>
+        <p:nvSpPr>
+          <p:cNvPr id="13" name="TextBox 12">
+            <a:extLst>
+              <a:ext uri="{FF2B5EF4-FFF2-40B4-BE49-F238E27FC236}">
+                <a16:creationId xmlns:a16="http://schemas.microsoft.com/office/drawing/2014/main" id="{1A00D852-DD8C-4404-8BC3-66322F63A13F}"/>
+              </a:ext>
+            </a:extLst>
+          </p:cNvPr>
+          <p:cNvSpPr txBox="1"/>
+          <p:nvPr/>
+        </p:nvSpPr>
+        <p:spPr>
+          <a:xfrm>
+            <a:off x="4618721" y="1598451"/>
+            <a:ext cx="4454652" cy="3139321"/>
+          </a:xfrm>
+          <a:prstGeom prst="rect">
+            <a:avLst/>
+          </a:prstGeom>
+          <a:solidFill>
+            <a:schemeClr val="accent3">
+              <a:lumMod val="20000"/>
+              <a:lumOff val="80000"/>
+            </a:schemeClr>
+          </a:solidFill>
+        </p:spPr>
+        <p:txBody>
+          <a:bodyPr wrap="square" rtlCol="0">
+            <a:spAutoFit/>
+          </a:bodyPr>
+          <a:lstStyle/>
+          <a:p>
+            <a:r>
+              <a:rPr lang="en-US" sz="900" dirty="0">
+                <a:latin typeface="Consolas" panose="020B0609020204030204" pitchFamily="49" charset="0"/>
+              </a:rPr>
+              <a:t>## Connect to Workspace</a:t>
+            </a:r>
+          </a:p>
+          <a:p>
+            <a:r>
+              <a:rPr lang="en-US" sz="900" dirty="0" err="1">
+                <a:latin typeface="Consolas" panose="020B0609020204030204" pitchFamily="49" charset="0"/>
+              </a:rPr>
+              <a:t>ws</a:t>
+            </a:r>
+            <a:r>
+              <a:rPr lang="en-US" sz="900" dirty="0">
+                <a:latin typeface="Consolas" panose="020B0609020204030204" pitchFamily="49" charset="0"/>
+              </a:rPr>
+              <a:t> = </a:t>
+            </a:r>
+            <a:r>
+              <a:rPr lang="en-US" sz="900" dirty="0" err="1">
+                <a:latin typeface="Consolas" panose="020B0609020204030204" pitchFamily="49" charset="0"/>
+              </a:rPr>
+              <a:t>Workspace.from_config</a:t>
+            </a:r>
+            <a:r>
+              <a:rPr lang="en-US" sz="900" dirty="0">
+                <a:latin typeface="Consolas" panose="020B0609020204030204" pitchFamily="49" charset="0"/>
+              </a:rPr>
+              <a:t>()</a:t>
+            </a:r>
+          </a:p>
+          <a:p>
+            <a:endParaRPr lang="en-US" sz="900" dirty="0">
+              <a:latin typeface="Consolas" panose="020B0609020204030204" pitchFamily="49" charset="0"/>
+            </a:endParaRPr>
+          </a:p>
+          <a:p>
+            <a:r>
+              <a:rPr lang="en-US" sz="900" dirty="0">
+                <a:latin typeface="Consolas" panose="020B0609020204030204" pitchFamily="49" charset="0"/>
+              </a:rPr>
+              <a:t>## Create Experiment</a:t>
+            </a:r>
+          </a:p>
+          <a:p>
+            <a:r>
+              <a:rPr lang="en-US" sz="900" dirty="0">
+                <a:latin typeface="Consolas" panose="020B0609020204030204" pitchFamily="49" charset="0"/>
+              </a:rPr>
+              <a:t>experiment = Experiment(workspace = </a:t>
+            </a:r>
+            <a:r>
+              <a:rPr lang="en-US" sz="900" dirty="0" err="1">
+                <a:latin typeface="Consolas" panose="020B0609020204030204" pitchFamily="49" charset="0"/>
+              </a:rPr>
+              <a:t>ws</a:t>
+            </a:r>
+            <a:r>
+              <a:rPr lang="en-US" sz="900" dirty="0">
+                <a:latin typeface="Consolas" panose="020B0609020204030204" pitchFamily="49" charset="0"/>
+              </a:rPr>
+              <a:t>, name = '&lt;group&gt;_diabetes')</a:t>
+            </a:r>
+          </a:p>
+          <a:p>
+            <a:endParaRPr lang="en-US" sz="900" dirty="0">
+              <a:latin typeface="Consolas" panose="020B0609020204030204" pitchFamily="49" charset="0"/>
+            </a:endParaRPr>
+          </a:p>
+          <a:p>
+            <a:r>
+              <a:rPr lang="en-US" sz="900" b="1" i="1" dirty="0">
+                <a:latin typeface="Consolas" panose="020B0609020204030204" pitchFamily="49" charset="0"/>
+              </a:rPr>
+              <a:t>&lt;ML STUFF in a train.py SCRIPT&gt;</a:t>
+            </a:r>
+          </a:p>
+          <a:p>
+            <a:endParaRPr lang="en-US" sz="900" dirty="0">
+              <a:latin typeface="Consolas" panose="020B0609020204030204" pitchFamily="49" charset="0"/>
+            </a:endParaRPr>
+          </a:p>
+          <a:p>
+            <a:r>
+              <a:rPr lang="en-US" sz="900" dirty="0">
+                <a:latin typeface="Consolas" panose="020B0609020204030204" pitchFamily="49" charset="0"/>
+              </a:rPr>
+              <a:t>## Connect to Compute Target (Optional)</a:t>
+            </a:r>
+          </a:p>
+          <a:p>
+            <a:r>
+              <a:rPr lang="en-US" sz="900" dirty="0" err="1">
+                <a:latin typeface="Consolas" panose="020B0609020204030204" pitchFamily="49" charset="0"/>
+              </a:rPr>
+              <a:t>training_cluster</a:t>
+            </a:r>
+            <a:r>
+              <a:rPr lang="en-US" sz="900" dirty="0">
+                <a:latin typeface="Consolas" panose="020B0609020204030204" pitchFamily="49" charset="0"/>
+              </a:rPr>
+              <a:t> = </a:t>
+            </a:r>
+            <a:r>
+              <a:rPr lang="en-US" sz="900" dirty="0" err="1">
+                <a:latin typeface="Consolas" panose="020B0609020204030204" pitchFamily="49" charset="0"/>
+              </a:rPr>
+              <a:t>ComputeTarget</a:t>
+            </a:r>
+            <a:r>
+              <a:rPr lang="en-US" sz="900" dirty="0">
+                <a:latin typeface="Consolas" panose="020B0609020204030204" pitchFamily="49" charset="0"/>
+              </a:rPr>
+              <a:t>(workspace=</a:t>
+            </a:r>
+            <a:r>
+              <a:rPr lang="en-US" sz="900" dirty="0" err="1">
+                <a:latin typeface="Consolas" panose="020B0609020204030204" pitchFamily="49" charset="0"/>
+              </a:rPr>
+              <a:t>ws</a:t>
+            </a:r>
+            <a:r>
+              <a:rPr lang="en-US" sz="900" dirty="0">
+                <a:latin typeface="Consolas" panose="020B0609020204030204" pitchFamily="49" charset="0"/>
+              </a:rPr>
+              <a:t>, name=</a:t>
+            </a:r>
+            <a:r>
+              <a:rPr lang="en-US" sz="900" dirty="0" err="1">
+                <a:latin typeface="Consolas" panose="020B0609020204030204" pitchFamily="49" charset="0"/>
+              </a:rPr>
+              <a:t>cluster_name</a:t>
+            </a:r>
+            <a:r>
+              <a:rPr lang="en-US" sz="900" dirty="0">
+                <a:latin typeface="Consolas" panose="020B0609020204030204" pitchFamily="49" charset="0"/>
+              </a:rPr>
+              <a:t>)</a:t>
+            </a:r>
+          </a:p>
+          <a:p>
+            <a:endParaRPr lang="en-US" sz="900" dirty="0">
+              <a:latin typeface="Consolas" panose="020B0609020204030204" pitchFamily="49" charset="0"/>
+            </a:endParaRPr>
+          </a:p>
+          <a:p>
+            <a:r>
+              <a:rPr lang="en-US" sz="900" dirty="0">
+                <a:latin typeface="Consolas" panose="020B0609020204030204" pitchFamily="49" charset="0"/>
+              </a:rPr>
+              <a:t>## Create Environment for </a:t>
+            </a:r>
+            <a:r>
+              <a:rPr lang="en-US" sz="900" dirty="0" err="1">
+                <a:latin typeface="Consolas" panose="020B0609020204030204" pitchFamily="49" charset="0"/>
+              </a:rPr>
+              <a:t>sklearn</a:t>
+            </a:r>
+            <a:endParaRPr lang="en-US" sz="900" dirty="0">
+              <a:latin typeface="Consolas" panose="020B0609020204030204" pitchFamily="49" charset="0"/>
+            </a:endParaRPr>
+          </a:p>
+          <a:p>
+            <a:r>
+              <a:rPr lang="en-US" sz="900" dirty="0" err="1">
+                <a:latin typeface="Consolas" panose="020B0609020204030204" pitchFamily="49" charset="0"/>
+              </a:rPr>
+              <a:t>sklearn_env</a:t>
+            </a:r>
+            <a:r>
+              <a:rPr lang="en-US" sz="900" dirty="0">
+                <a:latin typeface="Consolas" panose="020B0609020204030204" pitchFamily="49" charset="0"/>
+              </a:rPr>
+              <a:t> = Environment("</a:t>
+            </a:r>
+            <a:r>
+              <a:rPr lang="en-US" sz="900" dirty="0" err="1">
+                <a:latin typeface="Consolas" panose="020B0609020204030204" pitchFamily="49" charset="0"/>
+              </a:rPr>
+              <a:t>sklearn</a:t>
+            </a:r>
+            <a:r>
+              <a:rPr lang="en-US" sz="900" dirty="0">
+                <a:latin typeface="Consolas" panose="020B0609020204030204" pitchFamily="49" charset="0"/>
+              </a:rPr>
+              <a:t>-env")</a:t>
+            </a:r>
+          </a:p>
+          <a:p>
+            <a:endParaRPr lang="en-US" sz="900" dirty="0">
+              <a:latin typeface="Consolas" panose="020B0609020204030204" pitchFamily="49" charset="0"/>
+            </a:endParaRPr>
+          </a:p>
+          <a:p>
+            <a:r>
+              <a:rPr lang="en-US" sz="900" dirty="0">
+                <a:latin typeface="Consolas" panose="020B0609020204030204" pitchFamily="49" charset="0"/>
+              </a:rPr>
+              <a:t>## Create a script config</a:t>
+            </a:r>
+          </a:p>
+          <a:p>
+            <a:r>
+              <a:rPr lang="en-US" sz="900" dirty="0" err="1">
+                <a:latin typeface="Consolas" panose="020B0609020204030204" pitchFamily="49" charset="0"/>
+              </a:rPr>
+              <a:t>script_config</a:t>
+            </a:r>
+            <a:r>
+              <a:rPr lang="en-US" sz="900" dirty="0">
+                <a:latin typeface="Consolas" panose="020B0609020204030204" pitchFamily="49" charset="0"/>
+              </a:rPr>
+              <a:t> = </a:t>
+            </a:r>
+            <a:r>
+              <a:rPr lang="en-US" sz="900" dirty="0" err="1">
+                <a:latin typeface="Consolas" panose="020B0609020204030204" pitchFamily="49" charset="0"/>
+              </a:rPr>
+              <a:t>ScriptRunConfig</a:t>
+            </a:r>
+            <a:r>
+              <a:rPr lang="en-US" sz="900" dirty="0">
+                <a:latin typeface="Consolas" panose="020B0609020204030204" pitchFamily="49" charset="0"/>
+              </a:rPr>
+              <a:t>(</a:t>
+            </a:r>
+            <a:r>
+              <a:rPr lang="en-US" sz="900" dirty="0" err="1">
+                <a:latin typeface="Consolas" panose="020B0609020204030204" pitchFamily="49" charset="0"/>
+              </a:rPr>
+              <a:t>source_directory</a:t>
+            </a:r>
+            <a:r>
+              <a:rPr lang="en-US" sz="900" dirty="0">
+                <a:latin typeface="Consolas" panose="020B0609020204030204" pitchFamily="49" charset="0"/>
+              </a:rPr>
+              <a:t>='.',</a:t>
+            </a:r>
+          </a:p>
+          <a:p>
+            <a:r>
+              <a:rPr lang="en-US" sz="900" dirty="0">
+                <a:latin typeface="Consolas" panose="020B0609020204030204" pitchFamily="49" charset="0"/>
+              </a:rPr>
+              <a:t>                                script='train.py',</a:t>
+            </a:r>
+          </a:p>
+          <a:p>
+            <a:r>
+              <a:rPr lang="en-US" sz="900" dirty="0">
+                <a:latin typeface="Consolas" panose="020B0609020204030204" pitchFamily="49" charset="0"/>
+              </a:rPr>
+              <a:t>                                arguments = [],</a:t>
+            </a:r>
+          </a:p>
+          <a:p>
+            <a:r>
+              <a:rPr lang="en-US" sz="900" dirty="0">
+                <a:latin typeface="Consolas" panose="020B0609020204030204" pitchFamily="49" charset="0"/>
+              </a:rPr>
+              <a:t>                                </a:t>
+            </a:r>
+            <a:r>
+              <a:rPr lang="en-US" sz="900" dirty="0" err="1">
+                <a:latin typeface="Consolas" panose="020B0609020204030204" pitchFamily="49" charset="0"/>
+              </a:rPr>
+              <a:t>compute_target</a:t>
+            </a:r>
+            <a:r>
+              <a:rPr lang="en-US" sz="900" dirty="0">
+                <a:latin typeface="Consolas" panose="020B0609020204030204" pitchFamily="49" charset="0"/>
+              </a:rPr>
+              <a:t>=training_cluster,</a:t>
+            </a:r>
+          </a:p>
+          <a:p>
+            <a:r>
+              <a:rPr lang="en-US" sz="900" dirty="0">
+                <a:latin typeface="Consolas" panose="020B0609020204030204" pitchFamily="49" charset="0"/>
+              </a:rPr>
+              <a:t>                                environment=</a:t>
+            </a:r>
+            <a:r>
+              <a:rPr lang="en-US" sz="900" dirty="0" err="1">
+                <a:latin typeface="Consolas" panose="020B0609020204030204" pitchFamily="49" charset="0"/>
+              </a:rPr>
+              <a:t>sklearn_env</a:t>
+            </a:r>
+            <a:r>
+              <a:rPr lang="en-US" sz="900" dirty="0">
+                <a:latin typeface="Consolas" panose="020B0609020204030204" pitchFamily="49" charset="0"/>
+              </a:rPr>
+              <a:t>)</a:t>
+            </a:r>
+          </a:p>
+          <a:p>
+            <a:r>
+              <a:rPr lang="en-US" sz="900" dirty="0">
+                <a:latin typeface="Consolas" panose="020B0609020204030204" pitchFamily="49" charset="0"/>
+              </a:rPr>
+              <a:t>## Submit Experiment</a:t>
+            </a:r>
+          </a:p>
+          <a:p>
+            <a:r>
+              <a:rPr lang="en-US" sz="900" dirty="0">
+                <a:latin typeface="Consolas" panose="020B0609020204030204" pitchFamily="49" charset="0"/>
+              </a:rPr>
+              <a:t>run = </a:t>
+            </a:r>
+            <a:r>
+              <a:rPr lang="en-US" sz="900" dirty="0" err="1">
+                <a:latin typeface="Consolas" panose="020B0609020204030204" pitchFamily="49" charset="0"/>
+              </a:rPr>
+              <a:t>experiment.submit</a:t>
+            </a:r>
+            <a:r>
+              <a:rPr lang="en-US" sz="900" dirty="0">
+                <a:latin typeface="Consolas" panose="020B0609020204030204" pitchFamily="49" charset="0"/>
+              </a:rPr>
+              <a:t>(config = </a:t>
+            </a:r>
+            <a:r>
+              <a:rPr lang="en-US" sz="900" dirty="0" err="1">
+                <a:latin typeface="Consolas" panose="020B0609020204030204" pitchFamily="49" charset="0"/>
+              </a:rPr>
+              <a:t>script_config</a:t>
+            </a:r>
+            <a:r>
+              <a:rPr lang="en-US" sz="900" dirty="0">
+                <a:latin typeface="Consolas" panose="020B0609020204030204" pitchFamily="49" charset="0"/>
+              </a:rPr>
+              <a:t>)</a:t>
+            </a:r>
+          </a:p>
+        </p:txBody>
+      </p:sp>
+    </p:spTree>
+    <p:extLst>
+      <p:ext uri="{BB962C8B-B14F-4D97-AF65-F5344CB8AC3E}">
+        <p14:creationId xmlns:p14="http://schemas.microsoft.com/office/powerpoint/2010/main" val="2733519491"/>
+      </p:ext>
+    </p:extLst>
+  </p:cSld>
+  <p:clrMapOvr>
+    <a:masterClrMapping/>
+  </p:clrMapOvr>
+</p:sld>
+</file>
+
+<file path=ppt/slides/slide15.xml><?xml version="1.0" encoding="utf-8"?>
+<p:sld xmlns:a="http://schemas.openxmlformats.org/drawingml/2006/main" xmlns:r="http://schemas.openxmlformats.org/officeDocument/2006/relationships" xmlns:p="http://schemas.openxmlformats.org/presentationml/2006/main">
+  <p:cSld>
+    <p:spTree>
+      <p:nvGrpSpPr>
+        <p:cNvPr id="1" name=""/>
+        <p:cNvGrpSpPr/>
+        <p:nvPr/>
+      </p:nvGrpSpPr>
+      <p:grpSpPr>
+        <a:xfrm>
+          <a:off x="0" y="0"/>
+          <a:ext cx="0" cy="0"/>
+          <a:chOff x="0" y="0"/>
+          <a:chExt cx="0" cy="0"/>
+        </a:xfrm>
+      </p:grpSpPr>
+      <p:sp>
+        <p:nvSpPr>
+          <p:cNvPr id="2" name="Title 1">
+            <a:extLst>
+              <a:ext uri="{FF2B5EF4-FFF2-40B4-BE49-F238E27FC236}">
                 <a16:creationId xmlns:a16="http://schemas.microsoft.com/office/drawing/2014/main" id="{6FF3B6CD-C287-4358-8518-0002892C1F0F}"/>
               </a:ext>
             </a:extLst>
@@ -19022,7 +19851,7 @@
 </p:sld>
 </file>
 
-<file path=ppt/slides/slide15.xml><?xml version="1.0" encoding="utf-8"?>
+<file path=ppt/slides/slide16.xml><?xml version="1.0" encoding="utf-8"?>
 <p:sld xmlns:a="http://schemas.openxmlformats.org/drawingml/2006/main" xmlns:r="http://schemas.openxmlformats.org/officeDocument/2006/relationships" xmlns:p="http://schemas.openxmlformats.org/presentationml/2006/main">
   <p:cSld>
     <p:spTree>
@@ -20426,7 +21255,7 @@
 </p:sld>
 </file>
 
-<file path=ppt/slides/slide16.xml><?xml version="1.0" encoding="utf-8"?>
+<file path=ppt/slides/slide17.xml><?xml version="1.0" encoding="utf-8"?>
 <p:sld xmlns:a="http://schemas.openxmlformats.org/drawingml/2006/main" xmlns:r="http://schemas.openxmlformats.org/officeDocument/2006/relationships" xmlns:p="http://schemas.openxmlformats.org/presentationml/2006/main">
   <p:cSld>
     <p:spTree>
@@ -21186,7 +22015,7 @@
 </p:sld>
 </file>
 
-<file path=ppt/slides/slide17.xml><?xml version="1.0" encoding="utf-8"?>
+<file path=ppt/slides/slide18.xml><?xml version="1.0" encoding="utf-8"?>
 <p:sld xmlns:a="http://schemas.openxmlformats.org/drawingml/2006/main" xmlns:r="http://schemas.openxmlformats.org/officeDocument/2006/relationships" xmlns:p="http://schemas.openxmlformats.org/presentationml/2006/main">
   <p:cSld>
     <p:spTree>
@@ -21398,7 +22227,7 @@
 </p:sld>
 </file>
 
-<file path=ppt/slides/slide18.xml><?xml version="1.0" encoding="utf-8"?>
+<file path=ppt/slides/slide19.xml><?xml version="1.0" encoding="utf-8"?>
 <p:sld xmlns:a="http://schemas.openxmlformats.org/drawingml/2006/main" xmlns:r="http://schemas.openxmlformats.org/officeDocument/2006/relationships" xmlns:p="http://schemas.openxmlformats.org/presentationml/2006/main">
   <p:cSld>
     <p:spTree>
@@ -21457,7 +22286,7 @@
             <a:fld id="{EFD79178-3801-442D-9A2F-5D922A383BA0}" type="slidenum">
               <a:rPr lang="tr-TR"/>
               <a:pPr/>
-              <a:t>18</a:t>
+              <a:t>19</a:t>
             </a:fld>
             <a:endParaRPr lang="tr-TR"/>
           </a:p>
@@ -21879,7 +22708,210 @@
 </p:sld>
 </file>
 
-<file path=ppt/slides/slide19.xml><?xml version="1.0" encoding="utf-8"?>
+<file path=ppt/slides/slide2.xml><?xml version="1.0" encoding="utf-8"?>
+<p:sld xmlns:a="http://schemas.openxmlformats.org/drawingml/2006/main" xmlns:r="http://schemas.openxmlformats.org/officeDocument/2006/relationships" xmlns:p="http://schemas.openxmlformats.org/presentationml/2006/main">
+  <p:cSld>
+    <p:spTree>
+      <p:nvGrpSpPr>
+        <p:cNvPr id="1" name="Shape 77"/>
+        <p:cNvGrpSpPr/>
+        <p:nvPr/>
+      </p:nvGrpSpPr>
+      <p:grpSpPr>
+        <a:xfrm>
+          <a:off x="0" y="0"/>
+          <a:ext cx="0" cy="0"/>
+          <a:chOff x="0" y="0"/>
+          <a:chExt cx="0" cy="0"/>
+        </a:xfrm>
+      </p:grpSpPr>
+      <p:sp>
+        <p:nvSpPr>
+          <p:cNvPr id="78" name="Google Shape;78;p14"/>
+          <p:cNvSpPr txBox="1">
+            <a:spLocks noGrp="1"/>
+          </p:cNvSpPr>
+          <p:nvPr>
+            <p:ph type="title"/>
+          </p:nvPr>
+        </p:nvSpPr>
+        <p:spPr>
+          <a:xfrm>
+            <a:off x="265500" y="1912650"/>
+            <a:ext cx="4045200" cy="1318200"/>
+          </a:xfrm>
+          <a:prstGeom prst="rect">
+            <a:avLst/>
+          </a:prstGeom>
+        </p:spPr>
+        <p:txBody>
+          <a:bodyPr spcFirstLastPara="1" wrap="square" lIns="91425" tIns="91425" rIns="91425" bIns="91425" anchor="ctr" anchorCtr="0">
+            <a:noAutofit/>
+          </a:bodyPr>
+          <a:lstStyle/>
+          <a:p>
+            <a:pPr marL="0" lvl="0" indent="0" algn="ctr" rtl="0">
+              <a:spcBef>
+                <a:spcPts val="0"/>
+              </a:spcBef>
+              <a:spcAft>
+                <a:spcPts val="0"/>
+              </a:spcAft>
+              <a:buNone/>
+            </a:pPr>
+            <a:r>
+              <a:rPr lang="en" dirty="0"/>
+              <a:t>Overview</a:t>
+            </a:r>
+            <a:endParaRPr dirty="0"/>
+          </a:p>
+        </p:txBody>
+      </p:sp>
+      <p:sp>
+        <p:nvSpPr>
+          <p:cNvPr id="79" name="Google Shape;79;p14"/>
+          <p:cNvSpPr txBox="1">
+            <a:spLocks noGrp="1"/>
+          </p:cNvSpPr>
+          <p:nvPr>
+            <p:ph type="body" idx="2"/>
+          </p:nvPr>
+        </p:nvSpPr>
+        <p:spPr>
+          <a:xfrm>
+            <a:off x="4939500" y="394854"/>
+            <a:ext cx="3837000" cy="3719945"/>
+          </a:xfrm>
+          <a:prstGeom prst="rect">
+            <a:avLst/>
+          </a:prstGeom>
+        </p:spPr>
+        <p:txBody>
+          <a:bodyPr spcFirstLastPara="1" wrap="square" lIns="91425" tIns="91425" rIns="91425" bIns="91425" anchor="ctr" anchorCtr="0">
+            <a:noAutofit/>
+          </a:bodyPr>
+          <a:lstStyle/>
+          <a:p>
+            <a:pPr marL="0" indent="0">
+              <a:spcBef>
+                <a:spcPts val="1600"/>
+              </a:spcBef>
+              <a:buNone/>
+            </a:pPr>
+            <a:r>
+              <a:rPr lang="en-US" sz="1400" b="1" dirty="0"/>
+              <a:t>Intro to Machine Learning</a:t>
+            </a:r>
+          </a:p>
+          <a:p>
+            <a:pPr marL="0" indent="0">
+              <a:buNone/>
+            </a:pPr>
+            <a:r>
+              <a:rPr lang="en-US" sz="1400" b="1" dirty="0"/>
+              <a:t>Machine Learning in the Cloud</a:t>
+            </a:r>
+          </a:p>
+          <a:p>
+            <a:pPr marL="0" indent="0">
+              <a:buNone/>
+            </a:pPr>
+            <a:r>
+              <a:rPr lang="en-US" sz="1400" b="1" dirty="0"/>
+              <a:t>Cognitive Services</a:t>
+            </a:r>
+          </a:p>
+          <a:p>
+            <a:pPr marL="0" indent="0">
+              <a:buNone/>
+            </a:pPr>
+            <a:r>
+              <a:rPr lang="en-US" sz="1400" b="1" dirty="0" err="1"/>
+              <a:t>AutoML</a:t>
+            </a:r>
+            <a:endParaRPr lang="en-US" sz="1400" b="1" dirty="0"/>
+          </a:p>
+          <a:p>
+            <a:pPr marL="0" indent="0">
+              <a:spcBef>
+                <a:spcPts val="1600"/>
+              </a:spcBef>
+              <a:buNone/>
+            </a:pPr>
+            <a:r>
+              <a:rPr lang="en-US" sz="1400" b="1" dirty="0"/>
+              <a:t>Basics of Algorithms</a:t>
+            </a:r>
+          </a:p>
+          <a:p>
+            <a:pPr marL="285750" indent="-285750"/>
+            <a:r>
+              <a:rPr lang="en-US" sz="1400" b="1" dirty="0"/>
+              <a:t>Regression</a:t>
+            </a:r>
+          </a:p>
+          <a:p>
+            <a:pPr marL="285750" indent="-285750"/>
+            <a:r>
+              <a:rPr lang="en-US" sz="1400" b="1" dirty="0"/>
+              <a:t>Classification</a:t>
+            </a:r>
+          </a:p>
+          <a:p>
+            <a:pPr marL="285750" indent="-285750"/>
+            <a:r>
+              <a:rPr lang="en-US" sz="1400" b="1" dirty="0"/>
+              <a:t>Clustering</a:t>
+            </a:r>
+          </a:p>
+          <a:p>
+            <a:pPr marL="0" indent="0">
+              <a:spcBef>
+                <a:spcPts val="1600"/>
+              </a:spcBef>
+              <a:buNone/>
+            </a:pPr>
+            <a:r>
+              <a:rPr lang="en-US" sz="1400" b="1" dirty="0"/>
+              <a:t>Scaling Up with Parallelization</a:t>
+            </a:r>
+          </a:p>
+          <a:p>
+            <a:pPr marL="285750" indent="-285750"/>
+            <a:r>
+              <a:rPr lang="en-US" sz="1400" b="1" dirty="0"/>
+              <a:t>Training</a:t>
+            </a:r>
+          </a:p>
+          <a:p>
+            <a:pPr marL="285750" indent="-285750"/>
+            <a:r>
+              <a:rPr lang="en-US" sz="1400" b="1" dirty="0"/>
+              <a:t>Cross-Validation</a:t>
+            </a:r>
+          </a:p>
+          <a:p>
+            <a:pPr marL="285750" indent="-285750"/>
+            <a:r>
+              <a:rPr lang="en-US" sz="1400" b="1" dirty="0"/>
+              <a:t>Parameter Tuning</a:t>
+            </a:r>
+          </a:p>
+          <a:p>
+            <a:pPr marL="285750" indent="-285750"/>
+            <a:endParaRPr lang="en-US" sz="1400" b="1" dirty="0"/>
+          </a:p>
+        </p:txBody>
+      </p:sp>
+    </p:spTree>
+  </p:cSld>
+  <p:clrMapOvr>
+    <a:masterClrMapping/>
+  </p:clrMapOvr>
+</p:sld>
+</file>
+
+<file path=ppt/slides/slide20.xml><?xml version="1.0" encoding="utf-8"?>
 <p:sld xmlns:a="http://schemas.openxmlformats.org/drawingml/2006/main" xmlns:r="http://schemas.openxmlformats.org/officeDocument/2006/relationships" xmlns:p="http://schemas.openxmlformats.org/presentationml/2006/main">
   <p:cSld>
     <p:spTree>
@@ -21940,7 +22972,7 @@
             <a:fld id="{F6E1DC87-3DF8-4536-96F3-3C9B9F8DA82B}" type="slidenum">
               <a:rPr lang="tr-TR"/>
               <a:pPr/>
-              <a:t>19</a:t>
+              <a:t>20</a:t>
             </a:fld>
             <a:endParaRPr lang="tr-TR"/>
           </a:p>
@@ -21964,7 +22996,7 @@
           <a:graphicData uri="http://schemas.openxmlformats.org/presentationml/2006/ole">
             <mc:AlternateContent xmlns:mc="http://schemas.openxmlformats.org/markup-compatibility/2006">
               <mc:Choice xmlns:v="urn:schemas-microsoft-com:vml" Requires="v">
-                <p:oleObj spid="_x0000_s1126" name="Equation" r:id="rId3" imgW="1333440" imgH="457200" progId="Equation.3">
+                <p:oleObj spid="_x0000_s1136" name="Equation" r:id="rId3" imgW="1333440" imgH="457200" progId="Equation.3">
                   <p:embed/>
                 </p:oleObj>
               </mc:Choice>
@@ -22360,7 +23392,7 @@
           <a:graphicData uri="http://schemas.openxmlformats.org/presentationml/2006/ole">
             <mc:AlternateContent xmlns:mc="http://schemas.openxmlformats.org/markup-compatibility/2006">
               <mc:Choice xmlns:v="urn:schemas-microsoft-com:vml" Requires="v">
-                <p:oleObj spid="_x0000_s1127" name="Equation" r:id="rId5" imgW="1180800" imgH="431640" progId="Equation.3">
+                <p:oleObj spid="_x0000_s1137" name="Equation" r:id="rId5" imgW="1180800" imgH="431640" progId="Equation.3">
                   <p:embed/>
                 </p:oleObj>
               </mc:Choice>
@@ -22455,210 +23487,7 @@
 </p:sld>
 </file>
 
-<file path=ppt/slides/slide2.xml><?xml version="1.0" encoding="utf-8"?>
-<p:sld xmlns:a="http://schemas.openxmlformats.org/drawingml/2006/main" xmlns:r="http://schemas.openxmlformats.org/officeDocument/2006/relationships" xmlns:p="http://schemas.openxmlformats.org/presentationml/2006/main">
-  <p:cSld>
-    <p:spTree>
-      <p:nvGrpSpPr>
-        <p:cNvPr id="1" name="Shape 77"/>
-        <p:cNvGrpSpPr/>
-        <p:nvPr/>
-      </p:nvGrpSpPr>
-      <p:grpSpPr>
-        <a:xfrm>
-          <a:off x="0" y="0"/>
-          <a:ext cx="0" cy="0"/>
-          <a:chOff x="0" y="0"/>
-          <a:chExt cx="0" cy="0"/>
-        </a:xfrm>
-      </p:grpSpPr>
-      <p:sp>
-        <p:nvSpPr>
-          <p:cNvPr id="78" name="Google Shape;78;p14"/>
-          <p:cNvSpPr txBox="1">
-            <a:spLocks noGrp="1"/>
-          </p:cNvSpPr>
-          <p:nvPr>
-            <p:ph type="title"/>
-          </p:nvPr>
-        </p:nvSpPr>
-        <p:spPr>
-          <a:xfrm>
-            <a:off x="265500" y="1912650"/>
-            <a:ext cx="4045200" cy="1318200"/>
-          </a:xfrm>
-          <a:prstGeom prst="rect">
-            <a:avLst/>
-          </a:prstGeom>
-        </p:spPr>
-        <p:txBody>
-          <a:bodyPr spcFirstLastPara="1" wrap="square" lIns="91425" tIns="91425" rIns="91425" bIns="91425" anchor="ctr" anchorCtr="0">
-            <a:noAutofit/>
-          </a:bodyPr>
-          <a:lstStyle/>
-          <a:p>
-            <a:pPr marL="0" lvl="0" indent="0" algn="ctr" rtl="0">
-              <a:spcBef>
-                <a:spcPts val="0"/>
-              </a:spcBef>
-              <a:spcAft>
-                <a:spcPts val="0"/>
-              </a:spcAft>
-              <a:buNone/>
-            </a:pPr>
-            <a:r>
-              <a:rPr lang="en" dirty="0"/>
-              <a:t>Overview</a:t>
-            </a:r>
-            <a:endParaRPr dirty="0"/>
-          </a:p>
-        </p:txBody>
-      </p:sp>
-      <p:sp>
-        <p:nvSpPr>
-          <p:cNvPr id="79" name="Google Shape;79;p14"/>
-          <p:cNvSpPr txBox="1">
-            <a:spLocks noGrp="1"/>
-          </p:cNvSpPr>
-          <p:nvPr>
-            <p:ph type="body" idx="2"/>
-          </p:nvPr>
-        </p:nvSpPr>
-        <p:spPr>
-          <a:xfrm>
-            <a:off x="4939500" y="394854"/>
-            <a:ext cx="3837000" cy="3719945"/>
-          </a:xfrm>
-          <a:prstGeom prst="rect">
-            <a:avLst/>
-          </a:prstGeom>
-        </p:spPr>
-        <p:txBody>
-          <a:bodyPr spcFirstLastPara="1" wrap="square" lIns="91425" tIns="91425" rIns="91425" bIns="91425" anchor="ctr" anchorCtr="0">
-            <a:noAutofit/>
-          </a:bodyPr>
-          <a:lstStyle/>
-          <a:p>
-            <a:pPr marL="0" indent="0">
-              <a:spcBef>
-                <a:spcPts val="1600"/>
-              </a:spcBef>
-              <a:buNone/>
-            </a:pPr>
-            <a:r>
-              <a:rPr lang="en-US" sz="1400" b="1" dirty="0"/>
-              <a:t>Intro to Machine Learning</a:t>
-            </a:r>
-          </a:p>
-          <a:p>
-            <a:pPr marL="0" indent="0">
-              <a:buNone/>
-            </a:pPr>
-            <a:r>
-              <a:rPr lang="en-US" sz="1400" b="1" dirty="0"/>
-              <a:t>Machine Learning in the Cloud</a:t>
-            </a:r>
-          </a:p>
-          <a:p>
-            <a:pPr marL="0" indent="0">
-              <a:buNone/>
-            </a:pPr>
-            <a:r>
-              <a:rPr lang="en-US" sz="1400" b="1" dirty="0"/>
-              <a:t>Cognitive Services</a:t>
-            </a:r>
-          </a:p>
-          <a:p>
-            <a:pPr marL="0" indent="0">
-              <a:buNone/>
-            </a:pPr>
-            <a:r>
-              <a:rPr lang="en-US" sz="1400" b="1" dirty="0" err="1"/>
-              <a:t>AutoML</a:t>
-            </a:r>
-            <a:endParaRPr lang="en-US" sz="1400" b="1" dirty="0"/>
-          </a:p>
-          <a:p>
-            <a:pPr marL="0" indent="0">
-              <a:spcBef>
-                <a:spcPts val="1600"/>
-              </a:spcBef>
-              <a:buNone/>
-            </a:pPr>
-            <a:r>
-              <a:rPr lang="en-US" sz="1400" b="1" dirty="0"/>
-              <a:t>Basics of Algorithms</a:t>
-            </a:r>
-          </a:p>
-          <a:p>
-            <a:pPr marL="285750" indent="-285750"/>
-            <a:r>
-              <a:rPr lang="en-US" sz="1400" b="1" dirty="0"/>
-              <a:t>Regression</a:t>
-            </a:r>
-          </a:p>
-          <a:p>
-            <a:pPr marL="285750" indent="-285750"/>
-            <a:r>
-              <a:rPr lang="en-US" sz="1400" b="1" dirty="0"/>
-              <a:t>Classification</a:t>
-            </a:r>
-          </a:p>
-          <a:p>
-            <a:pPr marL="285750" indent="-285750"/>
-            <a:r>
-              <a:rPr lang="en-US" sz="1400" b="1" dirty="0"/>
-              <a:t>Clustering</a:t>
-            </a:r>
-          </a:p>
-          <a:p>
-            <a:pPr marL="0" indent="0">
-              <a:spcBef>
-                <a:spcPts val="1600"/>
-              </a:spcBef>
-              <a:buNone/>
-            </a:pPr>
-            <a:r>
-              <a:rPr lang="en-US" sz="1400" b="1" dirty="0"/>
-              <a:t>Scaling Up with Parallelization</a:t>
-            </a:r>
-          </a:p>
-          <a:p>
-            <a:pPr marL="285750" indent="-285750"/>
-            <a:r>
-              <a:rPr lang="en-US" sz="1400" b="1" dirty="0"/>
-              <a:t>Training</a:t>
-            </a:r>
-          </a:p>
-          <a:p>
-            <a:pPr marL="285750" indent="-285750"/>
-            <a:r>
-              <a:rPr lang="en-US" sz="1400" b="1" dirty="0"/>
-              <a:t>Cross-Validation</a:t>
-            </a:r>
-          </a:p>
-          <a:p>
-            <a:pPr marL="285750" indent="-285750"/>
-            <a:r>
-              <a:rPr lang="en-US" sz="1400" b="1" dirty="0"/>
-              <a:t>Parameter Tuning</a:t>
-            </a:r>
-          </a:p>
-          <a:p>
-            <a:pPr marL="285750" indent="-285750"/>
-            <a:endParaRPr lang="en-US" sz="1400" b="1" dirty="0"/>
-          </a:p>
-        </p:txBody>
-      </p:sp>
-    </p:spTree>
-  </p:cSld>
-  <p:clrMapOvr>
-    <a:masterClrMapping/>
-  </p:clrMapOvr>
-</p:sld>
-</file>
-
-<file path=ppt/slides/slide20.xml><?xml version="1.0" encoding="utf-8"?>
+<file path=ppt/slides/slide21.xml><?xml version="1.0" encoding="utf-8"?>
 <p:sld xmlns:a="http://schemas.openxmlformats.org/drawingml/2006/main" xmlns:r="http://schemas.openxmlformats.org/officeDocument/2006/relationships" xmlns:p="http://schemas.openxmlformats.org/presentationml/2006/main">
   <p:cSld>
     <p:spTree>
@@ -22921,7 +23750,7 @@
             <a:fld id="{55EF7AAF-5E6B-4622-8B02-2B6C4703C2FB}" type="slidenum">
               <a:rPr lang="tr-TR"/>
               <a:pPr/>
-              <a:t>20</a:t>
+              <a:t>21</a:t>
             </a:fld>
             <a:endParaRPr lang="tr-TR" dirty="0"/>
           </a:p>
@@ -22945,7 +23774,7 @@
           <a:graphicData uri="http://schemas.openxmlformats.org/presentationml/2006/ole">
             <mc:AlternateContent xmlns:mc="http://schemas.openxmlformats.org/markup-compatibility/2006">
               <mc:Choice xmlns:v="urn:schemas-microsoft-com:vml" Requires="v">
-                <p:oleObj spid="_x0000_s2150" name="Equation" r:id="rId3" imgW="1498320" imgH="482400" progId="Equation.3">
+                <p:oleObj spid="_x0000_s2160" name="Equation" r:id="rId3" imgW="1498320" imgH="482400" progId="Equation.3">
                   <p:embed/>
                 </p:oleObj>
               </mc:Choice>
@@ -23017,7 +23846,7 @@
           <a:graphicData uri="http://schemas.openxmlformats.org/presentationml/2006/ole">
             <mc:AlternateContent xmlns:mc="http://schemas.openxmlformats.org/markup-compatibility/2006">
               <mc:Choice xmlns:v="urn:schemas-microsoft-com:vml" Requires="v">
-                <p:oleObj spid="_x0000_s2151" name="Equation" r:id="rId5" imgW="1663560" imgH="444240" progId="Equation.3">
+                <p:oleObj spid="_x0000_s2161" name="Equation" r:id="rId5" imgW="1663560" imgH="444240" progId="Equation.3">
                   <p:embed/>
                 </p:oleObj>
               </mc:Choice>
@@ -23079,7 +23908,7 @@
 </p:sld>
 </file>
 
-<file path=ppt/slides/slide21.xml><?xml version="1.0" encoding="utf-8"?>
+<file path=ppt/slides/slide22.xml><?xml version="1.0" encoding="utf-8"?>
 <p:sld xmlns:a="http://schemas.openxmlformats.org/drawingml/2006/main" xmlns:r="http://schemas.openxmlformats.org/officeDocument/2006/relationships" xmlns:p="http://schemas.openxmlformats.org/presentationml/2006/main">
   <p:cSld>
     <p:spTree>
@@ -23138,7 +23967,7 @@
             <a:fld id="{B5F69795-7180-4348-84C5-5ED87E19885F}" type="slidenum">
               <a:rPr lang="tr-TR"/>
               <a:pPr/>
-              <a:t>21</a:t>
+              <a:t>22</a:t>
             </a:fld>
             <a:endParaRPr lang="tr-TR"/>
           </a:p>
@@ -23214,7 +24043,7 @@
 </p:sld>
 </file>
 
-<file path=ppt/slides/slide22.xml><?xml version="1.0" encoding="utf-8"?>
+<file path=ppt/slides/slide23.xml><?xml version="1.0" encoding="utf-8"?>
 <p:sld xmlns:a="http://schemas.openxmlformats.org/drawingml/2006/main" xmlns:r="http://schemas.openxmlformats.org/officeDocument/2006/relationships" xmlns:p="http://schemas.openxmlformats.org/presentationml/2006/main">
   <p:cSld>
     <p:spTree>
@@ -23294,7 +24123,7 @@
 </p:sld>
 </file>
 
-<file path=ppt/slides/slide23.xml><?xml version="1.0" encoding="utf-8"?>
+<file path=ppt/slides/slide24.xml><?xml version="1.0" encoding="utf-8"?>
 <p:sld xmlns:a="http://schemas.openxmlformats.org/drawingml/2006/main" xmlns:r="http://schemas.openxmlformats.org/officeDocument/2006/relationships" xmlns:p="http://schemas.openxmlformats.org/presentationml/2006/main">
   <p:cSld>
     <p:spTree>
@@ -23988,7 +24817,7 @@
 </p:sld>
 </file>
 
-<file path=ppt/slides/slide24.xml><?xml version="1.0" encoding="utf-8"?>
+<file path=ppt/slides/slide25.xml><?xml version="1.0" encoding="utf-8"?>
 <p:sld xmlns:a="http://schemas.openxmlformats.org/drawingml/2006/main" xmlns:r="http://schemas.openxmlformats.org/officeDocument/2006/relationships" xmlns:p="http://schemas.openxmlformats.org/presentationml/2006/main">
   <p:cSld>
     <p:spTree>
@@ -24261,7 +25090,7 @@
 </p:sld>
 </file>
 
-<file path=ppt/slides/slide25.xml><?xml version="1.0" encoding="utf-8"?>
+<file path=ppt/slides/slide26.xml><?xml version="1.0" encoding="utf-8"?>
 <p:sld xmlns:a="http://schemas.openxmlformats.org/drawingml/2006/main" xmlns:r="http://schemas.openxmlformats.org/officeDocument/2006/relationships" xmlns:p="http://schemas.openxmlformats.org/presentationml/2006/main">
   <p:cSld>
     <p:spTree>
@@ -26088,7 +26917,7 @@
 </p:sld>
 </file>
 
-<file path=ppt/slides/slide26.xml><?xml version="1.0" encoding="utf-8"?>
+<file path=ppt/slides/slide27.xml><?xml version="1.0" encoding="utf-8"?>
 <p:sld xmlns:a="http://schemas.openxmlformats.org/drawingml/2006/main" xmlns:r="http://schemas.openxmlformats.org/officeDocument/2006/relationships" xmlns:p="http://schemas.openxmlformats.org/presentationml/2006/main">
   <p:cSld>
     <p:spTree>
@@ -26346,7 +27175,7 @@
 </p:sld>
 </file>
 
-<file path=ppt/slides/slide27.xml><?xml version="1.0" encoding="utf-8"?>
+<file path=ppt/slides/slide28.xml><?xml version="1.0" encoding="utf-8"?>
 <p:sld xmlns:a="http://schemas.openxmlformats.org/drawingml/2006/main" xmlns:r="http://schemas.openxmlformats.org/officeDocument/2006/relationships" xmlns:p="http://schemas.openxmlformats.org/presentationml/2006/main">
   <p:cSld>
     <p:spTree>
@@ -29585,7 +30414,7 @@
 </p:sld>
 </file>
 
-<file path=ppt/slides/slide28.xml><?xml version="1.0" encoding="utf-8"?>
+<file path=ppt/slides/slide29.xml><?xml version="1.0" encoding="utf-8"?>
 <p:sld xmlns:a="http://schemas.openxmlformats.org/drawingml/2006/main" xmlns:r="http://schemas.openxmlformats.org/officeDocument/2006/relationships" xmlns:p="http://schemas.openxmlformats.org/presentationml/2006/main">
   <p:cSld>
     <p:spTree>
@@ -30855,423 +31684,6 @@
 </p:sld>
 </file>
 
-<file path=ppt/slides/slide29.xml><?xml version="1.0" encoding="utf-8"?>
-<p:sld xmlns:a="http://schemas.openxmlformats.org/drawingml/2006/main" xmlns:r="http://schemas.openxmlformats.org/officeDocument/2006/relationships" xmlns:p="http://schemas.openxmlformats.org/presentationml/2006/main">
-  <p:cSld>
-    <p:spTree>
-      <p:nvGrpSpPr>
-        <p:cNvPr id="1" name=""/>
-        <p:cNvGrpSpPr/>
-        <p:nvPr/>
-      </p:nvGrpSpPr>
-      <p:grpSpPr>
-        <a:xfrm>
-          <a:off x="0" y="0"/>
-          <a:ext cx="0" cy="0"/>
-          <a:chOff x="0" y="0"/>
-          <a:chExt cx="0" cy="0"/>
-        </a:xfrm>
-      </p:grpSpPr>
-      <p:sp>
-        <p:nvSpPr>
-          <p:cNvPr id="2" name="Title 1">
-            <a:extLst>
-              <a:ext uri="{FF2B5EF4-FFF2-40B4-BE49-F238E27FC236}">
-                <a16:creationId xmlns:a16="http://schemas.microsoft.com/office/drawing/2014/main" id="{3472FF27-B3AA-4859-999A-64197AF6C484}"/>
-              </a:ext>
-            </a:extLst>
-          </p:cNvPr>
-          <p:cNvSpPr>
-            <a:spLocks noGrp="1"/>
-          </p:cNvSpPr>
-          <p:nvPr>
-            <p:ph type="title"/>
-          </p:nvPr>
-        </p:nvSpPr>
-        <p:spPr/>
-        <p:txBody>
-          <a:bodyPr/>
-          <a:lstStyle/>
-          <a:p>
-            <a:r>
-              <a:rPr lang="en-US" dirty="0"/>
-              <a:t>Common Parameters to Sweep</a:t>
-            </a:r>
-          </a:p>
-        </p:txBody>
-      </p:sp>
-      <p:sp>
-        <p:nvSpPr>
-          <p:cNvPr id="3" name="Text Placeholder 2">
-            <a:extLst>
-              <a:ext uri="{FF2B5EF4-FFF2-40B4-BE49-F238E27FC236}">
-                <a16:creationId xmlns:a16="http://schemas.microsoft.com/office/drawing/2014/main" id="{AE4AD450-AFF1-44AC-9756-F18ED7C12BBD}"/>
-              </a:ext>
-            </a:extLst>
-          </p:cNvPr>
-          <p:cNvSpPr>
-            <a:spLocks noGrp="1"/>
-          </p:cNvSpPr>
-          <p:nvPr>
-            <p:ph type="body" idx="1"/>
-          </p:nvPr>
-        </p:nvSpPr>
-        <p:spPr/>
-        <p:txBody>
-          <a:bodyPr/>
-          <a:lstStyle/>
-          <a:p>
-            <a:r>
-              <a:rPr lang="en-US" dirty="0"/>
-              <a:t>Trees:</a:t>
-            </a:r>
-          </a:p>
-          <a:p>
-            <a:pPr lvl="1">
-              <a:lnSpc>
-                <a:spcPct val="100000"/>
-              </a:lnSpc>
-              <a:spcBef>
-                <a:spcPts val="0"/>
-              </a:spcBef>
-            </a:pPr>
-            <a:r>
-              <a:rPr lang="en-US" dirty="0"/>
-              <a:t>Max Depth</a:t>
-            </a:r>
-          </a:p>
-          <a:p>
-            <a:pPr lvl="1">
-              <a:lnSpc>
-                <a:spcPct val="100000"/>
-              </a:lnSpc>
-              <a:spcBef>
-                <a:spcPts val="0"/>
-              </a:spcBef>
-            </a:pPr>
-            <a:r>
-              <a:rPr lang="en-US" dirty="0"/>
-              <a:t>Max Bins</a:t>
-            </a:r>
-          </a:p>
-          <a:p>
-            <a:pPr lvl="1">
-              <a:lnSpc>
-                <a:spcPct val="100000"/>
-              </a:lnSpc>
-              <a:spcBef>
-                <a:spcPts val="0"/>
-              </a:spcBef>
-            </a:pPr>
-            <a:r>
-              <a:rPr lang="en-US" dirty="0"/>
-              <a:t>Number of Trees (in a Random Forest)</a:t>
-            </a:r>
-          </a:p>
-          <a:p>
-            <a:pPr lvl="1">
-              <a:lnSpc>
-                <a:spcPct val="100000"/>
-              </a:lnSpc>
-              <a:spcBef>
-                <a:spcPts val="0"/>
-              </a:spcBef>
-            </a:pPr>
-            <a:r>
-              <a:rPr lang="en-US" dirty="0"/>
-              <a:t>Max Splits</a:t>
-            </a:r>
-          </a:p>
-          <a:p>
-            <a:pPr lvl="1">
-              <a:lnSpc>
-                <a:spcPct val="100000"/>
-              </a:lnSpc>
-              <a:spcBef>
-                <a:spcPts val="0"/>
-              </a:spcBef>
-            </a:pPr>
-            <a:r>
-              <a:rPr lang="en-US" dirty="0"/>
-              <a:t>Max Features</a:t>
-            </a:r>
-          </a:p>
-          <a:p>
-            <a:pPr lvl="1">
-              <a:lnSpc>
-                <a:spcPct val="100000"/>
-              </a:lnSpc>
-              <a:spcBef>
-                <a:spcPts val="0"/>
-              </a:spcBef>
-            </a:pPr>
-            <a:r>
-              <a:rPr lang="en-US" dirty="0"/>
-              <a:t>Min Samples per Leaf</a:t>
-            </a:r>
-          </a:p>
-          <a:p>
-            <a:pPr lvl="1">
-              <a:lnSpc>
-                <a:spcPct val="100000"/>
-              </a:lnSpc>
-              <a:spcBef>
-                <a:spcPts val="0"/>
-              </a:spcBef>
-            </a:pPr>
-            <a:r>
-              <a:rPr lang="en-US" dirty="0"/>
-              <a:t>Max Leaf Nodes</a:t>
-            </a:r>
-          </a:p>
-          <a:p>
-            <a:pPr lvl="1">
-              <a:lnSpc>
-                <a:spcPct val="100000"/>
-              </a:lnSpc>
-              <a:spcBef>
-                <a:spcPts val="0"/>
-              </a:spcBef>
-            </a:pPr>
-            <a:r>
-              <a:rPr lang="en-US" dirty="0"/>
-              <a:t>Min Impurity Decrease</a:t>
-            </a:r>
-          </a:p>
-          <a:p>
-            <a:pPr lvl="1">
-              <a:lnSpc>
-                <a:spcPct val="100000"/>
-              </a:lnSpc>
-              <a:spcBef>
-                <a:spcPts val="0"/>
-              </a:spcBef>
-            </a:pPr>
-            <a:r>
-              <a:rPr lang="en-US" dirty="0"/>
-              <a:t>Min Impurity to Split</a:t>
-            </a:r>
-          </a:p>
-          <a:p>
-            <a:pPr lvl="1">
-              <a:lnSpc>
-                <a:spcPct val="100000"/>
-              </a:lnSpc>
-              <a:spcBef>
-                <a:spcPts val="0"/>
-              </a:spcBef>
-            </a:pPr>
-            <a:r>
-              <a:rPr lang="en-US" dirty="0"/>
-              <a:t>… and more</a:t>
-            </a:r>
-          </a:p>
-        </p:txBody>
-      </p:sp>
-      <p:sp>
-        <p:nvSpPr>
-          <p:cNvPr id="4" name="Text Placeholder 3">
-            <a:extLst>
-              <a:ext uri="{FF2B5EF4-FFF2-40B4-BE49-F238E27FC236}">
-                <a16:creationId xmlns:a16="http://schemas.microsoft.com/office/drawing/2014/main" id="{3A625093-B6F9-4EA9-8615-EEA75CF682AB}"/>
-              </a:ext>
-            </a:extLst>
-          </p:cNvPr>
-          <p:cNvSpPr>
-            <a:spLocks noGrp="1"/>
-          </p:cNvSpPr>
-          <p:nvPr>
-            <p:ph type="body" idx="2"/>
-          </p:nvPr>
-        </p:nvSpPr>
-        <p:spPr>
-          <a:xfrm>
-            <a:off x="5650572" y="1602675"/>
-            <a:ext cx="3398178" cy="3002400"/>
-          </a:xfrm>
-        </p:spPr>
-        <p:txBody>
-          <a:bodyPr/>
-          <a:lstStyle/>
-          <a:p>
-            <a:r>
-              <a:rPr lang="en-US" dirty="0"/>
-              <a:t>Regression and Other Algorithms:</a:t>
-            </a:r>
-          </a:p>
-          <a:p>
-            <a:pPr lvl="1">
-              <a:lnSpc>
-                <a:spcPct val="100000"/>
-              </a:lnSpc>
-              <a:spcBef>
-                <a:spcPts val="0"/>
-              </a:spcBef>
-            </a:pPr>
-            <a:r>
-              <a:rPr lang="en-US" dirty="0"/>
-              <a:t>Regularization</a:t>
-            </a:r>
-          </a:p>
-          <a:p>
-            <a:pPr lvl="1">
-              <a:lnSpc>
-                <a:spcPct val="100000"/>
-              </a:lnSpc>
-              <a:spcBef>
-                <a:spcPts val="0"/>
-              </a:spcBef>
-            </a:pPr>
-            <a:r>
-              <a:rPr lang="en-US" dirty="0"/>
-              <a:t>Elastic Net</a:t>
-            </a:r>
-          </a:p>
-          <a:p>
-            <a:pPr lvl="1">
-              <a:lnSpc>
-                <a:spcPct val="100000"/>
-              </a:lnSpc>
-              <a:spcBef>
-                <a:spcPts val="0"/>
-              </a:spcBef>
-            </a:pPr>
-            <a:r>
-              <a:rPr lang="en-US" dirty="0"/>
-              <a:t>Maximum Iterations</a:t>
-            </a:r>
-          </a:p>
-          <a:p>
-            <a:pPr lvl="1">
-              <a:lnSpc>
-                <a:spcPct val="100000"/>
-              </a:lnSpc>
-              <a:spcBef>
-                <a:spcPts val="0"/>
-              </a:spcBef>
-            </a:pPr>
-            <a:r>
-              <a:rPr lang="en-US" dirty="0"/>
-              <a:t>Smoothing (in Naïve Bayes)</a:t>
-            </a:r>
-          </a:p>
-          <a:p>
-            <a:pPr lvl="1">
-              <a:lnSpc>
-                <a:spcPct val="100000"/>
-              </a:lnSpc>
-              <a:spcBef>
-                <a:spcPts val="0"/>
-              </a:spcBef>
-            </a:pPr>
-            <a:r>
-              <a:rPr lang="en-US" dirty="0"/>
-              <a:t>… and more</a:t>
-            </a:r>
-          </a:p>
-        </p:txBody>
-      </p:sp>
-      <p:sp>
-        <p:nvSpPr>
-          <p:cNvPr id="5" name="Rectangle 4">
-            <a:extLst>
-              <a:ext uri="{FF2B5EF4-FFF2-40B4-BE49-F238E27FC236}">
-                <a16:creationId xmlns:a16="http://schemas.microsoft.com/office/drawing/2014/main" id="{3EBACC46-04CD-47C5-80D3-E64918757097}"/>
-              </a:ext>
-            </a:extLst>
-          </p:cNvPr>
-          <p:cNvSpPr/>
-          <p:nvPr/>
-        </p:nvSpPr>
-        <p:spPr>
-          <a:xfrm>
-            <a:off x="199444" y="1602675"/>
-            <a:ext cx="1857956" cy="3277820"/>
-          </a:xfrm>
-          <a:prstGeom prst="rect">
-            <a:avLst/>
-          </a:prstGeom>
-        </p:spPr>
-        <p:txBody>
-          <a:bodyPr wrap="square">
-            <a:spAutoFit/>
-          </a:bodyPr>
-          <a:lstStyle/>
-          <a:p>
-            <a:r>
-              <a:rPr lang="en-US" sz="900" dirty="0">
-                <a:hlinkClick r:id="rId2"/>
-              </a:rPr>
-              <a:t>https://scikit-learn.org/stable/modules/generated/sklearn.tree.DecisionTreeClassifier.html</a:t>
-            </a:r>
-            <a:endParaRPr lang="en-US" sz="900" dirty="0"/>
-          </a:p>
-          <a:p>
-            <a:endParaRPr lang="en-US" sz="900" dirty="0"/>
-          </a:p>
-          <a:p>
-            <a:r>
-              <a:rPr lang="en-US" sz="900" dirty="0">
-                <a:hlinkClick r:id="rId3"/>
-              </a:rPr>
-              <a:t>https://spark.apache.org/docs/2.2.0/mllib-decision-tree.html</a:t>
-            </a:r>
-            <a:endParaRPr lang="en-US" sz="900" dirty="0"/>
-          </a:p>
-          <a:p>
-            <a:endParaRPr lang="en-US" sz="900" dirty="0"/>
-          </a:p>
-          <a:p>
-            <a:r>
-              <a:rPr lang="en-US" sz="900" dirty="0">
-                <a:hlinkClick r:id="rId4"/>
-              </a:rPr>
-              <a:t>https://scikit-learn.org/stable/modules/generated/sklearn.linear_model.LinearRegression.html#sklearn.linear_model.LinearRegression</a:t>
-            </a:r>
-            <a:endParaRPr lang="en-US" sz="900" dirty="0"/>
-          </a:p>
-          <a:p>
-            <a:endParaRPr lang="en-US" sz="900" dirty="0"/>
-          </a:p>
-          <a:p>
-            <a:r>
-              <a:rPr lang="en-US" sz="900" dirty="0">
-                <a:hlinkClick r:id="rId5"/>
-              </a:rPr>
-              <a:t>https://spark.apache.org/docs/2.2.0/ml-classification-regression.html#regression</a:t>
-            </a:r>
-            <a:endParaRPr lang="en-US" sz="900" dirty="0"/>
-          </a:p>
-          <a:p>
-            <a:endParaRPr lang="en-US" sz="900" dirty="0"/>
-          </a:p>
-          <a:p>
-            <a:r>
-              <a:rPr lang="en-US" sz="900" dirty="0">
-                <a:hlinkClick r:id="rId6"/>
-              </a:rPr>
-              <a:t>https://spark.apache.org/docs/2.2.0/mllib-naive-bayes.html#naive-bayes-sparkmllib</a:t>
-            </a:r>
-            <a:endParaRPr lang="en-US" sz="900" dirty="0"/>
-          </a:p>
-          <a:p>
-            <a:endParaRPr lang="en-US" sz="900" dirty="0"/>
-          </a:p>
-        </p:txBody>
-      </p:sp>
-    </p:spTree>
-    <p:extLst>
-      <p:ext uri="{BB962C8B-B14F-4D97-AF65-F5344CB8AC3E}">
-        <p14:creationId xmlns:p14="http://schemas.microsoft.com/office/powerpoint/2010/main" val="2534537153"/>
-      </p:ext>
-    </p:extLst>
-  </p:cSld>
-  <p:clrMapOvr>
-    <a:masterClrMapping/>
-  </p:clrMapOvr>
-</p:sld>
-</file>
-
 <file path=ppt/slides/slide3.xml><?xml version="1.0" encoding="utf-8"?>
 <p:sld xmlns:a="http://schemas.openxmlformats.org/drawingml/2006/main" xmlns:r="http://schemas.openxmlformats.org/officeDocument/2006/relationships" xmlns:p="http://schemas.openxmlformats.org/presentationml/2006/main">
   <p:cSld>
@@ -31736,6 +32148,423 @@
 </file>
 
 <file path=ppt/slides/slide30.xml><?xml version="1.0" encoding="utf-8"?>
+<p:sld xmlns:a="http://schemas.openxmlformats.org/drawingml/2006/main" xmlns:r="http://schemas.openxmlformats.org/officeDocument/2006/relationships" xmlns:p="http://schemas.openxmlformats.org/presentationml/2006/main">
+  <p:cSld>
+    <p:spTree>
+      <p:nvGrpSpPr>
+        <p:cNvPr id="1" name=""/>
+        <p:cNvGrpSpPr/>
+        <p:nvPr/>
+      </p:nvGrpSpPr>
+      <p:grpSpPr>
+        <a:xfrm>
+          <a:off x="0" y="0"/>
+          <a:ext cx="0" cy="0"/>
+          <a:chOff x="0" y="0"/>
+          <a:chExt cx="0" cy="0"/>
+        </a:xfrm>
+      </p:grpSpPr>
+      <p:sp>
+        <p:nvSpPr>
+          <p:cNvPr id="2" name="Title 1">
+            <a:extLst>
+              <a:ext uri="{FF2B5EF4-FFF2-40B4-BE49-F238E27FC236}">
+                <a16:creationId xmlns:a16="http://schemas.microsoft.com/office/drawing/2014/main" id="{3472FF27-B3AA-4859-999A-64197AF6C484}"/>
+              </a:ext>
+            </a:extLst>
+          </p:cNvPr>
+          <p:cNvSpPr>
+            <a:spLocks noGrp="1"/>
+          </p:cNvSpPr>
+          <p:nvPr>
+            <p:ph type="title"/>
+          </p:nvPr>
+        </p:nvSpPr>
+        <p:spPr/>
+        <p:txBody>
+          <a:bodyPr/>
+          <a:lstStyle/>
+          <a:p>
+            <a:r>
+              <a:rPr lang="en-US" dirty="0"/>
+              <a:t>Common Parameters to Sweep</a:t>
+            </a:r>
+          </a:p>
+        </p:txBody>
+      </p:sp>
+      <p:sp>
+        <p:nvSpPr>
+          <p:cNvPr id="3" name="Text Placeholder 2">
+            <a:extLst>
+              <a:ext uri="{FF2B5EF4-FFF2-40B4-BE49-F238E27FC236}">
+                <a16:creationId xmlns:a16="http://schemas.microsoft.com/office/drawing/2014/main" id="{AE4AD450-AFF1-44AC-9756-F18ED7C12BBD}"/>
+              </a:ext>
+            </a:extLst>
+          </p:cNvPr>
+          <p:cNvSpPr>
+            <a:spLocks noGrp="1"/>
+          </p:cNvSpPr>
+          <p:nvPr>
+            <p:ph type="body" idx="1"/>
+          </p:nvPr>
+        </p:nvSpPr>
+        <p:spPr/>
+        <p:txBody>
+          <a:bodyPr/>
+          <a:lstStyle/>
+          <a:p>
+            <a:r>
+              <a:rPr lang="en-US" dirty="0"/>
+              <a:t>Trees:</a:t>
+            </a:r>
+          </a:p>
+          <a:p>
+            <a:pPr lvl="1">
+              <a:lnSpc>
+                <a:spcPct val="100000"/>
+              </a:lnSpc>
+              <a:spcBef>
+                <a:spcPts val="0"/>
+              </a:spcBef>
+            </a:pPr>
+            <a:r>
+              <a:rPr lang="en-US" dirty="0"/>
+              <a:t>Max Depth</a:t>
+            </a:r>
+          </a:p>
+          <a:p>
+            <a:pPr lvl="1">
+              <a:lnSpc>
+                <a:spcPct val="100000"/>
+              </a:lnSpc>
+              <a:spcBef>
+                <a:spcPts val="0"/>
+              </a:spcBef>
+            </a:pPr>
+            <a:r>
+              <a:rPr lang="en-US" dirty="0"/>
+              <a:t>Max Bins</a:t>
+            </a:r>
+          </a:p>
+          <a:p>
+            <a:pPr lvl="1">
+              <a:lnSpc>
+                <a:spcPct val="100000"/>
+              </a:lnSpc>
+              <a:spcBef>
+                <a:spcPts val="0"/>
+              </a:spcBef>
+            </a:pPr>
+            <a:r>
+              <a:rPr lang="en-US" dirty="0"/>
+              <a:t>Number of Trees (in a Random Forest)</a:t>
+            </a:r>
+          </a:p>
+          <a:p>
+            <a:pPr lvl="1">
+              <a:lnSpc>
+                <a:spcPct val="100000"/>
+              </a:lnSpc>
+              <a:spcBef>
+                <a:spcPts val="0"/>
+              </a:spcBef>
+            </a:pPr>
+            <a:r>
+              <a:rPr lang="en-US" dirty="0"/>
+              <a:t>Max Splits</a:t>
+            </a:r>
+          </a:p>
+          <a:p>
+            <a:pPr lvl="1">
+              <a:lnSpc>
+                <a:spcPct val="100000"/>
+              </a:lnSpc>
+              <a:spcBef>
+                <a:spcPts val="0"/>
+              </a:spcBef>
+            </a:pPr>
+            <a:r>
+              <a:rPr lang="en-US" dirty="0"/>
+              <a:t>Max Features</a:t>
+            </a:r>
+          </a:p>
+          <a:p>
+            <a:pPr lvl="1">
+              <a:lnSpc>
+                <a:spcPct val="100000"/>
+              </a:lnSpc>
+              <a:spcBef>
+                <a:spcPts val="0"/>
+              </a:spcBef>
+            </a:pPr>
+            <a:r>
+              <a:rPr lang="en-US" dirty="0"/>
+              <a:t>Min Samples per Leaf</a:t>
+            </a:r>
+          </a:p>
+          <a:p>
+            <a:pPr lvl="1">
+              <a:lnSpc>
+                <a:spcPct val="100000"/>
+              </a:lnSpc>
+              <a:spcBef>
+                <a:spcPts val="0"/>
+              </a:spcBef>
+            </a:pPr>
+            <a:r>
+              <a:rPr lang="en-US" dirty="0"/>
+              <a:t>Max Leaf Nodes</a:t>
+            </a:r>
+          </a:p>
+          <a:p>
+            <a:pPr lvl="1">
+              <a:lnSpc>
+                <a:spcPct val="100000"/>
+              </a:lnSpc>
+              <a:spcBef>
+                <a:spcPts val="0"/>
+              </a:spcBef>
+            </a:pPr>
+            <a:r>
+              <a:rPr lang="en-US" dirty="0"/>
+              <a:t>Min Impurity Decrease</a:t>
+            </a:r>
+          </a:p>
+          <a:p>
+            <a:pPr lvl="1">
+              <a:lnSpc>
+                <a:spcPct val="100000"/>
+              </a:lnSpc>
+              <a:spcBef>
+                <a:spcPts val="0"/>
+              </a:spcBef>
+            </a:pPr>
+            <a:r>
+              <a:rPr lang="en-US" dirty="0"/>
+              <a:t>Min Impurity to Split</a:t>
+            </a:r>
+          </a:p>
+          <a:p>
+            <a:pPr lvl="1">
+              <a:lnSpc>
+                <a:spcPct val="100000"/>
+              </a:lnSpc>
+              <a:spcBef>
+                <a:spcPts val="0"/>
+              </a:spcBef>
+            </a:pPr>
+            <a:r>
+              <a:rPr lang="en-US" dirty="0"/>
+              <a:t>… and more</a:t>
+            </a:r>
+          </a:p>
+        </p:txBody>
+      </p:sp>
+      <p:sp>
+        <p:nvSpPr>
+          <p:cNvPr id="4" name="Text Placeholder 3">
+            <a:extLst>
+              <a:ext uri="{FF2B5EF4-FFF2-40B4-BE49-F238E27FC236}">
+                <a16:creationId xmlns:a16="http://schemas.microsoft.com/office/drawing/2014/main" id="{3A625093-B6F9-4EA9-8615-EEA75CF682AB}"/>
+              </a:ext>
+            </a:extLst>
+          </p:cNvPr>
+          <p:cNvSpPr>
+            <a:spLocks noGrp="1"/>
+          </p:cNvSpPr>
+          <p:nvPr>
+            <p:ph type="body" idx="2"/>
+          </p:nvPr>
+        </p:nvSpPr>
+        <p:spPr>
+          <a:xfrm>
+            <a:off x="5650572" y="1602675"/>
+            <a:ext cx="3398178" cy="3002400"/>
+          </a:xfrm>
+        </p:spPr>
+        <p:txBody>
+          <a:bodyPr/>
+          <a:lstStyle/>
+          <a:p>
+            <a:r>
+              <a:rPr lang="en-US" dirty="0"/>
+              <a:t>Regression and Other Algorithms:</a:t>
+            </a:r>
+          </a:p>
+          <a:p>
+            <a:pPr lvl="1">
+              <a:lnSpc>
+                <a:spcPct val="100000"/>
+              </a:lnSpc>
+              <a:spcBef>
+                <a:spcPts val="0"/>
+              </a:spcBef>
+            </a:pPr>
+            <a:r>
+              <a:rPr lang="en-US" dirty="0"/>
+              <a:t>Regularization</a:t>
+            </a:r>
+          </a:p>
+          <a:p>
+            <a:pPr lvl="1">
+              <a:lnSpc>
+                <a:spcPct val="100000"/>
+              </a:lnSpc>
+              <a:spcBef>
+                <a:spcPts val="0"/>
+              </a:spcBef>
+            </a:pPr>
+            <a:r>
+              <a:rPr lang="en-US" dirty="0"/>
+              <a:t>Elastic Net</a:t>
+            </a:r>
+          </a:p>
+          <a:p>
+            <a:pPr lvl="1">
+              <a:lnSpc>
+                <a:spcPct val="100000"/>
+              </a:lnSpc>
+              <a:spcBef>
+                <a:spcPts val="0"/>
+              </a:spcBef>
+            </a:pPr>
+            <a:r>
+              <a:rPr lang="en-US" dirty="0"/>
+              <a:t>Maximum Iterations</a:t>
+            </a:r>
+          </a:p>
+          <a:p>
+            <a:pPr lvl="1">
+              <a:lnSpc>
+                <a:spcPct val="100000"/>
+              </a:lnSpc>
+              <a:spcBef>
+                <a:spcPts val="0"/>
+              </a:spcBef>
+            </a:pPr>
+            <a:r>
+              <a:rPr lang="en-US" dirty="0"/>
+              <a:t>Smoothing (in Naïve Bayes)</a:t>
+            </a:r>
+          </a:p>
+          <a:p>
+            <a:pPr lvl="1">
+              <a:lnSpc>
+                <a:spcPct val="100000"/>
+              </a:lnSpc>
+              <a:spcBef>
+                <a:spcPts val="0"/>
+              </a:spcBef>
+            </a:pPr>
+            <a:r>
+              <a:rPr lang="en-US" dirty="0"/>
+              <a:t>… and more</a:t>
+            </a:r>
+          </a:p>
+        </p:txBody>
+      </p:sp>
+      <p:sp>
+        <p:nvSpPr>
+          <p:cNvPr id="5" name="Rectangle 4">
+            <a:extLst>
+              <a:ext uri="{FF2B5EF4-FFF2-40B4-BE49-F238E27FC236}">
+                <a16:creationId xmlns:a16="http://schemas.microsoft.com/office/drawing/2014/main" id="{3EBACC46-04CD-47C5-80D3-E64918757097}"/>
+              </a:ext>
+            </a:extLst>
+          </p:cNvPr>
+          <p:cNvSpPr/>
+          <p:nvPr/>
+        </p:nvSpPr>
+        <p:spPr>
+          <a:xfrm>
+            <a:off x="199444" y="1602675"/>
+            <a:ext cx="1857956" cy="3277820"/>
+          </a:xfrm>
+          <a:prstGeom prst="rect">
+            <a:avLst/>
+          </a:prstGeom>
+        </p:spPr>
+        <p:txBody>
+          <a:bodyPr wrap="square">
+            <a:spAutoFit/>
+          </a:bodyPr>
+          <a:lstStyle/>
+          <a:p>
+            <a:r>
+              <a:rPr lang="en-US" sz="900" dirty="0">
+                <a:hlinkClick r:id="rId2"/>
+              </a:rPr>
+              <a:t>https://scikit-learn.org/stable/modules/generated/sklearn.tree.DecisionTreeClassifier.html</a:t>
+            </a:r>
+            <a:endParaRPr lang="en-US" sz="900" dirty="0"/>
+          </a:p>
+          <a:p>
+            <a:endParaRPr lang="en-US" sz="900" dirty="0"/>
+          </a:p>
+          <a:p>
+            <a:r>
+              <a:rPr lang="en-US" sz="900" dirty="0">
+                <a:hlinkClick r:id="rId3"/>
+              </a:rPr>
+              <a:t>https://spark.apache.org/docs/2.2.0/mllib-decision-tree.html</a:t>
+            </a:r>
+            <a:endParaRPr lang="en-US" sz="900" dirty="0"/>
+          </a:p>
+          <a:p>
+            <a:endParaRPr lang="en-US" sz="900" dirty="0"/>
+          </a:p>
+          <a:p>
+            <a:r>
+              <a:rPr lang="en-US" sz="900" dirty="0">
+                <a:hlinkClick r:id="rId4"/>
+              </a:rPr>
+              <a:t>https://scikit-learn.org/stable/modules/generated/sklearn.linear_model.LinearRegression.html#sklearn.linear_model.LinearRegression</a:t>
+            </a:r>
+            <a:endParaRPr lang="en-US" sz="900" dirty="0"/>
+          </a:p>
+          <a:p>
+            <a:endParaRPr lang="en-US" sz="900" dirty="0"/>
+          </a:p>
+          <a:p>
+            <a:r>
+              <a:rPr lang="en-US" sz="900" dirty="0">
+                <a:hlinkClick r:id="rId5"/>
+              </a:rPr>
+              <a:t>https://spark.apache.org/docs/2.2.0/ml-classification-regression.html#regression</a:t>
+            </a:r>
+            <a:endParaRPr lang="en-US" sz="900" dirty="0"/>
+          </a:p>
+          <a:p>
+            <a:endParaRPr lang="en-US" sz="900" dirty="0"/>
+          </a:p>
+          <a:p>
+            <a:r>
+              <a:rPr lang="en-US" sz="900" dirty="0">
+                <a:hlinkClick r:id="rId6"/>
+              </a:rPr>
+              <a:t>https://spark.apache.org/docs/2.2.0/mllib-naive-bayes.html#naive-bayes-sparkmllib</a:t>
+            </a:r>
+            <a:endParaRPr lang="en-US" sz="900" dirty="0"/>
+          </a:p>
+          <a:p>
+            <a:endParaRPr lang="en-US" sz="900" dirty="0"/>
+          </a:p>
+        </p:txBody>
+      </p:sp>
+    </p:spTree>
+    <p:extLst>
+      <p:ext uri="{BB962C8B-B14F-4D97-AF65-F5344CB8AC3E}">
+        <p14:creationId xmlns:p14="http://schemas.microsoft.com/office/powerpoint/2010/main" val="2534537153"/>
+      </p:ext>
+    </p:extLst>
+  </p:cSld>
+  <p:clrMapOvr>
+    <a:masterClrMapping/>
+  </p:clrMapOvr>
+</p:sld>
+</file>
+
+<file path=ppt/slides/slide31.xml><?xml version="1.0" encoding="utf-8"?>
 <p:sld xmlns:a="http://schemas.openxmlformats.org/drawingml/2006/main" xmlns:r="http://schemas.openxmlformats.org/officeDocument/2006/relationships" xmlns:p="http://schemas.openxmlformats.org/presentationml/2006/main">
   <p:cSld>
     <p:spTree>
@@ -32808,7 +33637,7 @@
 </p:sld>
 </file>
 
-<file path=ppt/slides/slide31.xml><?xml version="1.0" encoding="utf-8"?>
+<file path=ppt/slides/slide32.xml><?xml version="1.0" encoding="utf-8"?>
 <p:sld xmlns:a="http://schemas.openxmlformats.org/drawingml/2006/main" xmlns:r="http://schemas.openxmlformats.org/officeDocument/2006/relationships" xmlns:p="http://schemas.openxmlformats.org/presentationml/2006/main">
   <p:cSld>
     <p:spTree>
@@ -33210,7 +34039,7 @@
 </p:sld>
 </file>
 
-<file path=ppt/slides/slide32.xml><?xml version="1.0" encoding="utf-8"?>
+<file path=ppt/slides/slide33.xml><?xml version="1.0" encoding="utf-8"?>
 <p:sld xmlns:a="http://schemas.openxmlformats.org/drawingml/2006/main" xmlns:r="http://schemas.openxmlformats.org/officeDocument/2006/relationships" xmlns:p="http://schemas.openxmlformats.org/presentationml/2006/main">
   <p:cSld>
     <p:spTree>
@@ -33656,7 +34485,7 @@
 </p:sld>
 </file>
 
-<file path=ppt/slides/slide33.xml><?xml version="1.0" encoding="utf-8"?>
+<file path=ppt/slides/slide34.xml><?xml version="1.0" encoding="utf-8"?>
 <p:sld xmlns:a="http://schemas.openxmlformats.org/drawingml/2006/main" xmlns:r="http://schemas.openxmlformats.org/officeDocument/2006/relationships" xmlns:p="http://schemas.openxmlformats.org/presentationml/2006/main">
   <p:cSld>
     <p:spTree>
@@ -33874,7 +34703,7 @@
 </p:sld>
 </file>
 
-<file path=ppt/slides/slide34.xml><?xml version="1.0" encoding="utf-8"?>
+<file path=ppt/slides/slide35.xml><?xml version="1.0" encoding="utf-8"?>
 <p:sld xmlns:a="http://schemas.openxmlformats.org/drawingml/2006/main" xmlns:r="http://schemas.openxmlformats.org/officeDocument/2006/relationships" xmlns:p="http://schemas.openxmlformats.org/presentationml/2006/main">
   <p:cSld>
     <p:spTree>
@@ -33969,7 +34798,7 @@
 </p:sld>
 </file>
 
-<file path=ppt/slides/slide35.xml><?xml version="1.0" encoding="utf-8"?>
+<file path=ppt/slides/slide36.xml><?xml version="1.0" encoding="utf-8"?>
 <p:sld xmlns:a="http://schemas.openxmlformats.org/drawingml/2006/main" xmlns:r="http://schemas.openxmlformats.org/officeDocument/2006/relationships" xmlns:p="http://schemas.openxmlformats.org/presentationml/2006/main">
   <p:cSld>
     <p:spTree>

</xml_diff>

<commit_message>
Fix regression and regularization equations
</commit_message>
<xml_diff>
--- a/3 - Machine Learning/MachineLearning.pptx
+++ b/3 - Machine Learning/MachineLearning.pptx
@@ -74,7 +74,7 @@
       <p:boldItalic r:id="rId51"/>
     </p:embeddedFont>
     <p:embeddedFont>
-      <p:font typeface="Raleway" panose="020B0503030101060003" pitchFamily="34" charset="0"/>
+      <p:font typeface="Raleway" panose="020B0503030101060003" pitchFamily="34" charset="77"/>
       <p:regular r:id="rId52"/>
       <p:bold r:id="rId53"/>
       <p:italic r:id="rId54"/>
@@ -2313,12 +2313,12 @@
     <dgm:cxn modelId="{A63ECC29-2820-4062-B1BC-1C91FC33E551}" type="presOf" srcId="{57731373-C80E-4E09-AE92-8009F2922300}" destId="{25062737-8A56-4984-94AB-53248B63EA16}" srcOrd="0" destOrd="0" presId="urn:microsoft.com/office/officeart/2005/8/layout/bProcess3"/>
     <dgm:cxn modelId="{D14D1936-FA5E-4C62-BB7E-035C9D60EFEA}" type="presOf" srcId="{5C60A8DE-8E6B-48E8-B16A-DDDEA8EB18E1}" destId="{A9BC978D-AED0-4E09-BF79-F26E8D1CF4A1}" srcOrd="0" destOrd="0" presId="urn:microsoft.com/office/officeart/2005/8/layout/bProcess3"/>
     <dgm:cxn modelId="{EEE3B83B-8554-467E-A752-7DC252304D85}" type="presOf" srcId="{12429059-AE68-44B6-A08A-166C2A6F1376}" destId="{27649699-B745-4AC1-9D9D-D35BEE6C4113}" srcOrd="0" destOrd="0" presId="urn:microsoft.com/office/officeart/2005/8/layout/bProcess3"/>
-    <dgm:cxn modelId="{4098195F-3CE7-430D-8206-B59D789E3FD7}" type="presOf" srcId="{BEE22CC3-71A8-4FE2-A916-4C37F1A89AFD}" destId="{26C05194-595E-44D1-84CB-2197238A83C4}" srcOrd="0" destOrd="0" presId="urn:microsoft.com/office/officeart/2005/8/layout/bProcess3"/>
     <dgm:cxn modelId="{C4537042-B14B-47D2-94A6-4A6A4F576A77}" srcId="{4410F19C-9AF8-455E-BB49-82795D97D9E4}" destId="{D1424278-B4BF-48FD-BD7F-43BB4198C45E}" srcOrd="2" destOrd="0" parTransId="{025DF95C-27A1-4271-B7CB-6128AB8017B1}" sibTransId="{5E3834B2-A93D-4F9F-A3C4-748C7BCCDB2D}"/>
     <dgm:cxn modelId="{58D40353-3FDE-4676-AD8A-D9EB7DF093A7}" type="presOf" srcId="{4AF74A3F-7DDF-4BAC-8116-E32C06B2F2CC}" destId="{517F039B-46A4-4CED-9BE1-83705535D140}" srcOrd="0" destOrd="0" presId="urn:microsoft.com/office/officeart/2005/8/layout/bProcess3"/>
-    <dgm:cxn modelId="{70881873-E84C-4789-B0ED-F788AC16ECE9}" type="presOf" srcId="{4AF74A3F-7DDF-4BAC-8116-E32C06B2F2CC}" destId="{87AADF7E-62D6-4428-9714-F8C6A8B78AFA}" srcOrd="1" destOrd="0" presId="urn:microsoft.com/office/officeart/2005/8/layout/bProcess3"/>
     <dgm:cxn modelId="{87637D53-BC00-4DB4-99FE-2B7428C56F3D}" type="presOf" srcId="{5E3834B2-A93D-4F9F-A3C4-748C7BCCDB2D}" destId="{058BA394-4F29-4EF1-ABF8-0419C44C1287}" srcOrd="0" destOrd="0" presId="urn:microsoft.com/office/officeart/2005/8/layout/bProcess3"/>
     <dgm:cxn modelId="{ECB0C953-D608-4EF9-AA43-696CEE105F7F}" srcId="{4410F19C-9AF8-455E-BB49-82795D97D9E4}" destId="{5C60A8DE-8E6B-48E8-B16A-DDDEA8EB18E1}" srcOrd="1" destOrd="0" parTransId="{7BBFBABF-6BA4-41E2-951D-E2AB414E5AF3}" sibTransId="{4AF74A3F-7DDF-4BAC-8116-E32C06B2F2CC}"/>
+    <dgm:cxn modelId="{4098195F-3CE7-430D-8206-B59D789E3FD7}" type="presOf" srcId="{BEE22CC3-71A8-4FE2-A916-4C37F1A89AFD}" destId="{26C05194-595E-44D1-84CB-2197238A83C4}" srcOrd="0" destOrd="0" presId="urn:microsoft.com/office/officeart/2005/8/layout/bProcess3"/>
+    <dgm:cxn modelId="{70881873-E84C-4789-B0ED-F788AC16ECE9}" type="presOf" srcId="{4AF74A3F-7DDF-4BAC-8116-E32C06B2F2CC}" destId="{87AADF7E-62D6-4428-9714-F8C6A8B78AFA}" srcOrd="1" destOrd="0" presId="urn:microsoft.com/office/officeart/2005/8/layout/bProcess3"/>
     <dgm:cxn modelId="{FBC47275-6E52-4518-B9C3-A01CA1F204D8}" type="presOf" srcId="{E5FC531C-8865-4E2F-A01F-40309BF4A491}" destId="{D058FE29-7F42-400C-A266-F0C72530FEA6}" srcOrd="1" destOrd="0" presId="urn:microsoft.com/office/officeart/2005/8/layout/bProcess3"/>
     <dgm:cxn modelId="{B48C5A82-F3B4-4A09-8C51-9CE26342DE78}" type="presOf" srcId="{4410F19C-9AF8-455E-BB49-82795D97D9E4}" destId="{4C1C69C1-DAA9-4E29-A4CE-7C992F91D42F}" srcOrd="0" destOrd="0" presId="urn:microsoft.com/office/officeart/2005/8/layout/bProcess3"/>
     <dgm:cxn modelId="{77661E93-7F63-43DB-8F70-F7627385C301}" type="presOf" srcId="{D1424278-B4BF-48FD-BD7F-43BB4198C45E}" destId="{1F977013-8D01-457C-BF74-0007130FF42E}" srcOrd="0" destOrd="0" presId="urn:microsoft.com/office/officeart/2005/8/layout/bProcess3"/>
@@ -4171,6 +4171,13 @@
     <dgm:cxn modelId="{000ABB37-BAF6-45B1-8186-AC4FD34DBD80}" srcId="{B175281C-178F-406D-AE70-093369BD641A}" destId="{FB71929B-753E-4653-8F45-3EEE374AE6CC}" srcOrd="1" destOrd="0" parTransId="{355D9102-6D06-4334-9432-0FFCE7877B70}" sibTransId="{EB7389E2-FAB5-49FD-A383-89550947F9C2}"/>
     <dgm:cxn modelId="{BDE1233A-EA55-459D-89DB-04BB83D384A2}" srcId="{09C3324E-9336-456E-85C7-91CB2EA69F76}" destId="{3A8EEFEE-64FF-4FD1-B643-DA629220C7A0}" srcOrd="0" destOrd="0" parTransId="{C33DDF5E-7E4D-4B95-9051-7E281DF817C1}" sibTransId="{98A38D5B-839E-4671-8170-06750DCCB21A}"/>
     <dgm:cxn modelId="{D113093B-AD6C-4670-B2F3-1EBAAEC8B48E}" srcId="{FB71929B-753E-4653-8F45-3EEE374AE6CC}" destId="{2F42A220-4910-4A31-8F84-5B28FDD5B4ED}" srcOrd="1" destOrd="0" parTransId="{72101D0B-1019-47B1-AA9E-0E38A8371E9F}" sibTransId="{74AA7E7F-8001-405A-A38C-864D01ECA733}"/>
+    <dgm:cxn modelId="{B897B14A-B026-454D-B323-DD3E7265C9CF}" type="presOf" srcId="{9069B342-234C-40F0-AE36-628784B96AD8}" destId="{C6B43F54-4DE6-48F5-9642-DDF69CEC676F}" srcOrd="1" destOrd="0" presId="urn:microsoft.com/office/officeart/2005/8/layout/orgChart1"/>
+    <dgm:cxn modelId="{52CBBD4D-B38A-4DCF-B07A-4CA21413E486}" type="presOf" srcId="{56CA2637-857C-4119-909B-76EA4272DD32}" destId="{A3155A5E-C74C-45B8-BBAE-ABF4C6A45D9F}" srcOrd="1" destOrd="0" presId="urn:microsoft.com/office/officeart/2005/8/layout/orgChart1"/>
+    <dgm:cxn modelId="{8927314E-49D5-4262-9BCE-1A9128D3ED66}" type="presOf" srcId="{9B9D410A-7A9A-416A-9F12-E2403D566ED3}" destId="{F0CDD765-D3BE-43BD-9B4F-67B17C436B43}" srcOrd="1" destOrd="0" presId="urn:microsoft.com/office/officeart/2005/8/layout/orgChart1"/>
+    <dgm:cxn modelId="{E630674E-C191-4EFB-A961-2AB453DA9A89}" type="presOf" srcId="{5A2054A7-EB01-404C-8751-ECB80EEF1ECD}" destId="{479CF454-9913-4664-903D-C4C024A89E7E}" srcOrd="0" destOrd="0" presId="urn:microsoft.com/office/officeart/2005/8/layout/orgChart1"/>
+    <dgm:cxn modelId="{C7036C53-12A7-488F-AA58-F0EFD30403BD}" srcId="{302B97D2-1014-49D0-9622-B223F81CDC43}" destId="{662AA260-FF02-4DAA-AA13-5EB1D1CD32F4}" srcOrd="1" destOrd="0" parTransId="{5A2054A7-EB01-404C-8751-ECB80EEF1ECD}" sibTransId="{F60B1252-C61E-4CA2-AFB8-22DFE2C8862C}"/>
+    <dgm:cxn modelId="{94ABB353-2598-4A0E-A3E4-15A4B81CAF9D}" type="presOf" srcId="{2F42A220-4910-4A31-8F84-5B28FDD5B4ED}" destId="{E400B6D4-5308-4F14-B09D-5804E798C260}" srcOrd="1" destOrd="0" presId="urn:microsoft.com/office/officeart/2005/8/layout/orgChart1"/>
+    <dgm:cxn modelId="{717B2357-16AA-48E0-AF54-9E25FEB66530}" type="presOf" srcId="{6EFF71A3-F6C7-4247-902F-03F1906AF4B5}" destId="{9CC03CAF-0A94-43ED-9C9A-AD72549C7C3E}" srcOrd="0" destOrd="0" presId="urn:microsoft.com/office/officeart/2005/8/layout/orgChart1"/>
     <dgm:cxn modelId="{4016FC5D-0B0D-4D83-90F7-3678559BCB12}" srcId="{F9497423-7787-43BF-A1BE-F44991785509}" destId="{B2960507-5DFE-4AE5-8926-0C45FA5E9053}" srcOrd="0" destOrd="0" parTransId="{8A04D1E6-62FF-427D-86AA-376D0CF6B3B4}" sibTransId="{3987DF88-A0A3-45F4-B49E-FC33CC0B7CF7}"/>
     <dgm:cxn modelId="{3B280C60-47C0-42DA-B237-4AB51F409214}" type="presOf" srcId="{56CA2637-857C-4119-909B-76EA4272DD32}" destId="{542C40A6-7170-4C11-A121-34C6ADC5E028}" srcOrd="0" destOrd="0" presId="urn:microsoft.com/office/officeart/2005/8/layout/orgChart1"/>
     <dgm:cxn modelId="{82348E60-0A89-4CED-9399-C9FBD8814182}" type="presOf" srcId="{CE77F216-7BFD-42E5-A225-35A95FE271BF}" destId="{2CB542B1-2493-4BD2-9146-281EC2143D6E}" srcOrd="0" destOrd="0" presId="urn:microsoft.com/office/officeart/2005/8/layout/orgChart1"/>
@@ -4183,15 +4190,8 @@
     <dgm:cxn modelId="{F5841069-F754-4C2C-8660-431378262C03}" type="presOf" srcId="{50634887-9D04-441A-8E79-0541A92F607A}" destId="{14BE5F11-99D2-446B-9F4A-CE0AA1825208}" srcOrd="1" destOrd="0" presId="urn:microsoft.com/office/officeart/2005/8/layout/orgChart1"/>
     <dgm:cxn modelId="{C3F33B69-A906-41D4-857E-356E72AD4ED4}" srcId="{D82D1971-C486-4E87-8A15-F75DDF0E4844}" destId="{6C3C03FB-37C6-484E-9B68-076CC13622CD}" srcOrd="0" destOrd="0" parTransId="{A386C645-D06C-4261-AF7F-5AB4F14D4978}" sibTransId="{92E7E636-D32C-4AAB-B4CC-2FD64A546BB0}"/>
     <dgm:cxn modelId="{8AC2A06A-7C95-49FC-AAB3-CB0AA8B44B75}" srcId="{9069B342-234C-40F0-AE36-628784B96AD8}" destId="{17B2640D-4177-40D0-9CC6-F484AD058A4A}" srcOrd="0" destOrd="0" parTransId="{2975A251-6964-42E7-8375-87B8635C2199}" sibTransId="{E708A18D-A600-4DB1-A9F9-F21E5713C3A1}"/>
-    <dgm:cxn modelId="{B897B14A-B026-454D-B323-DD3E7265C9CF}" type="presOf" srcId="{9069B342-234C-40F0-AE36-628784B96AD8}" destId="{C6B43F54-4DE6-48F5-9642-DDF69CEC676F}" srcOrd="1" destOrd="0" presId="urn:microsoft.com/office/officeart/2005/8/layout/orgChart1"/>
-    <dgm:cxn modelId="{52CBBD4D-B38A-4DCF-B07A-4CA21413E486}" type="presOf" srcId="{56CA2637-857C-4119-909B-76EA4272DD32}" destId="{A3155A5E-C74C-45B8-BBAE-ABF4C6A45D9F}" srcOrd="1" destOrd="0" presId="urn:microsoft.com/office/officeart/2005/8/layout/orgChart1"/>
-    <dgm:cxn modelId="{8927314E-49D5-4262-9BCE-1A9128D3ED66}" type="presOf" srcId="{9B9D410A-7A9A-416A-9F12-E2403D566ED3}" destId="{F0CDD765-D3BE-43BD-9B4F-67B17C436B43}" srcOrd="1" destOrd="0" presId="urn:microsoft.com/office/officeart/2005/8/layout/orgChart1"/>
-    <dgm:cxn modelId="{E630674E-C191-4EFB-A961-2AB453DA9A89}" type="presOf" srcId="{5A2054A7-EB01-404C-8751-ECB80EEF1ECD}" destId="{479CF454-9913-4664-903D-C4C024A89E7E}" srcOrd="0" destOrd="0" presId="urn:microsoft.com/office/officeart/2005/8/layout/orgChart1"/>
     <dgm:cxn modelId="{B98A7972-B786-4B69-9E7E-BA53A690E9D0}" type="presOf" srcId="{A0589EB2-684A-4614-A8DB-97B038888ED3}" destId="{650D0449-0118-4ED5-8E28-07BC9FB831A8}" srcOrd="0" destOrd="0" presId="urn:microsoft.com/office/officeart/2005/8/layout/orgChart1"/>
-    <dgm:cxn modelId="{C7036C53-12A7-488F-AA58-F0EFD30403BD}" srcId="{302B97D2-1014-49D0-9622-B223F81CDC43}" destId="{662AA260-FF02-4DAA-AA13-5EB1D1CD32F4}" srcOrd="1" destOrd="0" parTransId="{5A2054A7-EB01-404C-8751-ECB80EEF1ECD}" sibTransId="{F60B1252-C61E-4CA2-AFB8-22DFE2C8862C}"/>
-    <dgm:cxn modelId="{94ABB353-2598-4A0E-A3E4-15A4B81CAF9D}" type="presOf" srcId="{2F42A220-4910-4A31-8F84-5B28FDD5B4ED}" destId="{E400B6D4-5308-4F14-B09D-5804E798C260}" srcOrd="1" destOrd="0" presId="urn:microsoft.com/office/officeart/2005/8/layout/orgChart1"/>
     <dgm:cxn modelId="{54C2F573-7CBC-4BCE-940F-283A49644961}" type="presOf" srcId="{09C3324E-9336-456E-85C7-91CB2EA69F76}" destId="{60021657-9451-477A-9A60-43EFCD73E3C6}" srcOrd="0" destOrd="0" presId="urn:microsoft.com/office/officeart/2005/8/layout/orgChart1"/>
-    <dgm:cxn modelId="{717B2357-16AA-48E0-AF54-9E25FEB66530}" type="presOf" srcId="{6EFF71A3-F6C7-4247-902F-03F1906AF4B5}" destId="{9CC03CAF-0A94-43ED-9C9A-AD72549C7C3E}" srcOrd="0" destOrd="0" presId="urn:microsoft.com/office/officeart/2005/8/layout/orgChart1"/>
     <dgm:cxn modelId="{A7041778-F461-4DFE-A6B5-07019907C326}" type="presOf" srcId="{B175281C-178F-406D-AE70-093369BD641A}" destId="{76CB79F9-F49D-4AE9-A7FD-239231C89790}" srcOrd="0" destOrd="0" presId="urn:microsoft.com/office/officeart/2005/8/layout/orgChart1"/>
     <dgm:cxn modelId="{1110397B-F1EA-44CE-9ABF-B5F830C74B4E}" type="presOf" srcId="{D82D1971-C486-4E87-8A15-F75DDF0E4844}" destId="{57D95651-A607-4454-AD5B-C4663C156726}" srcOrd="0" destOrd="0" presId="urn:microsoft.com/office/officeart/2005/8/layout/orgChart1"/>
     <dgm:cxn modelId="{F317587C-0A3A-4F9E-BB5C-797F6265CC63}" type="presOf" srcId="{10CD3D5C-FABB-4B36-8767-3BF69811C364}" destId="{938B9CA9-5A6D-42B0-94F7-33082A37F4E0}" srcOrd="1" destOrd="0" presId="urn:microsoft.com/office/officeart/2005/8/layout/orgChart1"/>
@@ -15356,7 +15356,7 @@
           <a:p>
             <a:fld id="{123CBCE9-0914-4950-A986-7596C92667F1}" type="datetime1">
               <a:rPr lang="en-US" smtClean="0"/>
-              <a:t>2/15/2022</a:t>
+              <a:t>2/16/22</a:t>
             </a:fld>
             <a:endParaRPr lang="en-US"/>
           </a:p>
@@ -19896,8 +19896,8 @@
           </a:p>
         </p:txBody>
       </p:sp>
-      <mc:AlternateContent xmlns:mc="http://schemas.openxmlformats.org/markup-compatibility/2006" xmlns:a14="http://schemas.microsoft.com/office/drawing/2010/main">
-        <mc:Choice Requires="a14">
+      <mc:AlternateContent xmlns:mc="http://schemas.openxmlformats.org/markup-compatibility/2006">
+        <mc:Choice xmlns:a14="http://schemas.microsoft.com/office/drawing/2010/main" Requires="a14">
           <p:sp>
             <p:nvSpPr>
               <p:cNvPr id="3" name="Text Placeholder 2">
@@ -20753,49 +20753,24 @@
                         </a:rPr>
                         <m:t>=</m:t>
                       </m:r>
-                      <m:sSup>
-                        <m:sSupPr>
+                      <m:d>
+                        <m:dPr>
                           <m:ctrlPr>
-                            <a:rPr lang="en-US" b="0" i="1" smtClean="0">
+                            <a:rPr lang="en-US" i="1">
                               <a:latin typeface="Cambria Math" panose="02040503050406030204" pitchFamily="18" charset="0"/>
                             </a:rPr>
                           </m:ctrlPr>
-                        </m:sSupPr>
+                        </m:dPr>
                         <m:e>
-                          <m:d>
-                            <m:dPr>
+                          <m:sSup>
+                            <m:sSupPr>
                               <m:ctrlPr>
                                 <a:rPr lang="en-US" i="1">
                                   <a:latin typeface="Cambria Math" panose="02040503050406030204" pitchFamily="18" charset="0"/>
                                 </a:rPr>
                               </m:ctrlPr>
-                            </m:dPr>
+                            </m:sSupPr>
                             <m:e>
-                              <m:sSup>
-                                <m:sSupPr>
-                                  <m:ctrlPr>
-                                    <a:rPr lang="en-US" i="1">
-                                      <a:latin typeface="Cambria Math" panose="02040503050406030204" pitchFamily="18" charset="0"/>
-                                    </a:rPr>
-                                  </m:ctrlPr>
-                                </m:sSupPr>
-                                <m:e>
-                                  <m:r>
-                                    <a:rPr lang="en-US" i="1">
-                                      <a:latin typeface="Cambria Math" panose="02040503050406030204" pitchFamily="18" charset="0"/>
-                                    </a:rPr>
-                                    <m:t>𝑋</m:t>
-                                  </m:r>
-                                </m:e>
-                                <m:sup>
-                                  <m:r>
-                                    <a:rPr lang="en-US" b="0" i="1" smtClean="0">
-                                      <a:latin typeface="Cambria Math" panose="02040503050406030204" pitchFamily="18" charset="0"/>
-                                    </a:rPr>
-                                    <m:t>′</m:t>
-                                  </m:r>
-                                </m:sup>
-                              </m:sSup>
                               <m:r>
                                 <a:rPr lang="en-US" i="1">
                                   <a:latin typeface="Cambria Math" panose="02040503050406030204" pitchFamily="18" charset="0"/>
@@ -20803,17 +20778,23 @@
                                 <m:t>𝑋</m:t>
                               </m:r>
                             </m:e>
-                          </m:d>
-                        </m:e>
-                        <m:sup>
+                            <m:sup>
+                              <m:r>
+                                <a:rPr lang="en-US" b="0" i="1" smtClean="0">
+                                  <a:latin typeface="Cambria Math" panose="02040503050406030204" pitchFamily="18" charset="0"/>
+                                </a:rPr>
+                                <m:t>𝑇</m:t>
+                              </m:r>
+                            </m:sup>
+                          </m:sSup>
                           <m:r>
-                            <a:rPr lang="en-US" b="0" i="1" smtClean="0">
+                            <a:rPr lang="en-US" i="1">
                               <a:latin typeface="Cambria Math" panose="02040503050406030204" pitchFamily="18" charset="0"/>
                             </a:rPr>
-                            <m:t>−1</m:t>
+                            <m:t>𝑋</m:t>
                           </m:r>
-                        </m:sup>
-                      </m:sSup>
+                        </m:e>
+                      </m:d>
                       <m:sSup>
                         <m:sSupPr>
                           <m:ctrlPr>
@@ -20835,7 +20816,7 @@
                             <a:rPr lang="en-US" b="0" i="1" smtClean="0">
                               <a:latin typeface="Cambria Math" panose="02040503050406030204" pitchFamily="18" charset="0"/>
                             </a:rPr>
-                            <m:t>′</m:t>
+                            <m:t>𝑇</m:t>
                           </m:r>
                         </m:sup>
                       </m:sSup>
@@ -20853,7 +20834,7 @@
             </p:txBody>
           </p:sp>
         </mc:Choice>
-        <mc:Fallback xmlns="">
+        <mc:Fallback>
           <p:sp>
             <p:nvSpPr>
               <p:cNvPr id="3" name="Text Placeholder 2">
@@ -20912,7 +20893,7 @@
         <p:spPr>
           <a:xfrm>
             <a:off x="4394200" y="371147"/>
-            <a:ext cx="3961341" cy="4401205"/>
+            <a:ext cx="4060727" cy="4401205"/>
           </a:xfrm>
           <a:prstGeom prst="rect">
             <a:avLst/>
@@ -22996,7 +22977,7 @@
           <a:graphicData uri="http://schemas.openxmlformats.org/presentationml/2006/ole">
             <mc:AlternateContent xmlns:mc="http://schemas.openxmlformats.org/markup-compatibility/2006">
               <mc:Choice xmlns:v="urn:schemas-microsoft-com:vml" Requires="v">
-                <p:oleObj spid="_x0000_s1136" name="Equation" r:id="rId3" imgW="1333440" imgH="457200" progId="Equation.3">
+                <p:oleObj spid="_x0000_s1140" name="Equation" r:id="rId3" imgW="1333440" imgH="457200" progId="Equation.3">
                   <p:embed/>
                 </p:oleObj>
               </mc:Choice>
@@ -23392,7 +23373,7 @@
           <a:graphicData uri="http://schemas.openxmlformats.org/presentationml/2006/ole">
             <mc:AlternateContent xmlns:mc="http://schemas.openxmlformats.org/markup-compatibility/2006">
               <mc:Choice xmlns:v="urn:schemas-microsoft-com:vml" Requires="v">
-                <p:oleObj spid="_x0000_s1137" name="Equation" r:id="rId5" imgW="1180800" imgH="431640" progId="Equation.3">
+                <p:oleObj spid="_x0000_s1141" name="Equation" r:id="rId5" imgW="1180800" imgH="431640" progId="Equation.3">
                   <p:embed/>
                 </p:oleObj>
               </mc:Choice>
@@ -23774,7 +23755,7 @@
           <a:graphicData uri="http://schemas.openxmlformats.org/presentationml/2006/ole">
             <mc:AlternateContent xmlns:mc="http://schemas.openxmlformats.org/markup-compatibility/2006">
               <mc:Choice xmlns:v="urn:schemas-microsoft-com:vml" Requires="v">
-                <p:oleObj spid="_x0000_s2160" name="Equation" r:id="rId3" imgW="1498320" imgH="482400" progId="Equation.3">
+                <p:oleObj spid="_x0000_s2164" name="Equation" r:id="rId3" imgW="1498320" imgH="482400" progId="Equation.3">
                   <p:embed/>
                 </p:oleObj>
               </mc:Choice>
@@ -23846,7 +23827,7 @@
           <a:graphicData uri="http://schemas.openxmlformats.org/presentationml/2006/ole">
             <mc:AlternateContent xmlns:mc="http://schemas.openxmlformats.org/markup-compatibility/2006">
               <mc:Choice xmlns:v="urn:schemas-microsoft-com:vml" Requires="v">
-                <p:oleObj spid="_x0000_s2161" name="Equation" r:id="rId5" imgW="1663560" imgH="444240" progId="Equation.3">
+                <p:oleObj spid="_x0000_s2165" name="Equation" r:id="rId5" imgW="1663560" imgH="444240" progId="Equation.3">
                   <p:embed/>
                 </p:oleObj>
               </mc:Choice>
@@ -30799,8 +30780,8 @@
           </a:p>
         </p:txBody>
       </p:sp>
-      <mc:AlternateContent xmlns:mc="http://schemas.openxmlformats.org/markup-compatibility/2006" xmlns:a14="http://schemas.microsoft.com/office/drawing/2010/main">
-        <mc:Choice Requires="a14">
+      <mc:AlternateContent xmlns:mc="http://schemas.openxmlformats.org/markup-compatibility/2006">
+        <mc:Choice xmlns:a14="http://schemas.microsoft.com/office/drawing/2010/main" Requires="a14">
           <p:sp>
             <p:nvSpPr>
               <p:cNvPr id="6" name="TextBox 5">
@@ -30815,8 +30796,8 @@
             </p:nvSpPr>
             <p:spPr>
               <a:xfrm>
-                <a:off x="3457452" y="534265"/>
-                <a:ext cx="5284498" cy="2396362"/>
+                <a:off x="3440954" y="300546"/>
+                <a:ext cx="5284498" cy="2611805"/>
               </a:xfrm>
               <a:prstGeom prst="rect">
                 <a:avLst/>
@@ -30859,10 +30840,145 @@
                 </a:pPr>
                 <a14:m>
                   <m:oMath xmlns:m="http://schemas.openxmlformats.org/officeDocument/2006/math">
+                    <m:r>
+                      <m:rPr>
+                        <m:sty m:val="p"/>
+                      </m:rPr>
+                      <a:rPr lang="en-US">
+                        <a:solidFill>
+                          <a:schemeClr val="tx1"/>
+                        </a:solidFill>
+                        <a:latin typeface="Cambria Math" panose="02040503050406030204" pitchFamily="18" charset="0"/>
+                        <a:ea typeface="Cambria Math" panose="02040503050406030204" pitchFamily="18" charset="0"/>
+                      </a:rPr>
+                      <m:t>SSError</m:t>
+                    </m:r>
+                    <m:r>
+                      <a:rPr lang="en-US" i="1">
+                        <a:solidFill>
+                          <a:schemeClr val="tx1"/>
+                        </a:solidFill>
+                        <a:latin typeface="Cambria Math" panose="02040503050406030204" pitchFamily="18" charset="0"/>
+                        <a:ea typeface="Cambria Math" panose="02040503050406030204" pitchFamily="18" charset="0"/>
+                      </a:rPr>
+                      <m:t>+(</m:t>
+                    </m:r>
+                    <m:r>
+                      <a:rPr lang="en-US" i="1">
+                        <a:solidFill>
+                          <a:schemeClr val="tx1"/>
+                        </a:solidFill>
+                        <a:latin typeface="Cambria Math" panose="02040503050406030204" pitchFamily="18" charset="0"/>
+                        <a:ea typeface="Cambria Math" panose="02040503050406030204" pitchFamily="18" charset="0"/>
+                      </a:rPr>
+                      <m:t>𝜆</m:t>
+                    </m:r>
+                    <m:r>
+                      <a:rPr lang="en-US" i="1">
+                        <a:solidFill>
+                          <a:schemeClr val="tx1"/>
+                        </a:solidFill>
+                        <a:latin typeface="Cambria Math" panose="02040503050406030204" pitchFamily="18" charset="0"/>
+                        <a:ea typeface="Cambria Math" panose="02040503050406030204" pitchFamily="18" charset="0"/>
+                      </a:rPr>
+                      <m:t> ×</m:t>
+                    </m:r>
+                    <m:d>
+                      <m:dPr>
+                        <m:begChr m:val="|"/>
+                        <m:endChr m:val="|"/>
+                        <m:ctrlPr>
+                          <a:rPr lang="en-US" i="1">
+                            <a:solidFill>
+                              <a:schemeClr val="tx1"/>
+                            </a:solidFill>
+                            <a:latin typeface="Cambria Math" panose="02040503050406030204" pitchFamily="18" charset="0"/>
+                            <a:ea typeface="Cambria Math" panose="02040503050406030204" pitchFamily="18" charset="0"/>
+                          </a:rPr>
+                        </m:ctrlPr>
+                      </m:dPr>
+                      <m:e>
+                        <m:r>
+                          <m:rPr>
+                            <m:sty m:val="p"/>
+                          </m:rPr>
+                          <a:rPr lang="en-US">
+                            <a:solidFill>
+                              <a:schemeClr val="tx1"/>
+                            </a:solidFill>
+                            <a:latin typeface="Cambria Math" panose="02040503050406030204" pitchFamily="18" charset="0"/>
+                            <a:ea typeface="Cambria Math" panose="02040503050406030204" pitchFamily="18" charset="0"/>
+                          </a:rPr>
+                          <m:t>slope</m:t>
+                        </m:r>
+                      </m:e>
+                    </m:d>
+                    <m:r>
+                      <a:rPr lang="en-US" i="1">
+                        <a:solidFill>
+                          <a:schemeClr val="tx1"/>
+                        </a:solidFill>
+                        <a:latin typeface="Cambria Math" panose="02040503050406030204" pitchFamily="18" charset="0"/>
+                        <a:ea typeface="Cambria Math" panose="02040503050406030204" pitchFamily="18" charset="0"/>
+                      </a:rPr>
+                      <m:t>)</m:t>
+                    </m:r>
+                  </m:oMath>
+                </a14:m>
+                <a:endParaRPr lang="en-US" dirty="0"/>
+              </a:p>
+              <a:p>
+                <a:pPr marL="285750" indent="-285750">
+                  <a:buFont typeface="Arial" panose="020B0604020202020204" pitchFamily="34" charset="0"/>
+                  <a:buChar char="•"/>
+                </a:pPr>
+                <a:endParaRPr lang="en-US" dirty="0"/>
+              </a:p>
+              <a:p>
+                <a:r>
+                  <a:rPr lang="en-US" dirty="0"/>
+                  <a:t>Ridge Regression (a.k.a. Weight Decay)</a:t>
+                </a:r>
+              </a:p>
+              <a:p>
+                <a:pPr marL="285750" indent="-285750">
+                  <a:buFont typeface="Arial" panose="020B0604020202020204" pitchFamily="34" charset="0"/>
+                  <a:buChar char="•"/>
+                </a:pPr>
+                <a:r>
+                  <a:rPr lang="en-US" dirty="0"/>
+                  <a:t>Most commonly used.</a:t>
+                </a:r>
+              </a:p>
+              <a:p>
+                <a:pPr marL="285750" indent="-285750">
+                  <a:buFont typeface="Arial" panose="020B0604020202020204" pitchFamily="34" charset="0"/>
+                  <a:buChar char="•"/>
+                </a:pPr>
+                <a:r>
+                  <a:rPr lang="en-US" dirty="0"/>
+                  <a:t>Based on L</a:t>
+                </a:r>
+                <a:r>
+                  <a:rPr lang="en-US" baseline="-25000" dirty="0"/>
+                  <a:t>2</a:t>
+                </a:r>
+                <a:r>
+                  <a:rPr lang="en-US" dirty="0"/>
+                  <a:t> distance (Euclidean distance)</a:t>
+                </a:r>
+              </a:p>
+              <a:p>
+                <a:pPr marL="285750" indent="-285750">
+                  <a:buFont typeface="Arial" panose="020B0604020202020204" pitchFamily="34" charset="0"/>
+                  <a:buChar char="•"/>
+                </a:pPr>
+                <a14:m>
+                  <m:oMath xmlns:m="http://schemas.openxmlformats.org/officeDocument/2006/math">
                     <m:func>
                       <m:funcPr>
                         <m:ctrlPr>
-                          <a:rPr lang="en-US" b="0" i="1" smtClean="0">
+                          <a:rPr lang="en-US" i="1">
                             <a:latin typeface="Cambria Math" panose="02040503050406030204" pitchFamily="18" charset="0"/>
                           </a:rPr>
                         </m:ctrlPr>
@@ -30871,7 +30987,7 @@
                         <m:limLow>
                           <m:limLowPr>
                             <m:ctrlPr>
-                              <a:rPr lang="en-US" b="0" i="1" smtClean="0">
+                              <a:rPr lang="en-US" i="1">
                                 <a:latin typeface="Cambria Math" panose="02040503050406030204" pitchFamily="18" charset="0"/>
                               </a:rPr>
                             </m:ctrlPr>
@@ -30881,7 +30997,7 @@
                               <m:rPr>
                                 <m:sty m:val="p"/>
                               </m:rPr>
-                              <a:rPr lang="en-US" b="0" i="0" smtClean="0">
+                              <a:rPr lang="en-US">
                                 <a:latin typeface="Cambria Math" panose="02040503050406030204" pitchFamily="18" charset="0"/>
                               </a:rPr>
                               <m:t>min</m:t>
@@ -30889,14 +31005,14 @@
                           </m:e>
                           <m:lim>
                             <m:r>
-                              <a:rPr lang="en-US" b="0" i="1" smtClean="0">
+                              <a:rPr lang="en-US" i="1">
                                 <a:latin typeface="Cambria Math" panose="02040503050406030204" pitchFamily="18" charset="0"/>
                                 <a:ea typeface="Cambria Math" panose="02040503050406030204" pitchFamily="18" charset="0"/>
                               </a:rPr>
                               <m:t>𝛽</m:t>
                             </m:r>
                             <m:r>
-                              <a:rPr lang="en-US" b="0" i="1" smtClean="0">
+                              <a:rPr lang="en-US" i="1">
                                 <a:latin typeface="Cambria Math" panose="02040503050406030204" pitchFamily="18" charset="0"/>
                                 <a:ea typeface="Cambria Math" panose="02040503050406030204" pitchFamily="18" charset="0"/>
                               </a:rPr>
@@ -30905,7 +31021,7 @@
                             <m:sSub>
                               <m:sSubPr>
                                 <m:ctrlPr>
-                                  <a:rPr lang="en-US" b="0" i="1" smtClean="0">
+                                  <a:rPr lang="en-US" i="1">
                                     <a:latin typeface="Cambria Math" panose="02040503050406030204" pitchFamily="18" charset="0"/>
                                     <a:ea typeface="Cambria Math" panose="02040503050406030204" pitchFamily="18" charset="0"/>
                                   </a:rPr>
@@ -30913,7 +31029,7 @@
                               </m:sSubPr>
                               <m:e>
                                 <m:r>
-                                  <a:rPr lang="en-US" b="0" i="1" smtClean="0">
+                                  <a:rPr lang="en-US" i="1">
                                     <a:latin typeface="Cambria Math" panose="02040503050406030204" pitchFamily="18" charset="0"/>
                                     <a:ea typeface="Cambria Math" panose="02040503050406030204" pitchFamily="18" charset="0"/>
                                   </a:rPr>
@@ -30922,7 +31038,7 @@
                               </m:e>
                               <m:sub>
                                 <m:r>
-                                  <a:rPr lang="en-US" b="0" i="1" smtClean="0">
+                                  <a:rPr lang="en-US" i="1">
                                     <a:latin typeface="Cambria Math" panose="02040503050406030204" pitchFamily="18" charset="0"/>
                                     <a:ea typeface="Cambria Math" panose="02040503050406030204" pitchFamily="18" charset="0"/>
                                   </a:rPr>
@@ -30955,7 +31071,7 @@
                               </m:fPr>
                               <m:num>
                                 <m:r>
-                                  <a:rPr lang="en-US" b="0" i="1" smtClean="0">
+                                  <a:rPr lang="en-US" i="1">
                                     <a:latin typeface="Cambria Math" panose="02040503050406030204" pitchFamily="18" charset="0"/>
                                   </a:rPr>
                                   <m:t>1</m:t>
@@ -30963,7 +31079,7 @@
                               </m:num>
                               <m:den>
                                 <m:r>
-                                  <a:rPr lang="en-US" b="0" i="1" smtClean="0">
+                                  <a:rPr lang="en-US" i="1">
                                     <a:latin typeface="Cambria Math" panose="02040503050406030204" pitchFamily="18" charset="0"/>
                                   </a:rPr>
                                   <m:t>𝑁</m:t>
@@ -30974,7 +31090,7 @@
                               <m:naryPr>
                                 <m:chr m:val="∑"/>
                                 <m:ctrlPr>
-                                  <a:rPr lang="en-US" i="1" smtClean="0">
+                                  <a:rPr lang="en-US" i="1">
                                     <a:latin typeface="Cambria Math" panose="02040503050406030204" pitchFamily="18" charset="0"/>
                                   </a:rPr>
                                 </m:ctrlPr>
@@ -30984,13 +31100,13 @@
                                   <m:rPr>
                                     <m:brk m:alnAt="23"/>
                                   </m:rPr>
-                                  <a:rPr lang="en-US" b="0" i="1" smtClean="0">
+                                  <a:rPr lang="en-US" i="1">
                                     <a:latin typeface="Cambria Math" panose="02040503050406030204" pitchFamily="18" charset="0"/>
                                   </a:rPr>
                                   <m:t>𝑖</m:t>
                                 </m:r>
                                 <m:r>
-                                  <a:rPr lang="en-US" b="0" i="1" smtClean="0">
+                                  <a:rPr lang="en-US" i="1">
                                     <a:latin typeface="Cambria Math" panose="02040503050406030204" pitchFamily="18" charset="0"/>
                                   </a:rPr>
                                   <m:t>=1</m:t>
@@ -30998,7 +31114,7 @@
                               </m:sub>
                               <m:sup>
                                 <m:r>
-                                  <a:rPr lang="en-US" b="0" i="1" smtClean="0">
+                                  <a:rPr lang="en-US" i="1">
                                     <a:latin typeface="Cambria Math" panose="02040503050406030204" pitchFamily="18" charset="0"/>
                                   </a:rPr>
                                   <m:t>𝑁</m:t>
@@ -31008,7 +31124,7 @@
                                 <m:sSup>
                                   <m:sSupPr>
                                     <m:ctrlPr>
-                                      <a:rPr lang="en-US" i="1" smtClean="0">
+                                      <a:rPr lang="en-US" i="1">
                                         <a:latin typeface="Cambria Math" panose="02040503050406030204" pitchFamily="18" charset="0"/>
                                       </a:rPr>
                                     </m:ctrlPr>
@@ -31131,7 +31247,7 @@
                                   </m:e>
                                   <m:sup>
                                     <m:r>
-                                      <a:rPr lang="en-US" b="0" i="1" smtClean="0">
+                                      <a:rPr lang="en-US" i="1">
                                         <a:latin typeface="Cambria Math" panose="02040503050406030204" pitchFamily="18" charset="0"/>
                                       </a:rPr>
                                       <m:t>2</m:t>
@@ -31155,7 +31271,7 @@
                     <m:sSup>
                       <m:sSupPr>
                         <m:ctrlPr>
-                          <a:rPr lang="en-US" i="1" smtClean="0">
+                          <a:rPr lang="en-US" i="1">
                             <a:latin typeface="Cambria Math" panose="02040503050406030204" pitchFamily="18" charset="0"/>
                           </a:rPr>
                         </m:ctrlPr>
@@ -31237,7 +31353,7 @@
                                   </m:e>
                                   <m:sup>
                                     <m:r>
-                                      <a:rPr lang="en-US" b="0" i="1" smtClean="0">
+                                      <a:rPr lang="en-US" i="1">
                                         <a:latin typeface="Cambria Math" panose="02040503050406030204" pitchFamily="18" charset="0"/>
                                         <a:ea typeface="Cambria Math" panose="02040503050406030204" pitchFamily="18" charset="0"/>
                                       </a:rPr>
@@ -31252,13 +31368,13 @@
                       </m:e>
                       <m:sup>
                         <m:r>
-                          <a:rPr lang="en-US" b="0" i="1" smtClean="0">
+                          <a:rPr lang="en-US" i="1">
                             <a:latin typeface="Cambria Math" panose="02040503050406030204" pitchFamily="18" charset="0"/>
                           </a:rPr>
                           <m:t>1/</m:t>
                         </m:r>
                         <m:r>
-                          <a:rPr lang="en-US" b="0" i="1" smtClean="0">
+                          <a:rPr lang="en-US" i="1">
                             <a:latin typeface="Cambria Math" panose="02040503050406030204" pitchFamily="18" charset="0"/>
                           </a:rPr>
                           <m:t>𝑝</m:t>
@@ -31282,168 +31398,7 @@
                       <m:rPr>
                         <m:sty m:val="p"/>
                       </m:rPr>
-                      <a:rPr lang="en-US" b="0" i="0" smtClean="0">
-                        <a:solidFill>
-                          <a:schemeClr val="tx1"/>
-                        </a:solidFill>
-                        <a:latin typeface="Cambria Math" panose="02040503050406030204" pitchFamily="18" charset="0"/>
-                        <a:ea typeface="Cambria Math" panose="02040503050406030204" pitchFamily="18" charset="0"/>
-                      </a:rPr>
-                      <m:t>SSError</m:t>
-                    </m:r>
-                    <m:r>
-                      <a:rPr lang="en-US" b="0" i="1" smtClean="0">
-                        <a:solidFill>
-                          <a:schemeClr val="tx1"/>
-                        </a:solidFill>
-                        <a:latin typeface="Cambria Math" panose="02040503050406030204" pitchFamily="18" charset="0"/>
-                        <a:ea typeface="Cambria Math" panose="02040503050406030204" pitchFamily="18" charset="0"/>
-                      </a:rPr>
-                      <m:t>+(</m:t>
-                    </m:r>
-                    <m:r>
-                      <a:rPr lang="en-US" b="0" i="1" smtClean="0">
-                        <a:solidFill>
-                          <a:schemeClr val="tx1"/>
-                        </a:solidFill>
-                        <a:latin typeface="Cambria Math" panose="02040503050406030204" pitchFamily="18" charset="0"/>
-                        <a:ea typeface="Cambria Math" panose="02040503050406030204" pitchFamily="18" charset="0"/>
-                      </a:rPr>
-                      <m:t>𝜆</m:t>
-                    </m:r>
-                    <m:r>
-                      <a:rPr lang="en-US" b="0" i="1" smtClean="0">
-                        <a:solidFill>
-                          <a:schemeClr val="tx1"/>
-                        </a:solidFill>
-                        <a:latin typeface="Cambria Math" panose="02040503050406030204" pitchFamily="18" charset="0"/>
-                        <a:ea typeface="Cambria Math" panose="02040503050406030204" pitchFamily="18" charset="0"/>
-                      </a:rPr>
-                      <m:t> ×</m:t>
-                    </m:r>
-                    <m:sSup>
-                      <m:sSupPr>
-                        <m:ctrlPr>
-                          <a:rPr lang="en-US" b="0" i="1" smtClean="0">
-                            <a:solidFill>
-                              <a:schemeClr val="tx1"/>
-                            </a:solidFill>
-                            <a:latin typeface="Cambria Math" panose="02040503050406030204" pitchFamily="18" charset="0"/>
-                            <a:ea typeface="Cambria Math" panose="02040503050406030204" pitchFamily="18" charset="0"/>
-                          </a:rPr>
-                        </m:ctrlPr>
-                      </m:sSupPr>
-                      <m:e>
-                        <m:r>
-                          <a:rPr lang="en-US" b="0" i="0" smtClean="0">
-                            <a:solidFill>
-                              <a:schemeClr val="tx1"/>
-                            </a:solidFill>
-                            <a:latin typeface="Cambria Math" panose="02040503050406030204" pitchFamily="18" charset="0"/>
-                            <a:ea typeface="Cambria Math" panose="02040503050406030204" pitchFamily="18" charset="0"/>
-                          </a:rPr>
-                          <m:t> </m:t>
-                        </m:r>
-                        <m:r>
-                          <m:rPr>
-                            <m:sty m:val="p"/>
-                          </m:rPr>
-                          <a:rPr lang="en-US" b="0" i="0" smtClean="0">
-                            <a:solidFill>
-                              <a:schemeClr val="tx1"/>
-                            </a:solidFill>
-                            <a:latin typeface="Cambria Math" panose="02040503050406030204" pitchFamily="18" charset="0"/>
-                            <a:ea typeface="Cambria Math" panose="02040503050406030204" pitchFamily="18" charset="0"/>
-                          </a:rPr>
-                          <m:t>slope</m:t>
-                        </m:r>
-                      </m:e>
-                      <m:sup>
-                        <m:r>
-                          <a:rPr lang="en-US" b="0" i="1" smtClean="0">
-                            <a:solidFill>
-                              <a:schemeClr val="tx1"/>
-                            </a:solidFill>
-                            <a:latin typeface="Cambria Math" panose="02040503050406030204" pitchFamily="18" charset="0"/>
-                            <a:ea typeface="Cambria Math" panose="02040503050406030204" pitchFamily="18" charset="0"/>
-                          </a:rPr>
-                          <m:t>2</m:t>
-                        </m:r>
-                      </m:sup>
-                    </m:sSup>
-                    <m:r>
-                      <a:rPr lang="en-US" b="0" i="1" smtClean="0">
-                        <a:solidFill>
-                          <a:schemeClr val="tx1"/>
-                        </a:solidFill>
-                        <a:latin typeface="Cambria Math" panose="02040503050406030204" pitchFamily="18" charset="0"/>
-                        <a:ea typeface="Cambria Math" panose="02040503050406030204" pitchFamily="18" charset="0"/>
-                      </a:rPr>
-                      <m:t>)</m:t>
-                    </m:r>
-                  </m:oMath>
-                </a14:m>
-                <a:endParaRPr lang="en-US" i="1" dirty="0">
-                  <a:solidFill>
-                    <a:schemeClr val="tx1"/>
-                  </a:solidFill>
-                  <a:latin typeface="Cambria Math" panose="02040503050406030204" pitchFamily="18" charset="0"/>
-                  <a:ea typeface="Cambria Math" panose="02040503050406030204" pitchFamily="18" charset="0"/>
-                </a:endParaRPr>
-              </a:p>
-              <a:p>
-                <a:pPr marL="285750" indent="-285750">
-                  <a:buFont typeface="Arial" panose="020B0604020202020204" pitchFamily="34" charset="0"/>
-                  <a:buChar char="•"/>
-                </a:pPr>
-                <a:endParaRPr lang="en-US" dirty="0"/>
-              </a:p>
-              <a:p>
-                <a:r>
-                  <a:rPr lang="en-US" dirty="0"/>
-                  <a:t>Ridge Regression (a.k.a. Weight Decay)</a:t>
-                </a:r>
-              </a:p>
-              <a:p>
-                <a:pPr marL="285750" indent="-285750">
-                  <a:buFont typeface="Arial" panose="020B0604020202020204" pitchFamily="34" charset="0"/>
-                  <a:buChar char="•"/>
-                </a:pPr>
-                <a:r>
-                  <a:rPr lang="en-US" dirty="0"/>
-                  <a:t>Most commonly used.</a:t>
-                </a:r>
-              </a:p>
-              <a:p>
-                <a:pPr marL="285750" indent="-285750">
-                  <a:buFont typeface="Arial" panose="020B0604020202020204" pitchFamily="34" charset="0"/>
-                  <a:buChar char="•"/>
-                </a:pPr>
-                <a:r>
-                  <a:rPr lang="en-US" dirty="0"/>
-                  <a:t>Based on L</a:t>
-                </a:r>
-                <a:r>
-                  <a:rPr lang="en-US" baseline="-25000" dirty="0"/>
-                  <a:t>2</a:t>
-                </a:r>
-                <a:r>
-                  <a:rPr lang="en-US" dirty="0"/>
-                  <a:t> distance (Euclidean distance)</a:t>
-                </a:r>
-              </a:p>
-              <a:p>
-                <a:pPr marL="285750" indent="-285750">
-                  <a:buFont typeface="Arial" panose="020B0604020202020204" pitchFamily="34" charset="0"/>
-                  <a:buChar char="•"/>
-                </a:pPr>
-                <a14:m>
-                  <m:oMath xmlns:m="http://schemas.openxmlformats.org/officeDocument/2006/math">
-                    <m:r>
-                      <m:rPr>
-                        <m:sty m:val="p"/>
-                      </m:rPr>
-                      <a:rPr lang="en-US" smtClean="0">
+                      <a:rPr lang="en-US">
                         <a:solidFill>
                           <a:schemeClr val="tx1"/>
                         </a:solidFill>
@@ -31482,12 +31437,10 @@
                       </a:rPr>
                       <m:t> ×</m:t>
                     </m:r>
-                    <m:d>
-                      <m:dPr>
-                        <m:begChr m:val="|"/>
-                        <m:endChr m:val="|"/>
+                    <m:sSup>
+                      <m:sSupPr>
                         <m:ctrlPr>
-                          <a:rPr lang="en-US" i="1" smtClean="0">
+                          <a:rPr lang="en-US" i="1">
                             <a:solidFill>
                               <a:schemeClr val="tx1"/>
                             </a:solidFill>
@@ -31495,13 +31448,23 @@
                             <a:ea typeface="Cambria Math" panose="02040503050406030204" pitchFamily="18" charset="0"/>
                           </a:rPr>
                         </m:ctrlPr>
-                      </m:dPr>
+                      </m:sSupPr>
                       <m:e>
+                        <m:r>
+                          <a:rPr lang="en-US">
+                            <a:solidFill>
+                              <a:schemeClr val="tx1"/>
+                            </a:solidFill>
+                            <a:latin typeface="Cambria Math" panose="02040503050406030204" pitchFamily="18" charset="0"/>
+                            <a:ea typeface="Cambria Math" panose="02040503050406030204" pitchFamily="18" charset="0"/>
+                          </a:rPr>
+                          <m:t> </m:t>
+                        </m:r>
                         <m:r>
                           <m:rPr>
                             <m:sty m:val="p"/>
                           </m:rPr>
-                          <a:rPr lang="en-US" b="0" i="0" smtClean="0">
+                          <a:rPr lang="en-US">
                             <a:solidFill>
                               <a:schemeClr val="tx1"/>
                             </a:solidFill>
@@ -31511,7 +31474,19 @@
                           <m:t>slope</m:t>
                         </m:r>
                       </m:e>
-                    </m:d>
+                      <m:sup>
+                        <m:r>
+                          <a:rPr lang="en-US" i="1">
+                            <a:solidFill>
+                              <a:schemeClr val="tx1"/>
+                            </a:solidFill>
+                            <a:latin typeface="Cambria Math" panose="02040503050406030204" pitchFamily="18" charset="0"/>
+                            <a:ea typeface="Cambria Math" panose="02040503050406030204" pitchFamily="18" charset="0"/>
+                          </a:rPr>
+                          <m:t>2</m:t>
+                        </m:r>
+                      </m:sup>
+                    </m:sSup>
                     <m:r>
                       <a:rPr lang="en-US" i="1">
                         <a:solidFill>
@@ -31537,12 +31512,25 @@
                   <a:buFont typeface="Arial" panose="020B0604020202020204" pitchFamily="34" charset="0"/>
                   <a:buChar char="•"/>
                 </a:pPr>
+                <a:endParaRPr lang="en-US" i="1" dirty="0">
+                  <a:solidFill>
+                    <a:schemeClr val="tx1"/>
+                  </a:solidFill>
+                  <a:latin typeface="Cambria Math" panose="02040503050406030204" pitchFamily="18" charset="0"/>
+                  <a:ea typeface="Cambria Math" panose="02040503050406030204" pitchFamily="18" charset="0"/>
+                </a:endParaRPr>
+              </a:p>
+              <a:p>
+                <a:pPr marL="285750" indent="-285750">
+                  <a:buFont typeface="Arial" panose="020B0604020202020204" pitchFamily="34" charset="0"/>
+                  <a:buChar char="•"/>
+                </a:pPr>
                 <a:endParaRPr lang="en-US" dirty="0"/>
               </a:p>
             </p:txBody>
           </p:sp>
         </mc:Choice>
-        <mc:Fallback xmlns="">
+        <mc:Fallback>
           <p:sp>
             <p:nvSpPr>
               <p:cNvPr id="6" name="TextBox 5">
@@ -31559,8 +31547,8 @@
             </p:nvSpPr>
             <p:spPr>
               <a:xfrm>
-                <a:off x="3457452" y="534265"/>
-                <a:ext cx="5284498" cy="2396362"/>
+                <a:off x="3440954" y="300546"/>
+                <a:ext cx="5284498" cy="2611805"/>
               </a:xfrm>
               <a:prstGeom prst="rect">
                 <a:avLst/>
@@ -31568,7 +31556,7 @@
               <a:blipFill>
                 <a:blip r:embed="rId9"/>
                 <a:stretch>
-                  <a:fillRect l="-240"/>
+                  <a:fillRect l="-240" t="-483"/>
                 </a:stretch>
               </a:blipFill>
             </p:spPr>

</xml_diff>